<commit_message>
crud completo de todo
</commit_message>
<xml_diff>
--- a/base datos/TEMPLATE 2021.pptx
+++ b/base datos/TEMPLATE 2021.pptx
@@ -5,16 +5,19 @@
     <p:sldMasterId id="2147483648" r:id="rId4"/>
   </p:sldMasterIdLst>
   <p:notesMasterIdLst>
-    <p:notesMasterId r:id="rId9"/>
+    <p:notesMasterId r:id="rId12"/>
   </p:notesMasterIdLst>
   <p:handoutMasterIdLst>
-    <p:handoutMasterId r:id="rId10"/>
+    <p:handoutMasterId r:id="rId13"/>
   </p:handoutMasterIdLst>
   <p:sldIdLst>
     <p:sldId id="269" r:id="rId5"/>
     <p:sldId id="272" r:id="rId6"/>
     <p:sldId id="273" r:id="rId7"/>
     <p:sldId id="259" r:id="rId8"/>
+    <p:sldId id="274" r:id="rId9"/>
+    <p:sldId id="277" r:id="rId10"/>
+    <p:sldId id="276" r:id="rId11"/>
   </p:sldIdLst>
   <p:sldSz cx="12192000" cy="6858000"/>
   <p:notesSz cx="6858000" cy="9144000"/>
@@ -162,7 +165,7 @@
           <p:cNvPr id="2" name="Header Placeholder 1">
             <a:extLst>
               <a:ext uri="{FF2B5EF4-FFF2-40B4-BE49-F238E27FC236}">
-                <a16:creationId xmlns="" xmlns:a16="http://schemas.microsoft.com/office/drawing/2014/main" id="{5A9E02AD-574F-46B1-91CF-758ECD927212}"/>
+                <a16:creationId xmlns:a16="http://schemas.microsoft.com/office/drawing/2014/main" xmlns="" id="{5A9E02AD-574F-46B1-91CF-758ECD927212}"/>
               </a:ext>
             </a:extLst>
           </p:cNvPr>
@@ -199,7 +202,7 @@
           <p:cNvPr id="3" name="Date Placeholder 2">
             <a:extLst>
               <a:ext uri="{FF2B5EF4-FFF2-40B4-BE49-F238E27FC236}">
-                <a16:creationId xmlns="" xmlns:a16="http://schemas.microsoft.com/office/drawing/2014/main" id="{0DCDBB3E-0962-4543-8203-0E0084580CE0}"/>
+                <a16:creationId xmlns:a16="http://schemas.microsoft.com/office/drawing/2014/main" xmlns="" id="{0DCDBB3E-0962-4543-8203-0E0084580CE0}"/>
               </a:ext>
             </a:extLst>
           </p:cNvPr>
@@ -229,7 +232,7 @@
           <a:p>
             <a:fld id="{F702A5B2-8064-4382-9E31-9E46E0F5B2C3}" type="datetimeFigureOut">
               <a:rPr lang="ru-RU" smtClean="0"/>
-              <a:t>25.02.2022</a:t>
+              <a:t>03.03.2022</a:t>
             </a:fld>
             <a:endParaRPr lang="ru-RU"/>
           </a:p>
@@ -240,7 +243,7 @@
           <p:cNvPr id="4" name="Footer Placeholder 3">
             <a:extLst>
               <a:ext uri="{FF2B5EF4-FFF2-40B4-BE49-F238E27FC236}">
-                <a16:creationId xmlns="" xmlns:a16="http://schemas.microsoft.com/office/drawing/2014/main" id="{DD61A4A7-FC01-4444-9707-74E93BD63497}"/>
+                <a16:creationId xmlns:a16="http://schemas.microsoft.com/office/drawing/2014/main" xmlns="" id="{DD61A4A7-FC01-4444-9707-74E93BD63497}"/>
               </a:ext>
             </a:extLst>
           </p:cNvPr>
@@ -277,7 +280,7 @@
           <p:cNvPr id="5" name="Slide Number Placeholder 4">
             <a:extLst>
               <a:ext uri="{FF2B5EF4-FFF2-40B4-BE49-F238E27FC236}">
-                <a16:creationId xmlns="" xmlns:a16="http://schemas.microsoft.com/office/drawing/2014/main" id="{B28D65D7-8813-49CE-A8BE-42984C5CBDA7}"/>
+                <a16:creationId xmlns:a16="http://schemas.microsoft.com/office/drawing/2014/main" xmlns="" id="{B28D65D7-8813-49CE-A8BE-42984C5CBDA7}"/>
               </a:ext>
             </a:extLst>
           </p:cNvPr>
@@ -406,7 +409,7 @@
           <a:p>
             <a:fld id="{7000EB3D-2307-4317-8A1D-B47FA45245F0}" type="datetimeFigureOut">
               <a:rPr lang="ru-RU" smtClean="0"/>
-              <a:t>25.02.2022</a:t>
+              <a:t>03.03.2022</a:t>
             </a:fld>
             <a:endParaRPr lang="ru-RU" dirty="0"/>
           </a:p>
@@ -696,7 +699,7 @@
           <p:cNvPr id="2" name="Title 1">
             <a:extLst>
               <a:ext uri="{FF2B5EF4-FFF2-40B4-BE49-F238E27FC236}">
-                <a16:creationId xmlns="" xmlns:a16="http://schemas.microsoft.com/office/drawing/2014/main" id="{199AD403-A15F-4A2F-B050-AB874136E732}"/>
+                <a16:creationId xmlns:a16="http://schemas.microsoft.com/office/drawing/2014/main" xmlns="" id="{199AD403-A15F-4A2F-B050-AB874136E732}"/>
               </a:ext>
             </a:extLst>
           </p:cNvPr>
@@ -743,7 +746,7 @@
           <p:cNvPr id="23" name="Text Placeholder 26">
             <a:extLst>
               <a:ext uri="{FF2B5EF4-FFF2-40B4-BE49-F238E27FC236}">
-                <a16:creationId xmlns="" xmlns:a16="http://schemas.microsoft.com/office/drawing/2014/main" id="{5BB088E3-63C1-423F-A939-150B8E1F87A7}"/>
+                <a16:creationId xmlns:a16="http://schemas.microsoft.com/office/drawing/2014/main" xmlns="" id="{5BB088E3-63C1-423F-A939-150B8E1F87A7}"/>
               </a:ext>
             </a:extLst>
           </p:cNvPr>
@@ -812,7 +815,7 @@
           <p:cNvPr id="28" name="Freeform: Shape 27">
             <a:extLst>
               <a:ext uri="{FF2B5EF4-FFF2-40B4-BE49-F238E27FC236}">
-                <a16:creationId xmlns="" xmlns:a16="http://schemas.microsoft.com/office/drawing/2014/main" id="{87A7AFAC-3F6D-48D1-A100-148792529BC6}"/>
+                <a16:creationId xmlns:a16="http://schemas.microsoft.com/office/drawing/2014/main" xmlns="" id="{87A7AFAC-3F6D-48D1-A100-148792529BC6}"/>
               </a:ext>
             </a:extLst>
           </p:cNvPr>
@@ -910,7 +913,7 @@
           <p:cNvPr id="29" name="Freeform: Shape 28">
             <a:extLst>
               <a:ext uri="{FF2B5EF4-FFF2-40B4-BE49-F238E27FC236}">
-                <a16:creationId xmlns="" xmlns:a16="http://schemas.microsoft.com/office/drawing/2014/main" id="{81A4F88F-4E35-4BB3-AD24-CAC580C12F96}"/>
+                <a16:creationId xmlns:a16="http://schemas.microsoft.com/office/drawing/2014/main" xmlns="" id="{81A4F88F-4E35-4BB3-AD24-CAC580C12F96}"/>
               </a:ext>
             </a:extLst>
           </p:cNvPr>
@@ -1018,7 +1021,7 @@
           <p:cNvPr id="30" name="Freeform: Shape 29">
             <a:extLst>
               <a:ext uri="{FF2B5EF4-FFF2-40B4-BE49-F238E27FC236}">
-                <a16:creationId xmlns="" xmlns:a16="http://schemas.microsoft.com/office/drawing/2014/main" id="{592CE00E-F2AB-4099-8BB8-F109C4F2EFDB}"/>
+                <a16:creationId xmlns:a16="http://schemas.microsoft.com/office/drawing/2014/main" xmlns="" id="{592CE00E-F2AB-4099-8BB8-F109C4F2EFDB}"/>
               </a:ext>
             </a:extLst>
           </p:cNvPr>
@@ -1128,7 +1131,7 @@
           <p:cNvPr id="33" name="Freeform: Shape 32">
             <a:extLst>
               <a:ext uri="{FF2B5EF4-FFF2-40B4-BE49-F238E27FC236}">
-                <a16:creationId xmlns="" xmlns:a16="http://schemas.microsoft.com/office/drawing/2014/main" id="{2DF8B751-9294-46D5-B390-5D322195540F}"/>
+                <a16:creationId xmlns:a16="http://schemas.microsoft.com/office/drawing/2014/main" xmlns="" id="{2DF8B751-9294-46D5-B390-5D322195540F}"/>
               </a:ext>
             </a:extLst>
           </p:cNvPr>
@@ -1239,7 +1242,7 @@
           <p:cNvPr id="34" name="Freeform: Shape 33">
             <a:extLst>
               <a:ext uri="{FF2B5EF4-FFF2-40B4-BE49-F238E27FC236}">
-                <a16:creationId xmlns="" xmlns:a16="http://schemas.microsoft.com/office/drawing/2014/main" id="{E0F651C6-BE74-4133-ABA8-316072D4F5B5}"/>
+                <a16:creationId xmlns:a16="http://schemas.microsoft.com/office/drawing/2014/main" xmlns="" id="{E0F651C6-BE74-4133-ABA8-316072D4F5B5}"/>
               </a:ext>
             </a:extLst>
           </p:cNvPr>
@@ -1451,7 +1454,7 @@
           <p:cNvPr id="36" name="Text Placeholder 14">
             <a:extLst>
               <a:ext uri="{FF2B5EF4-FFF2-40B4-BE49-F238E27FC236}">
-                <a16:creationId xmlns="" xmlns:a16="http://schemas.microsoft.com/office/drawing/2014/main" id="{2A3D73F7-77EC-4576-B541-20C032F462DC}"/>
+                <a16:creationId xmlns:a16="http://schemas.microsoft.com/office/drawing/2014/main" xmlns="" id="{2A3D73F7-77EC-4576-B541-20C032F462DC}"/>
               </a:ext>
             </a:extLst>
           </p:cNvPr>
@@ -1499,7 +1502,7 @@
           <p:cNvPr id="40" name="Graphic 37">
             <a:extLst>
               <a:ext uri="{FF2B5EF4-FFF2-40B4-BE49-F238E27FC236}">
-                <a16:creationId xmlns="" xmlns:a16="http://schemas.microsoft.com/office/drawing/2014/main" id="{9F75ED2D-7077-4753-B623-4B9A718EB224}"/>
+                <a16:creationId xmlns:a16="http://schemas.microsoft.com/office/drawing/2014/main" xmlns="" id="{9F75ED2D-7077-4753-B623-4B9A718EB224}"/>
               </a:ext>
             </a:extLst>
           </p:cNvPr>
@@ -1635,7 +1638,7 @@
           <p:cNvPr id="12" name="Graphic 36">
             <a:extLst>
               <a:ext uri="{FF2B5EF4-FFF2-40B4-BE49-F238E27FC236}">
-                <a16:creationId xmlns="" xmlns:a16="http://schemas.microsoft.com/office/drawing/2014/main" id="{21FF5BCF-BC53-4C3F-8B7F-7077B35ADCA8}"/>
+                <a16:creationId xmlns:a16="http://schemas.microsoft.com/office/drawing/2014/main" xmlns="" id="{21FF5BCF-BC53-4C3F-8B7F-7077B35ADCA8}"/>
               </a:ext>
             </a:extLst>
           </p:cNvPr>
@@ -1743,7 +1746,7 @@
           <p:cNvPr id="32" name="Freeform: Shape 31">
             <a:extLst>
               <a:ext uri="{FF2B5EF4-FFF2-40B4-BE49-F238E27FC236}">
-                <a16:creationId xmlns="" xmlns:a16="http://schemas.microsoft.com/office/drawing/2014/main" id="{B0920EEC-7CE3-4708-93D2-53699D17E5E3}"/>
+                <a16:creationId xmlns:a16="http://schemas.microsoft.com/office/drawing/2014/main" xmlns="" id="{B0920EEC-7CE3-4708-93D2-53699D17E5E3}"/>
               </a:ext>
             </a:extLst>
           </p:cNvPr>
@@ -1881,7 +1884,7 @@
           <p:cNvPr id="19" name="Text Placeholder 26">
             <a:extLst>
               <a:ext uri="{FF2B5EF4-FFF2-40B4-BE49-F238E27FC236}">
-                <a16:creationId xmlns="" xmlns:a16="http://schemas.microsoft.com/office/drawing/2014/main" id="{9DBE4B29-4897-4A3A-B883-A887BCDA3718}"/>
+                <a16:creationId xmlns:a16="http://schemas.microsoft.com/office/drawing/2014/main" xmlns="" id="{9DBE4B29-4897-4A3A-B883-A887BCDA3718}"/>
               </a:ext>
             </a:extLst>
           </p:cNvPr>
@@ -1938,7 +1941,7 @@
           <p:cNvPr id="20" name="Text Placeholder 26">
             <a:extLst>
               <a:ext uri="{FF2B5EF4-FFF2-40B4-BE49-F238E27FC236}">
-                <a16:creationId xmlns="" xmlns:a16="http://schemas.microsoft.com/office/drawing/2014/main" id="{0EF4532A-9AB5-4545-A83D-BD0E39635727}"/>
+                <a16:creationId xmlns:a16="http://schemas.microsoft.com/office/drawing/2014/main" xmlns="" id="{0EF4532A-9AB5-4545-A83D-BD0E39635727}"/>
               </a:ext>
             </a:extLst>
           </p:cNvPr>
@@ -1995,7 +1998,7 @@
           <p:cNvPr id="21" name="Text Placeholder 26">
             <a:extLst>
               <a:ext uri="{FF2B5EF4-FFF2-40B4-BE49-F238E27FC236}">
-                <a16:creationId xmlns="" xmlns:a16="http://schemas.microsoft.com/office/drawing/2014/main" id="{D579A1F5-9180-47FE-A31B-4E37384383C4}"/>
+                <a16:creationId xmlns:a16="http://schemas.microsoft.com/office/drawing/2014/main" xmlns="" id="{D579A1F5-9180-47FE-A31B-4E37384383C4}"/>
               </a:ext>
             </a:extLst>
           </p:cNvPr>
@@ -2057,7 +2060,7 @@
           <p:cNvPr id="22" name="Text Placeholder 26">
             <a:extLst>
               <a:ext uri="{FF2B5EF4-FFF2-40B4-BE49-F238E27FC236}">
-                <a16:creationId xmlns="" xmlns:a16="http://schemas.microsoft.com/office/drawing/2014/main" id="{71BBF4E8-67FF-4A65-9EC1-AE832CEBE85D}"/>
+                <a16:creationId xmlns:a16="http://schemas.microsoft.com/office/drawing/2014/main" xmlns="" id="{71BBF4E8-67FF-4A65-9EC1-AE832CEBE85D}"/>
               </a:ext>
             </a:extLst>
           </p:cNvPr>
@@ -2114,7 +2117,7 @@
           <p:cNvPr id="23" name="Text Placeholder 26">
             <a:extLst>
               <a:ext uri="{FF2B5EF4-FFF2-40B4-BE49-F238E27FC236}">
-                <a16:creationId xmlns="" xmlns:a16="http://schemas.microsoft.com/office/drawing/2014/main" id="{5BB088E3-63C1-423F-A939-150B8E1F87A7}"/>
+                <a16:creationId xmlns:a16="http://schemas.microsoft.com/office/drawing/2014/main" xmlns="" id="{5BB088E3-63C1-423F-A939-150B8E1F87A7}"/>
               </a:ext>
             </a:extLst>
           </p:cNvPr>
@@ -2176,7 +2179,7 @@
           <p:cNvPr id="3" name="Graphic 23">
             <a:extLst>
               <a:ext uri="{FF2B5EF4-FFF2-40B4-BE49-F238E27FC236}">
-                <a16:creationId xmlns="" xmlns:a16="http://schemas.microsoft.com/office/drawing/2014/main" id="{7E62A657-0B76-4081-A698-3C47F1AFC78E}"/>
+                <a16:creationId xmlns:a16="http://schemas.microsoft.com/office/drawing/2014/main" xmlns="" id="{7E62A657-0B76-4081-A698-3C47F1AFC78E}"/>
               </a:ext>
             </a:extLst>
           </p:cNvPr>
@@ -2306,7 +2309,7 @@
           <p:cNvPr id="25" name="Freeform: Shape 24">
             <a:extLst>
               <a:ext uri="{FF2B5EF4-FFF2-40B4-BE49-F238E27FC236}">
-                <a16:creationId xmlns="" xmlns:a16="http://schemas.microsoft.com/office/drawing/2014/main" id="{C51D0359-A547-4B21-8850-06B9F1CDF9CE}"/>
+                <a16:creationId xmlns:a16="http://schemas.microsoft.com/office/drawing/2014/main" xmlns="" id="{C51D0359-A547-4B21-8850-06B9F1CDF9CE}"/>
               </a:ext>
             </a:extLst>
           </p:cNvPr>
@@ -2414,7 +2417,7 @@
           <p:cNvPr id="12" name="Freeform: Shape 11">
             <a:extLst>
               <a:ext uri="{FF2B5EF4-FFF2-40B4-BE49-F238E27FC236}">
-                <a16:creationId xmlns="" xmlns:a16="http://schemas.microsoft.com/office/drawing/2014/main" id="{F9E3EED1-7BB3-4B75-BCA9-1C1223740B3C}"/>
+                <a16:creationId xmlns:a16="http://schemas.microsoft.com/office/drawing/2014/main" xmlns="" id="{F9E3EED1-7BB3-4B75-BCA9-1C1223740B3C}"/>
               </a:ext>
             </a:extLst>
           </p:cNvPr>
@@ -2509,7 +2512,7 @@
           <p:cNvPr id="13" name="Text Placeholder 2">
             <a:extLst>
               <a:ext uri="{FF2B5EF4-FFF2-40B4-BE49-F238E27FC236}">
-                <a16:creationId xmlns="" xmlns:a16="http://schemas.microsoft.com/office/drawing/2014/main" id="{5ECCBAE3-CEA3-4EE0-83F6-41CFC54D2B4A}"/>
+                <a16:creationId xmlns:a16="http://schemas.microsoft.com/office/drawing/2014/main" xmlns="" id="{5ECCBAE3-CEA3-4EE0-83F6-41CFC54D2B4A}"/>
               </a:ext>
             </a:extLst>
           </p:cNvPr>
@@ -2718,7 +2721,7 @@
           <p:cNvPr id="14" name="Imagen 18">
             <a:extLst>
               <a:ext uri="{FF2B5EF4-FFF2-40B4-BE49-F238E27FC236}">
-                <a16:creationId xmlns="" xmlns:a16="http://schemas.microsoft.com/office/drawing/2014/main" id="{CAA2F7E1-C4D5-49BC-9D8E-F33FED6ACF22}"/>
+                <a16:creationId xmlns:a16="http://schemas.microsoft.com/office/drawing/2014/main" xmlns="" id="{CAA2F7E1-C4D5-49BC-9D8E-F33FED6ACF22}"/>
               </a:ext>
             </a:extLst>
           </p:cNvPr>
@@ -2748,7 +2751,7 @@
           <p:cNvPr id="16" name="Freeform: Shape 15">
             <a:extLst>
               <a:ext uri="{FF2B5EF4-FFF2-40B4-BE49-F238E27FC236}">
-                <a16:creationId xmlns="" xmlns:a16="http://schemas.microsoft.com/office/drawing/2014/main" id="{29016A5F-A55B-4605-B66C-5C6E2BF4919F}"/>
+                <a16:creationId xmlns:a16="http://schemas.microsoft.com/office/drawing/2014/main" xmlns="" id="{29016A5F-A55B-4605-B66C-5C6E2BF4919F}"/>
               </a:ext>
             </a:extLst>
           </p:cNvPr>
@@ -2889,7 +2892,7 @@
           <p:cNvPr id="2" name="Title 1">
             <a:extLst>
               <a:ext uri="{FF2B5EF4-FFF2-40B4-BE49-F238E27FC236}">
-                <a16:creationId xmlns="" xmlns:a16="http://schemas.microsoft.com/office/drawing/2014/main" id="{199AD403-A15F-4A2F-B050-AB874136E732}"/>
+                <a16:creationId xmlns:a16="http://schemas.microsoft.com/office/drawing/2014/main" xmlns="" id="{199AD403-A15F-4A2F-B050-AB874136E732}"/>
               </a:ext>
             </a:extLst>
           </p:cNvPr>
@@ -2936,7 +2939,7 @@
           <p:cNvPr id="28" name="Freeform: Shape 27">
             <a:extLst>
               <a:ext uri="{FF2B5EF4-FFF2-40B4-BE49-F238E27FC236}">
-                <a16:creationId xmlns="" xmlns:a16="http://schemas.microsoft.com/office/drawing/2014/main" id="{87A7AFAC-3F6D-48D1-A100-148792529BC6}"/>
+                <a16:creationId xmlns:a16="http://schemas.microsoft.com/office/drawing/2014/main" xmlns="" id="{87A7AFAC-3F6D-48D1-A100-148792529BC6}"/>
               </a:ext>
             </a:extLst>
           </p:cNvPr>
@@ -3031,7 +3034,7 @@
           <p:cNvPr id="29" name="Freeform: Shape 28">
             <a:extLst>
               <a:ext uri="{FF2B5EF4-FFF2-40B4-BE49-F238E27FC236}">
-                <a16:creationId xmlns="" xmlns:a16="http://schemas.microsoft.com/office/drawing/2014/main" id="{81A4F88F-4E35-4BB3-AD24-CAC580C12F96}"/>
+                <a16:creationId xmlns:a16="http://schemas.microsoft.com/office/drawing/2014/main" xmlns="" id="{81A4F88F-4E35-4BB3-AD24-CAC580C12F96}"/>
               </a:ext>
             </a:extLst>
           </p:cNvPr>
@@ -3139,7 +3142,7 @@
           <p:cNvPr id="30" name="Freeform: Shape 29">
             <a:extLst>
               <a:ext uri="{FF2B5EF4-FFF2-40B4-BE49-F238E27FC236}">
-                <a16:creationId xmlns="" xmlns:a16="http://schemas.microsoft.com/office/drawing/2014/main" id="{592CE00E-F2AB-4099-8BB8-F109C4F2EFDB}"/>
+                <a16:creationId xmlns:a16="http://schemas.microsoft.com/office/drawing/2014/main" xmlns="" id="{592CE00E-F2AB-4099-8BB8-F109C4F2EFDB}"/>
               </a:ext>
             </a:extLst>
           </p:cNvPr>
@@ -3247,7 +3250,7 @@
           <p:cNvPr id="32" name="Freeform: Shape 31">
             <a:extLst>
               <a:ext uri="{FF2B5EF4-FFF2-40B4-BE49-F238E27FC236}">
-                <a16:creationId xmlns="" xmlns:a16="http://schemas.microsoft.com/office/drawing/2014/main" id="{B0920EEC-7CE3-4708-93D2-53699D17E5E3}"/>
+                <a16:creationId xmlns:a16="http://schemas.microsoft.com/office/drawing/2014/main" xmlns="" id="{B0920EEC-7CE3-4708-93D2-53699D17E5E3}"/>
               </a:ext>
             </a:extLst>
           </p:cNvPr>
@@ -3355,7 +3358,7 @@
           <p:cNvPr id="33" name="Freeform: Shape 32">
             <a:extLst>
               <a:ext uri="{FF2B5EF4-FFF2-40B4-BE49-F238E27FC236}">
-                <a16:creationId xmlns="" xmlns:a16="http://schemas.microsoft.com/office/drawing/2014/main" id="{2DF8B751-9294-46D5-B390-5D322195540F}"/>
+                <a16:creationId xmlns:a16="http://schemas.microsoft.com/office/drawing/2014/main" xmlns="" id="{2DF8B751-9294-46D5-B390-5D322195540F}"/>
               </a:ext>
             </a:extLst>
           </p:cNvPr>
@@ -3463,7 +3466,7 @@
           <p:cNvPr id="34" name="Freeform: Shape 33">
             <a:extLst>
               <a:ext uri="{FF2B5EF4-FFF2-40B4-BE49-F238E27FC236}">
-                <a16:creationId xmlns="" xmlns:a16="http://schemas.microsoft.com/office/drawing/2014/main" id="{E0F651C6-BE74-4133-ABA8-316072D4F5B5}"/>
+                <a16:creationId xmlns:a16="http://schemas.microsoft.com/office/drawing/2014/main" xmlns="" id="{E0F651C6-BE74-4133-ABA8-316072D4F5B5}"/>
               </a:ext>
             </a:extLst>
           </p:cNvPr>
@@ -3673,7 +3676,7 @@
           <p:cNvPr id="40" name="Graphic 37">
             <a:extLst>
               <a:ext uri="{FF2B5EF4-FFF2-40B4-BE49-F238E27FC236}">
-                <a16:creationId xmlns="" xmlns:a16="http://schemas.microsoft.com/office/drawing/2014/main" id="{9F75ED2D-7077-4753-B623-4B9A718EB224}"/>
+                <a16:creationId xmlns:a16="http://schemas.microsoft.com/office/drawing/2014/main" xmlns="" id="{9F75ED2D-7077-4753-B623-4B9A718EB224}"/>
               </a:ext>
             </a:extLst>
           </p:cNvPr>
@@ -3809,7 +3812,7 @@
           <p:cNvPr id="12" name="Graphic 36">
             <a:extLst>
               <a:ext uri="{FF2B5EF4-FFF2-40B4-BE49-F238E27FC236}">
-                <a16:creationId xmlns="" xmlns:a16="http://schemas.microsoft.com/office/drawing/2014/main" id="{21FF5BCF-BC53-4C3F-8B7F-7077B35ADCA8}"/>
+                <a16:creationId xmlns:a16="http://schemas.microsoft.com/office/drawing/2014/main" xmlns="" id="{21FF5BCF-BC53-4C3F-8B7F-7077B35ADCA8}"/>
               </a:ext>
             </a:extLst>
           </p:cNvPr>
@@ -3917,7 +3920,7 @@
           <p:cNvPr id="15" name="Subtitle 2">
             <a:extLst>
               <a:ext uri="{FF2B5EF4-FFF2-40B4-BE49-F238E27FC236}">
-                <a16:creationId xmlns="" xmlns:a16="http://schemas.microsoft.com/office/drawing/2014/main" id="{4BCD5243-C973-44F2-88E8-A4A6E3387B1F}"/>
+                <a16:creationId xmlns:a16="http://schemas.microsoft.com/office/drawing/2014/main" xmlns="" id="{4BCD5243-C973-44F2-88E8-A4A6E3387B1F}"/>
               </a:ext>
             </a:extLst>
           </p:cNvPr>
@@ -3989,7 +3992,7 @@
           <p:cNvPr id="34" name="Oval 33">
             <a:extLst>
               <a:ext uri="{FF2B5EF4-FFF2-40B4-BE49-F238E27FC236}">
-                <a16:creationId xmlns="" xmlns:a16="http://schemas.microsoft.com/office/drawing/2014/main" id="{13074BE4-153F-46FE-B915-CD1AEF318A25}"/>
+                <a16:creationId xmlns:a16="http://schemas.microsoft.com/office/drawing/2014/main" xmlns="" id="{13074BE4-153F-46FE-B915-CD1AEF318A25}"/>
               </a:ext>
             </a:extLst>
           </p:cNvPr>
@@ -4041,7 +4044,7 @@
           <p:cNvPr id="35" name="Graphic 12">
             <a:extLst>
               <a:ext uri="{FF2B5EF4-FFF2-40B4-BE49-F238E27FC236}">
-                <a16:creationId xmlns="" xmlns:a16="http://schemas.microsoft.com/office/drawing/2014/main" id="{0B7E91C4-F19E-46BE-B05F-139B5418924E}"/>
+                <a16:creationId xmlns:a16="http://schemas.microsoft.com/office/drawing/2014/main" xmlns="" id="{0B7E91C4-F19E-46BE-B05F-139B5418924E}"/>
               </a:ext>
             </a:extLst>
           </p:cNvPr>
@@ -4158,7 +4161,7 @@
           <p:cNvPr id="10" name="Freeform: Shape 9">
             <a:extLst>
               <a:ext uri="{FF2B5EF4-FFF2-40B4-BE49-F238E27FC236}">
-                <a16:creationId xmlns="" xmlns:a16="http://schemas.microsoft.com/office/drawing/2014/main" id="{08A64499-0304-4070-BCB0-67E2BE20A3EA}"/>
+                <a16:creationId xmlns:a16="http://schemas.microsoft.com/office/drawing/2014/main" xmlns="" id="{08A64499-0304-4070-BCB0-67E2BE20A3EA}"/>
               </a:ext>
             </a:extLst>
           </p:cNvPr>
@@ -4266,7 +4269,7 @@
           <p:cNvPr id="25" name="Freeform: Shape 24">
             <a:extLst>
               <a:ext uri="{FF2B5EF4-FFF2-40B4-BE49-F238E27FC236}">
-                <a16:creationId xmlns="" xmlns:a16="http://schemas.microsoft.com/office/drawing/2014/main" id="{ED1736B3-AE79-40C2-80FF-2FB0FEE27195}"/>
+                <a16:creationId xmlns:a16="http://schemas.microsoft.com/office/drawing/2014/main" xmlns="" id="{ED1736B3-AE79-40C2-80FF-2FB0FEE27195}"/>
               </a:ext>
             </a:extLst>
           </p:cNvPr>
@@ -4356,7 +4359,7 @@
           <p:cNvPr id="2" name="Title 1">
             <a:extLst>
               <a:ext uri="{FF2B5EF4-FFF2-40B4-BE49-F238E27FC236}">
-                <a16:creationId xmlns="" xmlns:a16="http://schemas.microsoft.com/office/drawing/2014/main" id="{DC2228EE-3546-4272-9C39-150FF23CE033}"/>
+                <a16:creationId xmlns:a16="http://schemas.microsoft.com/office/drawing/2014/main" xmlns="" id="{DC2228EE-3546-4272-9C39-150FF23CE033}"/>
               </a:ext>
             </a:extLst>
           </p:cNvPr>
@@ -4408,7 +4411,7 @@
           <p:cNvPr id="3" name="Subtitle 2">
             <a:extLst>
               <a:ext uri="{FF2B5EF4-FFF2-40B4-BE49-F238E27FC236}">
-                <a16:creationId xmlns="" xmlns:a16="http://schemas.microsoft.com/office/drawing/2014/main" id="{0F2EFCC6-4D5A-4B43-A534-1A868887BC7F}"/>
+                <a16:creationId xmlns:a16="http://schemas.microsoft.com/office/drawing/2014/main" xmlns="" id="{0F2EFCC6-4D5A-4B43-A534-1A868887BC7F}"/>
               </a:ext>
             </a:extLst>
           </p:cNvPr>
@@ -4485,7 +4488,7 @@
           <p:cNvPr id="24" name="Graphic 22">
             <a:extLst>
               <a:ext uri="{FF2B5EF4-FFF2-40B4-BE49-F238E27FC236}">
-                <a16:creationId xmlns="" xmlns:a16="http://schemas.microsoft.com/office/drawing/2014/main" id="{4EE1436E-33B5-4388-87D8-2D0633CC3CE7}"/>
+                <a16:creationId xmlns:a16="http://schemas.microsoft.com/office/drawing/2014/main" xmlns="" id="{4EE1436E-33B5-4388-87D8-2D0633CC3CE7}"/>
               </a:ext>
             </a:extLst>
           </p:cNvPr>
@@ -4621,7 +4624,7 @@
           <p:cNvPr id="9" name="Freeform: Shape 8">
             <a:extLst>
               <a:ext uri="{FF2B5EF4-FFF2-40B4-BE49-F238E27FC236}">
-                <a16:creationId xmlns="" xmlns:a16="http://schemas.microsoft.com/office/drawing/2014/main" id="{A8FB11AB-3031-47CA-85DD-696856C3C62C}"/>
+                <a16:creationId xmlns:a16="http://schemas.microsoft.com/office/drawing/2014/main" xmlns="" id="{A8FB11AB-3031-47CA-85DD-696856C3C62C}"/>
               </a:ext>
             </a:extLst>
           </p:cNvPr>
@@ -4729,7 +4732,7 @@
           <p:cNvPr id="38" name="Freeform: Shape 37">
             <a:extLst>
               <a:ext uri="{FF2B5EF4-FFF2-40B4-BE49-F238E27FC236}">
-                <a16:creationId xmlns="" xmlns:a16="http://schemas.microsoft.com/office/drawing/2014/main" id="{9CD6F167-FB82-4EFB-BAB9-1D0FEE07B85D}"/>
+                <a16:creationId xmlns:a16="http://schemas.microsoft.com/office/drawing/2014/main" xmlns="" id="{9CD6F167-FB82-4EFB-BAB9-1D0FEE07B85D}"/>
               </a:ext>
             </a:extLst>
           </p:cNvPr>
@@ -4855,7 +4858,7 @@
           <p:cNvPr id="36" name="Freeform: Shape 35">
             <a:extLst>
               <a:ext uri="{FF2B5EF4-FFF2-40B4-BE49-F238E27FC236}">
-                <a16:creationId xmlns="" xmlns:a16="http://schemas.microsoft.com/office/drawing/2014/main" id="{3DD2082D-81A7-4E2D-8136-9D48016E7FE9}"/>
+                <a16:creationId xmlns:a16="http://schemas.microsoft.com/office/drawing/2014/main" xmlns="" id="{3DD2082D-81A7-4E2D-8136-9D48016E7FE9}"/>
               </a:ext>
             </a:extLst>
           </p:cNvPr>
@@ -4945,7 +4948,7 @@
           <p:cNvPr id="30" name="Freeform: Shape 29">
             <a:extLst>
               <a:ext uri="{FF2B5EF4-FFF2-40B4-BE49-F238E27FC236}">
-                <a16:creationId xmlns="" xmlns:a16="http://schemas.microsoft.com/office/drawing/2014/main" id="{ECF16C35-4A81-4062-808C-7697AF0FD6F5}"/>
+                <a16:creationId xmlns:a16="http://schemas.microsoft.com/office/drawing/2014/main" xmlns="" id="{ECF16C35-4A81-4062-808C-7697AF0FD6F5}"/>
               </a:ext>
             </a:extLst>
           </p:cNvPr>
@@ -5097,7 +5100,7 @@
           <p:cNvPr id="7" name="Date Placeholder 6">
             <a:extLst>
               <a:ext uri="{FF2B5EF4-FFF2-40B4-BE49-F238E27FC236}">
-                <a16:creationId xmlns="" xmlns:a16="http://schemas.microsoft.com/office/drawing/2014/main" id="{B7EF9C60-0FED-4965-A9BC-CE69886A38CA}"/>
+                <a16:creationId xmlns:a16="http://schemas.microsoft.com/office/drawing/2014/main" xmlns="" id="{B7EF9C60-0FED-4965-A9BC-CE69886A38CA}"/>
               </a:ext>
             </a:extLst>
           </p:cNvPr>
@@ -5126,7 +5129,7 @@
           <p:cNvPr id="8" name="Footer Placeholder 7">
             <a:extLst>
               <a:ext uri="{FF2B5EF4-FFF2-40B4-BE49-F238E27FC236}">
-                <a16:creationId xmlns="" xmlns:a16="http://schemas.microsoft.com/office/drawing/2014/main" id="{239F2410-4015-48DB-BB4D-B5944D8C16B7}"/>
+                <a16:creationId xmlns:a16="http://schemas.microsoft.com/office/drawing/2014/main" xmlns="" id="{239F2410-4015-48DB-BB4D-B5944D8C16B7}"/>
               </a:ext>
             </a:extLst>
           </p:cNvPr>
@@ -5155,7 +5158,7 @@
           <p:cNvPr id="11" name="Slide Number Placeholder 10">
             <a:extLst>
               <a:ext uri="{FF2B5EF4-FFF2-40B4-BE49-F238E27FC236}">
-                <a16:creationId xmlns="" xmlns:a16="http://schemas.microsoft.com/office/drawing/2014/main" id="{C44F5F26-1B35-405A-AD75-5DFF48CF6BD6}"/>
+                <a16:creationId xmlns:a16="http://schemas.microsoft.com/office/drawing/2014/main" xmlns="" id="{C44F5F26-1B35-405A-AD75-5DFF48CF6BD6}"/>
               </a:ext>
             </a:extLst>
           </p:cNvPr>
@@ -5231,7 +5234,7 @@
           <p:cNvPr id="48" name="Oval 47">
             <a:extLst>
               <a:ext uri="{FF2B5EF4-FFF2-40B4-BE49-F238E27FC236}">
-                <a16:creationId xmlns="" xmlns:a16="http://schemas.microsoft.com/office/drawing/2014/main" id="{2F290D8B-987A-4555-890C-F3CD026BF7BF}"/>
+                <a16:creationId xmlns:a16="http://schemas.microsoft.com/office/drawing/2014/main" xmlns="" id="{2F290D8B-987A-4555-890C-F3CD026BF7BF}"/>
               </a:ext>
             </a:extLst>
           </p:cNvPr>
@@ -5283,7 +5286,7 @@
           <p:cNvPr id="49" name="Graphic 12">
             <a:extLst>
               <a:ext uri="{FF2B5EF4-FFF2-40B4-BE49-F238E27FC236}">
-                <a16:creationId xmlns="" xmlns:a16="http://schemas.microsoft.com/office/drawing/2014/main" id="{6139C5E6-5A04-4458-8EF9-628BFBA73A92}"/>
+                <a16:creationId xmlns:a16="http://schemas.microsoft.com/office/drawing/2014/main" xmlns="" id="{6139C5E6-5A04-4458-8EF9-628BFBA73A92}"/>
               </a:ext>
             </a:extLst>
           </p:cNvPr>
@@ -5400,7 +5403,7 @@
           <p:cNvPr id="4" name="Date Placeholder 3">
             <a:extLst>
               <a:ext uri="{FF2B5EF4-FFF2-40B4-BE49-F238E27FC236}">
-                <a16:creationId xmlns="" xmlns:a16="http://schemas.microsoft.com/office/drawing/2014/main" id="{DC2A0631-3130-4C36-8E5E-80464B1A62A7}"/>
+                <a16:creationId xmlns:a16="http://schemas.microsoft.com/office/drawing/2014/main" xmlns="" id="{DC2A0631-3130-4C36-8E5E-80464B1A62A7}"/>
               </a:ext>
             </a:extLst>
           </p:cNvPr>
@@ -5428,7 +5431,7 @@
           <p:cNvPr id="5" name="Footer Placeholder 4">
             <a:extLst>
               <a:ext uri="{FF2B5EF4-FFF2-40B4-BE49-F238E27FC236}">
-                <a16:creationId xmlns="" xmlns:a16="http://schemas.microsoft.com/office/drawing/2014/main" id="{79230F82-FE68-4450-98DF-5D29369AEE76}"/>
+                <a16:creationId xmlns:a16="http://schemas.microsoft.com/office/drawing/2014/main" xmlns="" id="{79230F82-FE68-4450-98DF-5D29369AEE76}"/>
               </a:ext>
             </a:extLst>
           </p:cNvPr>
@@ -5465,7 +5468,7 @@
           <p:cNvPr id="6" name="Slide Number Placeholder 5">
             <a:extLst>
               <a:ext uri="{FF2B5EF4-FFF2-40B4-BE49-F238E27FC236}">
-                <a16:creationId xmlns="" xmlns:a16="http://schemas.microsoft.com/office/drawing/2014/main" id="{EE6603C1-6E1A-4E4B-9555-31D84B6BDAD9}"/>
+                <a16:creationId xmlns:a16="http://schemas.microsoft.com/office/drawing/2014/main" xmlns="" id="{EE6603C1-6E1A-4E4B-9555-31D84B6BDAD9}"/>
               </a:ext>
             </a:extLst>
           </p:cNvPr>
@@ -5494,7 +5497,7 @@
           <p:cNvPr id="41" name="Graphic 39">
             <a:extLst>
               <a:ext uri="{FF2B5EF4-FFF2-40B4-BE49-F238E27FC236}">
-                <a16:creationId xmlns="" xmlns:a16="http://schemas.microsoft.com/office/drawing/2014/main" id="{1D75FFD8-3F66-48B3-BB01-D4B8A9496851}"/>
+                <a16:creationId xmlns:a16="http://schemas.microsoft.com/office/drawing/2014/main" xmlns="" id="{1D75FFD8-3F66-48B3-BB01-D4B8A9496851}"/>
               </a:ext>
             </a:extLst>
           </p:cNvPr>
@@ -5514,7 +5517,7 @@
             <p:cNvPr id="42" name="Freeform: Shape 41">
               <a:extLst>
                 <a:ext uri="{FF2B5EF4-FFF2-40B4-BE49-F238E27FC236}">
-                  <a16:creationId xmlns="" xmlns:a16="http://schemas.microsoft.com/office/drawing/2014/main" id="{9BA0EC60-510D-41EF-AFE6-E4E6BD83F8C9}"/>
+                  <a16:creationId xmlns:a16="http://schemas.microsoft.com/office/drawing/2014/main" xmlns="" id="{9BA0EC60-510D-41EF-AFE6-E4E6BD83F8C9}"/>
                 </a:ext>
               </a:extLst>
             </p:cNvPr>
@@ -5704,7 +5707,7 @@
             <p:cNvPr id="43" name="Freeform: Shape 42">
               <a:extLst>
                 <a:ext uri="{FF2B5EF4-FFF2-40B4-BE49-F238E27FC236}">
-                  <a16:creationId xmlns="" xmlns:a16="http://schemas.microsoft.com/office/drawing/2014/main" id="{0162C508-E081-418C-A19D-15A59388C43A}"/>
+                  <a16:creationId xmlns:a16="http://schemas.microsoft.com/office/drawing/2014/main" xmlns="" id="{0162C508-E081-418C-A19D-15A59388C43A}"/>
                 </a:ext>
               </a:extLst>
             </p:cNvPr>
@@ -5812,7 +5815,7 @@
             <p:cNvPr id="44" name="Freeform: Shape 43">
               <a:extLst>
                 <a:ext uri="{FF2B5EF4-FFF2-40B4-BE49-F238E27FC236}">
-                  <a16:creationId xmlns="" xmlns:a16="http://schemas.microsoft.com/office/drawing/2014/main" id="{2A710D7D-FC65-4BF6-BDA4-E59B01AD6FBC}"/>
+                  <a16:creationId xmlns:a16="http://schemas.microsoft.com/office/drawing/2014/main" xmlns="" id="{2A710D7D-FC65-4BF6-BDA4-E59B01AD6FBC}"/>
                 </a:ext>
               </a:extLst>
             </p:cNvPr>
@@ -5920,7 +5923,7 @@
             <p:cNvPr id="45" name="Freeform: Shape 44">
               <a:extLst>
                 <a:ext uri="{FF2B5EF4-FFF2-40B4-BE49-F238E27FC236}">
-                  <a16:creationId xmlns="" xmlns:a16="http://schemas.microsoft.com/office/drawing/2014/main" id="{18811B6B-BBB0-4D69-AEF8-AD0A7F9A4B57}"/>
+                  <a16:creationId xmlns:a16="http://schemas.microsoft.com/office/drawing/2014/main" xmlns="" id="{18811B6B-BBB0-4D69-AEF8-AD0A7F9A4B57}"/>
                 </a:ext>
               </a:extLst>
             </p:cNvPr>
@@ -6028,7 +6031,7 @@
             <p:cNvPr id="46" name="Freeform: Shape 45">
               <a:extLst>
                 <a:ext uri="{FF2B5EF4-FFF2-40B4-BE49-F238E27FC236}">
-                  <a16:creationId xmlns="" xmlns:a16="http://schemas.microsoft.com/office/drawing/2014/main" id="{3DB7F04C-0D31-4172-9D02-F8C8B2043EB9}"/>
+                  <a16:creationId xmlns:a16="http://schemas.microsoft.com/office/drawing/2014/main" xmlns="" id="{3DB7F04C-0D31-4172-9D02-F8C8B2043EB9}"/>
                 </a:ext>
               </a:extLst>
             </p:cNvPr>
@@ -6208,7 +6211,7 @@
             <p:cNvPr id="47" name="Freeform: Shape 46">
               <a:extLst>
                 <a:ext uri="{FF2B5EF4-FFF2-40B4-BE49-F238E27FC236}">
-                  <a16:creationId xmlns="" xmlns:a16="http://schemas.microsoft.com/office/drawing/2014/main" id="{1FB04931-77A8-4259-95CA-DA7DEDB2DEFD}"/>
+                  <a16:creationId xmlns:a16="http://schemas.microsoft.com/office/drawing/2014/main" xmlns="" id="{1FB04931-77A8-4259-95CA-DA7DEDB2DEFD}"/>
                 </a:ext>
               </a:extLst>
             </p:cNvPr>
@@ -6399,7 +6402,7 @@
           <p:cNvPr id="18" name="Content Placeholder 2">
             <a:extLst>
               <a:ext uri="{FF2B5EF4-FFF2-40B4-BE49-F238E27FC236}">
-                <a16:creationId xmlns="" xmlns:a16="http://schemas.microsoft.com/office/drawing/2014/main" id="{D7B996D2-06BA-413A-BDEE-428A188D3ADF}"/>
+                <a16:creationId xmlns:a16="http://schemas.microsoft.com/office/drawing/2014/main" xmlns="" id="{D7B996D2-06BA-413A-BDEE-428A188D3ADF}"/>
               </a:ext>
             </a:extLst>
           </p:cNvPr>
@@ -6500,7 +6503,7 @@
           <p:cNvPr id="7" name="Title 6">
             <a:extLst>
               <a:ext uri="{FF2B5EF4-FFF2-40B4-BE49-F238E27FC236}">
-                <a16:creationId xmlns="" xmlns:a16="http://schemas.microsoft.com/office/drawing/2014/main" id="{5E5109FC-8CB6-4120-99CF-163DDAB90612}"/>
+                <a16:creationId xmlns:a16="http://schemas.microsoft.com/office/drawing/2014/main" xmlns="" id="{5E5109FC-8CB6-4120-99CF-163DDAB90612}"/>
               </a:ext>
             </a:extLst>
           </p:cNvPr>
@@ -6533,7 +6536,7 @@
           <p:cNvPr id="20" name="Graphic 19">
             <a:extLst>
               <a:ext uri="{FF2B5EF4-FFF2-40B4-BE49-F238E27FC236}">
-                <a16:creationId xmlns="" xmlns:a16="http://schemas.microsoft.com/office/drawing/2014/main" id="{9462DA56-F882-470A-8F8C-A55B25FD8A7A}"/>
+                <a16:creationId xmlns:a16="http://schemas.microsoft.com/office/drawing/2014/main" xmlns="" id="{9462DA56-F882-470A-8F8C-A55B25FD8A7A}"/>
               </a:ext>
             </a:extLst>
           </p:cNvPr>
@@ -6699,7 +6702,7 @@
           <p:cNvPr id="48" name="Oval 47">
             <a:extLst>
               <a:ext uri="{FF2B5EF4-FFF2-40B4-BE49-F238E27FC236}">
-                <a16:creationId xmlns="" xmlns:a16="http://schemas.microsoft.com/office/drawing/2014/main" id="{2F290D8B-987A-4555-890C-F3CD026BF7BF}"/>
+                <a16:creationId xmlns:a16="http://schemas.microsoft.com/office/drawing/2014/main" xmlns="" id="{2F290D8B-987A-4555-890C-F3CD026BF7BF}"/>
               </a:ext>
             </a:extLst>
           </p:cNvPr>
@@ -6751,7 +6754,7 @@
           <p:cNvPr id="49" name="Graphic 12">
             <a:extLst>
               <a:ext uri="{FF2B5EF4-FFF2-40B4-BE49-F238E27FC236}">
-                <a16:creationId xmlns="" xmlns:a16="http://schemas.microsoft.com/office/drawing/2014/main" id="{6139C5E6-5A04-4458-8EF9-628BFBA73A92}"/>
+                <a16:creationId xmlns:a16="http://schemas.microsoft.com/office/drawing/2014/main" xmlns="" id="{6139C5E6-5A04-4458-8EF9-628BFBA73A92}"/>
               </a:ext>
             </a:extLst>
           </p:cNvPr>
@@ -6868,7 +6871,7 @@
           <p:cNvPr id="4" name="Date Placeholder 3">
             <a:extLst>
               <a:ext uri="{FF2B5EF4-FFF2-40B4-BE49-F238E27FC236}">
-                <a16:creationId xmlns="" xmlns:a16="http://schemas.microsoft.com/office/drawing/2014/main" id="{DC2A0631-3130-4C36-8E5E-80464B1A62A7}"/>
+                <a16:creationId xmlns:a16="http://schemas.microsoft.com/office/drawing/2014/main" xmlns="" id="{DC2A0631-3130-4C36-8E5E-80464B1A62A7}"/>
               </a:ext>
             </a:extLst>
           </p:cNvPr>
@@ -6896,7 +6899,7 @@
           <p:cNvPr id="5" name="Footer Placeholder 4">
             <a:extLst>
               <a:ext uri="{FF2B5EF4-FFF2-40B4-BE49-F238E27FC236}">
-                <a16:creationId xmlns="" xmlns:a16="http://schemas.microsoft.com/office/drawing/2014/main" id="{79230F82-FE68-4450-98DF-5D29369AEE76}"/>
+                <a16:creationId xmlns:a16="http://schemas.microsoft.com/office/drawing/2014/main" xmlns="" id="{79230F82-FE68-4450-98DF-5D29369AEE76}"/>
               </a:ext>
             </a:extLst>
           </p:cNvPr>
@@ -6933,7 +6936,7 @@
           <p:cNvPr id="6" name="Slide Number Placeholder 5">
             <a:extLst>
               <a:ext uri="{FF2B5EF4-FFF2-40B4-BE49-F238E27FC236}">
-                <a16:creationId xmlns="" xmlns:a16="http://schemas.microsoft.com/office/drawing/2014/main" id="{EE6603C1-6E1A-4E4B-9555-31D84B6BDAD9}"/>
+                <a16:creationId xmlns:a16="http://schemas.microsoft.com/office/drawing/2014/main" xmlns="" id="{EE6603C1-6E1A-4E4B-9555-31D84B6BDAD9}"/>
               </a:ext>
             </a:extLst>
           </p:cNvPr>
@@ -6962,7 +6965,7 @@
           <p:cNvPr id="41" name="Graphic 39">
             <a:extLst>
               <a:ext uri="{FF2B5EF4-FFF2-40B4-BE49-F238E27FC236}">
-                <a16:creationId xmlns="" xmlns:a16="http://schemas.microsoft.com/office/drawing/2014/main" id="{1D75FFD8-3F66-48B3-BB01-D4B8A9496851}"/>
+                <a16:creationId xmlns:a16="http://schemas.microsoft.com/office/drawing/2014/main" xmlns="" id="{1D75FFD8-3F66-48B3-BB01-D4B8A9496851}"/>
               </a:ext>
             </a:extLst>
           </p:cNvPr>
@@ -6982,7 +6985,7 @@
             <p:cNvPr id="42" name="Freeform: Shape 41">
               <a:extLst>
                 <a:ext uri="{FF2B5EF4-FFF2-40B4-BE49-F238E27FC236}">
-                  <a16:creationId xmlns="" xmlns:a16="http://schemas.microsoft.com/office/drawing/2014/main" id="{9BA0EC60-510D-41EF-AFE6-E4E6BD83F8C9}"/>
+                  <a16:creationId xmlns:a16="http://schemas.microsoft.com/office/drawing/2014/main" xmlns="" id="{9BA0EC60-510D-41EF-AFE6-E4E6BD83F8C9}"/>
                 </a:ext>
               </a:extLst>
             </p:cNvPr>
@@ -7172,7 +7175,7 @@
             <p:cNvPr id="43" name="Freeform: Shape 42">
               <a:extLst>
                 <a:ext uri="{FF2B5EF4-FFF2-40B4-BE49-F238E27FC236}">
-                  <a16:creationId xmlns="" xmlns:a16="http://schemas.microsoft.com/office/drawing/2014/main" id="{0162C508-E081-418C-A19D-15A59388C43A}"/>
+                  <a16:creationId xmlns:a16="http://schemas.microsoft.com/office/drawing/2014/main" xmlns="" id="{0162C508-E081-418C-A19D-15A59388C43A}"/>
                 </a:ext>
               </a:extLst>
             </p:cNvPr>
@@ -7280,7 +7283,7 @@
             <p:cNvPr id="44" name="Freeform: Shape 43">
               <a:extLst>
                 <a:ext uri="{FF2B5EF4-FFF2-40B4-BE49-F238E27FC236}">
-                  <a16:creationId xmlns="" xmlns:a16="http://schemas.microsoft.com/office/drawing/2014/main" id="{2A710D7D-FC65-4BF6-BDA4-E59B01AD6FBC}"/>
+                  <a16:creationId xmlns:a16="http://schemas.microsoft.com/office/drawing/2014/main" xmlns="" id="{2A710D7D-FC65-4BF6-BDA4-E59B01AD6FBC}"/>
                 </a:ext>
               </a:extLst>
             </p:cNvPr>
@@ -7388,7 +7391,7 @@
             <p:cNvPr id="45" name="Freeform: Shape 44">
               <a:extLst>
                 <a:ext uri="{FF2B5EF4-FFF2-40B4-BE49-F238E27FC236}">
-                  <a16:creationId xmlns="" xmlns:a16="http://schemas.microsoft.com/office/drawing/2014/main" id="{18811B6B-BBB0-4D69-AEF8-AD0A7F9A4B57}"/>
+                  <a16:creationId xmlns:a16="http://schemas.microsoft.com/office/drawing/2014/main" xmlns="" id="{18811B6B-BBB0-4D69-AEF8-AD0A7F9A4B57}"/>
                 </a:ext>
               </a:extLst>
             </p:cNvPr>
@@ -7496,7 +7499,7 @@
             <p:cNvPr id="46" name="Freeform: Shape 45">
               <a:extLst>
                 <a:ext uri="{FF2B5EF4-FFF2-40B4-BE49-F238E27FC236}">
-                  <a16:creationId xmlns="" xmlns:a16="http://schemas.microsoft.com/office/drawing/2014/main" id="{3DB7F04C-0D31-4172-9D02-F8C8B2043EB9}"/>
+                  <a16:creationId xmlns:a16="http://schemas.microsoft.com/office/drawing/2014/main" xmlns="" id="{3DB7F04C-0D31-4172-9D02-F8C8B2043EB9}"/>
                 </a:ext>
               </a:extLst>
             </p:cNvPr>
@@ -7676,7 +7679,7 @@
             <p:cNvPr id="47" name="Freeform: Shape 46">
               <a:extLst>
                 <a:ext uri="{FF2B5EF4-FFF2-40B4-BE49-F238E27FC236}">
-                  <a16:creationId xmlns="" xmlns:a16="http://schemas.microsoft.com/office/drawing/2014/main" id="{1FB04931-77A8-4259-95CA-DA7DEDB2DEFD}"/>
+                  <a16:creationId xmlns:a16="http://schemas.microsoft.com/office/drawing/2014/main" xmlns="" id="{1FB04931-77A8-4259-95CA-DA7DEDB2DEFD}"/>
                 </a:ext>
               </a:extLst>
             </p:cNvPr>
@@ -7867,7 +7870,7 @@
           <p:cNvPr id="7" name="Title 6">
             <a:extLst>
               <a:ext uri="{FF2B5EF4-FFF2-40B4-BE49-F238E27FC236}">
-                <a16:creationId xmlns="" xmlns:a16="http://schemas.microsoft.com/office/drawing/2014/main" id="{5E5109FC-8CB6-4120-99CF-163DDAB90612}"/>
+                <a16:creationId xmlns:a16="http://schemas.microsoft.com/office/drawing/2014/main" xmlns="" id="{5E5109FC-8CB6-4120-99CF-163DDAB90612}"/>
               </a:ext>
             </a:extLst>
           </p:cNvPr>
@@ -7900,7 +7903,7 @@
           <p:cNvPr id="20" name="Graphic 19">
             <a:extLst>
               <a:ext uri="{FF2B5EF4-FFF2-40B4-BE49-F238E27FC236}">
-                <a16:creationId xmlns="" xmlns:a16="http://schemas.microsoft.com/office/drawing/2014/main" id="{9462DA56-F882-470A-8F8C-A55B25FD8A7A}"/>
+                <a16:creationId xmlns:a16="http://schemas.microsoft.com/office/drawing/2014/main" xmlns="" id="{9462DA56-F882-470A-8F8C-A55B25FD8A7A}"/>
               </a:ext>
             </a:extLst>
           </p:cNvPr>
@@ -8036,7 +8039,7 @@
           <p:cNvPr id="17" name="Text Placeholder 2">
             <a:extLst>
               <a:ext uri="{FF2B5EF4-FFF2-40B4-BE49-F238E27FC236}">
-                <a16:creationId xmlns="" xmlns:a16="http://schemas.microsoft.com/office/drawing/2014/main" id="{24B91177-A100-491C-B5EF-BC77E2E33F72}"/>
+                <a16:creationId xmlns:a16="http://schemas.microsoft.com/office/drawing/2014/main" xmlns="" id="{24B91177-A100-491C-B5EF-BC77E2E33F72}"/>
               </a:ext>
             </a:extLst>
           </p:cNvPr>
@@ -8109,7 +8112,7 @@
           <p:cNvPr id="19" name="Content Placeholder 3">
             <a:extLst>
               <a:ext uri="{FF2B5EF4-FFF2-40B4-BE49-F238E27FC236}">
-                <a16:creationId xmlns="" xmlns:a16="http://schemas.microsoft.com/office/drawing/2014/main" id="{B6758D2F-C9AC-4514-B48E-2863E8DDE0CF}"/>
+                <a16:creationId xmlns:a16="http://schemas.microsoft.com/office/drawing/2014/main" xmlns="" id="{B6758D2F-C9AC-4514-B48E-2863E8DDE0CF}"/>
               </a:ext>
             </a:extLst>
           </p:cNvPr>
@@ -8210,7 +8213,7 @@
           <p:cNvPr id="21" name="Text Placeholder 4">
             <a:extLst>
               <a:ext uri="{FF2B5EF4-FFF2-40B4-BE49-F238E27FC236}">
-                <a16:creationId xmlns="" xmlns:a16="http://schemas.microsoft.com/office/drawing/2014/main" id="{633C3A9F-17E4-45DF-8DB7-7A55846AAA8F}"/>
+                <a16:creationId xmlns:a16="http://schemas.microsoft.com/office/drawing/2014/main" xmlns="" id="{633C3A9F-17E4-45DF-8DB7-7A55846AAA8F}"/>
               </a:ext>
             </a:extLst>
           </p:cNvPr>
@@ -8283,7 +8286,7 @@
           <p:cNvPr id="22" name="Content Placeholder 5">
             <a:extLst>
               <a:ext uri="{FF2B5EF4-FFF2-40B4-BE49-F238E27FC236}">
-                <a16:creationId xmlns="" xmlns:a16="http://schemas.microsoft.com/office/drawing/2014/main" id="{C19AB308-7C32-46C9-B8DB-AA96B7ED0D62}"/>
+                <a16:creationId xmlns:a16="http://schemas.microsoft.com/office/drawing/2014/main" xmlns="" id="{C19AB308-7C32-46C9-B8DB-AA96B7ED0D62}"/>
               </a:ext>
             </a:extLst>
           </p:cNvPr>
@@ -8413,7 +8416,7 @@
           <p:cNvPr id="48" name="Oval 47">
             <a:extLst>
               <a:ext uri="{FF2B5EF4-FFF2-40B4-BE49-F238E27FC236}">
-                <a16:creationId xmlns="" xmlns:a16="http://schemas.microsoft.com/office/drawing/2014/main" id="{2F290D8B-987A-4555-890C-F3CD026BF7BF}"/>
+                <a16:creationId xmlns:a16="http://schemas.microsoft.com/office/drawing/2014/main" xmlns="" id="{2F290D8B-987A-4555-890C-F3CD026BF7BF}"/>
               </a:ext>
             </a:extLst>
           </p:cNvPr>
@@ -8465,7 +8468,7 @@
           <p:cNvPr id="49" name="Graphic 12">
             <a:extLst>
               <a:ext uri="{FF2B5EF4-FFF2-40B4-BE49-F238E27FC236}">
-                <a16:creationId xmlns="" xmlns:a16="http://schemas.microsoft.com/office/drawing/2014/main" id="{6139C5E6-5A04-4458-8EF9-628BFBA73A92}"/>
+                <a16:creationId xmlns:a16="http://schemas.microsoft.com/office/drawing/2014/main" xmlns="" id="{6139C5E6-5A04-4458-8EF9-628BFBA73A92}"/>
               </a:ext>
             </a:extLst>
           </p:cNvPr>
@@ -8582,7 +8585,7 @@
           <p:cNvPr id="4" name="Date Placeholder 3">
             <a:extLst>
               <a:ext uri="{FF2B5EF4-FFF2-40B4-BE49-F238E27FC236}">
-                <a16:creationId xmlns="" xmlns:a16="http://schemas.microsoft.com/office/drawing/2014/main" id="{DC2A0631-3130-4C36-8E5E-80464B1A62A7}"/>
+                <a16:creationId xmlns:a16="http://schemas.microsoft.com/office/drawing/2014/main" xmlns="" id="{DC2A0631-3130-4C36-8E5E-80464B1A62A7}"/>
               </a:ext>
             </a:extLst>
           </p:cNvPr>
@@ -8610,7 +8613,7 @@
           <p:cNvPr id="5" name="Footer Placeholder 4">
             <a:extLst>
               <a:ext uri="{FF2B5EF4-FFF2-40B4-BE49-F238E27FC236}">
-                <a16:creationId xmlns="" xmlns:a16="http://schemas.microsoft.com/office/drawing/2014/main" id="{79230F82-FE68-4450-98DF-5D29369AEE76}"/>
+                <a16:creationId xmlns:a16="http://schemas.microsoft.com/office/drawing/2014/main" xmlns="" id="{79230F82-FE68-4450-98DF-5D29369AEE76}"/>
               </a:ext>
             </a:extLst>
           </p:cNvPr>
@@ -8647,7 +8650,7 @@
           <p:cNvPr id="6" name="Slide Number Placeholder 5">
             <a:extLst>
               <a:ext uri="{FF2B5EF4-FFF2-40B4-BE49-F238E27FC236}">
-                <a16:creationId xmlns="" xmlns:a16="http://schemas.microsoft.com/office/drawing/2014/main" id="{EE6603C1-6E1A-4E4B-9555-31D84B6BDAD9}"/>
+                <a16:creationId xmlns:a16="http://schemas.microsoft.com/office/drawing/2014/main" xmlns="" id="{EE6603C1-6E1A-4E4B-9555-31D84B6BDAD9}"/>
               </a:ext>
             </a:extLst>
           </p:cNvPr>
@@ -8676,7 +8679,7 @@
           <p:cNvPr id="41" name="Graphic 39">
             <a:extLst>
               <a:ext uri="{FF2B5EF4-FFF2-40B4-BE49-F238E27FC236}">
-                <a16:creationId xmlns="" xmlns:a16="http://schemas.microsoft.com/office/drawing/2014/main" id="{1D75FFD8-3F66-48B3-BB01-D4B8A9496851}"/>
+                <a16:creationId xmlns:a16="http://schemas.microsoft.com/office/drawing/2014/main" xmlns="" id="{1D75FFD8-3F66-48B3-BB01-D4B8A9496851}"/>
               </a:ext>
             </a:extLst>
           </p:cNvPr>
@@ -8696,7 +8699,7 @@
             <p:cNvPr id="42" name="Freeform: Shape 41">
               <a:extLst>
                 <a:ext uri="{FF2B5EF4-FFF2-40B4-BE49-F238E27FC236}">
-                  <a16:creationId xmlns="" xmlns:a16="http://schemas.microsoft.com/office/drawing/2014/main" id="{9BA0EC60-510D-41EF-AFE6-E4E6BD83F8C9}"/>
+                  <a16:creationId xmlns:a16="http://schemas.microsoft.com/office/drawing/2014/main" xmlns="" id="{9BA0EC60-510D-41EF-AFE6-E4E6BD83F8C9}"/>
                 </a:ext>
               </a:extLst>
             </p:cNvPr>
@@ -8886,7 +8889,7 @@
             <p:cNvPr id="43" name="Freeform: Shape 42">
               <a:extLst>
                 <a:ext uri="{FF2B5EF4-FFF2-40B4-BE49-F238E27FC236}">
-                  <a16:creationId xmlns="" xmlns:a16="http://schemas.microsoft.com/office/drawing/2014/main" id="{0162C508-E081-418C-A19D-15A59388C43A}"/>
+                  <a16:creationId xmlns:a16="http://schemas.microsoft.com/office/drawing/2014/main" xmlns="" id="{0162C508-E081-418C-A19D-15A59388C43A}"/>
                 </a:ext>
               </a:extLst>
             </p:cNvPr>
@@ -8994,7 +8997,7 @@
             <p:cNvPr id="44" name="Freeform: Shape 43">
               <a:extLst>
                 <a:ext uri="{FF2B5EF4-FFF2-40B4-BE49-F238E27FC236}">
-                  <a16:creationId xmlns="" xmlns:a16="http://schemas.microsoft.com/office/drawing/2014/main" id="{2A710D7D-FC65-4BF6-BDA4-E59B01AD6FBC}"/>
+                  <a16:creationId xmlns:a16="http://schemas.microsoft.com/office/drawing/2014/main" xmlns="" id="{2A710D7D-FC65-4BF6-BDA4-E59B01AD6FBC}"/>
                 </a:ext>
               </a:extLst>
             </p:cNvPr>
@@ -9102,7 +9105,7 @@
             <p:cNvPr id="45" name="Freeform: Shape 44">
               <a:extLst>
                 <a:ext uri="{FF2B5EF4-FFF2-40B4-BE49-F238E27FC236}">
-                  <a16:creationId xmlns="" xmlns:a16="http://schemas.microsoft.com/office/drawing/2014/main" id="{18811B6B-BBB0-4D69-AEF8-AD0A7F9A4B57}"/>
+                  <a16:creationId xmlns:a16="http://schemas.microsoft.com/office/drawing/2014/main" xmlns="" id="{18811B6B-BBB0-4D69-AEF8-AD0A7F9A4B57}"/>
                 </a:ext>
               </a:extLst>
             </p:cNvPr>
@@ -9210,7 +9213,7 @@
             <p:cNvPr id="46" name="Freeform: Shape 45">
               <a:extLst>
                 <a:ext uri="{FF2B5EF4-FFF2-40B4-BE49-F238E27FC236}">
-                  <a16:creationId xmlns="" xmlns:a16="http://schemas.microsoft.com/office/drawing/2014/main" id="{3DB7F04C-0D31-4172-9D02-F8C8B2043EB9}"/>
+                  <a16:creationId xmlns:a16="http://schemas.microsoft.com/office/drawing/2014/main" xmlns="" id="{3DB7F04C-0D31-4172-9D02-F8C8B2043EB9}"/>
                 </a:ext>
               </a:extLst>
             </p:cNvPr>
@@ -9390,7 +9393,7 @@
             <p:cNvPr id="47" name="Freeform: Shape 46">
               <a:extLst>
                 <a:ext uri="{FF2B5EF4-FFF2-40B4-BE49-F238E27FC236}">
-                  <a16:creationId xmlns="" xmlns:a16="http://schemas.microsoft.com/office/drawing/2014/main" id="{1FB04931-77A8-4259-95CA-DA7DEDB2DEFD}"/>
+                  <a16:creationId xmlns:a16="http://schemas.microsoft.com/office/drawing/2014/main" xmlns="" id="{1FB04931-77A8-4259-95CA-DA7DEDB2DEFD}"/>
                 </a:ext>
               </a:extLst>
             </p:cNvPr>
@@ -9581,7 +9584,7 @@
           <p:cNvPr id="7" name="Title 6">
             <a:extLst>
               <a:ext uri="{FF2B5EF4-FFF2-40B4-BE49-F238E27FC236}">
-                <a16:creationId xmlns="" xmlns:a16="http://schemas.microsoft.com/office/drawing/2014/main" id="{5E5109FC-8CB6-4120-99CF-163DDAB90612}"/>
+                <a16:creationId xmlns:a16="http://schemas.microsoft.com/office/drawing/2014/main" xmlns="" id="{5E5109FC-8CB6-4120-99CF-163DDAB90612}"/>
               </a:ext>
             </a:extLst>
           </p:cNvPr>
@@ -9614,7 +9617,7 @@
           <p:cNvPr id="20" name="Graphic 19">
             <a:extLst>
               <a:ext uri="{FF2B5EF4-FFF2-40B4-BE49-F238E27FC236}">
-                <a16:creationId xmlns="" xmlns:a16="http://schemas.microsoft.com/office/drawing/2014/main" id="{9462DA56-F882-470A-8F8C-A55B25FD8A7A}"/>
+                <a16:creationId xmlns:a16="http://schemas.microsoft.com/office/drawing/2014/main" xmlns="" id="{9462DA56-F882-470A-8F8C-A55B25FD8A7A}"/>
               </a:ext>
             </a:extLst>
           </p:cNvPr>
@@ -9750,7 +9753,7 @@
           <p:cNvPr id="23" name="Content Placeholder 2">
             <a:extLst>
               <a:ext uri="{FF2B5EF4-FFF2-40B4-BE49-F238E27FC236}">
-                <a16:creationId xmlns="" xmlns:a16="http://schemas.microsoft.com/office/drawing/2014/main" id="{CD5AE8A8-E027-4529-A5B7-4D355C71E647}"/>
+                <a16:creationId xmlns:a16="http://schemas.microsoft.com/office/drawing/2014/main" xmlns="" id="{CD5AE8A8-E027-4529-A5B7-4D355C71E647}"/>
               </a:ext>
             </a:extLst>
           </p:cNvPr>
@@ -9850,7 +9853,7 @@
           <p:cNvPr id="24" name="Content Placeholder 3">
             <a:extLst>
               <a:ext uri="{FF2B5EF4-FFF2-40B4-BE49-F238E27FC236}">
-                <a16:creationId xmlns="" xmlns:a16="http://schemas.microsoft.com/office/drawing/2014/main" id="{FB3E4803-F2CA-4138-9997-6108BFDFE7E2}"/>
+                <a16:creationId xmlns:a16="http://schemas.microsoft.com/office/drawing/2014/main" xmlns="" id="{FB3E4803-F2CA-4138-9997-6108BFDFE7E2}"/>
               </a:ext>
             </a:extLst>
           </p:cNvPr>
@@ -9980,7 +9983,7 @@
           <p:cNvPr id="57" name="Picture Placeholder 56">
             <a:extLst>
               <a:ext uri="{FF2B5EF4-FFF2-40B4-BE49-F238E27FC236}">
-                <a16:creationId xmlns="" xmlns:a16="http://schemas.microsoft.com/office/drawing/2014/main" id="{8E328517-DD21-40E0-B948-B25B366BDEC7}"/>
+                <a16:creationId xmlns:a16="http://schemas.microsoft.com/office/drawing/2014/main" xmlns="" id="{8E328517-DD21-40E0-B948-B25B366BDEC7}"/>
               </a:ext>
             </a:extLst>
           </p:cNvPr>
@@ -10377,7 +10380,7 @@
           <p:cNvPr id="35" name="Oval 34">
             <a:extLst>
               <a:ext uri="{FF2B5EF4-FFF2-40B4-BE49-F238E27FC236}">
-                <a16:creationId xmlns="" xmlns:a16="http://schemas.microsoft.com/office/drawing/2014/main" id="{7BC6DBB9-1B34-4374-A887-DC30F9E2F62F}"/>
+                <a16:creationId xmlns:a16="http://schemas.microsoft.com/office/drawing/2014/main" xmlns="" id="{7BC6DBB9-1B34-4374-A887-DC30F9E2F62F}"/>
               </a:ext>
             </a:extLst>
           </p:cNvPr>
@@ -10429,7 +10432,7 @@
           <p:cNvPr id="36" name="Graphic 12">
             <a:extLst>
               <a:ext uri="{FF2B5EF4-FFF2-40B4-BE49-F238E27FC236}">
-                <a16:creationId xmlns="" xmlns:a16="http://schemas.microsoft.com/office/drawing/2014/main" id="{00DE0AE3-F44D-4F2C-B7A3-C253AA498DEF}"/>
+                <a16:creationId xmlns:a16="http://schemas.microsoft.com/office/drawing/2014/main" xmlns="" id="{00DE0AE3-F44D-4F2C-B7A3-C253AA498DEF}"/>
               </a:ext>
             </a:extLst>
           </p:cNvPr>
@@ -10546,7 +10549,7 @@
           <p:cNvPr id="4" name="Date Placeholder 3">
             <a:extLst>
               <a:ext uri="{FF2B5EF4-FFF2-40B4-BE49-F238E27FC236}">
-                <a16:creationId xmlns="" xmlns:a16="http://schemas.microsoft.com/office/drawing/2014/main" id="{AC6F89F8-3E24-406D-9C49-00E6E47E4AAC}"/>
+                <a16:creationId xmlns:a16="http://schemas.microsoft.com/office/drawing/2014/main" xmlns="" id="{AC6F89F8-3E24-406D-9C49-00E6E47E4AAC}"/>
               </a:ext>
             </a:extLst>
           </p:cNvPr>
@@ -10574,7 +10577,7 @@
           <p:cNvPr id="5" name="Footer Placeholder 4">
             <a:extLst>
               <a:ext uri="{FF2B5EF4-FFF2-40B4-BE49-F238E27FC236}">
-                <a16:creationId xmlns="" xmlns:a16="http://schemas.microsoft.com/office/drawing/2014/main" id="{4392DBDA-ED00-4248-AC6D-0CE0B821B52F}"/>
+                <a16:creationId xmlns:a16="http://schemas.microsoft.com/office/drawing/2014/main" xmlns="" id="{4392DBDA-ED00-4248-AC6D-0CE0B821B52F}"/>
               </a:ext>
             </a:extLst>
           </p:cNvPr>
@@ -10611,7 +10614,7 @@
           <p:cNvPr id="6" name="Slide Number Placeholder 5">
             <a:extLst>
               <a:ext uri="{FF2B5EF4-FFF2-40B4-BE49-F238E27FC236}">
-                <a16:creationId xmlns="" xmlns:a16="http://schemas.microsoft.com/office/drawing/2014/main" id="{EC2B5F97-2F18-4EF2-9CBC-AAAB9FF4CC91}"/>
+                <a16:creationId xmlns:a16="http://schemas.microsoft.com/office/drawing/2014/main" xmlns="" id="{EC2B5F97-2F18-4EF2-9CBC-AAAB9FF4CC91}"/>
               </a:ext>
             </a:extLst>
           </p:cNvPr>
@@ -10640,7 +10643,7 @@
           <p:cNvPr id="38" name="Freeform: Shape 37">
             <a:extLst>
               <a:ext uri="{FF2B5EF4-FFF2-40B4-BE49-F238E27FC236}">
-                <a16:creationId xmlns="" xmlns:a16="http://schemas.microsoft.com/office/drawing/2014/main" id="{C6C05708-08C7-4EF1-B0D8-6A01C1B1AD85}"/>
+                <a16:creationId xmlns:a16="http://schemas.microsoft.com/office/drawing/2014/main" xmlns="" id="{C6C05708-08C7-4EF1-B0D8-6A01C1B1AD85}"/>
               </a:ext>
             </a:extLst>
           </p:cNvPr>
@@ -10748,7 +10751,7 @@
           <p:cNvPr id="3" name="Graphic 33">
             <a:extLst>
               <a:ext uri="{FF2B5EF4-FFF2-40B4-BE49-F238E27FC236}">
-                <a16:creationId xmlns="" xmlns:a16="http://schemas.microsoft.com/office/drawing/2014/main" id="{38956B41-4EE0-4C7C-8436-027F5DE8B1BC}"/>
+                <a16:creationId xmlns:a16="http://schemas.microsoft.com/office/drawing/2014/main" xmlns="" id="{38956B41-4EE0-4C7C-8436-027F5DE8B1BC}"/>
               </a:ext>
             </a:extLst>
           </p:cNvPr>
@@ -10884,7 +10887,7 @@
           <p:cNvPr id="33" name="Freeform: Shape 32">
             <a:extLst>
               <a:ext uri="{FF2B5EF4-FFF2-40B4-BE49-F238E27FC236}">
-                <a16:creationId xmlns="" xmlns:a16="http://schemas.microsoft.com/office/drawing/2014/main" id="{E08687FC-7322-4F20-9769-1ECF4296A96E}"/>
+                <a16:creationId xmlns:a16="http://schemas.microsoft.com/office/drawing/2014/main" xmlns="" id="{E08687FC-7322-4F20-9769-1ECF4296A96E}"/>
               </a:ext>
             </a:extLst>
           </p:cNvPr>
@@ -10992,7 +10995,7 @@
           <p:cNvPr id="41" name="Freeform: Shape 40">
             <a:extLst>
               <a:ext uri="{FF2B5EF4-FFF2-40B4-BE49-F238E27FC236}">
-                <a16:creationId xmlns="" xmlns:a16="http://schemas.microsoft.com/office/drawing/2014/main" id="{0FCCDE26-7222-4C1B-884A-0FAE84FA57DB}"/>
+                <a16:creationId xmlns:a16="http://schemas.microsoft.com/office/drawing/2014/main" xmlns="" id="{0FCCDE26-7222-4C1B-884A-0FAE84FA57DB}"/>
               </a:ext>
             </a:extLst>
           </p:cNvPr>
@@ -11100,7 +11103,7 @@
           <p:cNvPr id="19" name="Title 1">
             <a:extLst>
               <a:ext uri="{FF2B5EF4-FFF2-40B4-BE49-F238E27FC236}">
-                <a16:creationId xmlns="" xmlns:a16="http://schemas.microsoft.com/office/drawing/2014/main" id="{2AC78A4D-01A3-43A6-BE82-E64E2BF16D65}"/>
+                <a16:creationId xmlns:a16="http://schemas.microsoft.com/office/drawing/2014/main" xmlns="" id="{2AC78A4D-01A3-43A6-BE82-E64E2BF16D65}"/>
               </a:ext>
             </a:extLst>
           </p:cNvPr>
@@ -11137,7 +11140,7 @@
           <p:cNvPr id="20" name="Text Placeholder 3">
             <a:extLst>
               <a:ext uri="{FF2B5EF4-FFF2-40B4-BE49-F238E27FC236}">
-                <a16:creationId xmlns="" xmlns:a16="http://schemas.microsoft.com/office/drawing/2014/main" id="{E6544955-4597-4E52-9C7E-8AEB5D2A4983}"/>
+                <a16:creationId xmlns:a16="http://schemas.microsoft.com/office/drawing/2014/main" xmlns="" id="{E6544955-4597-4E52-9C7E-8AEB5D2A4983}"/>
               </a:ext>
             </a:extLst>
           </p:cNvPr>
@@ -11238,7 +11241,7 @@
           <p:cNvPr id="35" name="Oval 34">
             <a:extLst>
               <a:ext uri="{FF2B5EF4-FFF2-40B4-BE49-F238E27FC236}">
-                <a16:creationId xmlns="" xmlns:a16="http://schemas.microsoft.com/office/drawing/2014/main" id="{7BC6DBB9-1B34-4374-A887-DC30F9E2F62F}"/>
+                <a16:creationId xmlns:a16="http://schemas.microsoft.com/office/drawing/2014/main" xmlns="" id="{7BC6DBB9-1B34-4374-A887-DC30F9E2F62F}"/>
               </a:ext>
             </a:extLst>
           </p:cNvPr>
@@ -11290,7 +11293,7 @@
           <p:cNvPr id="36" name="Graphic 12">
             <a:extLst>
               <a:ext uri="{FF2B5EF4-FFF2-40B4-BE49-F238E27FC236}">
-                <a16:creationId xmlns="" xmlns:a16="http://schemas.microsoft.com/office/drawing/2014/main" id="{00DE0AE3-F44D-4F2C-B7A3-C253AA498DEF}"/>
+                <a16:creationId xmlns:a16="http://schemas.microsoft.com/office/drawing/2014/main" xmlns="" id="{00DE0AE3-F44D-4F2C-B7A3-C253AA498DEF}"/>
               </a:ext>
             </a:extLst>
           </p:cNvPr>
@@ -11407,7 +11410,7 @@
           <p:cNvPr id="4" name="Date Placeholder 3">
             <a:extLst>
               <a:ext uri="{FF2B5EF4-FFF2-40B4-BE49-F238E27FC236}">
-                <a16:creationId xmlns="" xmlns:a16="http://schemas.microsoft.com/office/drawing/2014/main" id="{AC6F89F8-3E24-406D-9C49-00E6E47E4AAC}"/>
+                <a16:creationId xmlns:a16="http://schemas.microsoft.com/office/drawing/2014/main" xmlns="" id="{AC6F89F8-3E24-406D-9C49-00E6E47E4AAC}"/>
               </a:ext>
             </a:extLst>
           </p:cNvPr>
@@ -11435,7 +11438,7 @@
           <p:cNvPr id="5" name="Footer Placeholder 4">
             <a:extLst>
               <a:ext uri="{FF2B5EF4-FFF2-40B4-BE49-F238E27FC236}">
-                <a16:creationId xmlns="" xmlns:a16="http://schemas.microsoft.com/office/drawing/2014/main" id="{4392DBDA-ED00-4248-AC6D-0CE0B821B52F}"/>
+                <a16:creationId xmlns:a16="http://schemas.microsoft.com/office/drawing/2014/main" xmlns="" id="{4392DBDA-ED00-4248-AC6D-0CE0B821B52F}"/>
               </a:ext>
             </a:extLst>
           </p:cNvPr>
@@ -11472,7 +11475,7 @@
           <p:cNvPr id="6" name="Slide Number Placeholder 5">
             <a:extLst>
               <a:ext uri="{FF2B5EF4-FFF2-40B4-BE49-F238E27FC236}">
-                <a16:creationId xmlns="" xmlns:a16="http://schemas.microsoft.com/office/drawing/2014/main" id="{EC2B5F97-2F18-4EF2-9CBC-AAAB9FF4CC91}"/>
+                <a16:creationId xmlns:a16="http://schemas.microsoft.com/office/drawing/2014/main" xmlns="" id="{EC2B5F97-2F18-4EF2-9CBC-AAAB9FF4CC91}"/>
               </a:ext>
             </a:extLst>
           </p:cNvPr>
@@ -11501,7 +11504,7 @@
           <p:cNvPr id="38" name="Freeform: Shape 37">
             <a:extLst>
               <a:ext uri="{FF2B5EF4-FFF2-40B4-BE49-F238E27FC236}">
-                <a16:creationId xmlns="" xmlns:a16="http://schemas.microsoft.com/office/drawing/2014/main" id="{C6C05708-08C7-4EF1-B0D8-6A01C1B1AD85}"/>
+                <a16:creationId xmlns:a16="http://schemas.microsoft.com/office/drawing/2014/main" xmlns="" id="{C6C05708-08C7-4EF1-B0D8-6A01C1B1AD85}"/>
               </a:ext>
             </a:extLst>
           </p:cNvPr>
@@ -11609,7 +11612,7 @@
           <p:cNvPr id="3" name="Graphic 33">
             <a:extLst>
               <a:ext uri="{FF2B5EF4-FFF2-40B4-BE49-F238E27FC236}">
-                <a16:creationId xmlns="" xmlns:a16="http://schemas.microsoft.com/office/drawing/2014/main" id="{38956B41-4EE0-4C7C-8436-027F5DE8B1BC}"/>
+                <a16:creationId xmlns:a16="http://schemas.microsoft.com/office/drawing/2014/main" xmlns="" id="{38956B41-4EE0-4C7C-8436-027F5DE8B1BC}"/>
               </a:ext>
             </a:extLst>
           </p:cNvPr>
@@ -11745,7 +11748,7 @@
           <p:cNvPr id="33" name="Freeform: Shape 32">
             <a:extLst>
               <a:ext uri="{FF2B5EF4-FFF2-40B4-BE49-F238E27FC236}">
-                <a16:creationId xmlns="" xmlns:a16="http://schemas.microsoft.com/office/drawing/2014/main" id="{E08687FC-7322-4F20-9769-1ECF4296A96E}"/>
+                <a16:creationId xmlns:a16="http://schemas.microsoft.com/office/drawing/2014/main" xmlns="" id="{E08687FC-7322-4F20-9769-1ECF4296A96E}"/>
               </a:ext>
             </a:extLst>
           </p:cNvPr>
@@ -11853,7 +11856,7 @@
           <p:cNvPr id="41" name="Freeform: Shape 40">
             <a:extLst>
               <a:ext uri="{FF2B5EF4-FFF2-40B4-BE49-F238E27FC236}">
-                <a16:creationId xmlns="" xmlns:a16="http://schemas.microsoft.com/office/drawing/2014/main" id="{0FCCDE26-7222-4C1B-884A-0FAE84FA57DB}"/>
+                <a16:creationId xmlns:a16="http://schemas.microsoft.com/office/drawing/2014/main" xmlns="" id="{0FCCDE26-7222-4C1B-884A-0FAE84FA57DB}"/>
               </a:ext>
             </a:extLst>
           </p:cNvPr>
@@ -11961,7 +11964,7 @@
           <p:cNvPr id="19" name="Title 1">
             <a:extLst>
               <a:ext uri="{FF2B5EF4-FFF2-40B4-BE49-F238E27FC236}">
-                <a16:creationId xmlns="" xmlns:a16="http://schemas.microsoft.com/office/drawing/2014/main" id="{2AC78A4D-01A3-43A6-BE82-E64E2BF16D65}"/>
+                <a16:creationId xmlns:a16="http://schemas.microsoft.com/office/drawing/2014/main" xmlns="" id="{2AC78A4D-01A3-43A6-BE82-E64E2BF16D65}"/>
               </a:ext>
             </a:extLst>
           </p:cNvPr>
@@ -11998,7 +12001,7 @@
           <p:cNvPr id="20" name="Text Placeholder 3">
             <a:extLst>
               <a:ext uri="{FF2B5EF4-FFF2-40B4-BE49-F238E27FC236}">
-                <a16:creationId xmlns="" xmlns:a16="http://schemas.microsoft.com/office/drawing/2014/main" id="{E6544955-4597-4E52-9C7E-8AEB5D2A4983}"/>
+                <a16:creationId xmlns:a16="http://schemas.microsoft.com/office/drawing/2014/main" xmlns="" id="{E6544955-4597-4E52-9C7E-8AEB5D2A4983}"/>
               </a:ext>
             </a:extLst>
           </p:cNvPr>
@@ -12069,7 +12072,7 @@
           <p:cNvPr id="14" name="Content Placeholder 2">
             <a:extLst>
               <a:ext uri="{FF2B5EF4-FFF2-40B4-BE49-F238E27FC236}">
-                <a16:creationId xmlns="" xmlns:a16="http://schemas.microsoft.com/office/drawing/2014/main" id="{A28A6791-A2CB-40CE-AEF5-A729106DA43B}"/>
+                <a16:creationId xmlns:a16="http://schemas.microsoft.com/office/drawing/2014/main" xmlns="" id="{A28A6791-A2CB-40CE-AEF5-A729106DA43B}"/>
               </a:ext>
             </a:extLst>
           </p:cNvPr>
@@ -12191,7 +12194,7 @@
           <p:cNvPr id="48" name="Oval 47">
             <a:extLst>
               <a:ext uri="{FF2B5EF4-FFF2-40B4-BE49-F238E27FC236}">
-                <a16:creationId xmlns="" xmlns:a16="http://schemas.microsoft.com/office/drawing/2014/main" id="{2F290D8B-987A-4555-890C-F3CD026BF7BF}"/>
+                <a16:creationId xmlns:a16="http://schemas.microsoft.com/office/drawing/2014/main" xmlns="" id="{2F290D8B-987A-4555-890C-F3CD026BF7BF}"/>
               </a:ext>
             </a:extLst>
           </p:cNvPr>
@@ -12243,7 +12246,7 @@
           <p:cNvPr id="49" name="Graphic 12">
             <a:extLst>
               <a:ext uri="{FF2B5EF4-FFF2-40B4-BE49-F238E27FC236}">
-                <a16:creationId xmlns="" xmlns:a16="http://schemas.microsoft.com/office/drawing/2014/main" id="{6139C5E6-5A04-4458-8EF9-628BFBA73A92}"/>
+                <a16:creationId xmlns:a16="http://schemas.microsoft.com/office/drawing/2014/main" xmlns="" id="{6139C5E6-5A04-4458-8EF9-628BFBA73A92}"/>
               </a:ext>
             </a:extLst>
           </p:cNvPr>
@@ -12360,7 +12363,7 @@
           <p:cNvPr id="4" name="Date Placeholder 3">
             <a:extLst>
               <a:ext uri="{FF2B5EF4-FFF2-40B4-BE49-F238E27FC236}">
-                <a16:creationId xmlns="" xmlns:a16="http://schemas.microsoft.com/office/drawing/2014/main" id="{DC2A0631-3130-4C36-8E5E-80464B1A62A7}"/>
+                <a16:creationId xmlns:a16="http://schemas.microsoft.com/office/drawing/2014/main" xmlns="" id="{DC2A0631-3130-4C36-8E5E-80464B1A62A7}"/>
               </a:ext>
             </a:extLst>
           </p:cNvPr>
@@ -12388,7 +12391,7 @@
           <p:cNvPr id="5" name="Footer Placeholder 4">
             <a:extLst>
               <a:ext uri="{FF2B5EF4-FFF2-40B4-BE49-F238E27FC236}">
-                <a16:creationId xmlns="" xmlns:a16="http://schemas.microsoft.com/office/drawing/2014/main" id="{79230F82-FE68-4450-98DF-5D29369AEE76}"/>
+                <a16:creationId xmlns:a16="http://schemas.microsoft.com/office/drawing/2014/main" xmlns="" id="{79230F82-FE68-4450-98DF-5D29369AEE76}"/>
               </a:ext>
             </a:extLst>
           </p:cNvPr>
@@ -12425,7 +12428,7 @@
           <p:cNvPr id="6" name="Slide Number Placeholder 5">
             <a:extLst>
               <a:ext uri="{FF2B5EF4-FFF2-40B4-BE49-F238E27FC236}">
-                <a16:creationId xmlns="" xmlns:a16="http://schemas.microsoft.com/office/drawing/2014/main" id="{EE6603C1-6E1A-4E4B-9555-31D84B6BDAD9}"/>
+                <a16:creationId xmlns:a16="http://schemas.microsoft.com/office/drawing/2014/main" xmlns="" id="{EE6603C1-6E1A-4E4B-9555-31D84B6BDAD9}"/>
               </a:ext>
             </a:extLst>
           </p:cNvPr>
@@ -12454,7 +12457,7 @@
           <p:cNvPr id="41" name="Graphic 39">
             <a:extLst>
               <a:ext uri="{FF2B5EF4-FFF2-40B4-BE49-F238E27FC236}">
-                <a16:creationId xmlns="" xmlns:a16="http://schemas.microsoft.com/office/drawing/2014/main" id="{1D75FFD8-3F66-48B3-BB01-D4B8A9496851}"/>
+                <a16:creationId xmlns:a16="http://schemas.microsoft.com/office/drawing/2014/main" xmlns="" id="{1D75FFD8-3F66-48B3-BB01-D4B8A9496851}"/>
               </a:ext>
             </a:extLst>
           </p:cNvPr>
@@ -12474,7 +12477,7 @@
             <p:cNvPr id="42" name="Freeform: Shape 41">
               <a:extLst>
                 <a:ext uri="{FF2B5EF4-FFF2-40B4-BE49-F238E27FC236}">
-                  <a16:creationId xmlns="" xmlns:a16="http://schemas.microsoft.com/office/drawing/2014/main" id="{9BA0EC60-510D-41EF-AFE6-E4E6BD83F8C9}"/>
+                  <a16:creationId xmlns:a16="http://schemas.microsoft.com/office/drawing/2014/main" xmlns="" id="{9BA0EC60-510D-41EF-AFE6-E4E6BD83F8C9}"/>
                 </a:ext>
               </a:extLst>
             </p:cNvPr>
@@ -12664,7 +12667,7 @@
             <p:cNvPr id="43" name="Freeform: Shape 42">
               <a:extLst>
                 <a:ext uri="{FF2B5EF4-FFF2-40B4-BE49-F238E27FC236}">
-                  <a16:creationId xmlns="" xmlns:a16="http://schemas.microsoft.com/office/drawing/2014/main" id="{0162C508-E081-418C-A19D-15A59388C43A}"/>
+                  <a16:creationId xmlns:a16="http://schemas.microsoft.com/office/drawing/2014/main" xmlns="" id="{0162C508-E081-418C-A19D-15A59388C43A}"/>
                 </a:ext>
               </a:extLst>
             </p:cNvPr>
@@ -12772,7 +12775,7 @@
             <p:cNvPr id="44" name="Freeform: Shape 43">
               <a:extLst>
                 <a:ext uri="{FF2B5EF4-FFF2-40B4-BE49-F238E27FC236}">
-                  <a16:creationId xmlns="" xmlns:a16="http://schemas.microsoft.com/office/drawing/2014/main" id="{2A710D7D-FC65-4BF6-BDA4-E59B01AD6FBC}"/>
+                  <a16:creationId xmlns:a16="http://schemas.microsoft.com/office/drawing/2014/main" xmlns="" id="{2A710D7D-FC65-4BF6-BDA4-E59B01AD6FBC}"/>
                 </a:ext>
               </a:extLst>
             </p:cNvPr>
@@ -12880,7 +12883,7 @@
             <p:cNvPr id="45" name="Freeform: Shape 44">
               <a:extLst>
                 <a:ext uri="{FF2B5EF4-FFF2-40B4-BE49-F238E27FC236}">
-                  <a16:creationId xmlns="" xmlns:a16="http://schemas.microsoft.com/office/drawing/2014/main" id="{18811B6B-BBB0-4D69-AEF8-AD0A7F9A4B57}"/>
+                  <a16:creationId xmlns:a16="http://schemas.microsoft.com/office/drawing/2014/main" xmlns="" id="{18811B6B-BBB0-4D69-AEF8-AD0A7F9A4B57}"/>
                 </a:ext>
               </a:extLst>
             </p:cNvPr>
@@ -12988,7 +12991,7 @@
             <p:cNvPr id="46" name="Freeform: Shape 45">
               <a:extLst>
                 <a:ext uri="{FF2B5EF4-FFF2-40B4-BE49-F238E27FC236}">
-                  <a16:creationId xmlns="" xmlns:a16="http://schemas.microsoft.com/office/drawing/2014/main" id="{3DB7F04C-0D31-4172-9D02-F8C8B2043EB9}"/>
+                  <a16:creationId xmlns:a16="http://schemas.microsoft.com/office/drawing/2014/main" xmlns="" id="{3DB7F04C-0D31-4172-9D02-F8C8B2043EB9}"/>
                 </a:ext>
               </a:extLst>
             </p:cNvPr>
@@ -13168,7 +13171,7 @@
             <p:cNvPr id="47" name="Freeform: Shape 46">
               <a:extLst>
                 <a:ext uri="{FF2B5EF4-FFF2-40B4-BE49-F238E27FC236}">
-                  <a16:creationId xmlns="" xmlns:a16="http://schemas.microsoft.com/office/drawing/2014/main" id="{1FB04931-77A8-4259-95CA-DA7DEDB2DEFD}"/>
+                  <a16:creationId xmlns:a16="http://schemas.microsoft.com/office/drawing/2014/main" xmlns="" id="{1FB04931-77A8-4259-95CA-DA7DEDB2DEFD}"/>
                 </a:ext>
               </a:extLst>
             </p:cNvPr>
@@ -13359,7 +13362,7 @@
           <p:cNvPr id="18" name="Graphic 19">
             <a:extLst>
               <a:ext uri="{FF2B5EF4-FFF2-40B4-BE49-F238E27FC236}">
-                <a16:creationId xmlns="" xmlns:a16="http://schemas.microsoft.com/office/drawing/2014/main" id="{436C4D92-1746-4D54-8232-468DFF66CF79}"/>
+                <a16:creationId xmlns:a16="http://schemas.microsoft.com/office/drawing/2014/main" xmlns="" id="{436C4D92-1746-4D54-8232-468DFF66CF79}"/>
               </a:ext>
             </a:extLst>
           </p:cNvPr>
@@ -13495,7 +13498,7 @@
           <p:cNvPr id="19" name="Title 6">
             <a:extLst>
               <a:ext uri="{FF2B5EF4-FFF2-40B4-BE49-F238E27FC236}">
-                <a16:creationId xmlns="" xmlns:a16="http://schemas.microsoft.com/office/drawing/2014/main" id="{E77FD51D-3B1F-4D51-8A61-6CF8222774BD}"/>
+                <a16:creationId xmlns:a16="http://schemas.microsoft.com/office/drawing/2014/main" xmlns="" id="{E77FD51D-3B1F-4D51-8A61-6CF8222774BD}"/>
               </a:ext>
             </a:extLst>
           </p:cNvPr>
@@ -13558,7 +13561,7 @@
           <p:cNvPr id="48" name="Oval 47">
             <a:extLst>
               <a:ext uri="{FF2B5EF4-FFF2-40B4-BE49-F238E27FC236}">
-                <a16:creationId xmlns="" xmlns:a16="http://schemas.microsoft.com/office/drawing/2014/main" id="{2F290D8B-987A-4555-890C-F3CD026BF7BF}"/>
+                <a16:creationId xmlns:a16="http://schemas.microsoft.com/office/drawing/2014/main" xmlns="" id="{2F290D8B-987A-4555-890C-F3CD026BF7BF}"/>
               </a:ext>
             </a:extLst>
           </p:cNvPr>
@@ -13610,7 +13613,7 @@
           <p:cNvPr id="49" name="Graphic 12">
             <a:extLst>
               <a:ext uri="{FF2B5EF4-FFF2-40B4-BE49-F238E27FC236}">
-                <a16:creationId xmlns="" xmlns:a16="http://schemas.microsoft.com/office/drawing/2014/main" id="{6139C5E6-5A04-4458-8EF9-628BFBA73A92}"/>
+                <a16:creationId xmlns:a16="http://schemas.microsoft.com/office/drawing/2014/main" xmlns="" id="{6139C5E6-5A04-4458-8EF9-628BFBA73A92}"/>
               </a:ext>
             </a:extLst>
           </p:cNvPr>
@@ -13727,7 +13730,7 @@
           <p:cNvPr id="4" name="Date Placeholder 3">
             <a:extLst>
               <a:ext uri="{FF2B5EF4-FFF2-40B4-BE49-F238E27FC236}">
-                <a16:creationId xmlns="" xmlns:a16="http://schemas.microsoft.com/office/drawing/2014/main" id="{DC2A0631-3130-4C36-8E5E-80464B1A62A7}"/>
+                <a16:creationId xmlns:a16="http://schemas.microsoft.com/office/drawing/2014/main" xmlns="" id="{DC2A0631-3130-4C36-8E5E-80464B1A62A7}"/>
               </a:ext>
             </a:extLst>
           </p:cNvPr>
@@ -13755,7 +13758,7 @@
           <p:cNvPr id="5" name="Footer Placeholder 4">
             <a:extLst>
               <a:ext uri="{FF2B5EF4-FFF2-40B4-BE49-F238E27FC236}">
-                <a16:creationId xmlns="" xmlns:a16="http://schemas.microsoft.com/office/drawing/2014/main" id="{79230F82-FE68-4450-98DF-5D29369AEE76}"/>
+                <a16:creationId xmlns:a16="http://schemas.microsoft.com/office/drawing/2014/main" xmlns="" id="{79230F82-FE68-4450-98DF-5D29369AEE76}"/>
               </a:ext>
             </a:extLst>
           </p:cNvPr>
@@ -13792,7 +13795,7 @@
           <p:cNvPr id="6" name="Slide Number Placeholder 5">
             <a:extLst>
               <a:ext uri="{FF2B5EF4-FFF2-40B4-BE49-F238E27FC236}">
-                <a16:creationId xmlns="" xmlns:a16="http://schemas.microsoft.com/office/drawing/2014/main" id="{EE6603C1-6E1A-4E4B-9555-31D84B6BDAD9}"/>
+                <a16:creationId xmlns:a16="http://schemas.microsoft.com/office/drawing/2014/main" xmlns="" id="{EE6603C1-6E1A-4E4B-9555-31D84B6BDAD9}"/>
               </a:ext>
             </a:extLst>
           </p:cNvPr>
@@ -13821,7 +13824,7 @@
           <p:cNvPr id="41" name="Graphic 39">
             <a:extLst>
               <a:ext uri="{FF2B5EF4-FFF2-40B4-BE49-F238E27FC236}">
-                <a16:creationId xmlns="" xmlns:a16="http://schemas.microsoft.com/office/drawing/2014/main" id="{1D75FFD8-3F66-48B3-BB01-D4B8A9496851}"/>
+                <a16:creationId xmlns:a16="http://schemas.microsoft.com/office/drawing/2014/main" xmlns="" id="{1D75FFD8-3F66-48B3-BB01-D4B8A9496851}"/>
               </a:ext>
             </a:extLst>
           </p:cNvPr>
@@ -13841,7 +13844,7 @@
             <p:cNvPr id="42" name="Freeform: Shape 41">
               <a:extLst>
                 <a:ext uri="{FF2B5EF4-FFF2-40B4-BE49-F238E27FC236}">
-                  <a16:creationId xmlns="" xmlns:a16="http://schemas.microsoft.com/office/drawing/2014/main" id="{9BA0EC60-510D-41EF-AFE6-E4E6BD83F8C9}"/>
+                  <a16:creationId xmlns:a16="http://schemas.microsoft.com/office/drawing/2014/main" xmlns="" id="{9BA0EC60-510D-41EF-AFE6-E4E6BD83F8C9}"/>
                 </a:ext>
               </a:extLst>
             </p:cNvPr>
@@ -14031,7 +14034,7 @@
             <p:cNvPr id="43" name="Freeform: Shape 42">
               <a:extLst>
                 <a:ext uri="{FF2B5EF4-FFF2-40B4-BE49-F238E27FC236}">
-                  <a16:creationId xmlns="" xmlns:a16="http://schemas.microsoft.com/office/drawing/2014/main" id="{0162C508-E081-418C-A19D-15A59388C43A}"/>
+                  <a16:creationId xmlns:a16="http://schemas.microsoft.com/office/drawing/2014/main" xmlns="" id="{0162C508-E081-418C-A19D-15A59388C43A}"/>
                 </a:ext>
               </a:extLst>
             </p:cNvPr>
@@ -14139,7 +14142,7 @@
             <p:cNvPr id="44" name="Freeform: Shape 43">
               <a:extLst>
                 <a:ext uri="{FF2B5EF4-FFF2-40B4-BE49-F238E27FC236}">
-                  <a16:creationId xmlns="" xmlns:a16="http://schemas.microsoft.com/office/drawing/2014/main" id="{2A710D7D-FC65-4BF6-BDA4-E59B01AD6FBC}"/>
+                  <a16:creationId xmlns:a16="http://schemas.microsoft.com/office/drawing/2014/main" xmlns="" id="{2A710D7D-FC65-4BF6-BDA4-E59B01AD6FBC}"/>
                 </a:ext>
               </a:extLst>
             </p:cNvPr>
@@ -14247,7 +14250,7 @@
             <p:cNvPr id="45" name="Freeform: Shape 44">
               <a:extLst>
                 <a:ext uri="{FF2B5EF4-FFF2-40B4-BE49-F238E27FC236}">
-                  <a16:creationId xmlns="" xmlns:a16="http://schemas.microsoft.com/office/drawing/2014/main" id="{18811B6B-BBB0-4D69-AEF8-AD0A7F9A4B57}"/>
+                  <a16:creationId xmlns:a16="http://schemas.microsoft.com/office/drawing/2014/main" xmlns="" id="{18811B6B-BBB0-4D69-AEF8-AD0A7F9A4B57}"/>
                 </a:ext>
               </a:extLst>
             </p:cNvPr>
@@ -14355,7 +14358,7 @@
             <p:cNvPr id="46" name="Freeform: Shape 45">
               <a:extLst>
                 <a:ext uri="{FF2B5EF4-FFF2-40B4-BE49-F238E27FC236}">
-                  <a16:creationId xmlns="" xmlns:a16="http://schemas.microsoft.com/office/drawing/2014/main" id="{3DB7F04C-0D31-4172-9D02-F8C8B2043EB9}"/>
+                  <a16:creationId xmlns:a16="http://schemas.microsoft.com/office/drawing/2014/main" xmlns="" id="{3DB7F04C-0D31-4172-9D02-F8C8B2043EB9}"/>
                 </a:ext>
               </a:extLst>
             </p:cNvPr>
@@ -14535,7 +14538,7 @@
             <p:cNvPr id="47" name="Freeform: Shape 46">
               <a:extLst>
                 <a:ext uri="{FF2B5EF4-FFF2-40B4-BE49-F238E27FC236}">
-                  <a16:creationId xmlns="" xmlns:a16="http://schemas.microsoft.com/office/drawing/2014/main" id="{1FB04931-77A8-4259-95CA-DA7DEDB2DEFD}"/>
+                  <a16:creationId xmlns:a16="http://schemas.microsoft.com/office/drawing/2014/main" xmlns="" id="{1FB04931-77A8-4259-95CA-DA7DEDB2DEFD}"/>
                 </a:ext>
               </a:extLst>
             </p:cNvPr>
@@ -14756,7 +14759,7 @@
           <p:cNvPr id="39" name="Picture Placeholder 38">
             <a:extLst>
               <a:ext uri="{FF2B5EF4-FFF2-40B4-BE49-F238E27FC236}">
-                <a16:creationId xmlns="" xmlns:a16="http://schemas.microsoft.com/office/drawing/2014/main" id="{12A714F2-A8EC-40F7-ACFF-A00E1DD10C56}"/>
+                <a16:creationId xmlns:a16="http://schemas.microsoft.com/office/drawing/2014/main" xmlns="" id="{12A714F2-A8EC-40F7-ACFF-A00E1DD10C56}"/>
               </a:ext>
             </a:extLst>
           </p:cNvPr>
@@ -14923,7 +14926,7 @@
           <p:cNvPr id="34" name="Oval 33">
             <a:extLst>
               <a:ext uri="{FF2B5EF4-FFF2-40B4-BE49-F238E27FC236}">
-                <a16:creationId xmlns="" xmlns:a16="http://schemas.microsoft.com/office/drawing/2014/main" id="{13074BE4-153F-46FE-B915-CD1AEF318A25}"/>
+                <a16:creationId xmlns:a16="http://schemas.microsoft.com/office/drawing/2014/main" xmlns="" id="{13074BE4-153F-46FE-B915-CD1AEF318A25}"/>
               </a:ext>
             </a:extLst>
           </p:cNvPr>
@@ -14975,7 +14978,7 @@
           <p:cNvPr id="35" name="Graphic 12">
             <a:extLst>
               <a:ext uri="{FF2B5EF4-FFF2-40B4-BE49-F238E27FC236}">
-                <a16:creationId xmlns="" xmlns:a16="http://schemas.microsoft.com/office/drawing/2014/main" id="{0B7E91C4-F19E-46BE-B05F-139B5418924E}"/>
+                <a16:creationId xmlns:a16="http://schemas.microsoft.com/office/drawing/2014/main" xmlns="" id="{0B7E91C4-F19E-46BE-B05F-139B5418924E}"/>
               </a:ext>
             </a:extLst>
           </p:cNvPr>
@@ -15092,7 +15095,7 @@
           <p:cNvPr id="10" name="Freeform: Shape 9">
             <a:extLst>
               <a:ext uri="{FF2B5EF4-FFF2-40B4-BE49-F238E27FC236}">
-                <a16:creationId xmlns="" xmlns:a16="http://schemas.microsoft.com/office/drawing/2014/main" id="{08A64499-0304-4070-BCB0-67E2BE20A3EA}"/>
+                <a16:creationId xmlns:a16="http://schemas.microsoft.com/office/drawing/2014/main" xmlns="" id="{08A64499-0304-4070-BCB0-67E2BE20A3EA}"/>
               </a:ext>
             </a:extLst>
           </p:cNvPr>
@@ -15200,7 +15203,7 @@
           <p:cNvPr id="25" name="Freeform: Shape 24">
             <a:extLst>
               <a:ext uri="{FF2B5EF4-FFF2-40B4-BE49-F238E27FC236}">
-                <a16:creationId xmlns="" xmlns:a16="http://schemas.microsoft.com/office/drawing/2014/main" id="{ED1736B3-AE79-40C2-80FF-2FB0FEE27195}"/>
+                <a16:creationId xmlns:a16="http://schemas.microsoft.com/office/drawing/2014/main" xmlns="" id="{ED1736B3-AE79-40C2-80FF-2FB0FEE27195}"/>
               </a:ext>
             </a:extLst>
           </p:cNvPr>
@@ -15290,7 +15293,7 @@
           <p:cNvPr id="2" name="Title 1">
             <a:extLst>
               <a:ext uri="{FF2B5EF4-FFF2-40B4-BE49-F238E27FC236}">
-                <a16:creationId xmlns="" xmlns:a16="http://schemas.microsoft.com/office/drawing/2014/main" id="{DC2228EE-3546-4272-9C39-150FF23CE033}"/>
+                <a16:creationId xmlns:a16="http://schemas.microsoft.com/office/drawing/2014/main" xmlns="" id="{DC2228EE-3546-4272-9C39-150FF23CE033}"/>
               </a:ext>
             </a:extLst>
           </p:cNvPr>
@@ -15342,7 +15345,7 @@
           <p:cNvPr id="3" name="Subtitle 2">
             <a:extLst>
               <a:ext uri="{FF2B5EF4-FFF2-40B4-BE49-F238E27FC236}">
-                <a16:creationId xmlns="" xmlns:a16="http://schemas.microsoft.com/office/drawing/2014/main" id="{0F2EFCC6-4D5A-4B43-A534-1A868887BC7F}"/>
+                <a16:creationId xmlns:a16="http://schemas.microsoft.com/office/drawing/2014/main" xmlns="" id="{0F2EFCC6-4D5A-4B43-A534-1A868887BC7F}"/>
               </a:ext>
             </a:extLst>
           </p:cNvPr>
@@ -15419,7 +15422,7 @@
           <p:cNvPr id="4" name="Date Placeholder 3">
             <a:extLst>
               <a:ext uri="{FF2B5EF4-FFF2-40B4-BE49-F238E27FC236}">
-                <a16:creationId xmlns="" xmlns:a16="http://schemas.microsoft.com/office/drawing/2014/main" id="{0FD10BB4-D57E-4372-8E10-AC15DC09615A}"/>
+                <a16:creationId xmlns:a16="http://schemas.microsoft.com/office/drawing/2014/main" xmlns="" id="{0FD10BB4-D57E-4372-8E10-AC15DC09615A}"/>
               </a:ext>
             </a:extLst>
           </p:cNvPr>
@@ -15447,7 +15450,7 @@
           <p:cNvPr id="5" name="Footer Placeholder 4">
             <a:extLst>
               <a:ext uri="{FF2B5EF4-FFF2-40B4-BE49-F238E27FC236}">
-                <a16:creationId xmlns="" xmlns:a16="http://schemas.microsoft.com/office/drawing/2014/main" id="{66020939-F172-405E-A418-A87CE5D908B7}"/>
+                <a16:creationId xmlns:a16="http://schemas.microsoft.com/office/drawing/2014/main" xmlns="" id="{66020939-F172-405E-A418-A87CE5D908B7}"/>
               </a:ext>
             </a:extLst>
           </p:cNvPr>
@@ -15484,7 +15487,7 @@
           <p:cNvPr id="24" name="Graphic 22">
             <a:extLst>
               <a:ext uri="{FF2B5EF4-FFF2-40B4-BE49-F238E27FC236}">
-                <a16:creationId xmlns="" xmlns:a16="http://schemas.microsoft.com/office/drawing/2014/main" id="{4EE1436E-33B5-4388-87D8-2D0633CC3CE7}"/>
+                <a16:creationId xmlns:a16="http://schemas.microsoft.com/office/drawing/2014/main" xmlns="" id="{4EE1436E-33B5-4388-87D8-2D0633CC3CE7}"/>
               </a:ext>
             </a:extLst>
           </p:cNvPr>
@@ -15620,7 +15623,7 @@
           <p:cNvPr id="9" name="Freeform: Shape 8">
             <a:extLst>
               <a:ext uri="{FF2B5EF4-FFF2-40B4-BE49-F238E27FC236}">
-                <a16:creationId xmlns="" xmlns:a16="http://schemas.microsoft.com/office/drawing/2014/main" id="{A8FB11AB-3031-47CA-85DD-696856C3C62C}"/>
+                <a16:creationId xmlns:a16="http://schemas.microsoft.com/office/drawing/2014/main" xmlns="" id="{A8FB11AB-3031-47CA-85DD-696856C3C62C}"/>
               </a:ext>
             </a:extLst>
           </p:cNvPr>
@@ -15728,7 +15731,7 @@
           <p:cNvPr id="6" name="Slide Number Placeholder 5">
             <a:extLst>
               <a:ext uri="{FF2B5EF4-FFF2-40B4-BE49-F238E27FC236}">
-                <a16:creationId xmlns="" xmlns:a16="http://schemas.microsoft.com/office/drawing/2014/main" id="{E0210624-61F8-48B2-BD00-D3BC39DEBDCF}"/>
+                <a16:creationId xmlns:a16="http://schemas.microsoft.com/office/drawing/2014/main" xmlns="" id="{E0210624-61F8-48B2-BD00-D3BC39DEBDCF}"/>
               </a:ext>
             </a:extLst>
           </p:cNvPr>
@@ -15757,7 +15760,7 @@
           <p:cNvPr id="38" name="Freeform: Shape 37">
             <a:extLst>
               <a:ext uri="{FF2B5EF4-FFF2-40B4-BE49-F238E27FC236}">
-                <a16:creationId xmlns="" xmlns:a16="http://schemas.microsoft.com/office/drawing/2014/main" id="{9CD6F167-FB82-4EFB-BAB9-1D0FEE07B85D}"/>
+                <a16:creationId xmlns:a16="http://schemas.microsoft.com/office/drawing/2014/main" xmlns="" id="{9CD6F167-FB82-4EFB-BAB9-1D0FEE07B85D}"/>
               </a:ext>
             </a:extLst>
           </p:cNvPr>
@@ -15883,7 +15886,7 @@
           <p:cNvPr id="36" name="Freeform: Shape 35">
             <a:extLst>
               <a:ext uri="{FF2B5EF4-FFF2-40B4-BE49-F238E27FC236}">
-                <a16:creationId xmlns="" xmlns:a16="http://schemas.microsoft.com/office/drawing/2014/main" id="{3DD2082D-81A7-4E2D-8136-9D48016E7FE9}"/>
+                <a16:creationId xmlns:a16="http://schemas.microsoft.com/office/drawing/2014/main" xmlns="" id="{3DD2082D-81A7-4E2D-8136-9D48016E7FE9}"/>
               </a:ext>
             </a:extLst>
           </p:cNvPr>
@@ -15973,7 +15976,7 @@
           <p:cNvPr id="30" name="Freeform: Shape 29">
             <a:extLst>
               <a:ext uri="{FF2B5EF4-FFF2-40B4-BE49-F238E27FC236}">
-                <a16:creationId xmlns="" xmlns:a16="http://schemas.microsoft.com/office/drawing/2014/main" id="{ECF16C35-4A81-4062-808C-7697AF0FD6F5}"/>
+                <a16:creationId xmlns:a16="http://schemas.microsoft.com/office/drawing/2014/main" xmlns="" id="{ECF16C35-4A81-4062-808C-7697AF0FD6F5}"/>
               </a:ext>
             </a:extLst>
           </p:cNvPr>
@@ -16293,7 +16296,7 @@
           <p:cNvPr id="26" name="Picture Placeholder 25">
             <a:extLst>
               <a:ext uri="{FF2B5EF4-FFF2-40B4-BE49-F238E27FC236}">
-                <a16:creationId xmlns="" xmlns:a16="http://schemas.microsoft.com/office/drawing/2014/main" id="{5A97CE06-9ECC-4438-8B22-B58B27F2B5FA}"/>
+                <a16:creationId xmlns:a16="http://schemas.microsoft.com/office/drawing/2014/main" xmlns="" id="{5A97CE06-9ECC-4438-8B22-B58B27F2B5FA}"/>
               </a:ext>
             </a:extLst>
           </p:cNvPr>
@@ -16496,7 +16499,7 @@
           <p:cNvPr id="24" name="Oval 23">
             <a:extLst>
               <a:ext uri="{FF2B5EF4-FFF2-40B4-BE49-F238E27FC236}">
-                <a16:creationId xmlns="" xmlns:a16="http://schemas.microsoft.com/office/drawing/2014/main" id="{CE8B26E3-C9CA-4CFF-8221-19518F497FF4}"/>
+                <a16:creationId xmlns:a16="http://schemas.microsoft.com/office/drawing/2014/main" xmlns="" id="{CE8B26E3-C9CA-4CFF-8221-19518F497FF4}"/>
               </a:ext>
             </a:extLst>
           </p:cNvPr>
@@ -16548,7 +16551,7 @@
           <p:cNvPr id="25" name="Graphic 12">
             <a:extLst>
               <a:ext uri="{FF2B5EF4-FFF2-40B4-BE49-F238E27FC236}">
-                <a16:creationId xmlns="" xmlns:a16="http://schemas.microsoft.com/office/drawing/2014/main" id="{A9957602-C843-44E0-A93F-66AF5A6A0F0A}"/>
+                <a16:creationId xmlns:a16="http://schemas.microsoft.com/office/drawing/2014/main" xmlns="" id="{A9957602-C843-44E0-A93F-66AF5A6A0F0A}"/>
               </a:ext>
             </a:extLst>
           </p:cNvPr>
@@ -16665,7 +16668,7 @@
           <p:cNvPr id="2" name="Title 1">
             <a:extLst>
               <a:ext uri="{FF2B5EF4-FFF2-40B4-BE49-F238E27FC236}">
-                <a16:creationId xmlns="" xmlns:a16="http://schemas.microsoft.com/office/drawing/2014/main" id="{7242568A-7F20-40F2-9490-E3BC7466DA0D}"/>
+                <a16:creationId xmlns:a16="http://schemas.microsoft.com/office/drawing/2014/main" xmlns="" id="{7242568A-7F20-40F2-9490-E3BC7466DA0D}"/>
               </a:ext>
             </a:extLst>
           </p:cNvPr>
@@ -16703,7 +16706,7 @@
           <p:cNvPr id="4" name="Date Placeholder 3">
             <a:extLst>
               <a:ext uri="{FF2B5EF4-FFF2-40B4-BE49-F238E27FC236}">
-                <a16:creationId xmlns="" xmlns:a16="http://schemas.microsoft.com/office/drawing/2014/main" id="{AC6F89F8-3E24-406D-9C49-00E6E47E4AAC}"/>
+                <a16:creationId xmlns:a16="http://schemas.microsoft.com/office/drawing/2014/main" xmlns="" id="{AC6F89F8-3E24-406D-9C49-00E6E47E4AAC}"/>
               </a:ext>
             </a:extLst>
           </p:cNvPr>
@@ -16731,7 +16734,7 @@
           <p:cNvPr id="5" name="Footer Placeholder 4">
             <a:extLst>
               <a:ext uri="{FF2B5EF4-FFF2-40B4-BE49-F238E27FC236}">
-                <a16:creationId xmlns="" xmlns:a16="http://schemas.microsoft.com/office/drawing/2014/main" id="{4392DBDA-ED00-4248-AC6D-0CE0B821B52F}"/>
+                <a16:creationId xmlns:a16="http://schemas.microsoft.com/office/drawing/2014/main" xmlns="" id="{4392DBDA-ED00-4248-AC6D-0CE0B821B52F}"/>
               </a:ext>
             </a:extLst>
           </p:cNvPr>
@@ -16768,7 +16771,7 @@
           <p:cNvPr id="6" name="Slide Number Placeholder 5">
             <a:extLst>
               <a:ext uri="{FF2B5EF4-FFF2-40B4-BE49-F238E27FC236}">
-                <a16:creationId xmlns="" xmlns:a16="http://schemas.microsoft.com/office/drawing/2014/main" id="{EC2B5F97-2F18-4EF2-9CBC-AAAB9FF4CC91}"/>
+                <a16:creationId xmlns:a16="http://schemas.microsoft.com/office/drawing/2014/main" xmlns="" id="{EC2B5F97-2F18-4EF2-9CBC-AAAB9FF4CC91}"/>
               </a:ext>
             </a:extLst>
           </p:cNvPr>
@@ -16797,7 +16800,7 @@
           <p:cNvPr id="10" name="Freeform: Shape 9">
             <a:extLst>
               <a:ext uri="{FF2B5EF4-FFF2-40B4-BE49-F238E27FC236}">
-                <a16:creationId xmlns="" xmlns:a16="http://schemas.microsoft.com/office/drawing/2014/main" id="{7492975F-6F5D-4157-A751-54BACCCF1800}"/>
+                <a16:creationId xmlns:a16="http://schemas.microsoft.com/office/drawing/2014/main" xmlns="" id="{7492975F-6F5D-4157-A751-54BACCCF1800}"/>
               </a:ext>
             </a:extLst>
           </p:cNvPr>
@@ -16905,7 +16908,7 @@
           <p:cNvPr id="13" name="Freeform: Shape 12">
             <a:extLst>
               <a:ext uri="{FF2B5EF4-FFF2-40B4-BE49-F238E27FC236}">
-                <a16:creationId xmlns="" xmlns:a16="http://schemas.microsoft.com/office/drawing/2014/main" id="{6C50EDEB-35C1-4DED-A608-A0EAA8DE5404}"/>
+                <a16:creationId xmlns:a16="http://schemas.microsoft.com/office/drawing/2014/main" xmlns="" id="{6C50EDEB-35C1-4DED-A608-A0EAA8DE5404}"/>
               </a:ext>
             </a:extLst>
           </p:cNvPr>
@@ -17065,7 +17068,7 @@
           <p:cNvPr id="16" name="Text Placeholder 14">
             <a:extLst>
               <a:ext uri="{FF2B5EF4-FFF2-40B4-BE49-F238E27FC236}">
-                <a16:creationId xmlns="" xmlns:a16="http://schemas.microsoft.com/office/drawing/2014/main" id="{F469DEB5-CC79-4D71-8360-0B10B34244B7}"/>
+                <a16:creationId xmlns:a16="http://schemas.microsoft.com/office/drawing/2014/main" xmlns="" id="{F469DEB5-CC79-4D71-8360-0B10B34244B7}"/>
               </a:ext>
             </a:extLst>
           </p:cNvPr>
@@ -17106,7 +17109,7 @@
           <p:cNvPr id="17" name="Text Placeholder 14">
             <a:extLst>
               <a:ext uri="{FF2B5EF4-FFF2-40B4-BE49-F238E27FC236}">
-                <a16:creationId xmlns="" xmlns:a16="http://schemas.microsoft.com/office/drawing/2014/main" id="{9EE0722D-F13C-4FFB-9E31-CC024B92E6CD}"/>
+                <a16:creationId xmlns:a16="http://schemas.microsoft.com/office/drawing/2014/main" xmlns="" id="{9EE0722D-F13C-4FFB-9E31-CC024B92E6CD}"/>
               </a:ext>
             </a:extLst>
           </p:cNvPr>
@@ -17161,7 +17164,7 @@
           <p:cNvPr id="3" name="Graphic 22">
             <a:extLst>
               <a:ext uri="{FF2B5EF4-FFF2-40B4-BE49-F238E27FC236}">
-                <a16:creationId xmlns="" xmlns:a16="http://schemas.microsoft.com/office/drawing/2014/main" id="{827885C7-FA6F-4513-83BC-BEAD42F63D5B}"/>
+                <a16:creationId xmlns:a16="http://schemas.microsoft.com/office/drawing/2014/main" xmlns="" id="{827885C7-FA6F-4513-83BC-BEAD42F63D5B}"/>
               </a:ext>
             </a:extLst>
           </p:cNvPr>
@@ -17297,7 +17300,7 @@
           <p:cNvPr id="22" name="Freeform: Shape 21">
             <a:extLst>
               <a:ext uri="{FF2B5EF4-FFF2-40B4-BE49-F238E27FC236}">
-                <a16:creationId xmlns="" xmlns:a16="http://schemas.microsoft.com/office/drawing/2014/main" id="{30961087-B677-45AC-8D02-FEE615D17609}"/>
+                <a16:creationId xmlns:a16="http://schemas.microsoft.com/office/drawing/2014/main" xmlns="" id="{30961087-B677-45AC-8D02-FEE615D17609}"/>
               </a:ext>
             </a:extLst>
           </p:cNvPr>
@@ -17435,7 +17438,7 @@
           <p:cNvPr id="42" name="Picture Placeholder 41">
             <a:extLst>
               <a:ext uri="{FF2B5EF4-FFF2-40B4-BE49-F238E27FC236}">
-                <a16:creationId xmlns="" xmlns:a16="http://schemas.microsoft.com/office/drawing/2014/main" id="{D6E0F90B-941A-45B6-85DA-E0D4E7977CD8}"/>
+                <a16:creationId xmlns:a16="http://schemas.microsoft.com/office/drawing/2014/main" xmlns="" id="{D6E0F90B-941A-45B6-85DA-E0D4E7977CD8}"/>
               </a:ext>
             </a:extLst>
           </p:cNvPr>
@@ -17672,7 +17675,7 @@
           <p:cNvPr id="35" name="Oval 34">
             <a:extLst>
               <a:ext uri="{FF2B5EF4-FFF2-40B4-BE49-F238E27FC236}">
-                <a16:creationId xmlns="" xmlns:a16="http://schemas.microsoft.com/office/drawing/2014/main" id="{7BC6DBB9-1B34-4374-A887-DC30F9E2F62F}"/>
+                <a16:creationId xmlns:a16="http://schemas.microsoft.com/office/drawing/2014/main" xmlns="" id="{7BC6DBB9-1B34-4374-A887-DC30F9E2F62F}"/>
               </a:ext>
             </a:extLst>
           </p:cNvPr>
@@ -17724,7 +17727,7 @@
           <p:cNvPr id="36" name="Graphic 12">
             <a:extLst>
               <a:ext uri="{FF2B5EF4-FFF2-40B4-BE49-F238E27FC236}">
-                <a16:creationId xmlns="" xmlns:a16="http://schemas.microsoft.com/office/drawing/2014/main" id="{00DE0AE3-F44D-4F2C-B7A3-C253AA498DEF}"/>
+                <a16:creationId xmlns:a16="http://schemas.microsoft.com/office/drawing/2014/main" xmlns="" id="{00DE0AE3-F44D-4F2C-B7A3-C253AA498DEF}"/>
               </a:ext>
             </a:extLst>
           </p:cNvPr>
@@ -17841,7 +17844,7 @@
           <p:cNvPr id="2" name="Title 1">
             <a:extLst>
               <a:ext uri="{FF2B5EF4-FFF2-40B4-BE49-F238E27FC236}">
-                <a16:creationId xmlns="" xmlns:a16="http://schemas.microsoft.com/office/drawing/2014/main" id="{7242568A-7F20-40F2-9490-E3BC7466DA0D}"/>
+                <a16:creationId xmlns:a16="http://schemas.microsoft.com/office/drawing/2014/main" xmlns="" id="{7242568A-7F20-40F2-9490-E3BC7466DA0D}"/>
               </a:ext>
             </a:extLst>
           </p:cNvPr>
@@ -17879,7 +17882,7 @@
           <p:cNvPr id="4" name="Date Placeholder 3">
             <a:extLst>
               <a:ext uri="{FF2B5EF4-FFF2-40B4-BE49-F238E27FC236}">
-                <a16:creationId xmlns="" xmlns:a16="http://schemas.microsoft.com/office/drawing/2014/main" id="{AC6F89F8-3E24-406D-9C49-00E6E47E4AAC}"/>
+                <a16:creationId xmlns:a16="http://schemas.microsoft.com/office/drawing/2014/main" xmlns="" id="{AC6F89F8-3E24-406D-9C49-00E6E47E4AAC}"/>
               </a:ext>
             </a:extLst>
           </p:cNvPr>
@@ -17907,7 +17910,7 @@
           <p:cNvPr id="5" name="Footer Placeholder 4">
             <a:extLst>
               <a:ext uri="{FF2B5EF4-FFF2-40B4-BE49-F238E27FC236}">
-                <a16:creationId xmlns="" xmlns:a16="http://schemas.microsoft.com/office/drawing/2014/main" id="{4392DBDA-ED00-4248-AC6D-0CE0B821B52F}"/>
+                <a16:creationId xmlns:a16="http://schemas.microsoft.com/office/drawing/2014/main" xmlns="" id="{4392DBDA-ED00-4248-AC6D-0CE0B821B52F}"/>
               </a:ext>
             </a:extLst>
           </p:cNvPr>
@@ -17944,7 +17947,7 @@
           <p:cNvPr id="6" name="Slide Number Placeholder 5">
             <a:extLst>
               <a:ext uri="{FF2B5EF4-FFF2-40B4-BE49-F238E27FC236}">
-                <a16:creationId xmlns="" xmlns:a16="http://schemas.microsoft.com/office/drawing/2014/main" id="{EC2B5F97-2F18-4EF2-9CBC-AAAB9FF4CC91}"/>
+                <a16:creationId xmlns:a16="http://schemas.microsoft.com/office/drawing/2014/main" xmlns="" id="{EC2B5F97-2F18-4EF2-9CBC-AAAB9FF4CC91}"/>
               </a:ext>
             </a:extLst>
           </p:cNvPr>
@@ -17973,7 +17976,7 @@
           <p:cNvPr id="18" name="Text Placeholder 14">
             <a:extLst>
               <a:ext uri="{FF2B5EF4-FFF2-40B4-BE49-F238E27FC236}">
-                <a16:creationId xmlns="" xmlns:a16="http://schemas.microsoft.com/office/drawing/2014/main" id="{82903A57-2768-42F8-A5EA-4C19B9049850}"/>
+                <a16:creationId xmlns:a16="http://schemas.microsoft.com/office/drawing/2014/main" xmlns="" id="{82903A57-2768-42F8-A5EA-4C19B9049850}"/>
               </a:ext>
             </a:extLst>
           </p:cNvPr>
@@ -18028,7 +18031,7 @@
           <p:cNvPr id="38" name="Freeform: Shape 37">
             <a:extLst>
               <a:ext uri="{FF2B5EF4-FFF2-40B4-BE49-F238E27FC236}">
-                <a16:creationId xmlns="" xmlns:a16="http://schemas.microsoft.com/office/drawing/2014/main" id="{C6C05708-08C7-4EF1-B0D8-6A01C1B1AD85}"/>
+                <a16:creationId xmlns:a16="http://schemas.microsoft.com/office/drawing/2014/main" xmlns="" id="{C6C05708-08C7-4EF1-B0D8-6A01C1B1AD85}"/>
               </a:ext>
             </a:extLst>
           </p:cNvPr>
@@ -18136,7 +18139,7 @@
           <p:cNvPr id="29" name="Freeform: Shape 28">
             <a:extLst>
               <a:ext uri="{FF2B5EF4-FFF2-40B4-BE49-F238E27FC236}">
-                <a16:creationId xmlns="" xmlns:a16="http://schemas.microsoft.com/office/drawing/2014/main" id="{E46691B2-7AF3-4CAC-A285-36444A9101D9}"/>
+                <a16:creationId xmlns:a16="http://schemas.microsoft.com/office/drawing/2014/main" xmlns="" id="{E46691B2-7AF3-4CAC-A285-36444A9101D9}"/>
               </a:ext>
             </a:extLst>
           </p:cNvPr>
@@ -18226,7 +18229,7 @@
           <p:cNvPr id="26" name="Freeform: Shape 25">
             <a:extLst>
               <a:ext uri="{FF2B5EF4-FFF2-40B4-BE49-F238E27FC236}">
-                <a16:creationId xmlns="" xmlns:a16="http://schemas.microsoft.com/office/drawing/2014/main" id="{FE8ACF66-A148-4D4F-A35C-837CDC6B154D}"/>
+                <a16:creationId xmlns:a16="http://schemas.microsoft.com/office/drawing/2014/main" xmlns="" id="{FE8ACF66-A148-4D4F-A35C-837CDC6B154D}"/>
               </a:ext>
             </a:extLst>
           </p:cNvPr>
@@ -18316,7 +18319,7 @@
           <p:cNvPr id="28" name="Text Placeholder 26">
             <a:extLst>
               <a:ext uri="{FF2B5EF4-FFF2-40B4-BE49-F238E27FC236}">
-                <a16:creationId xmlns="" xmlns:a16="http://schemas.microsoft.com/office/drawing/2014/main" id="{5F10B1F7-5633-4C8B-A868-72D9C782CBA6}"/>
+                <a16:creationId xmlns:a16="http://schemas.microsoft.com/office/drawing/2014/main" xmlns="" id="{5F10B1F7-5633-4C8B-A868-72D9C782CBA6}"/>
               </a:ext>
             </a:extLst>
           </p:cNvPr>
@@ -18373,7 +18376,7 @@
           <p:cNvPr id="31" name="Text Placeholder 29">
             <a:extLst>
               <a:ext uri="{FF2B5EF4-FFF2-40B4-BE49-F238E27FC236}">
-                <a16:creationId xmlns="" xmlns:a16="http://schemas.microsoft.com/office/drawing/2014/main" id="{CBA9BCD0-48BA-4D5B-8871-61204EACE422}"/>
+                <a16:creationId xmlns:a16="http://schemas.microsoft.com/office/drawing/2014/main" xmlns="" id="{CBA9BCD0-48BA-4D5B-8871-61204EACE422}"/>
               </a:ext>
             </a:extLst>
           </p:cNvPr>
@@ -18463,7 +18466,7 @@
           <p:cNvPr id="3" name="Graphic 33">
             <a:extLst>
               <a:ext uri="{FF2B5EF4-FFF2-40B4-BE49-F238E27FC236}">
-                <a16:creationId xmlns="" xmlns:a16="http://schemas.microsoft.com/office/drawing/2014/main" id="{38956B41-4EE0-4C7C-8436-027F5DE8B1BC}"/>
+                <a16:creationId xmlns:a16="http://schemas.microsoft.com/office/drawing/2014/main" xmlns="" id="{38956B41-4EE0-4C7C-8436-027F5DE8B1BC}"/>
               </a:ext>
             </a:extLst>
           </p:cNvPr>
@@ -18599,7 +18602,7 @@
           <p:cNvPr id="33" name="Freeform: Shape 32">
             <a:extLst>
               <a:ext uri="{FF2B5EF4-FFF2-40B4-BE49-F238E27FC236}">
-                <a16:creationId xmlns="" xmlns:a16="http://schemas.microsoft.com/office/drawing/2014/main" id="{E08687FC-7322-4F20-9769-1ECF4296A96E}"/>
+                <a16:creationId xmlns:a16="http://schemas.microsoft.com/office/drawing/2014/main" xmlns="" id="{E08687FC-7322-4F20-9769-1ECF4296A96E}"/>
               </a:ext>
             </a:extLst>
           </p:cNvPr>
@@ -18707,7 +18710,7 @@
           <p:cNvPr id="41" name="Freeform: Shape 40">
             <a:extLst>
               <a:ext uri="{FF2B5EF4-FFF2-40B4-BE49-F238E27FC236}">
-                <a16:creationId xmlns="" xmlns:a16="http://schemas.microsoft.com/office/drawing/2014/main" id="{0FCCDE26-7222-4C1B-884A-0FAE84FA57DB}"/>
+                <a16:creationId xmlns:a16="http://schemas.microsoft.com/office/drawing/2014/main" xmlns="" id="{0FCCDE26-7222-4C1B-884A-0FAE84FA57DB}"/>
               </a:ext>
             </a:extLst>
           </p:cNvPr>
@@ -18845,7 +18848,7 @@
           <p:cNvPr id="48" name="Oval 47">
             <a:extLst>
               <a:ext uri="{FF2B5EF4-FFF2-40B4-BE49-F238E27FC236}">
-                <a16:creationId xmlns="" xmlns:a16="http://schemas.microsoft.com/office/drawing/2014/main" id="{6F44C9A9-0E74-4918-9B66-273196D2956C}"/>
+                <a16:creationId xmlns:a16="http://schemas.microsoft.com/office/drawing/2014/main" xmlns="" id="{6F44C9A9-0E74-4918-9B66-273196D2956C}"/>
               </a:ext>
             </a:extLst>
           </p:cNvPr>
@@ -18899,7 +18902,7 @@
           <p:cNvPr id="49" name="Graphic 12">
             <a:extLst>
               <a:ext uri="{FF2B5EF4-FFF2-40B4-BE49-F238E27FC236}">
-                <a16:creationId xmlns="" xmlns:a16="http://schemas.microsoft.com/office/drawing/2014/main" id="{4FD74D9D-1BEE-4A13-ABAA-5FBA5C4D1BFA}"/>
+                <a16:creationId xmlns:a16="http://schemas.microsoft.com/office/drawing/2014/main" xmlns="" id="{4FD74D9D-1BEE-4A13-ABAA-5FBA5C4D1BFA}"/>
               </a:ext>
             </a:extLst>
           </p:cNvPr>
@@ -19007,7 +19010,7 @@
           <p:cNvPr id="2" name="Title 1">
             <a:extLst>
               <a:ext uri="{FF2B5EF4-FFF2-40B4-BE49-F238E27FC236}">
-                <a16:creationId xmlns="" xmlns:a16="http://schemas.microsoft.com/office/drawing/2014/main" id="{81053F33-9837-4E9F-8D29-24A800D841E9}"/>
+                <a16:creationId xmlns:a16="http://schemas.microsoft.com/office/drawing/2014/main" xmlns="" id="{81053F33-9837-4E9F-8D29-24A800D841E9}"/>
               </a:ext>
             </a:extLst>
           </p:cNvPr>
@@ -19047,7 +19050,7 @@
           <p:cNvPr id="3" name="Text Placeholder 2">
             <a:extLst>
               <a:ext uri="{FF2B5EF4-FFF2-40B4-BE49-F238E27FC236}">
-                <a16:creationId xmlns="" xmlns:a16="http://schemas.microsoft.com/office/drawing/2014/main" id="{40DFDBBD-D278-4F5A-BD28-172F5B157E88}"/>
+                <a16:creationId xmlns:a16="http://schemas.microsoft.com/office/drawing/2014/main" xmlns="" id="{40DFDBBD-D278-4F5A-BD28-172F5B157E88}"/>
               </a:ext>
             </a:extLst>
           </p:cNvPr>
@@ -19173,7 +19176,7 @@
           <p:cNvPr id="4" name="Date Placeholder 3">
             <a:extLst>
               <a:ext uri="{FF2B5EF4-FFF2-40B4-BE49-F238E27FC236}">
-                <a16:creationId xmlns="" xmlns:a16="http://schemas.microsoft.com/office/drawing/2014/main" id="{DC2A0631-3130-4C36-8E5E-80464B1A62A7}"/>
+                <a16:creationId xmlns:a16="http://schemas.microsoft.com/office/drawing/2014/main" xmlns="" id="{DC2A0631-3130-4C36-8E5E-80464B1A62A7}"/>
               </a:ext>
             </a:extLst>
           </p:cNvPr>
@@ -19201,7 +19204,7 @@
           <p:cNvPr id="5" name="Footer Placeholder 4">
             <a:extLst>
               <a:ext uri="{FF2B5EF4-FFF2-40B4-BE49-F238E27FC236}">
-                <a16:creationId xmlns="" xmlns:a16="http://schemas.microsoft.com/office/drawing/2014/main" id="{79230F82-FE68-4450-98DF-5D29369AEE76}"/>
+                <a16:creationId xmlns:a16="http://schemas.microsoft.com/office/drawing/2014/main" xmlns="" id="{79230F82-FE68-4450-98DF-5D29369AEE76}"/>
               </a:ext>
             </a:extLst>
           </p:cNvPr>
@@ -19238,7 +19241,7 @@
           <p:cNvPr id="6" name="Slide Number Placeholder 5">
             <a:extLst>
               <a:ext uri="{FF2B5EF4-FFF2-40B4-BE49-F238E27FC236}">
-                <a16:creationId xmlns="" xmlns:a16="http://schemas.microsoft.com/office/drawing/2014/main" id="{EE6603C1-6E1A-4E4B-9555-31D84B6BDAD9}"/>
+                <a16:creationId xmlns:a16="http://schemas.microsoft.com/office/drawing/2014/main" xmlns="" id="{EE6603C1-6E1A-4E4B-9555-31D84B6BDAD9}"/>
               </a:ext>
             </a:extLst>
           </p:cNvPr>
@@ -19272,7 +19275,7 @@
           <p:cNvPr id="17" name="Text Placeholder 26">
             <a:extLst>
               <a:ext uri="{FF2B5EF4-FFF2-40B4-BE49-F238E27FC236}">
-                <a16:creationId xmlns="" xmlns:a16="http://schemas.microsoft.com/office/drawing/2014/main" id="{C990C5BD-BC2C-4822-AA4E-446B77052F23}"/>
+                <a16:creationId xmlns:a16="http://schemas.microsoft.com/office/drawing/2014/main" xmlns="" id="{C990C5BD-BC2C-4822-AA4E-446B77052F23}"/>
               </a:ext>
             </a:extLst>
           </p:cNvPr>
@@ -19329,7 +19332,7 @@
           <p:cNvPr id="22" name="Graphic 19">
             <a:extLst>
               <a:ext uri="{FF2B5EF4-FFF2-40B4-BE49-F238E27FC236}">
-                <a16:creationId xmlns="" xmlns:a16="http://schemas.microsoft.com/office/drawing/2014/main" id="{258EB2BC-F42B-4177-83EB-F2D2BF76129C}"/>
+                <a16:creationId xmlns:a16="http://schemas.microsoft.com/office/drawing/2014/main" xmlns="" id="{258EB2BC-F42B-4177-83EB-F2D2BF76129C}"/>
               </a:ext>
             </a:extLst>
           </p:cNvPr>
@@ -19459,7 +19462,7 @@
           <p:cNvPr id="24" name="Text Placeholder 2">
             <a:extLst>
               <a:ext uri="{FF2B5EF4-FFF2-40B4-BE49-F238E27FC236}">
-                <a16:creationId xmlns="" xmlns:a16="http://schemas.microsoft.com/office/drawing/2014/main" id="{B971AAD9-2660-4922-9B41-C45976A31C4F}"/>
+                <a16:creationId xmlns:a16="http://schemas.microsoft.com/office/drawing/2014/main" xmlns="" id="{B971AAD9-2660-4922-9B41-C45976A31C4F}"/>
               </a:ext>
             </a:extLst>
           </p:cNvPr>
@@ -19585,7 +19588,7 @@
           <p:cNvPr id="28" name="Text Placeholder 26">
             <a:extLst>
               <a:ext uri="{FF2B5EF4-FFF2-40B4-BE49-F238E27FC236}">
-                <a16:creationId xmlns="" xmlns:a16="http://schemas.microsoft.com/office/drawing/2014/main" id="{D0525F80-1CD7-406E-A2B0-ACB0CD78A32C}"/>
+                <a16:creationId xmlns:a16="http://schemas.microsoft.com/office/drawing/2014/main" xmlns="" id="{D0525F80-1CD7-406E-A2B0-ACB0CD78A32C}"/>
               </a:ext>
             </a:extLst>
           </p:cNvPr>
@@ -19678,7 +19681,7 @@
           <p:cNvPr id="30" name="Text Placeholder 26">
             <a:extLst>
               <a:ext uri="{FF2B5EF4-FFF2-40B4-BE49-F238E27FC236}">
-                <a16:creationId xmlns="" xmlns:a16="http://schemas.microsoft.com/office/drawing/2014/main" id="{527B617A-AB11-44E9-B2E2-53B7F35CD968}"/>
+                <a16:creationId xmlns:a16="http://schemas.microsoft.com/office/drawing/2014/main" xmlns="" id="{527B617A-AB11-44E9-B2E2-53B7F35CD968}"/>
               </a:ext>
             </a:extLst>
           </p:cNvPr>
@@ -19771,7 +19774,7 @@
           <p:cNvPr id="41" name="Graphic 39">
             <a:extLst>
               <a:ext uri="{FF2B5EF4-FFF2-40B4-BE49-F238E27FC236}">
-                <a16:creationId xmlns="" xmlns:a16="http://schemas.microsoft.com/office/drawing/2014/main" id="{F4C9083C-573A-4951-8064-8A2074E45857}"/>
+                <a16:creationId xmlns:a16="http://schemas.microsoft.com/office/drawing/2014/main" xmlns="" id="{F4C9083C-573A-4951-8064-8A2074E45857}"/>
               </a:ext>
             </a:extLst>
           </p:cNvPr>
@@ -19791,7 +19794,7 @@
             <p:cNvPr id="42" name="Freeform: Shape 41">
               <a:extLst>
                 <a:ext uri="{FF2B5EF4-FFF2-40B4-BE49-F238E27FC236}">
-                  <a16:creationId xmlns="" xmlns:a16="http://schemas.microsoft.com/office/drawing/2014/main" id="{E24D028E-B0C2-46BA-B6A7-734B26FEA989}"/>
+                  <a16:creationId xmlns:a16="http://schemas.microsoft.com/office/drawing/2014/main" xmlns="" id="{E24D028E-B0C2-46BA-B6A7-734B26FEA989}"/>
                 </a:ext>
               </a:extLst>
             </p:cNvPr>
@@ -19981,7 +19984,7 @@
             <p:cNvPr id="43" name="Freeform: Shape 42">
               <a:extLst>
                 <a:ext uri="{FF2B5EF4-FFF2-40B4-BE49-F238E27FC236}">
-                  <a16:creationId xmlns="" xmlns:a16="http://schemas.microsoft.com/office/drawing/2014/main" id="{1FD2C3DF-070C-48BB-8EC1-3FE31FCD20DC}"/>
+                  <a16:creationId xmlns:a16="http://schemas.microsoft.com/office/drawing/2014/main" xmlns="" id="{1FD2C3DF-070C-48BB-8EC1-3FE31FCD20DC}"/>
                 </a:ext>
               </a:extLst>
             </p:cNvPr>
@@ -20089,7 +20092,7 @@
             <p:cNvPr id="44" name="Freeform: Shape 43">
               <a:extLst>
                 <a:ext uri="{FF2B5EF4-FFF2-40B4-BE49-F238E27FC236}">
-                  <a16:creationId xmlns="" xmlns:a16="http://schemas.microsoft.com/office/drawing/2014/main" id="{F503CC8C-61AD-4DAB-B26E-509EA44669D4}"/>
+                  <a16:creationId xmlns:a16="http://schemas.microsoft.com/office/drawing/2014/main" xmlns="" id="{F503CC8C-61AD-4DAB-B26E-509EA44669D4}"/>
                 </a:ext>
               </a:extLst>
             </p:cNvPr>
@@ -20199,7 +20202,7 @@
             <p:cNvPr id="45" name="Freeform: Shape 44">
               <a:extLst>
                 <a:ext uri="{FF2B5EF4-FFF2-40B4-BE49-F238E27FC236}">
-                  <a16:creationId xmlns="" xmlns:a16="http://schemas.microsoft.com/office/drawing/2014/main" id="{8BB58BBD-BF4B-44A6-A2C8-AF1BE81D516E}"/>
+                  <a16:creationId xmlns:a16="http://schemas.microsoft.com/office/drawing/2014/main" xmlns="" id="{8BB58BBD-BF4B-44A6-A2C8-AF1BE81D516E}"/>
                 </a:ext>
               </a:extLst>
             </p:cNvPr>
@@ -20309,7 +20312,7 @@
             <p:cNvPr id="46" name="Freeform: Shape 45">
               <a:extLst>
                 <a:ext uri="{FF2B5EF4-FFF2-40B4-BE49-F238E27FC236}">
-                  <a16:creationId xmlns="" xmlns:a16="http://schemas.microsoft.com/office/drawing/2014/main" id="{602EAB3F-89ED-4532-AC15-8D6D0DE40EEB}"/>
+                  <a16:creationId xmlns:a16="http://schemas.microsoft.com/office/drawing/2014/main" xmlns="" id="{602EAB3F-89ED-4532-AC15-8D6D0DE40EEB}"/>
                 </a:ext>
               </a:extLst>
             </p:cNvPr>
@@ -20489,7 +20492,7 @@
             <p:cNvPr id="47" name="Freeform: Shape 46">
               <a:extLst>
                 <a:ext uri="{FF2B5EF4-FFF2-40B4-BE49-F238E27FC236}">
-                  <a16:creationId xmlns="" xmlns:a16="http://schemas.microsoft.com/office/drawing/2014/main" id="{714D3737-C4D1-46DE-A197-29A638CA1F30}"/>
+                  <a16:creationId xmlns:a16="http://schemas.microsoft.com/office/drawing/2014/main" xmlns="" id="{714D3737-C4D1-46DE-A197-29A638CA1F30}"/>
                 </a:ext>
               </a:extLst>
             </p:cNvPr>
@@ -20680,7 +20683,7 @@
           <p:cNvPr id="21" name="Imagen 18">
             <a:extLst>
               <a:ext uri="{FF2B5EF4-FFF2-40B4-BE49-F238E27FC236}">
-                <a16:creationId xmlns="" xmlns:a16="http://schemas.microsoft.com/office/drawing/2014/main" id="{CAA2F7E1-C4D5-49BC-9D8E-F33FED6ACF22}"/>
+                <a16:creationId xmlns:a16="http://schemas.microsoft.com/office/drawing/2014/main" xmlns="" id="{CAA2F7E1-C4D5-49BC-9D8E-F33FED6ACF22}"/>
               </a:ext>
             </a:extLst>
           </p:cNvPr>
@@ -20740,7 +20743,7 @@
           <p:cNvPr id="48" name="Oval 47">
             <a:extLst>
               <a:ext uri="{FF2B5EF4-FFF2-40B4-BE49-F238E27FC236}">
-                <a16:creationId xmlns="" xmlns:a16="http://schemas.microsoft.com/office/drawing/2014/main" id="{6BE8D45D-1E08-4F59-96CC-EA53D7CA6AB0}"/>
+                <a16:creationId xmlns:a16="http://schemas.microsoft.com/office/drawing/2014/main" xmlns="" id="{6BE8D45D-1E08-4F59-96CC-EA53D7CA6AB0}"/>
               </a:ext>
             </a:extLst>
           </p:cNvPr>
@@ -20792,7 +20795,7 @@
           <p:cNvPr id="49" name="Graphic 12">
             <a:extLst>
               <a:ext uri="{FF2B5EF4-FFF2-40B4-BE49-F238E27FC236}">
-                <a16:creationId xmlns="" xmlns:a16="http://schemas.microsoft.com/office/drawing/2014/main" id="{8E968353-82DA-42A2-88B6-AEFCF124AF4E}"/>
+                <a16:creationId xmlns:a16="http://schemas.microsoft.com/office/drawing/2014/main" xmlns="" id="{8E968353-82DA-42A2-88B6-AEFCF124AF4E}"/>
               </a:ext>
             </a:extLst>
           </p:cNvPr>
@@ -20909,7 +20912,7 @@
           <p:cNvPr id="2" name="Title 1">
             <a:extLst>
               <a:ext uri="{FF2B5EF4-FFF2-40B4-BE49-F238E27FC236}">
-                <a16:creationId xmlns="" xmlns:a16="http://schemas.microsoft.com/office/drawing/2014/main" id="{81053F33-9837-4E9F-8D29-24A800D841E9}"/>
+                <a16:creationId xmlns:a16="http://schemas.microsoft.com/office/drawing/2014/main" xmlns="" id="{81053F33-9837-4E9F-8D29-24A800D841E9}"/>
               </a:ext>
             </a:extLst>
           </p:cNvPr>
@@ -20949,7 +20952,7 @@
           <p:cNvPr id="4" name="Date Placeholder 3">
             <a:extLst>
               <a:ext uri="{FF2B5EF4-FFF2-40B4-BE49-F238E27FC236}">
-                <a16:creationId xmlns="" xmlns:a16="http://schemas.microsoft.com/office/drawing/2014/main" id="{DC2A0631-3130-4C36-8E5E-80464B1A62A7}"/>
+                <a16:creationId xmlns:a16="http://schemas.microsoft.com/office/drawing/2014/main" xmlns="" id="{DC2A0631-3130-4C36-8E5E-80464B1A62A7}"/>
               </a:ext>
             </a:extLst>
           </p:cNvPr>
@@ -20977,7 +20980,7 @@
           <p:cNvPr id="5" name="Footer Placeholder 4">
             <a:extLst>
               <a:ext uri="{FF2B5EF4-FFF2-40B4-BE49-F238E27FC236}">
-                <a16:creationId xmlns="" xmlns:a16="http://schemas.microsoft.com/office/drawing/2014/main" id="{79230F82-FE68-4450-98DF-5D29369AEE76}"/>
+                <a16:creationId xmlns:a16="http://schemas.microsoft.com/office/drawing/2014/main" xmlns="" id="{79230F82-FE68-4450-98DF-5D29369AEE76}"/>
               </a:ext>
             </a:extLst>
           </p:cNvPr>
@@ -21014,7 +21017,7 @@
           <p:cNvPr id="6" name="Slide Number Placeholder 5">
             <a:extLst>
               <a:ext uri="{FF2B5EF4-FFF2-40B4-BE49-F238E27FC236}">
-                <a16:creationId xmlns="" xmlns:a16="http://schemas.microsoft.com/office/drawing/2014/main" id="{EE6603C1-6E1A-4E4B-9555-31D84B6BDAD9}"/>
+                <a16:creationId xmlns:a16="http://schemas.microsoft.com/office/drawing/2014/main" xmlns="" id="{EE6603C1-6E1A-4E4B-9555-31D84B6BDAD9}"/>
               </a:ext>
             </a:extLst>
           </p:cNvPr>
@@ -21043,7 +21046,7 @@
           <p:cNvPr id="17" name="Text Placeholder 26">
             <a:extLst>
               <a:ext uri="{FF2B5EF4-FFF2-40B4-BE49-F238E27FC236}">
-                <a16:creationId xmlns="" xmlns:a16="http://schemas.microsoft.com/office/drawing/2014/main" id="{C990C5BD-BC2C-4822-AA4E-446B77052F23}"/>
+                <a16:creationId xmlns:a16="http://schemas.microsoft.com/office/drawing/2014/main" xmlns="" id="{C990C5BD-BC2C-4822-AA4E-446B77052F23}"/>
               </a:ext>
             </a:extLst>
           </p:cNvPr>
@@ -21100,7 +21103,7 @@
           <p:cNvPr id="24" name="Text Placeholder 2">
             <a:extLst>
               <a:ext uri="{FF2B5EF4-FFF2-40B4-BE49-F238E27FC236}">
-                <a16:creationId xmlns="" xmlns:a16="http://schemas.microsoft.com/office/drawing/2014/main" id="{B971AAD9-2660-4922-9B41-C45976A31C4F}"/>
+                <a16:creationId xmlns:a16="http://schemas.microsoft.com/office/drawing/2014/main" xmlns="" id="{B971AAD9-2660-4922-9B41-C45976A31C4F}"/>
               </a:ext>
             </a:extLst>
           </p:cNvPr>
@@ -21226,7 +21229,7 @@
           <p:cNvPr id="30" name="Text Placeholder 26">
             <a:extLst>
               <a:ext uri="{FF2B5EF4-FFF2-40B4-BE49-F238E27FC236}">
-                <a16:creationId xmlns="" xmlns:a16="http://schemas.microsoft.com/office/drawing/2014/main" id="{527B617A-AB11-44E9-B2E2-53B7F35CD968}"/>
+                <a16:creationId xmlns:a16="http://schemas.microsoft.com/office/drawing/2014/main" xmlns="" id="{527B617A-AB11-44E9-B2E2-53B7F35CD968}"/>
               </a:ext>
             </a:extLst>
           </p:cNvPr>
@@ -21320,7 +21323,7 @@
           <p:cNvPr id="23" name="Text Placeholder 2">
             <a:extLst>
               <a:ext uri="{FF2B5EF4-FFF2-40B4-BE49-F238E27FC236}">
-                <a16:creationId xmlns="" xmlns:a16="http://schemas.microsoft.com/office/drawing/2014/main" id="{E9080FED-3BFC-4CCC-8B5A-A2942CA5CF36}"/>
+                <a16:creationId xmlns:a16="http://schemas.microsoft.com/office/drawing/2014/main" xmlns="" id="{E9080FED-3BFC-4CCC-8B5A-A2942CA5CF36}"/>
               </a:ext>
             </a:extLst>
           </p:cNvPr>
@@ -21446,7 +21449,7 @@
           <p:cNvPr id="25" name="Text Placeholder 26">
             <a:extLst>
               <a:ext uri="{FF2B5EF4-FFF2-40B4-BE49-F238E27FC236}">
-                <a16:creationId xmlns="" xmlns:a16="http://schemas.microsoft.com/office/drawing/2014/main" id="{E7EC8229-D712-4FD1-990B-9212FC211A9B}"/>
+                <a16:creationId xmlns:a16="http://schemas.microsoft.com/office/drawing/2014/main" xmlns="" id="{E7EC8229-D712-4FD1-990B-9212FC211A9B}"/>
               </a:ext>
             </a:extLst>
           </p:cNvPr>
@@ -21540,7 +21543,7 @@
           <p:cNvPr id="27" name="Text Placeholder 2">
             <a:extLst>
               <a:ext uri="{FF2B5EF4-FFF2-40B4-BE49-F238E27FC236}">
-                <a16:creationId xmlns="" xmlns:a16="http://schemas.microsoft.com/office/drawing/2014/main" id="{27341020-DCB7-4CC5-BE55-AAAF421822ED}"/>
+                <a16:creationId xmlns:a16="http://schemas.microsoft.com/office/drawing/2014/main" xmlns="" id="{27341020-DCB7-4CC5-BE55-AAAF421822ED}"/>
               </a:ext>
             </a:extLst>
           </p:cNvPr>
@@ -21666,7 +21669,7 @@
           <p:cNvPr id="29" name="Text Placeholder 26">
             <a:extLst>
               <a:ext uri="{FF2B5EF4-FFF2-40B4-BE49-F238E27FC236}">
-                <a16:creationId xmlns="" xmlns:a16="http://schemas.microsoft.com/office/drawing/2014/main" id="{B1896019-AE20-47E2-AA66-ED9D16B2DAF7}"/>
+                <a16:creationId xmlns:a16="http://schemas.microsoft.com/office/drawing/2014/main" xmlns="" id="{B1896019-AE20-47E2-AA66-ED9D16B2DAF7}"/>
               </a:ext>
             </a:extLst>
           </p:cNvPr>
@@ -21760,7 +21763,7 @@
           <p:cNvPr id="32" name="Text Placeholder 2">
             <a:extLst>
               <a:ext uri="{FF2B5EF4-FFF2-40B4-BE49-F238E27FC236}">
-                <a16:creationId xmlns="" xmlns:a16="http://schemas.microsoft.com/office/drawing/2014/main" id="{212C49D2-92E0-4567-8BD4-9B8FC0536701}"/>
+                <a16:creationId xmlns:a16="http://schemas.microsoft.com/office/drawing/2014/main" xmlns="" id="{212C49D2-92E0-4567-8BD4-9B8FC0536701}"/>
               </a:ext>
             </a:extLst>
           </p:cNvPr>
@@ -21886,7 +21889,7 @@
           <p:cNvPr id="33" name="Text Placeholder 26">
             <a:extLst>
               <a:ext uri="{FF2B5EF4-FFF2-40B4-BE49-F238E27FC236}">
-                <a16:creationId xmlns="" xmlns:a16="http://schemas.microsoft.com/office/drawing/2014/main" id="{6B5DA211-72E1-4B00-AA61-980CE5A34565}"/>
+                <a16:creationId xmlns:a16="http://schemas.microsoft.com/office/drawing/2014/main" xmlns="" id="{6B5DA211-72E1-4B00-AA61-980CE5A34565}"/>
               </a:ext>
             </a:extLst>
           </p:cNvPr>
@@ -21980,7 +21983,7 @@
           <p:cNvPr id="35" name="Text Placeholder 2">
             <a:extLst>
               <a:ext uri="{FF2B5EF4-FFF2-40B4-BE49-F238E27FC236}">
-                <a16:creationId xmlns="" xmlns:a16="http://schemas.microsoft.com/office/drawing/2014/main" id="{A7CF7C63-619A-46EE-AF36-FCA26441A064}"/>
+                <a16:creationId xmlns:a16="http://schemas.microsoft.com/office/drawing/2014/main" xmlns="" id="{A7CF7C63-619A-46EE-AF36-FCA26441A064}"/>
               </a:ext>
             </a:extLst>
           </p:cNvPr>
@@ -22106,7 +22109,7 @@
           <p:cNvPr id="36" name="Text Placeholder 26">
             <a:extLst>
               <a:ext uri="{FF2B5EF4-FFF2-40B4-BE49-F238E27FC236}">
-                <a16:creationId xmlns="" xmlns:a16="http://schemas.microsoft.com/office/drawing/2014/main" id="{92E0EA61-C10D-4760-B03F-F27BCF1FC24C}"/>
+                <a16:creationId xmlns:a16="http://schemas.microsoft.com/office/drawing/2014/main" xmlns="" id="{92E0EA61-C10D-4760-B03F-F27BCF1FC24C}"/>
               </a:ext>
             </a:extLst>
           </p:cNvPr>
@@ -22200,7 +22203,7 @@
           <p:cNvPr id="38" name="Text Placeholder 2">
             <a:extLst>
               <a:ext uri="{FF2B5EF4-FFF2-40B4-BE49-F238E27FC236}">
-                <a16:creationId xmlns="" xmlns:a16="http://schemas.microsoft.com/office/drawing/2014/main" id="{1A3A14FA-D9E9-4000-B30C-14CADBFE48F6}"/>
+                <a16:creationId xmlns:a16="http://schemas.microsoft.com/office/drawing/2014/main" xmlns="" id="{1A3A14FA-D9E9-4000-B30C-14CADBFE48F6}"/>
               </a:ext>
             </a:extLst>
           </p:cNvPr>
@@ -22326,7 +22329,7 @@
           <p:cNvPr id="39" name="Text Placeholder 26">
             <a:extLst>
               <a:ext uri="{FF2B5EF4-FFF2-40B4-BE49-F238E27FC236}">
-                <a16:creationId xmlns="" xmlns:a16="http://schemas.microsoft.com/office/drawing/2014/main" id="{0FBCB607-92E0-4206-871B-10CAEB3377B3}"/>
+                <a16:creationId xmlns:a16="http://schemas.microsoft.com/office/drawing/2014/main" xmlns="" id="{0FBCB607-92E0-4206-871B-10CAEB3377B3}"/>
               </a:ext>
             </a:extLst>
           </p:cNvPr>
@@ -22420,7 +22423,7 @@
           <p:cNvPr id="19" name="Chart Placeholder 18">
             <a:extLst>
               <a:ext uri="{FF2B5EF4-FFF2-40B4-BE49-F238E27FC236}">
-                <a16:creationId xmlns="" xmlns:a16="http://schemas.microsoft.com/office/drawing/2014/main" id="{08CD548A-F4DA-41C7-BC55-620C696D5A6A}"/>
+                <a16:creationId xmlns:a16="http://schemas.microsoft.com/office/drawing/2014/main" xmlns="" id="{08CD548A-F4DA-41C7-BC55-620C696D5A6A}"/>
               </a:ext>
             </a:extLst>
           </p:cNvPr>
@@ -22468,7 +22471,7 @@
           <p:cNvPr id="41" name="Graphic 39">
             <a:extLst>
               <a:ext uri="{FF2B5EF4-FFF2-40B4-BE49-F238E27FC236}">
-                <a16:creationId xmlns="" xmlns:a16="http://schemas.microsoft.com/office/drawing/2014/main" id="{D0A213E0-4DC9-4F6A-98B8-21DE9AE2D9B0}"/>
+                <a16:creationId xmlns:a16="http://schemas.microsoft.com/office/drawing/2014/main" xmlns="" id="{D0A213E0-4DC9-4F6A-98B8-21DE9AE2D9B0}"/>
               </a:ext>
             </a:extLst>
           </p:cNvPr>
@@ -22488,7 +22491,7 @@
             <p:cNvPr id="42" name="Freeform: Shape 41">
               <a:extLst>
                 <a:ext uri="{FF2B5EF4-FFF2-40B4-BE49-F238E27FC236}">
-                  <a16:creationId xmlns="" xmlns:a16="http://schemas.microsoft.com/office/drawing/2014/main" id="{24312820-32BB-4DFC-B775-2031DE03F33E}"/>
+                  <a16:creationId xmlns:a16="http://schemas.microsoft.com/office/drawing/2014/main" xmlns="" id="{24312820-32BB-4DFC-B775-2031DE03F33E}"/>
                 </a:ext>
               </a:extLst>
             </p:cNvPr>
@@ -22678,7 +22681,7 @@
             <p:cNvPr id="43" name="Freeform: Shape 42">
               <a:extLst>
                 <a:ext uri="{FF2B5EF4-FFF2-40B4-BE49-F238E27FC236}">
-                  <a16:creationId xmlns="" xmlns:a16="http://schemas.microsoft.com/office/drawing/2014/main" id="{F9B4581F-B122-40B8-BE37-64894A713B38}"/>
+                  <a16:creationId xmlns:a16="http://schemas.microsoft.com/office/drawing/2014/main" xmlns="" id="{F9B4581F-B122-40B8-BE37-64894A713B38}"/>
                 </a:ext>
               </a:extLst>
             </p:cNvPr>
@@ -22786,7 +22789,7 @@
             <p:cNvPr id="44" name="Freeform: Shape 43">
               <a:extLst>
                 <a:ext uri="{FF2B5EF4-FFF2-40B4-BE49-F238E27FC236}">
-                  <a16:creationId xmlns="" xmlns:a16="http://schemas.microsoft.com/office/drawing/2014/main" id="{C7CF8C75-A610-43BA-923F-335A6051357D}"/>
+                  <a16:creationId xmlns:a16="http://schemas.microsoft.com/office/drawing/2014/main" xmlns="" id="{C7CF8C75-A610-43BA-923F-335A6051357D}"/>
                 </a:ext>
               </a:extLst>
             </p:cNvPr>
@@ -22894,7 +22897,7 @@
             <p:cNvPr id="45" name="Freeform: Shape 44">
               <a:extLst>
                 <a:ext uri="{FF2B5EF4-FFF2-40B4-BE49-F238E27FC236}">
-                  <a16:creationId xmlns="" xmlns:a16="http://schemas.microsoft.com/office/drawing/2014/main" id="{56793F9B-5B71-414E-9CB2-2B76F8308871}"/>
+                  <a16:creationId xmlns:a16="http://schemas.microsoft.com/office/drawing/2014/main" xmlns="" id="{56793F9B-5B71-414E-9CB2-2B76F8308871}"/>
                 </a:ext>
               </a:extLst>
             </p:cNvPr>
@@ -23002,7 +23005,7 @@
             <p:cNvPr id="46" name="Freeform: Shape 45">
               <a:extLst>
                 <a:ext uri="{FF2B5EF4-FFF2-40B4-BE49-F238E27FC236}">
-                  <a16:creationId xmlns="" xmlns:a16="http://schemas.microsoft.com/office/drawing/2014/main" id="{9807DE94-0E8D-4E1B-A7D2-E0F91AF2E54C}"/>
+                  <a16:creationId xmlns:a16="http://schemas.microsoft.com/office/drawing/2014/main" xmlns="" id="{9807DE94-0E8D-4E1B-A7D2-E0F91AF2E54C}"/>
                 </a:ext>
               </a:extLst>
             </p:cNvPr>
@@ -23182,7 +23185,7 @@
             <p:cNvPr id="47" name="Freeform: Shape 46">
               <a:extLst>
                 <a:ext uri="{FF2B5EF4-FFF2-40B4-BE49-F238E27FC236}">
-                  <a16:creationId xmlns="" xmlns:a16="http://schemas.microsoft.com/office/drawing/2014/main" id="{7BC592BA-C191-49B5-8F41-8E14CFFDAC40}"/>
+                  <a16:creationId xmlns:a16="http://schemas.microsoft.com/office/drawing/2014/main" xmlns="" id="{7BC592BA-C191-49B5-8F41-8E14CFFDAC40}"/>
                 </a:ext>
               </a:extLst>
             </p:cNvPr>
@@ -23373,7 +23376,7 @@
           <p:cNvPr id="3" name="Graphic 50">
             <a:extLst>
               <a:ext uri="{FF2B5EF4-FFF2-40B4-BE49-F238E27FC236}">
-                <a16:creationId xmlns="" xmlns:a16="http://schemas.microsoft.com/office/drawing/2014/main" id="{33AA43FA-C2DC-406C-BFE6-A2A804112236}"/>
+                <a16:creationId xmlns:a16="http://schemas.microsoft.com/office/drawing/2014/main" xmlns="" id="{33AA43FA-C2DC-406C-BFE6-A2A804112236}"/>
               </a:ext>
             </a:extLst>
           </p:cNvPr>
@@ -23539,7 +23542,7 @@
           <p:cNvPr id="52" name="Oval 51">
             <a:extLst>
               <a:ext uri="{FF2B5EF4-FFF2-40B4-BE49-F238E27FC236}">
-                <a16:creationId xmlns="" xmlns:a16="http://schemas.microsoft.com/office/drawing/2014/main" id="{F21AF1E2-466C-487E-86AF-CA6FFFCA2720}"/>
+                <a16:creationId xmlns:a16="http://schemas.microsoft.com/office/drawing/2014/main" xmlns="" id="{F21AF1E2-466C-487E-86AF-CA6FFFCA2720}"/>
               </a:ext>
             </a:extLst>
           </p:cNvPr>
@@ -23591,7 +23594,7 @@
           <p:cNvPr id="53" name="Graphic 12">
             <a:extLst>
               <a:ext uri="{FF2B5EF4-FFF2-40B4-BE49-F238E27FC236}">
-                <a16:creationId xmlns="" xmlns:a16="http://schemas.microsoft.com/office/drawing/2014/main" id="{531F1BC1-79BD-45BA-B27E-7A2C62A65EC9}"/>
+                <a16:creationId xmlns:a16="http://schemas.microsoft.com/office/drawing/2014/main" xmlns="" id="{531F1BC1-79BD-45BA-B27E-7A2C62A65EC9}"/>
               </a:ext>
             </a:extLst>
           </p:cNvPr>
@@ -23708,7 +23711,7 @@
           <p:cNvPr id="2" name="Title 1">
             <a:extLst>
               <a:ext uri="{FF2B5EF4-FFF2-40B4-BE49-F238E27FC236}">
-                <a16:creationId xmlns="" xmlns:a16="http://schemas.microsoft.com/office/drawing/2014/main" id="{81053F33-9837-4E9F-8D29-24A800D841E9}"/>
+                <a16:creationId xmlns:a16="http://schemas.microsoft.com/office/drawing/2014/main" xmlns="" id="{81053F33-9837-4E9F-8D29-24A800D841E9}"/>
               </a:ext>
             </a:extLst>
           </p:cNvPr>
@@ -23748,7 +23751,7 @@
           <p:cNvPr id="4" name="Date Placeholder 3">
             <a:extLst>
               <a:ext uri="{FF2B5EF4-FFF2-40B4-BE49-F238E27FC236}">
-                <a16:creationId xmlns="" xmlns:a16="http://schemas.microsoft.com/office/drawing/2014/main" id="{DC2A0631-3130-4C36-8E5E-80464B1A62A7}"/>
+                <a16:creationId xmlns:a16="http://schemas.microsoft.com/office/drawing/2014/main" xmlns="" id="{DC2A0631-3130-4C36-8E5E-80464B1A62A7}"/>
               </a:ext>
             </a:extLst>
           </p:cNvPr>
@@ -23776,7 +23779,7 @@
           <p:cNvPr id="5" name="Footer Placeholder 4">
             <a:extLst>
               <a:ext uri="{FF2B5EF4-FFF2-40B4-BE49-F238E27FC236}">
-                <a16:creationId xmlns="" xmlns:a16="http://schemas.microsoft.com/office/drawing/2014/main" id="{79230F82-FE68-4450-98DF-5D29369AEE76}"/>
+                <a16:creationId xmlns:a16="http://schemas.microsoft.com/office/drawing/2014/main" xmlns="" id="{79230F82-FE68-4450-98DF-5D29369AEE76}"/>
               </a:ext>
             </a:extLst>
           </p:cNvPr>
@@ -23813,7 +23816,7 @@
           <p:cNvPr id="6" name="Slide Number Placeholder 5">
             <a:extLst>
               <a:ext uri="{FF2B5EF4-FFF2-40B4-BE49-F238E27FC236}">
-                <a16:creationId xmlns="" xmlns:a16="http://schemas.microsoft.com/office/drawing/2014/main" id="{EE6603C1-6E1A-4E4B-9555-31D84B6BDAD9}"/>
+                <a16:creationId xmlns:a16="http://schemas.microsoft.com/office/drawing/2014/main" xmlns="" id="{EE6603C1-6E1A-4E4B-9555-31D84B6BDAD9}"/>
               </a:ext>
             </a:extLst>
           </p:cNvPr>
@@ -23842,7 +23845,7 @@
           <p:cNvPr id="17" name="Text Placeholder 26">
             <a:extLst>
               <a:ext uri="{FF2B5EF4-FFF2-40B4-BE49-F238E27FC236}">
-                <a16:creationId xmlns="" xmlns:a16="http://schemas.microsoft.com/office/drawing/2014/main" id="{C990C5BD-BC2C-4822-AA4E-446B77052F23}"/>
+                <a16:creationId xmlns:a16="http://schemas.microsoft.com/office/drawing/2014/main" xmlns="" id="{C990C5BD-BC2C-4822-AA4E-446B77052F23}"/>
               </a:ext>
             </a:extLst>
           </p:cNvPr>
@@ -23899,7 +23902,7 @@
           <p:cNvPr id="18" name="Table Placeholder 17">
             <a:extLst>
               <a:ext uri="{FF2B5EF4-FFF2-40B4-BE49-F238E27FC236}">
-                <a16:creationId xmlns="" xmlns:a16="http://schemas.microsoft.com/office/drawing/2014/main" id="{3AF64257-E00C-4FE5-925B-A78911D1D2B9}"/>
+                <a16:creationId xmlns:a16="http://schemas.microsoft.com/office/drawing/2014/main" xmlns="" id="{3AF64257-E00C-4FE5-925B-A78911D1D2B9}"/>
               </a:ext>
             </a:extLst>
           </p:cNvPr>
@@ -23947,7 +23950,7 @@
           <p:cNvPr id="45" name="Graphic 39">
             <a:extLst>
               <a:ext uri="{FF2B5EF4-FFF2-40B4-BE49-F238E27FC236}">
-                <a16:creationId xmlns="" xmlns:a16="http://schemas.microsoft.com/office/drawing/2014/main" id="{2B29CFAD-7DFA-43C8-BC78-F666303C4A65}"/>
+                <a16:creationId xmlns:a16="http://schemas.microsoft.com/office/drawing/2014/main" xmlns="" id="{2B29CFAD-7DFA-43C8-BC78-F666303C4A65}"/>
               </a:ext>
             </a:extLst>
           </p:cNvPr>
@@ -23967,7 +23970,7 @@
             <p:cNvPr id="46" name="Freeform: Shape 45">
               <a:extLst>
                 <a:ext uri="{FF2B5EF4-FFF2-40B4-BE49-F238E27FC236}">
-                  <a16:creationId xmlns="" xmlns:a16="http://schemas.microsoft.com/office/drawing/2014/main" id="{7709766F-07C2-47E0-94AE-482595B63D17}"/>
+                  <a16:creationId xmlns:a16="http://schemas.microsoft.com/office/drawing/2014/main" xmlns="" id="{7709766F-07C2-47E0-94AE-482595B63D17}"/>
                 </a:ext>
               </a:extLst>
             </p:cNvPr>
@@ -24157,7 +24160,7 @@
             <p:cNvPr id="47" name="Freeform: Shape 46">
               <a:extLst>
                 <a:ext uri="{FF2B5EF4-FFF2-40B4-BE49-F238E27FC236}">
-                  <a16:creationId xmlns="" xmlns:a16="http://schemas.microsoft.com/office/drawing/2014/main" id="{29F02ED7-2803-4FC7-8D17-DB9AF81B2257}"/>
+                  <a16:creationId xmlns:a16="http://schemas.microsoft.com/office/drawing/2014/main" xmlns="" id="{29F02ED7-2803-4FC7-8D17-DB9AF81B2257}"/>
                 </a:ext>
               </a:extLst>
             </p:cNvPr>
@@ -24265,7 +24268,7 @@
             <p:cNvPr id="48" name="Freeform: Shape 47">
               <a:extLst>
                 <a:ext uri="{FF2B5EF4-FFF2-40B4-BE49-F238E27FC236}">
-                  <a16:creationId xmlns="" xmlns:a16="http://schemas.microsoft.com/office/drawing/2014/main" id="{6715C276-3245-4E87-976F-10DC35AF0E89}"/>
+                  <a16:creationId xmlns:a16="http://schemas.microsoft.com/office/drawing/2014/main" xmlns="" id="{6715C276-3245-4E87-976F-10DC35AF0E89}"/>
                 </a:ext>
               </a:extLst>
             </p:cNvPr>
@@ -24373,7 +24376,7 @@
             <p:cNvPr id="49" name="Freeform: Shape 48">
               <a:extLst>
                 <a:ext uri="{FF2B5EF4-FFF2-40B4-BE49-F238E27FC236}">
-                  <a16:creationId xmlns="" xmlns:a16="http://schemas.microsoft.com/office/drawing/2014/main" id="{4D4F9402-D548-4465-B31D-5C89E49D8F2D}"/>
+                  <a16:creationId xmlns:a16="http://schemas.microsoft.com/office/drawing/2014/main" xmlns="" id="{4D4F9402-D548-4465-B31D-5C89E49D8F2D}"/>
                 </a:ext>
               </a:extLst>
             </p:cNvPr>
@@ -24481,7 +24484,7 @@
             <p:cNvPr id="50" name="Freeform: Shape 49">
               <a:extLst>
                 <a:ext uri="{FF2B5EF4-FFF2-40B4-BE49-F238E27FC236}">
-                  <a16:creationId xmlns="" xmlns:a16="http://schemas.microsoft.com/office/drawing/2014/main" id="{64C16800-96DF-4B5C-B15B-EB27E1475EB3}"/>
+                  <a16:creationId xmlns:a16="http://schemas.microsoft.com/office/drawing/2014/main" xmlns="" id="{64C16800-96DF-4B5C-B15B-EB27E1475EB3}"/>
                 </a:ext>
               </a:extLst>
             </p:cNvPr>
@@ -24661,7 +24664,7 @@
             <p:cNvPr id="51" name="Freeform: Shape 50">
               <a:extLst>
                 <a:ext uri="{FF2B5EF4-FFF2-40B4-BE49-F238E27FC236}">
-                  <a16:creationId xmlns="" xmlns:a16="http://schemas.microsoft.com/office/drawing/2014/main" id="{AE9DBF7F-0A02-4C85-A28D-3C88C66B3486}"/>
+                  <a16:creationId xmlns:a16="http://schemas.microsoft.com/office/drawing/2014/main" xmlns="" id="{AE9DBF7F-0A02-4C85-A28D-3C88C66B3486}"/>
                 </a:ext>
               </a:extLst>
             </p:cNvPr>
@@ -24852,7 +24855,7 @@
           <p:cNvPr id="3" name="Graphic 54">
             <a:extLst>
               <a:ext uri="{FF2B5EF4-FFF2-40B4-BE49-F238E27FC236}">
-                <a16:creationId xmlns="" xmlns:a16="http://schemas.microsoft.com/office/drawing/2014/main" id="{A1820133-6B1B-4297-8A79-2E89B2C7199B}"/>
+                <a16:creationId xmlns:a16="http://schemas.microsoft.com/office/drawing/2014/main" xmlns="" id="{A1820133-6B1B-4297-8A79-2E89B2C7199B}"/>
               </a:ext>
             </a:extLst>
           </p:cNvPr>
@@ -25018,7 +25021,7 @@
           <p:cNvPr id="51" name="Picture Placeholder 50">
             <a:extLst>
               <a:ext uri="{FF2B5EF4-FFF2-40B4-BE49-F238E27FC236}">
-                <a16:creationId xmlns="" xmlns:a16="http://schemas.microsoft.com/office/drawing/2014/main" id="{3767FEE9-DC75-4465-BA6B-06E00CF6A27B}"/>
+                <a16:creationId xmlns:a16="http://schemas.microsoft.com/office/drawing/2014/main" xmlns="" id="{3767FEE9-DC75-4465-BA6B-06E00CF6A27B}"/>
               </a:ext>
             </a:extLst>
           </p:cNvPr>
@@ -25349,7 +25352,7 @@
           <p:cNvPr id="46" name="Freeform: Shape 45">
             <a:extLst>
               <a:ext uri="{FF2B5EF4-FFF2-40B4-BE49-F238E27FC236}">
-                <a16:creationId xmlns="" xmlns:a16="http://schemas.microsoft.com/office/drawing/2014/main" id="{3A0902BC-58E0-4395-9D80-6CF5CA0FAAB0}"/>
+                <a16:creationId xmlns:a16="http://schemas.microsoft.com/office/drawing/2014/main" xmlns="" id="{3A0902BC-58E0-4395-9D80-6CF5CA0FAAB0}"/>
               </a:ext>
             </a:extLst>
           </p:cNvPr>
@@ -25465,7 +25468,7 @@
           <p:cNvPr id="47" name="Freeform: Shape 46">
             <a:extLst>
               <a:ext uri="{FF2B5EF4-FFF2-40B4-BE49-F238E27FC236}">
-                <a16:creationId xmlns="" xmlns:a16="http://schemas.microsoft.com/office/drawing/2014/main" id="{5DCE3DA5-C000-4DAD-8FCD-9A285AB48C83}"/>
+                <a16:creationId xmlns:a16="http://schemas.microsoft.com/office/drawing/2014/main" xmlns="" id="{5DCE3DA5-C000-4DAD-8FCD-9A285AB48C83}"/>
               </a:ext>
             </a:extLst>
           </p:cNvPr>
@@ -25573,7 +25576,7 @@
           <p:cNvPr id="45" name="Freeform: Shape 44">
             <a:extLst>
               <a:ext uri="{FF2B5EF4-FFF2-40B4-BE49-F238E27FC236}">
-                <a16:creationId xmlns="" xmlns:a16="http://schemas.microsoft.com/office/drawing/2014/main" id="{EAE88C29-9AC8-4A6D-9141-98B2210C7466}"/>
+                <a16:creationId xmlns:a16="http://schemas.microsoft.com/office/drawing/2014/main" xmlns="" id="{EAE88C29-9AC8-4A6D-9141-98B2210C7466}"/>
               </a:ext>
             </a:extLst>
           </p:cNvPr>
@@ -25681,7 +25684,7 @@
           <p:cNvPr id="24" name="Oval 23">
             <a:extLst>
               <a:ext uri="{FF2B5EF4-FFF2-40B4-BE49-F238E27FC236}">
-                <a16:creationId xmlns="" xmlns:a16="http://schemas.microsoft.com/office/drawing/2014/main" id="{7F8CA5B8-0BAD-4554-87FE-E0910E6CD5C5}"/>
+                <a16:creationId xmlns:a16="http://schemas.microsoft.com/office/drawing/2014/main" xmlns="" id="{7F8CA5B8-0BAD-4554-87FE-E0910E6CD5C5}"/>
               </a:ext>
             </a:extLst>
           </p:cNvPr>
@@ -25733,7 +25736,7 @@
           <p:cNvPr id="25" name="Graphic 12">
             <a:extLst>
               <a:ext uri="{FF2B5EF4-FFF2-40B4-BE49-F238E27FC236}">
-                <a16:creationId xmlns="" xmlns:a16="http://schemas.microsoft.com/office/drawing/2014/main" id="{12CBB0CF-5FCC-4507-BD7B-C02386D2A23C}"/>
+                <a16:creationId xmlns:a16="http://schemas.microsoft.com/office/drawing/2014/main" xmlns="" id="{12CBB0CF-5FCC-4507-BD7B-C02386D2A23C}"/>
               </a:ext>
             </a:extLst>
           </p:cNvPr>
@@ -25850,7 +25853,7 @@
           <p:cNvPr id="2" name="Title 1">
             <a:extLst>
               <a:ext uri="{FF2B5EF4-FFF2-40B4-BE49-F238E27FC236}">
-                <a16:creationId xmlns="" xmlns:a16="http://schemas.microsoft.com/office/drawing/2014/main" id="{0B9CB2BB-1ED9-489E-8AC7-2A8D8459E388}"/>
+                <a16:creationId xmlns:a16="http://schemas.microsoft.com/office/drawing/2014/main" xmlns="" id="{0B9CB2BB-1ED9-489E-8AC7-2A8D8459E388}"/>
               </a:ext>
             </a:extLst>
           </p:cNvPr>
@@ -25892,7 +25895,7 @@
           <p:cNvPr id="6" name="Footer Placeholder 5">
             <a:extLst>
               <a:ext uri="{FF2B5EF4-FFF2-40B4-BE49-F238E27FC236}">
-                <a16:creationId xmlns="" xmlns:a16="http://schemas.microsoft.com/office/drawing/2014/main" id="{FC208BCD-3B7E-49DF-8BF5-68AE9DD7D786}"/>
+                <a16:creationId xmlns:a16="http://schemas.microsoft.com/office/drawing/2014/main" xmlns="" id="{FC208BCD-3B7E-49DF-8BF5-68AE9DD7D786}"/>
               </a:ext>
             </a:extLst>
           </p:cNvPr>
@@ -25929,7 +25932,7 @@
           <p:cNvPr id="7" name="Slide Number Placeholder 6">
             <a:extLst>
               <a:ext uri="{FF2B5EF4-FFF2-40B4-BE49-F238E27FC236}">
-                <a16:creationId xmlns="" xmlns:a16="http://schemas.microsoft.com/office/drawing/2014/main" id="{B41517C1-CBB7-46B0-99AA-8512104026B7}"/>
+                <a16:creationId xmlns:a16="http://schemas.microsoft.com/office/drawing/2014/main" xmlns="" id="{B41517C1-CBB7-46B0-99AA-8512104026B7}"/>
               </a:ext>
             </a:extLst>
           </p:cNvPr>
@@ -25958,7 +25961,7 @@
           <p:cNvPr id="21" name="Text Placeholder 26">
             <a:extLst>
               <a:ext uri="{FF2B5EF4-FFF2-40B4-BE49-F238E27FC236}">
-                <a16:creationId xmlns="" xmlns:a16="http://schemas.microsoft.com/office/drawing/2014/main" id="{78B29DA7-7E72-4576-8F68-91B70D11C8FD}"/>
+                <a16:creationId xmlns:a16="http://schemas.microsoft.com/office/drawing/2014/main" xmlns="" id="{78B29DA7-7E72-4576-8F68-91B70D11C8FD}"/>
               </a:ext>
             </a:extLst>
           </p:cNvPr>
@@ -26015,7 +26018,7 @@
           <p:cNvPr id="22" name="Graphic 21">
             <a:extLst>
               <a:ext uri="{FF2B5EF4-FFF2-40B4-BE49-F238E27FC236}">
-                <a16:creationId xmlns="" xmlns:a16="http://schemas.microsoft.com/office/drawing/2014/main" id="{B091E01B-B80B-4194-AC2B-41043EC597D2}"/>
+                <a16:creationId xmlns:a16="http://schemas.microsoft.com/office/drawing/2014/main" xmlns="" id="{B091E01B-B80B-4194-AC2B-41043EC597D2}"/>
               </a:ext>
             </a:extLst>
           </p:cNvPr>
@@ -26028,7 +26031,7 @@
           <a:blip r:embed="rId2">
             <a:extLst>
               <a:ext uri="{96DAC541-7B7A-43D3-8B79-37D633B846F1}">
-                <asvg:svgBlip xmlns="" xmlns:asvg="http://schemas.microsoft.com/office/drawing/2016/SVG/main" r:embed="rId3"/>
+                <asvg:svgBlip xmlns:asvg="http://schemas.microsoft.com/office/drawing/2016/SVG/main" xmlns="" r:embed="rId3"/>
               </a:ext>
             </a:extLst>
           </a:blip>
@@ -26051,7 +26054,7 @@
           <p:cNvPr id="40" name="Freeform: Shape 39">
             <a:extLst>
               <a:ext uri="{FF2B5EF4-FFF2-40B4-BE49-F238E27FC236}">
-                <a16:creationId xmlns="" xmlns:a16="http://schemas.microsoft.com/office/drawing/2014/main" id="{FBE26926-54A6-49D3-95EA-F31F133A0E3B}"/>
+                <a16:creationId xmlns:a16="http://schemas.microsoft.com/office/drawing/2014/main" xmlns="" id="{FBE26926-54A6-49D3-95EA-F31F133A0E3B}"/>
               </a:ext>
             </a:extLst>
           </p:cNvPr>
@@ -26146,7 +26149,7 @@
           <p:cNvPr id="41" name="Freeform: Shape 40">
             <a:extLst>
               <a:ext uri="{FF2B5EF4-FFF2-40B4-BE49-F238E27FC236}">
-                <a16:creationId xmlns="" xmlns:a16="http://schemas.microsoft.com/office/drawing/2014/main" id="{C3AFCA09-1411-4603-AEED-DBD79C4BE2CA}"/>
+                <a16:creationId xmlns:a16="http://schemas.microsoft.com/office/drawing/2014/main" xmlns="" id="{C3AFCA09-1411-4603-AEED-DBD79C4BE2CA}"/>
               </a:ext>
             </a:extLst>
           </p:cNvPr>
@@ -26291,7 +26294,7 @@
           <p:cNvPr id="42" name="Freeform: Shape 41">
             <a:extLst>
               <a:ext uri="{FF2B5EF4-FFF2-40B4-BE49-F238E27FC236}">
-                <a16:creationId xmlns="" xmlns:a16="http://schemas.microsoft.com/office/drawing/2014/main" id="{7E4E0103-B430-4F31-B26F-21E197A41135}"/>
+                <a16:creationId xmlns:a16="http://schemas.microsoft.com/office/drawing/2014/main" xmlns="" id="{7E4E0103-B430-4F31-B26F-21E197A41135}"/>
               </a:ext>
             </a:extLst>
           </p:cNvPr>
@@ -26509,7 +26512,7 @@
           <p:cNvPr id="44" name="Freeform: Shape 43">
             <a:extLst>
               <a:ext uri="{FF2B5EF4-FFF2-40B4-BE49-F238E27FC236}">
-                <a16:creationId xmlns="" xmlns:a16="http://schemas.microsoft.com/office/drawing/2014/main" id="{65525C01-736F-4E07-B20A-72ABE0F38C9F}"/>
+                <a16:creationId xmlns:a16="http://schemas.microsoft.com/office/drawing/2014/main" xmlns="" id="{65525C01-736F-4E07-B20A-72ABE0F38C9F}"/>
               </a:ext>
             </a:extLst>
           </p:cNvPr>
@@ -26719,7 +26722,7 @@
           <p:cNvPr id="48" name="Freeform: Shape 47">
             <a:extLst>
               <a:ext uri="{FF2B5EF4-FFF2-40B4-BE49-F238E27FC236}">
-                <a16:creationId xmlns="" xmlns:a16="http://schemas.microsoft.com/office/drawing/2014/main" id="{49472789-B79C-464F-9D88-E51F8B5062D3}"/>
+                <a16:creationId xmlns:a16="http://schemas.microsoft.com/office/drawing/2014/main" xmlns="" id="{49472789-B79C-464F-9D88-E51F8B5062D3}"/>
               </a:ext>
             </a:extLst>
           </p:cNvPr>
@@ -26983,7 +26986,7 @@
           <p:cNvPr id="25" name="Oval 24">
             <a:extLst>
               <a:ext uri="{FF2B5EF4-FFF2-40B4-BE49-F238E27FC236}">
-                <a16:creationId xmlns="" xmlns:a16="http://schemas.microsoft.com/office/drawing/2014/main" id="{DD823940-1850-4484-BDCE-3D9B898D6787}"/>
+                <a16:creationId xmlns:a16="http://schemas.microsoft.com/office/drawing/2014/main" xmlns="" id="{DD823940-1850-4484-BDCE-3D9B898D6787}"/>
               </a:ext>
             </a:extLst>
           </p:cNvPr>
@@ -27035,7 +27038,7 @@
           <p:cNvPr id="26" name="Graphic 12">
             <a:extLst>
               <a:ext uri="{FF2B5EF4-FFF2-40B4-BE49-F238E27FC236}">
-                <a16:creationId xmlns="" xmlns:a16="http://schemas.microsoft.com/office/drawing/2014/main" id="{6FFA8582-48C8-4154-ACF0-5F6412FAAE0C}"/>
+                <a16:creationId xmlns:a16="http://schemas.microsoft.com/office/drawing/2014/main" xmlns="" id="{6FFA8582-48C8-4154-ACF0-5F6412FAAE0C}"/>
               </a:ext>
             </a:extLst>
           </p:cNvPr>
@@ -27152,7 +27155,7 @@
           <p:cNvPr id="8" name="Media Placeholder 7">
             <a:extLst>
               <a:ext uri="{FF2B5EF4-FFF2-40B4-BE49-F238E27FC236}">
-                <a16:creationId xmlns="" xmlns:a16="http://schemas.microsoft.com/office/drawing/2014/main" id="{FBCC61A6-FEB7-4CD2-9686-FB5F1EB66A10}"/>
+                <a16:creationId xmlns:a16="http://schemas.microsoft.com/office/drawing/2014/main" xmlns="" id="{FBCC61A6-FEB7-4CD2-9686-FB5F1EB66A10}"/>
               </a:ext>
             </a:extLst>
           </p:cNvPr>
@@ -27200,7 +27203,7 @@
           <p:cNvPr id="6" name="Footer Placeholder 5">
             <a:extLst>
               <a:ext uri="{FF2B5EF4-FFF2-40B4-BE49-F238E27FC236}">
-                <a16:creationId xmlns="" xmlns:a16="http://schemas.microsoft.com/office/drawing/2014/main" id="{FC208BCD-3B7E-49DF-8BF5-68AE9DD7D786}"/>
+                <a16:creationId xmlns:a16="http://schemas.microsoft.com/office/drawing/2014/main" xmlns="" id="{FC208BCD-3B7E-49DF-8BF5-68AE9DD7D786}"/>
               </a:ext>
             </a:extLst>
           </p:cNvPr>
@@ -27237,7 +27240,7 @@
           <p:cNvPr id="7" name="Slide Number Placeholder 6">
             <a:extLst>
               <a:ext uri="{FF2B5EF4-FFF2-40B4-BE49-F238E27FC236}">
-                <a16:creationId xmlns="" xmlns:a16="http://schemas.microsoft.com/office/drawing/2014/main" id="{B41517C1-CBB7-46B0-99AA-8512104026B7}"/>
+                <a16:creationId xmlns:a16="http://schemas.microsoft.com/office/drawing/2014/main" xmlns="" id="{B41517C1-CBB7-46B0-99AA-8512104026B7}"/>
               </a:ext>
             </a:extLst>
           </p:cNvPr>
@@ -27266,7 +27269,7 @@
           <p:cNvPr id="11" name="Freeform: Shape 10">
             <a:extLst>
               <a:ext uri="{FF2B5EF4-FFF2-40B4-BE49-F238E27FC236}">
-                <a16:creationId xmlns="" xmlns:a16="http://schemas.microsoft.com/office/drawing/2014/main" id="{B8EAB5B0-43C3-4F9F-98FF-253CBE6C9668}"/>
+                <a16:creationId xmlns:a16="http://schemas.microsoft.com/office/drawing/2014/main" xmlns="" id="{B8EAB5B0-43C3-4F9F-98FF-253CBE6C9668}"/>
               </a:ext>
             </a:extLst>
           </p:cNvPr>
@@ -27411,7 +27414,7 @@
           <p:cNvPr id="15" name="Freeform: Shape 14">
             <a:extLst>
               <a:ext uri="{FF2B5EF4-FFF2-40B4-BE49-F238E27FC236}">
-                <a16:creationId xmlns="" xmlns:a16="http://schemas.microsoft.com/office/drawing/2014/main" id="{06A97B71-3A84-4844-BDB5-E3F77302BBC0}"/>
+                <a16:creationId xmlns:a16="http://schemas.microsoft.com/office/drawing/2014/main" xmlns="" id="{06A97B71-3A84-4844-BDB5-E3F77302BBC0}"/>
               </a:ext>
             </a:extLst>
           </p:cNvPr>
@@ -27519,7 +27522,7 @@
           <p:cNvPr id="16" name="Freeform: Shape 15">
             <a:extLst>
               <a:ext uri="{FF2B5EF4-FFF2-40B4-BE49-F238E27FC236}">
-                <a16:creationId xmlns="" xmlns:a16="http://schemas.microsoft.com/office/drawing/2014/main" id="{030939C4-65C9-4508-8EFE-F715B9946844}"/>
+                <a16:creationId xmlns:a16="http://schemas.microsoft.com/office/drawing/2014/main" xmlns="" id="{030939C4-65C9-4508-8EFE-F715B9946844}"/>
               </a:ext>
             </a:extLst>
           </p:cNvPr>
@@ -27729,7 +27732,7 @@
           <p:cNvPr id="17" name="Freeform: Shape 16">
             <a:extLst>
               <a:ext uri="{FF2B5EF4-FFF2-40B4-BE49-F238E27FC236}">
-                <a16:creationId xmlns="" xmlns:a16="http://schemas.microsoft.com/office/drawing/2014/main" id="{759BB951-621D-4456-A832-116187764B2E}"/>
+                <a16:creationId xmlns:a16="http://schemas.microsoft.com/office/drawing/2014/main" xmlns="" id="{759BB951-621D-4456-A832-116187764B2E}"/>
               </a:ext>
             </a:extLst>
           </p:cNvPr>
@@ -27845,7 +27848,7 @@
           <p:cNvPr id="18" name="Freeform: Shape 17">
             <a:extLst>
               <a:ext uri="{FF2B5EF4-FFF2-40B4-BE49-F238E27FC236}">
-                <a16:creationId xmlns="" xmlns:a16="http://schemas.microsoft.com/office/drawing/2014/main" id="{3F8008CE-2F0A-4568-9C4A-C347A4880513}"/>
+                <a16:creationId xmlns:a16="http://schemas.microsoft.com/office/drawing/2014/main" xmlns="" id="{3F8008CE-2F0A-4568-9C4A-C347A4880513}"/>
               </a:ext>
             </a:extLst>
           </p:cNvPr>
@@ -28081,7 +28084,7 @@
           <p:cNvPr id="19" name="Title 2">
             <a:extLst>
               <a:ext uri="{FF2B5EF4-FFF2-40B4-BE49-F238E27FC236}">
-                <a16:creationId xmlns="" xmlns:a16="http://schemas.microsoft.com/office/drawing/2014/main" id="{3A926948-B9C1-4E84-AF0F-40965A132C47}"/>
+                <a16:creationId xmlns:a16="http://schemas.microsoft.com/office/drawing/2014/main" xmlns="" id="{3A926948-B9C1-4E84-AF0F-40965A132C47}"/>
               </a:ext>
             </a:extLst>
           </p:cNvPr>
@@ -28128,7 +28131,7 @@
           <p:cNvPr id="10" name="Group 9">
             <a:extLst>
               <a:ext uri="{FF2B5EF4-FFF2-40B4-BE49-F238E27FC236}">
-                <a16:creationId xmlns="" xmlns:a16="http://schemas.microsoft.com/office/drawing/2014/main" id="{223A17C7-5A8B-4D9D-AC8A-2486018F3FB8}"/>
+                <a16:creationId xmlns:a16="http://schemas.microsoft.com/office/drawing/2014/main" xmlns="" id="{223A17C7-5A8B-4D9D-AC8A-2486018F3FB8}"/>
               </a:ext>
             </a:extLst>
           </p:cNvPr>
@@ -28148,7 +28151,7 @@
             <p:cNvPr id="3" name="Freeform: Shape 2">
               <a:extLst>
                 <a:ext uri="{FF2B5EF4-FFF2-40B4-BE49-F238E27FC236}">
-                  <a16:creationId xmlns="" xmlns:a16="http://schemas.microsoft.com/office/drawing/2014/main" id="{C42001FF-B76E-4445-BDE5-6BFAD41EBBD4}"/>
+                  <a16:creationId xmlns:a16="http://schemas.microsoft.com/office/drawing/2014/main" xmlns="" id="{C42001FF-B76E-4445-BDE5-6BFAD41EBBD4}"/>
                 </a:ext>
               </a:extLst>
             </p:cNvPr>
@@ -28256,7 +28259,7 @@
             <p:cNvPr id="4" name="Freeform: Shape 3">
               <a:extLst>
                 <a:ext uri="{FF2B5EF4-FFF2-40B4-BE49-F238E27FC236}">
-                  <a16:creationId xmlns="" xmlns:a16="http://schemas.microsoft.com/office/drawing/2014/main" id="{55EB89C3-8B52-4763-9DB2-C51CC8AF377C}"/>
+                  <a16:creationId xmlns:a16="http://schemas.microsoft.com/office/drawing/2014/main" xmlns="" id="{55EB89C3-8B52-4763-9DB2-C51CC8AF377C}"/>
                 </a:ext>
               </a:extLst>
             </p:cNvPr>
@@ -28454,7 +28457,7 @@
             <p:cNvPr id="5" name="Freeform: Shape 4">
               <a:extLst>
                 <a:ext uri="{FF2B5EF4-FFF2-40B4-BE49-F238E27FC236}">
-                  <a16:creationId xmlns="" xmlns:a16="http://schemas.microsoft.com/office/drawing/2014/main" id="{8F230BC5-B028-4266-A395-BFB56DFDC484}"/>
+                  <a16:creationId xmlns:a16="http://schemas.microsoft.com/office/drawing/2014/main" xmlns="" id="{8F230BC5-B028-4266-A395-BFB56DFDC484}"/>
                 </a:ext>
               </a:extLst>
             </p:cNvPr>
@@ -28562,7 +28565,7 @@
             <p:cNvPr id="9" name="Freeform: Shape 8">
               <a:extLst>
                 <a:ext uri="{FF2B5EF4-FFF2-40B4-BE49-F238E27FC236}">
-                  <a16:creationId xmlns="" xmlns:a16="http://schemas.microsoft.com/office/drawing/2014/main" id="{5A52C234-DC7D-488B-8975-61485991A4A8}"/>
+                  <a16:creationId xmlns:a16="http://schemas.microsoft.com/office/drawing/2014/main" xmlns="" id="{5A52C234-DC7D-488B-8975-61485991A4A8}"/>
                 </a:ext>
               </a:extLst>
             </p:cNvPr>
@@ -28758,7 +28761,7 @@
           <p:cNvPr id="2" name="Title Placeholder 1">
             <a:extLst>
               <a:ext uri="{FF2B5EF4-FFF2-40B4-BE49-F238E27FC236}">
-                <a16:creationId xmlns="" xmlns:a16="http://schemas.microsoft.com/office/drawing/2014/main" id="{A8DB6A3A-74E6-4FE2-8AD2-CEB070447182}"/>
+                <a16:creationId xmlns:a16="http://schemas.microsoft.com/office/drawing/2014/main" xmlns="" id="{A8DB6A3A-74E6-4FE2-8AD2-CEB070447182}"/>
               </a:ext>
             </a:extLst>
           </p:cNvPr>
@@ -28797,7 +28800,7 @@
           <p:cNvPr id="3" name="Text Placeholder 2">
             <a:extLst>
               <a:ext uri="{FF2B5EF4-FFF2-40B4-BE49-F238E27FC236}">
-                <a16:creationId xmlns="" xmlns:a16="http://schemas.microsoft.com/office/drawing/2014/main" id="{2C0128AA-FDF4-4DD5-A009-3C58D24570F2}"/>
+                <a16:creationId xmlns:a16="http://schemas.microsoft.com/office/drawing/2014/main" xmlns="" id="{2C0128AA-FDF4-4DD5-A009-3C58D24570F2}"/>
               </a:ext>
             </a:extLst>
           </p:cNvPr>
@@ -28865,7 +28868,7 @@
           <p:cNvPr id="4" name="Date Placeholder 3">
             <a:extLst>
               <a:ext uri="{FF2B5EF4-FFF2-40B4-BE49-F238E27FC236}">
-                <a16:creationId xmlns="" xmlns:a16="http://schemas.microsoft.com/office/drawing/2014/main" id="{BB1C2DC0-7E13-4A66-9F9B-371BA9C6E4F1}"/>
+                <a16:creationId xmlns:a16="http://schemas.microsoft.com/office/drawing/2014/main" xmlns="" id="{BB1C2DC0-7E13-4A66-9F9B-371BA9C6E4F1}"/>
               </a:ext>
             </a:extLst>
           </p:cNvPr>
@@ -28911,7 +28914,7 @@
           <p:cNvPr id="6" name="Slide Number Placeholder 5">
             <a:extLst>
               <a:ext uri="{FF2B5EF4-FFF2-40B4-BE49-F238E27FC236}">
-                <a16:creationId xmlns="" xmlns:a16="http://schemas.microsoft.com/office/drawing/2014/main" id="{9475097E-EB08-4475-9112-275B8402794C}"/>
+                <a16:creationId xmlns:a16="http://schemas.microsoft.com/office/drawing/2014/main" xmlns="" id="{9475097E-EB08-4475-9112-275B8402794C}"/>
               </a:ext>
             </a:extLst>
           </p:cNvPr>
@@ -28957,7 +28960,7 @@
           <p:cNvPr id="11" name="Footer Placeholder 4">
             <a:extLst>
               <a:ext uri="{FF2B5EF4-FFF2-40B4-BE49-F238E27FC236}">
-                <a16:creationId xmlns="" xmlns:a16="http://schemas.microsoft.com/office/drawing/2014/main" id="{1F296578-6D40-435B-861E-0904DDC10B7C}"/>
+                <a16:creationId xmlns:a16="http://schemas.microsoft.com/office/drawing/2014/main" xmlns="" id="{1F296578-6D40-435B-861E-0904DDC10B7C}"/>
               </a:ext>
             </a:extLst>
           </p:cNvPr>
@@ -29387,7 +29390,7 @@
           <p:cNvPr id="3" name="Text Placeholder 2">
             <a:extLst>
               <a:ext uri="{FF2B5EF4-FFF2-40B4-BE49-F238E27FC236}">
-                <a16:creationId xmlns="" xmlns:a16="http://schemas.microsoft.com/office/drawing/2014/main" id="{D46DC636-DB75-49A5-B764-91FF21804DA0}"/>
+                <a16:creationId xmlns:a16="http://schemas.microsoft.com/office/drawing/2014/main" xmlns="" id="{D46DC636-DB75-49A5-B764-91FF21804DA0}"/>
               </a:ext>
             </a:extLst>
           </p:cNvPr>
@@ -29552,7 +29555,7 @@
           <p:cNvPr id="4" name="Text Placeholder 3">
             <a:extLst>
               <a:ext uri="{FF2B5EF4-FFF2-40B4-BE49-F238E27FC236}">
-                <a16:creationId xmlns="" xmlns:a16="http://schemas.microsoft.com/office/drawing/2014/main" id="{EE5A967A-4C75-4949-9D48-17FD2D8B8B59}"/>
+                <a16:creationId xmlns:a16="http://schemas.microsoft.com/office/drawing/2014/main" xmlns="" id="{EE5A967A-4C75-4949-9D48-17FD2D8B8B59}"/>
               </a:ext>
             </a:extLst>
           </p:cNvPr>
@@ -29646,7 +29649,7 @@
           <p:cNvPr id="7" name="Text Placeholder 6">
             <a:extLst>
               <a:ext uri="{FF2B5EF4-FFF2-40B4-BE49-F238E27FC236}">
-                <a16:creationId xmlns="" xmlns:a16="http://schemas.microsoft.com/office/drawing/2014/main" id="{D10F5C8F-9E7F-4E64-9AF6-329D1654118B}"/>
+                <a16:creationId xmlns:a16="http://schemas.microsoft.com/office/drawing/2014/main" xmlns="" id="{D10F5C8F-9E7F-4E64-9AF6-329D1654118B}"/>
               </a:ext>
             </a:extLst>
           </p:cNvPr>
@@ -29859,7 +29862,7 @@
           <p:cNvPr id="16" name="Text Placeholder 3">
             <a:extLst>
               <a:ext uri="{FF2B5EF4-FFF2-40B4-BE49-F238E27FC236}">
-                <a16:creationId xmlns="" xmlns:a16="http://schemas.microsoft.com/office/drawing/2014/main" id="{EE5A967A-4C75-4949-9D48-17FD2D8B8B59}"/>
+                <a16:creationId xmlns:a16="http://schemas.microsoft.com/office/drawing/2014/main" xmlns="" id="{EE5A967A-4C75-4949-9D48-17FD2D8B8B59}"/>
               </a:ext>
             </a:extLst>
           </p:cNvPr>
@@ -30094,7 +30097,7 @@
           <p:cNvPr id="5" name="Slide Number Placeholder 4">
             <a:extLst>
               <a:ext uri="{FF2B5EF4-FFF2-40B4-BE49-F238E27FC236}">
-                <a16:creationId xmlns="" xmlns:a16="http://schemas.microsoft.com/office/drawing/2014/main" id="{CFEE48EC-430B-4D42-9565-527E52286C4D}"/>
+                <a16:creationId xmlns:a16="http://schemas.microsoft.com/office/drawing/2014/main" xmlns="" id="{CFEE48EC-430B-4D42-9565-527E52286C4D}"/>
               </a:ext>
             </a:extLst>
           </p:cNvPr>
@@ -30223,7 +30226,7 @@
           <p:cNvPr id="3" name="Text Placeholder 2">
             <a:extLst>
               <a:ext uri="{FF2B5EF4-FFF2-40B4-BE49-F238E27FC236}">
-                <a16:creationId xmlns="" xmlns:a16="http://schemas.microsoft.com/office/drawing/2014/main" id="{C9DF92D8-1371-40FE-AB90-C65DFF928F5D}"/>
+                <a16:creationId xmlns:a16="http://schemas.microsoft.com/office/drawing/2014/main" xmlns="" id="{C9DF92D8-1371-40FE-AB90-C65DFF928F5D}"/>
               </a:ext>
             </a:extLst>
           </p:cNvPr>
@@ -30273,7 +30276,7 @@
           <p:cNvPr id="5" name="Slide Number Placeholder 4">
             <a:extLst>
               <a:ext uri="{FF2B5EF4-FFF2-40B4-BE49-F238E27FC236}">
-                <a16:creationId xmlns="" xmlns:a16="http://schemas.microsoft.com/office/drawing/2014/main" id="{CFEE48EC-430B-4D42-9565-527E52286C4D}"/>
+                <a16:creationId xmlns:a16="http://schemas.microsoft.com/office/drawing/2014/main" xmlns="" id="{CFEE48EC-430B-4D42-9565-527E52286C4D}"/>
               </a:ext>
             </a:extLst>
           </p:cNvPr>
@@ -30326,7 +30329,7 @@
           <p:cNvPr id="8" name="Text Placeholder 2">
             <a:extLst>
               <a:ext uri="{FF2B5EF4-FFF2-40B4-BE49-F238E27FC236}">
-                <a16:creationId xmlns="" xmlns:a16="http://schemas.microsoft.com/office/drawing/2014/main" id="{C9DF92D8-1371-40FE-AB90-C65DFF928F5D}"/>
+                <a16:creationId xmlns:a16="http://schemas.microsoft.com/office/drawing/2014/main" xmlns="" id="{C9DF92D8-1371-40FE-AB90-C65DFF928F5D}"/>
               </a:ext>
             </a:extLst>
           </p:cNvPr>
@@ -30409,7 +30412,7 @@
           <p:cNvPr id="12" name="Text Placeholder 2">
             <a:extLst>
               <a:ext uri="{FF2B5EF4-FFF2-40B4-BE49-F238E27FC236}">
-                <a16:creationId xmlns="" xmlns:a16="http://schemas.microsoft.com/office/drawing/2014/main" id="{C9DF92D8-1371-40FE-AB90-C65DFF928F5D}"/>
+                <a16:creationId xmlns:a16="http://schemas.microsoft.com/office/drawing/2014/main" xmlns="" id="{C9DF92D8-1371-40FE-AB90-C65DFF928F5D}"/>
               </a:ext>
             </a:extLst>
           </p:cNvPr>
@@ -30502,7 +30505,7 @@
           <p:cNvPr id="5" name="Slide Number Placeholder 4">
             <a:extLst>
               <a:ext uri="{FF2B5EF4-FFF2-40B4-BE49-F238E27FC236}">
-                <a16:creationId xmlns="" xmlns:a16="http://schemas.microsoft.com/office/drawing/2014/main" id="{CFEE48EC-430B-4D42-9565-527E52286C4D}"/>
+                <a16:creationId xmlns:a16="http://schemas.microsoft.com/office/drawing/2014/main" xmlns="" id="{CFEE48EC-430B-4D42-9565-527E52286C4D}"/>
               </a:ext>
             </a:extLst>
           </p:cNvPr>
@@ -30548,17 +30551,6 @@
           <a:lstStyle/>
           <a:p>
             <a:r>
-              <a:rPr lang="en-US" dirty="0" smtClean="0">
-                <a:solidFill>
-                  <a:schemeClr val="tx1">
-                    <a:lumMod val="65000"/>
-                    <a:lumOff val="35000"/>
-                  </a:schemeClr>
-                </a:solidFill>
-              </a:rPr>
-              <a:t>SELECTION </a:t>
-            </a:r>
-            <a:r>
               <a:rPr lang="en-US" dirty="0">
                 <a:solidFill>
                   <a:schemeClr val="tx1">
@@ -30567,8 +30559,16 @@
                   </a:schemeClr>
                 </a:solidFill>
               </a:rPr>
-              <a:t>OF THE SUBJECT</a:t>
+              <a:t>REASON FOR THE SELECTION OF THE SUBJECT</a:t>
             </a:r>
+            <a:endParaRPr lang="en-US" dirty="0">
+              <a:solidFill>
+                <a:schemeClr val="tx1">
+                  <a:lumMod val="65000"/>
+                  <a:lumOff val="35000"/>
+                </a:schemeClr>
+              </a:solidFill>
+            </a:endParaRPr>
           </a:p>
         </p:txBody>
       </p:sp>
@@ -30599,6 +30599,410 @@
     <p:extLst>
       <p:ext uri="{BB962C8B-B14F-4D97-AF65-F5344CB8AC3E}">
         <p14:creationId xmlns:p14="http://schemas.microsoft.com/office/powerpoint/2010/main" val="3953500455"/>
+      </p:ext>
+    </p:extLst>
+  </p:cSld>
+  <p:clrMapOvr>
+    <a:masterClrMapping/>
+  </p:clrMapOvr>
+</p:sld>
+</file>
+
+<file path=ppt/slides/slide5.xml><?xml version="1.0" encoding="utf-8"?>
+<p:sld xmlns:a="http://schemas.openxmlformats.org/drawingml/2006/main" xmlns:r="http://schemas.openxmlformats.org/officeDocument/2006/relationships" xmlns:p="http://schemas.openxmlformats.org/presentationml/2006/main">
+  <p:cSld>
+    <p:spTree>
+      <p:nvGrpSpPr>
+        <p:cNvPr id="1" name=""/>
+        <p:cNvGrpSpPr/>
+        <p:nvPr/>
+      </p:nvGrpSpPr>
+      <p:grpSpPr>
+        <a:xfrm>
+          <a:off x="0" y="0"/>
+          <a:ext cx="0" cy="0"/>
+          <a:chOff x="0" y="0"/>
+          <a:chExt cx="0" cy="0"/>
+        </a:xfrm>
+      </p:grpSpPr>
+      <p:sp>
+        <p:nvSpPr>
+          <p:cNvPr id="5" name="Slide Number Placeholder 4">
+            <a:extLst>
+              <a:ext uri="{FF2B5EF4-FFF2-40B4-BE49-F238E27FC236}">
+                <a16:creationId xmlns:a16="http://schemas.microsoft.com/office/drawing/2014/main" xmlns="" id="{CFEE48EC-430B-4D42-9565-527E52286C4D}"/>
+              </a:ext>
+            </a:extLst>
+          </p:cNvPr>
+          <p:cNvSpPr>
+            <a:spLocks noGrp="1"/>
+          </p:cNvSpPr>
+          <p:nvPr>
+            <p:ph type="sldNum" sz="quarter" idx="12"/>
+          </p:nvPr>
+        </p:nvSpPr>
+        <p:spPr/>
+        <p:txBody>
+          <a:bodyPr/>
+          <a:lstStyle/>
+          <a:p>
+            <a:fld id="{D495E168-DA5E-4888-8D8A-92B118324C14}" type="slidenum">
+              <a:rPr lang="ru-RU" smtClean="0"/>
+              <a:pPr/>
+              <a:t>5</a:t>
+            </a:fld>
+            <a:endParaRPr lang="ru-RU" dirty="0"/>
+          </a:p>
+        </p:txBody>
+      </p:sp>
+      <p:sp>
+        <p:nvSpPr>
+          <p:cNvPr id="10" name="Title 8"/>
+          <p:cNvSpPr>
+            <a:spLocks noGrp="1"/>
+          </p:cNvSpPr>
+          <p:nvPr>
+            <p:ph type="title"/>
+          </p:nvPr>
+        </p:nvSpPr>
+        <p:spPr>
+          <a:xfrm>
+            <a:off x="50290" y="81139"/>
+            <a:ext cx="11047201" cy="676275"/>
+          </a:xfrm>
+        </p:spPr>
+        <p:txBody>
+          <a:bodyPr>
+            <a:normAutofit/>
+          </a:bodyPr>
+          <a:lstStyle/>
+          <a:p>
+            <a:r>
+              <a:rPr lang="en-US" sz="3600" dirty="0">
+                <a:solidFill>
+                  <a:schemeClr val="tx1">
+                    <a:lumMod val="65000"/>
+                    <a:lumOff val="35000"/>
+                  </a:schemeClr>
+                </a:solidFill>
+              </a:rPr>
+              <a:t>3.-KNOWLEDGE OF THE CURRENT SITUATION</a:t>
+            </a:r>
+            <a:endParaRPr lang="en-US" sz="3600" dirty="0">
+              <a:solidFill>
+                <a:schemeClr val="tx1">
+                  <a:lumMod val="65000"/>
+                  <a:lumOff val="35000"/>
+                </a:schemeClr>
+              </a:solidFill>
+            </a:endParaRPr>
+          </a:p>
+        </p:txBody>
+      </p:sp>
+      <p:pic>
+        <p:nvPicPr>
+          <p:cNvPr id="11" name="Imagen 10"/>
+          <p:cNvPicPr>
+            <a:picLocks noChangeAspect="1"/>
+          </p:cNvPicPr>
+          <p:nvPr/>
+        </p:nvPicPr>
+        <p:blipFill rotWithShape="1">
+          <a:blip r:embed="rId2"/>
+          <a:srcRect l="43375" t="20333" r="37535" b="17333"/>
+          <a:stretch/>
+        </p:blipFill>
+        <p:spPr>
+          <a:xfrm>
+            <a:off x="1643195" y="1060318"/>
+            <a:ext cx="2909336" cy="5343526"/>
+          </a:xfrm>
+          <a:prstGeom prst="rect">
+            <a:avLst/>
+          </a:prstGeom>
+        </p:spPr>
+      </p:pic>
+      <p:pic>
+        <p:nvPicPr>
+          <p:cNvPr id="14" name="Imagen 13"/>
+          <p:cNvPicPr>
+            <a:picLocks noChangeAspect="1"/>
+          </p:cNvPicPr>
+          <p:nvPr/>
+        </p:nvPicPr>
+        <p:blipFill rotWithShape="1">
+          <a:blip r:embed="rId2"/>
+          <a:srcRect l="62350" t="26000" r="26550" b="24666"/>
+          <a:stretch/>
+        </p:blipFill>
+        <p:spPr>
+          <a:xfrm>
+            <a:off x="7610006" y="1191319"/>
+            <a:ext cx="2151512" cy="5378780"/>
+          </a:xfrm>
+          <a:prstGeom prst="rect">
+            <a:avLst/>
+          </a:prstGeom>
+        </p:spPr>
+      </p:pic>
+    </p:spTree>
+    <p:extLst>
+      <p:ext uri="{BB962C8B-B14F-4D97-AF65-F5344CB8AC3E}">
+        <p14:creationId xmlns:p14="http://schemas.microsoft.com/office/powerpoint/2010/main" val="3786783396"/>
+      </p:ext>
+    </p:extLst>
+  </p:cSld>
+  <p:clrMapOvr>
+    <a:masterClrMapping/>
+  </p:clrMapOvr>
+</p:sld>
+</file>
+
+<file path=ppt/slides/slide6.xml><?xml version="1.0" encoding="utf-8"?>
+<p:sld xmlns:a="http://schemas.openxmlformats.org/drawingml/2006/main" xmlns:r="http://schemas.openxmlformats.org/officeDocument/2006/relationships" xmlns:p="http://schemas.openxmlformats.org/presentationml/2006/main">
+  <p:cSld>
+    <p:spTree>
+      <p:nvGrpSpPr>
+        <p:cNvPr id="1" name=""/>
+        <p:cNvGrpSpPr/>
+        <p:nvPr/>
+      </p:nvGrpSpPr>
+      <p:grpSpPr>
+        <a:xfrm>
+          <a:off x="0" y="0"/>
+          <a:ext cx="0" cy="0"/>
+          <a:chOff x="0" y="0"/>
+          <a:chExt cx="0" cy="0"/>
+        </a:xfrm>
+      </p:grpSpPr>
+      <p:sp>
+        <p:nvSpPr>
+          <p:cNvPr id="5" name="Slide Number Placeholder 4">
+            <a:extLst>
+              <a:ext uri="{FF2B5EF4-FFF2-40B4-BE49-F238E27FC236}">
+                <a16:creationId xmlns:a16="http://schemas.microsoft.com/office/drawing/2014/main" xmlns="" id="{CFEE48EC-430B-4D42-9565-527E52286C4D}"/>
+              </a:ext>
+            </a:extLst>
+          </p:cNvPr>
+          <p:cNvSpPr>
+            <a:spLocks noGrp="1"/>
+          </p:cNvSpPr>
+          <p:nvPr>
+            <p:ph type="sldNum" sz="quarter" idx="12"/>
+          </p:nvPr>
+        </p:nvSpPr>
+        <p:spPr/>
+        <p:txBody>
+          <a:bodyPr/>
+          <a:lstStyle/>
+          <a:p>
+            <a:fld id="{D495E168-DA5E-4888-8D8A-92B118324C14}" type="slidenum">
+              <a:rPr lang="ru-RU" smtClean="0"/>
+              <a:pPr/>
+              <a:t>6</a:t>
+            </a:fld>
+            <a:endParaRPr lang="ru-RU" dirty="0"/>
+          </a:p>
+        </p:txBody>
+      </p:sp>
+      <p:sp>
+        <p:nvSpPr>
+          <p:cNvPr id="10" name="Title 8"/>
+          <p:cNvSpPr>
+            <a:spLocks noGrp="1"/>
+          </p:cNvSpPr>
+          <p:nvPr>
+            <p:ph type="title"/>
+          </p:nvPr>
+        </p:nvSpPr>
+        <p:spPr>
+          <a:xfrm>
+            <a:off x="50290" y="81139"/>
+            <a:ext cx="11047201" cy="676275"/>
+          </a:xfrm>
+        </p:spPr>
+        <p:txBody>
+          <a:bodyPr>
+            <a:normAutofit/>
+          </a:bodyPr>
+          <a:lstStyle/>
+          <a:p>
+            <a:r>
+              <a:rPr lang="en-US" sz="3600" dirty="0">
+                <a:solidFill>
+                  <a:schemeClr val="tx1">
+                    <a:lumMod val="65000"/>
+                    <a:lumOff val="35000"/>
+                  </a:schemeClr>
+                </a:solidFill>
+              </a:rPr>
+              <a:t>3.-KNOWLEDGE OF THE CURRENT SITUATION</a:t>
+            </a:r>
+            <a:endParaRPr lang="en-US" sz="3600" dirty="0">
+              <a:solidFill>
+                <a:schemeClr val="tx1">
+                  <a:lumMod val="65000"/>
+                  <a:lumOff val="35000"/>
+                </a:schemeClr>
+              </a:solidFill>
+            </a:endParaRPr>
+          </a:p>
+        </p:txBody>
+      </p:sp>
+      <p:pic>
+        <p:nvPicPr>
+          <p:cNvPr id="9" name="Imagen 8"/>
+          <p:cNvPicPr>
+            <a:picLocks noChangeAspect="1"/>
+          </p:cNvPicPr>
+          <p:nvPr/>
+        </p:nvPicPr>
+        <p:blipFill rotWithShape="1">
+          <a:blip r:embed="rId2"/>
+          <a:srcRect l="5403" t="31611" r="33039" b="34727"/>
+          <a:stretch/>
+        </p:blipFill>
+        <p:spPr>
+          <a:xfrm>
+            <a:off x="342571" y="1947553"/>
+            <a:ext cx="11080207" cy="3408217"/>
+          </a:xfrm>
+          <a:prstGeom prst="rect">
+            <a:avLst/>
+          </a:prstGeom>
+        </p:spPr>
+      </p:pic>
+    </p:spTree>
+    <p:extLst>
+      <p:ext uri="{BB962C8B-B14F-4D97-AF65-F5344CB8AC3E}">
+        <p14:creationId xmlns:p14="http://schemas.microsoft.com/office/powerpoint/2010/main" val="2444307403"/>
+      </p:ext>
+    </p:extLst>
+  </p:cSld>
+  <p:clrMapOvr>
+    <a:masterClrMapping/>
+  </p:clrMapOvr>
+</p:sld>
+</file>
+
+<file path=ppt/slides/slide7.xml><?xml version="1.0" encoding="utf-8"?>
+<p:sld xmlns:a="http://schemas.openxmlformats.org/drawingml/2006/main" xmlns:r="http://schemas.openxmlformats.org/officeDocument/2006/relationships" xmlns:p="http://schemas.openxmlformats.org/presentationml/2006/main">
+  <p:cSld>
+    <p:spTree>
+      <p:nvGrpSpPr>
+        <p:cNvPr id="1" name=""/>
+        <p:cNvGrpSpPr/>
+        <p:nvPr/>
+      </p:nvGrpSpPr>
+      <p:grpSpPr>
+        <a:xfrm>
+          <a:off x="0" y="0"/>
+          <a:ext cx="0" cy="0"/>
+          <a:chOff x="0" y="0"/>
+          <a:chExt cx="0" cy="0"/>
+        </a:xfrm>
+      </p:grpSpPr>
+      <p:sp>
+        <p:nvSpPr>
+          <p:cNvPr id="5" name="Slide Number Placeholder 4">
+            <a:extLst>
+              <a:ext uri="{FF2B5EF4-FFF2-40B4-BE49-F238E27FC236}">
+                <a16:creationId xmlns:a16="http://schemas.microsoft.com/office/drawing/2014/main" xmlns="" id="{CFEE48EC-430B-4D42-9565-527E52286C4D}"/>
+              </a:ext>
+            </a:extLst>
+          </p:cNvPr>
+          <p:cNvSpPr>
+            <a:spLocks noGrp="1"/>
+          </p:cNvSpPr>
+          <p:nvPr>
+            <p:ph type="sldNum" sz="quarter" idx="12"/>
+          </p:nvPr>
+        </p:nvSpPr>
+        <p:spPr/>
+        <p:txBody>
+          <a:bodyPr/>
+          <a:lstStyle/>
+          <a:p>
+            <a:fld id="{D495E168-DA5E-4888-8D8A-92B118324C14}" type="slidenum">
+              <a:rPr lang="ru-RU" smtClean="0"/>
+              <a:pPr/>
+              <a:t>7</a:t>
+            </a:fld>
+            <a:endParaRPr lang="ru-RU" dirty="0"/>
+          </a:p>
+        </p:txBody>
+      </p:sp>
+      <p:sp>
+        <p:nvSpPr>
+          <p:cNvPr id="10" name="Title 8"/>
+          <p:cNvSpPr>
+            <a:spLocks noGrp="1"/>
+          </p:cNvSpPr>
+          <p:nvPr>
+            <p:ph type="title"/>
+          </p:nvPr>
+        </p:nvSpPr>
+        <p:spPr>
+          <a:xfrm>
+            <a:off x="50290" y="81139"/>
+            <a:ext cx="11047201" cy="676275"/>
+          </a:xfrm>
+        </p:spPr>
+        <p:txBody>
+          <a:bodyPr>
+            <a:normAutofit/>
+          </a:bodyPr>
+          <a:lstStyle/>
+          <a:p>
+            <a:r>
+              <a:rPr lang="en-US" sz="3600" dirty="0">
+                <a:solidFill>
+                  <a:schemeClr val="tx1">
+                    <a:lumMod val="65000"/>
+                    <a:lumOff val="35000"/>
+                  </a:schemeClr>
+                </a:solidFill>
+              </a:rPr>
+              <a:t>4.-ESTABLISHMENT OF THE OBJECTIVE</a:t>
+            </a:r>
+            <a:endParaRPr lang="en-US" sz="3600" dirty="0">
+              <a:solidFill>
+                <a:schemeClr val="tx1">
+                  <a:lumMod val="65000"/>
+                  <a:lumOff val="35000"/>
+                </a:schemeClr>
+              </a:solidFill>
+            </a:endParaRPr>
+          </a:p>
+        </p:txBody>
+      </p:sp>
+      <p:pic>
+        <p:nvPicPr>
+          <p:cNvPr id="9" name="Imagen 8"/>
+          <p:cNvPicPr>
+            <a:picLocks noChangeAspect="1"/>
+          </p:cNvPicPr>
+          <p:nvPr/>
+        </p:nvPicPr>
+        <p:blipFill rotWithShape="1">
+          <a:blip r:embed="rId2"/>
+          <a:srcRect l="31896" t="34935" r="18779" b="22537"/>
+          <a:stretch/>
+        </p:blipFill>
+        <p:spPr>
+          <a:xfrm>
+            <a:off x="1199408" y="1543791"/>
+            <a:ext cx="9010703" cy="4370120"/>
+          </a:xfrm>
+          <a:prstGeom prst="rect">
+            <a:avLst/>
+          </a:prstGeom>
+        </p:spPr>
+      </p:pic>
+    </p:spTree>
+    <p:extLst>
+      <p:ext uri="{BB962C8B-B14F-4D97-AF65-F5344CB8AC3E}">
+        <p14:creationId xmlns:p14="http://schemas.microsoft.com/office/powerpoint/2010/main" val="2185023096"/>
       </p:ext>
     </p:extLst>
   </p:cSld>
@@ -31428,24 +31832,6 @@
 </file>
 
 <file path=customXml/item1.xml><?xml version="1.0" encoding="utf-8"?>
-<?mso-contentType ?>
-<FormTemplates xmlns="http://schemas.microsoft.com/sharepoint/v3/contenttype/forms">
-  <Display>DocumentLibraryForm</Display>
-  <Edit>DocumentLibraryForm</Edit>
-  <New>DocumentLibraryForm</New>
-</FormTemplates>
-</file>
-
-<file path=customXml/item2.xml><?xml version="1.0" encoding="utf-8"?>
-<p:properties xmlns:p="http://schemas.microsoft.com/office/2006/metadata/properties" xmlns:xsi="http://www.w3.org/2001/XMLSchema-instance" xmlns:pc="http://schemas.microsoft.com/office/infopath/2007/PartnerControls">
-  <documentManagement>
-    <_ip_UnifiedCompliancePolicyUIAction xmlns="http://schemas.microsoft.com/sharepoint/v3" xsi:nil="true"/>
-    <_ip_UnifiedCompliancePolicyProperties xmlns="http://schemas.microsoft.com/sharepoint/v3" xsi:nil="true"/>
-  </documentManagement>
-</p:properties>
-</file>
-
-<file path=customXml/item3.xml><?xml version="1.0" encoding="utf-8"?>
 <ct:contentTypeSchema xmlns:ct="http://schemas.microsoft.com/office/2006/metadata/contentType" xmlns:ma="http://schemas.microsoft.com/office/2006/metadata/properties/metaAttributes" ct:_="" ma:_="" ma:contentTypeName="Document" ma:contentTypeID="0x010100DEEA25CC0A0AC24199CDC46C25B8B0BC" ma:contentTypeVersion="10" ma:contentTypeDescription="Create a new document." ma:contentTypeScope="" ma:versionID="e3b47856d4cf355c0dacb39e1084d14f">
   <xsd:schema xmlns:xsd="http://www.w3.org/2001/XMLSchema" xmlns:xs="http://www.w3.org/2001/XMLSchema" xmlns:p="http://schemas.microsoft.com/office/2006/metadata/properties" xmlns:ns1="http://schemas.microsoft.com/sharepoint/v3" xmlns:ns2="6dc4bcd6-49db-4c07-9060-8acfc67cef9f" xmlns:ns3="fb0879af-3eba-417a-a55a-ffe6dcd6ca77" targetNamespace="http://schemas.microsoft.com/office/2006/metadata/properties" ma:root="true" ma:fieldsID="a845a615265fdb1f7b12cc65ac20ecbd" ns1:_="" ns2:_="" ns3:_="">
     <xsd:import namespace="http://schemas.microsoft.com/sharepoint/v3"/>
@@ -31653,27 +32039,25 @@
 </ct:contentTypeSchema>
 </file>
 
-<file path=customXml/itemProps1.xml><?xml version="1.0" encoding="utf-8"?>
-<ds:datastoreItem xmlns:ds="http://schemas.openxmlformats.org/officeDocument/2006/customXml" ds:itemID="{750F309C-DE10-4641-9043-BB7E781AC404}">
-  <ds:schemaRefs>
-    <ds:schemaRef ds:uri="http://schemas.microsoft.com/sharepoint/v3/contenttype/forms"/>
-  </ds:schemaRefs>
-</ds:datastoreItem>
+<file path=customXml/item2.xml><?xml version="1.0" encoding="utf-8"?>
+<p:properties xmlns:p="http://schemas.microsoft.com/office/2006/metadata/properties" xmlns:xsi="http://www.w3.org/2001/XMLSchema-instance" xmlns:pc="http://schemas.microsoft.com/office/infopath/2007/PartnerControls">
+  <documentManagement>
+    <_ip_UnifiedCompliancePolicyUIAction xmlns="http://schemas.microsoft.com/sharepoint/v3" xsi:nil="true"/>
+    <_ip_UnifiedCompliancePolicyProperties xmlns="http://schemas.microsoft.com/sharepoint/v3" xsi:nil="true"/>
+  </documentManagement>
+</p:properties>
 </file>
 
-<file path=customXml/itemProps2.xml><?xml version="1.0" encoding="utf-8"?>
-<ds:datastoreItem xmlns:ds="http://schemas.openxmlformats.org/officeDocument/2006/customXml" ds:itemID="{12024DF7-0783-4549-86B7-A48B29FBA9C2}">
-  <ds:schemaRefs>
-    <ds:schemaRef ds:uri="http://schemas.microsoft.com/office/2006/metadata/properties"/>
-    <ds:schemaRef ds:uri="http://www.w3.org/2000/xmlns/"/>
-    <ds:schemaRef ds:uri="http://schemas.microsoft.com/sharepoint/v3"/>
-    <ds:schemaRef ds:uri="http://www.w3.org/2001/XMLSchema-instance"/>
-    <ds:schemaRef ds:uri="http://schemas.microsoft.com/office/infopath/2007/PartnerControls"/>
-  </ds:schemaRefs>
-</ds:datastoreItem>
+<file path=customXml/item3.xml><?xml version="1.0" encoding="utf-8"?>
+<?mso-contentType ?>
+<FormTemplates xmlns="http://schemas.microsoft.com/sharepoint/v3/contenttype/forms">
+  <Display>DocumentLibraryForm</Display>
+  <Edit>DocumentLibraryForm</Edit>
+  <New>DocumentLibraryForm</New>
+</FormTemplates>
 </file>
 
-<file path=customXml/itemProps3.xml><?xml version="1.0" encoding="utf-8"?>
+<file path=customXml/itemProps1.xml><?xml version="1.0" encoding="utf-8"?>
 <ds:datastoreItem xmlns:ds="http://schemas.openxmlformats.org/officeDocument/2006/customXml" ds:itemID="{A6393BED-762D-4FA3-96CF-866F426A043C}">
   <ds:schemaRefs>
     <ds:schemaRef ds:uri="http://schemas.microsoft.com/office/2006/metadata/contentType"/>
@@ -31692,4 +32076,24 @@
     <ds:schemaRef ds:uri="http://schemas.microsoft.com/internal/obd"/>
   </ds:schemaRefs>
 </ds:datastoreItem>
+</file>
+
+<file path=customXml/itemProps2.xml><?xml version="1.0" encoding="utf-8"?>
+<ds:datastoreItem xmlns:ds="http://schemas.openxmlformats.org/officeDocument/2006/customXml" ds:itemID="{12024DF7-0783-4549-86B7-A48B29FBA9C2}">
+  <ds:schemaRefs>
+    <ds:schemaRef ds:uri="http://schemas.microsoft.com/office/2006/metadata/properties"/>
+    <ds:schemaRef ds:uri="http://www.w3.org/2000/xmlns/"/>
+    <ds:schemaRef ds:uri="http://schemas.microsoft.com/sharepoint/v3"/>
+    <ds:schemaRef ds:uri="http://www.w3.org/2001/XMLSchema-instance"/>
+    <ds:schemaRef ds:uri="http://schemas.microsoft.com/office/infopath/2007/PartnerControls"/>
+  </ds:schemaRefs>
+</ds:datastoreItem>
+</file>
+
+<file path=customXml/itemProps3.xml><?xml version="1.0" encoding="utf-8"?>
+<ds:datastoreItem xmlns:ds="http://schemas.openxmlformats.org/officeDocument/2006/customXml" ds:itemID="{750F309C-DE10-4641-9043-BB7E781AC404}">
+  <ds:schemaRefs>
+    <ds:schemaRef ds:uri="http://schemas.microsoft.com/sharepoint/v3/contenttype/forms"/>
+  </ds:schemaRefs>
+</ds:datastoreItem>
 </file>
</xml_diff>

<commit_message>
avance en tabla de registro
</commit_message>
<xml_diff>
--- a/base datos/TEMPLATE 2021.pptx
+++ b/base datos/TEMPLATE 2021.pptx
@@ -5,10 +5,10 @@
     <p:sldMasterId id="2147483648" r:id="rId4"/>
   </p:sldMasterIdLst>
   <p:notesMasterIdLst>
-    <p:notesMasterId r:id="rId12"/>
+    <p:notesMasterId r:id="rId13"/>
   </p:notesMasterIdLst>
   <p:handoutMasterIdLst>
-    <p:handoutMasterId r:id="rId13"/>
+    <p:handoutMasterId r:id="rId14"/>
   </p:handoutMasterIdLst>
   <p:sldIdLst>
     <p:sldId id="269" r:id="rId5"/>
@@ -18,6 +18,7 @@
     <p:sldId id="274" r:id="rId9"/>
     <p:sldId id="277" r:id="rId10"/>
     <p:sldId id="276" r:id="rId11"/>
+    <p:sldId id="278" r:id="rId12"/>
   </p:sldIdLst>
   <p:sldSz cx="12192000" cy="6858000"/>
   <p:notesSz cx="6858000" cy="9144000"/>
@@ -165,7 +166,7 @@
           <p:cNvPr id="2" name="Header Placeholder 1">
             <a:extLst>
               <a:ext uri="{FF2B5EF4-FFF2-40B4-BE49-F238E27FC236}">
-                <a16:creationId xmlns:a16="http://schemas.microsoft.com/office/drawing/2014/main" xmlns="" id="{5A9E02AD-574F-46B1-91CF-758ECD927212}"/>
+                <a16:creationId xmlns="" xmlns:a16="http://schemas.microsoft.com/office/drawing/2014/main" id="{5A9E02AD-574F-46B1-91CF-758ECD927212}"/>
               </a:ext>
             </a:extLst>
           </p:cNvPr>
@@ -202,7 +203,7 @@
           <p:cNvPr id="3" name="Date Placeholder 2">
             <a:extLst>
               <a:ext uri="{FF2B5EF4-FFF2-40B4-BE49-F238E27FC236}">
-                <a16:creationId xmlns:a16="http://schemas.microsoft.com/office/drawing/2014/main" xmlns="" id="{0DCDBB3E-0962-4543-8203-0E0084580CE0}"/>
+                <a16:creationId xmlns="" xmlns:a16="http://schemas.microsoft.com/office/drawing/2014/main" id="{0DCDBB3E-0962-4543-8203-0E0084580CE0}"/>
               </a:ext>
             </a:extLst>
           </p:cNvPr>
@@ -232,7 +233,7 @@
           <a:p>
             <a:fld id="{F702A5B2-8064-4382-9E31-9E46E0F5B2C3}" type="datetimeFigureOut">
               <a:rPr lang="ru-RU" smtClean="0"/>
-              <a:t>03.03.2022</a:t>
+              <a:t>11.03.2022</a:t>
             </a:fld>
             <a:endParaRPr lang="ru-RU"/>
           </a:p>
@@ -243,7 +244,7 @@
           <p:cNvPr id="4" name="Footer Placeholder 3">
             <a:extLst>
               <a:ext uri="{FF2B5EF4-FFF2-40B4-BE49-F238E27FC236}">
-                <a16:creationId xmlns:a16="http://schemas.microsoft.com/office/drawing/2014/main" xmlns="" id="{DD61A4A7-FC01-4444-9707-74E93BD63497}"/>
+                <a16:creationId xmlns="" xmlns:a16="http://schemas.microsoft.com/office/drawing/2014/main" id="{DD61A4A7-FC01-4444-9707-74E93BD63497}"/>
               </a:ext>
             </a:extLst>
           </p:cNvPr>
@@ -280,7 +281,7 @@
           <p:cNvPr id="5" name="Slide Number Placeholder 4">
             <a:extLst>
               <a:ext uri="{FF2B5EF4-FFF2-40B4-BE49-F238E27FC236}">
-                <a16:creationId xmlns:a16="http://schemas.microsoft.com/office/drawing/2014/main" xmlns="" id="{B28D65D7-8813-49CE-A8BE-42984C5CBDA7}"/>
+                <a16:creationId xmlns="" xmlns:a16="http://schemas.microsoft.com/office/drawing/2014/main" id="{B28D65D7-8813-49CE-A8BE-42984C5CBDA7}"/>
               </a:ext>
             </a:extLst>
           </p:cNvPr>
@@ -409,7 +410,7 @@
           <a:p>
             <a:fld id="{7000EB3D-2307-4317-8A1D-B47FA45245F0}" type="datetimeFigureOut">
               <a:rPr lang="ru-RU" smtClean="0"/>
-              <a:t>03.03.2022</a:t>
+              <a:t>11.03.2022</a:t>
             </a:fld>
             <a:endParaRPr lang="ru-RU" dirty="0"/>
           </a:p>
@@ -699,7 +700,7 @@
           <p:cNvPr id="2" name="Title 1">
             <a:extLst>
               <a:ext uri="{FF2B5EF4-FFF2-40B4-BE49-F238E27FC236}">
-                <a16:creationId xmlns:a16="http://schemas.microsoft.com/office/drawing/2014/main" xmlns="" id="{199AD403-A15F-4A2F-B050-AB874136E732}"/>
+                <a16:creationId xmlns="" xmlns:a16="http://schemas.microsoft.com/office/drawing/2014/main" id="{199AD403-A15F-4A2F-B050-AB874136E732}"/>
               </a:ext>
             </a:extLst>
           </p:cNvPr>
@@ -746,7 +747,7 @@
           <p:cNvPr id="23" name="Text Placeholder 26">
             <a:extLst>
               <a:ext uri="{FF2B5EF4-FFF2-40B4-BE49-F238E27FC236}">
-                <a16:creationId xmlns:a16="http://schemas.microsoft.com/office/drawing/2014/main" xmlns="" id="{5BB088E3-63C1-423F-A939-150B8E1F87A7}"/>
+                <a16:creationId xmlns="" xmlns:a16="http://schemas.microsoft.com/office/drawing/2014/main" id="{5BB088E3-63C1-423F-A939-150B8E1F87A7}"/>
               </a:ext>
             </a:extLst>
           </p:cNvPr>
@@ -815,7 +816,7 @@
           <p:cNvPr id="28" name="Freeform: Shape 27">
             <a:extLst>
               <a:ext uri="{FF2B5EF4-FFF2-40B4-BE49-F238E27FC236}">
-                <a16:creationId xmlns:a16="http://schemas.microsoft.com/office/drawing/2014/main" xmlns="" id="{87A7AFAC-3F6D-48D1-A100-148792529BC6}"/>
+                <a16:creationId xmlns="" xmlns:a16="http://schemas.microsoft.com/office/drawing/2014/main" id="{87A7AFAC-3F6D-48D1-A100-148792529BC6}"/>
               </a:ext>
             </a:extLst>
           </p:cNvPr>
@@ -913,7 +914,7 @@
           <p:cNvPr id="29" name="Freeform: Shape 28">
             <a:extLst>
               <a:ext uri="{FF2B5EF4-FFF2-40B4-BE49-F238E27FC236}">
-                <a16:creationId xmlns:a16="http://schemas.microsoft.com/office/drawing/2014/main" xmlns="" id="{81A4F88F-4E35-4BB3-AD24-CAC580C12F96}"/>
+                <a16:creationId xmlns="" xmlns:a16="http://schemas.microsoft.com/office/drawing/2014/main" id="{81A4F88F-4E35-4BB3-AD24-CAC580C12F96}"/>
               </a:ext>
             </a:extLst>
           </p:cNvPr>
@@ -1021,7 +1022,7 @@
           <p:cNvPr id="30" name="Freeform: Shape 29">
             <a:extLst>
               <a:ext uri="{FF2B5EF4-FFF2-40B4-BE49-F238E27FC236}">
-                <a16:creationId xmlns:a16="http://schemas.microsoft.com/office/drawing/2014/main" xmlns="" id="{592CE00E-F2AB-4099-8BB8-F109C4F2EFDB}"/>
+                <a16:creationId xmlns="" xmlns:a16="http://schemas.microsoft.com/office/drawing/2014/main" id="{592CE00E-F2AB-4099-8BB8-F109C4F2EFDB}"/>
               </a:ext>
             </a:extLst>
           </p:cNvPr>
@@ -1131,7 +1132,7 @@
           <p:cNvPr id="33" name="Freeform: Shape 32">
             <a:extLst>
               <a:ext uri="{FF2B5EF4-FFF2-40B4-BE49-F238E27FC236}">
-                <a16:creationId xmlns:a16="http://schemas.microsoft.com/office/drawing/2014/main" xmlns="" id="{2DF8B751-9294-46D5-B390-5D322195540F}"/>
+                <a16:creationId xmlns="" xmlns:a16="http://schemas.microsoft.com/office/drawing/2014/main" id="{2DF8B751-9294-46D5-B390-5D322195540F}"/>
               </a:ext>
             </a:extLst>
           </p:cNvPr>
@@ -1242,7 +1243,7 @@
           <p:cNvPr id="34" name="Freeform: Shape 33">
             <a:extLst>
               <a:ext uri="{FF2B5EF4-FFF2-40B4-BE49-F238E27FC236}">
-                <a16:creationId xmlns:a16="http://schemas.microsoft.com/office/drawing/2014/main" xmlns="" id="{E0F651C6-BE74-4133-ABA8-316072D4F5B5}"/>
+                <a16:creationId xmlns="" xmlns:a16="http://schemas.microsoft.com/office/drawing/2014/main" id="{E0F651C6-BE74-4133-ABA8-316072D4F5B5}"/>
               </a:ext>
             </a:extLst>
           </p:cNvPr>
@@ -1454,7 +1455,7 @@
           <p:cNvPr id="36" name="Text Placeholder 14">
             <a:extLst>
               <a:ext uri="{FF2B5EF4-FFF2-40B4-BE49-F238E27FC236}">
-                <a16:creationId xmlns:a16="http://schemas.microsoft.com/office/drawing/2014/main" xmlns="" id="{2A3D73F7-77EC-4576-B541-20C032F462DC}"/>
+                <a16:creationId xmlns="" xmlns:a16="http://schemas.microsoft.com/office/drawing/2014/main" id="{2A3D73F7-77EC-4576-B541-20C032F462DC}"/>
               </a:ext>
             </a:extLst>
           </p:cNvPr>
@@ -1502,7 +1503,7 @@
           <p:cNvPr id="40" name="Graphic 37">
             <a:extLst>
               <a:ext uri="{FF2B5EF4-FFF2-40B4-BE49-F238E27FC236}">
-                <a16:creationId xmlns:a16="http://schemas.microsoft.com/office/drawing/2014/main" xmlns="" id="{9F75ED2D-7077-4753-B623-4B9A718EB224}"/>
+                <a16:creationId xmlns="" xmlns:a16="http://schemas.microsoft.com/office/drawing/2014/main" id="{9F75ED2D-7077-4753-B623-4B9A718EB224}"/>
               </a:ext>
             </a:extLst>
           </p:cNvPr>
@@ -1638,7 +1639,7 @@
           <p:cNvPr id="12" name="Graphic 36">
             <a:extLst>
               <a:ext uri="{FF2B5EF4-FFF2-40B4-BE49-F238E27FC236}">
-                <a16:creationId xmlns:a16="http://schemas.microsoft.com/office/drawing/2014/main" xmlns="" id="{21FF5BCF-BC53-4C3F-8B7F-7077B35ADCA8}"/>
+                <a16:creationId xmlns="" xmlns:a16="http://schemas.microsoft.com/office/drawing/2014/main" id="{21FF5BCF-BC53-4C3F-8B7F-7077B35ADCA8}"/>
               </a:ext>
             </a:extLst>
           </p:cNvPr>
@@ -1746,7 +1747,7 @@
           <p:cNvPr id="32" name="Freeform: Shape 31">
             <a:extLst>
               <a:ext uri="{FF2B5EF4-FFF2-40B4-BE49-F238E27FC236}">
-                <a16:creationId xmlns:a16="http://schemas.microsoft.com/office/drawing/2014/main" xmlns="" id="{B0920EEC-7CE3-4708-93D2-53699D17E5E3}"/>
+                <a16:creationId xmlns="" xmlns:a16="http://schemas.microsoft.com/office/drawing/2014/main" id="{B0920EEC-7CE3-4708-93D2-53699D17E5E3}"/>
               </a:ext>
             </a:extLst>
           </p:cNvPr>
@@ -1884,7 +1885,7 @@
           <p:cNvPr id="19" name="Text Placeholder 26">
             <a:extLst>
               <a:ext uri="{FF2B5EF4-FFF2-40B4-BE49-F238E27FC236}">
-                <a16:creationId xmlns:a16="http://schemas.microsoft.com/office/drawing/2014/main" xmlns="" id="{9DBE4B29-4897-4A3A-B883-A887BCDA3718}"/>
+                <a16:creationId xmlns="" xmlns:a16="http://schemas.microsoft.com/office/drawing/2014/main" id="{9DBE4B29-4897-4A3A-B883-A887BCDA3718}"/>
               </a:ext>
             </a:extLst>
           </p:cNvPr>
@@ -1941,7 +1942,7 @@
           <p:cNvPr id="20" name="Text Placeholder 26">
             <a:extLst>
               <a:ext uri="{FF2B5EF4-FFF2-40B4-BE49-F238E27FC236}">
-                <a16:creationId xmlns:a16="http://schemas.microsoft.com/office/drawing/2014/main" xmlns="" id="{0EF4532A-9AB5-4545-A83D-BD0E39635727}"/>
+                <a16:creationId xmlns="" xmlns:a16="http://schemas.microsoft.com/office/drawing/2014/main" id="{0EF4532A-9AB5-4545-A83D-BD0E39635727}"/>
               </a:ext>
             </a:extLst>
           </p:cNvPr>
@@ -1998,7 +1999,7 @@
           <p:cNvPr id="21" name="Text Placeholder 26">
             <a:extLst>
               <a:ext uri="{FF2B5EF4-FFF2-40B4-BE49-F238E27FC236}">
-                <a16:creationId xmlns:a16="http://schemas.microsoft.com/office/drawing/2014/main" xmlns="" id="{D579A1F5-9180-47FE-A31B-4E37384383C4}"/>
+                <a16:creationId xmlns="" xmlns:a16="http://schemas.microsoft.com/office/drawing/2014/main" id="{D579A1F5-9180-47FE-A31B-4E37384383C4}"/>
               </a:ext>
             </a:extLst>
           </p:cNvPr>
@@ -2060,7 +2061,7 @@
           <p:cNvPr id="22" name="Text Placeholder 26">
             <a:extLst>
               <a:ext uri="{FF2B5EF4-FFF2-40B4-BE49-F238E27FC236}">
-                <a16:creationId xmlns:a16="http://schemas.microsoft.com/office/drawing/2014/main" xmlns="" id="{71BBF4E8-67FF-4A65-9EC1-AE832CEBE85D}"/>
+                <a16:creationId xmlns="" xmlns:a16="http://schemas.microsoft.com/office/drawing/2014/main" id="{71BBF4E8-67FF-4A65-9EC1-AE832CEBE85D}"/>
               </a:ext>
             </a:extLst>
           </p:cNvPr>
@@ -2117,7 +2118,7 @@
           <p:cNvPr id="23" name="Text Placeholder 26">
             <a:extLst>
               <a:ext uri="{FF2B5EF4-FFF2-40B4-BE49-F238E27FC236}">
-                <a16:creationId xmlns:a16="http://schemas.microsoft.com/office/drawing/2014/main" xmlns="" id="{5BB088E3-63C1-423F-A939-150B8E1F87A7}"/>
+                <a16:creationId xmlns="" xmlns:a16="http://schemas.microsoft.com/office/drawing/2014/main" id="{5BB088E3-63C1-423F-A939-150B8E1F87A7}"/>
               </a:ext>
             </a:extLst>
           </p:cNvPr>
@@ -2179,7 +2180,7 @@
           <p:cNvPr id="3" name="Graphic 23">
             <a:extLst>
               <a:ext uri="{FF2B5EF4-FFF2-40B4-BE49-F238E27FC236}">
-                <a16:creationId xmlns:a16="http://schemas.microsoft.com/office/drawing/2014/main" xmlns="" id="{7E62A657-0B76-4081-A698-3C47F1AFC78E}"/>
+                <a16:creationId xmlns="" xmlns:a16="http://schemas.microsoft.com/office/drawing/2014/main" id="{7E62A657-0B76-4081-A698-3C47F1AFC78E}"/>
               </a:ext>
             </a:extLst>
           </p:cNvPr>
@@ -2309,7 +2310,7 @@
           <p:cNvPr id="25" name="Freeform: Shape 24">
             <a:extLst>
               <a:ext uri="{FF2B5EF4-FFF2-40B4-BE49-F238E27FC236}">
-                <a16:creationId xmlns:a16="http://schemas.microsoft.com/office/drawing/2014/main" xmlns="" id="{C51D0359-A547-4B21-8850-06B9F1CDF9CE}"/>
+                <a16:creationId xmlns="" xmlns:a16="http://schemas.microsoft.com/office/drawing/2014/main" id="{C51D0359-A547-4B21-8850-06B9F1CDF9CE}"/>
               </a:ext>
             </a:extLst>
           </p:cNvPr>
@@ -2417,7 +2418,7 @@
           <p:cNvPr id="12" name="Freeform: Shape 11">
             <a:extLst>
               <a:ext uri="{FF2B5EF4-FFF2-40B4-BE49-F238E27FC236}">
-                <a16:creationId xmlns:a16="http://schemas.microsoft.com/office/drawing/2014/main" xmlns="" id="{F9E3EED1-7BB3-4B75-BCA9-1C1223740B3C}"/>
+                <a16:creationId xmlns="" xmlns:a16="http://schemas.microsoft.com/office/drawing/2014/main" id="{F9E3EED1-7BB3-4B75-BCA9-1C1223740B3C}"/>
               </a:ext>
             </a:extLst>
           </p:cNvPr>
@@ -2512,7 +2513,7 @@
           <p:cNvPr id="13" name="Text Placeholder 2">
             <a:extLst>
               <a:ext uri="{FF2B5EF4-FFF2-40B4-BE49-F238E27FC236}">
-                <a16:creationId xmlns:a16="http://schemas.microsoft.com/office/drawing/2014/main" xmlns="" id="{5ECCBAE3-CEA3-4EE0-83F6-41CFC54D2B4A}"/>
+                <a16:creationId xmlns="" xmlns:a16="http://schemas.microsoft.com/office/drawing/2014/main" id="{5ECCBAE3-CEA3-4EE0-83F6-41CFC54D2B4A}"/>
               </a:ext>
             </a:extLst>
           </p:cNvPr>
@@ -2721,7 +2722,7 @@
           <p:cNvPr id="14" name="Imagen 18">
             <a:extLst>
               <a:ext uri="{FF2B5EF4-FFF2-40B4-BE49-F238E27FC236}">
-                <a16:creationId xmlns:a16="http://schemas.microsoft.com/office/drawing/2014/main" xmlns="" id="{CAA2F7E1-C4D5-49BC-9D8E-F33FED6ACF22}"/>
+                <a16:creationId xmlns="" xmlns:a16="http://schemas.microsoft.com/office/drawing/2014/main" id="{CAA2F7E1-C4D5-49BC-9D8E-F33FED6ACF22}"/>
               </a:ext>
             </a:extLst>
           </p:cNvPr>
@@ -2751,7 +2752,7 @@
           <p:cNvPr id="16" name="Freeform: Shape 15">
             <a:extLst>
               <a:ext uri="{FF2B5EF4-FFF2-40B4-BE49-F238E27FC236}">
-                <a16:creationId xmlns:a16="http://schemas.microsoft.com/office/drawing/2014/main" xmlns="" id="{29016A5F-A55B-4605-B66C-5C6E2BF4919F}"/>
+                <a16:creationId xmlns="" xmlns:a16="http://schemas.microsoft.com/office/drawing/2014/main" id="{29016A5F-A55B-4605-B66C-5C6E2BF4919F}"/>
               </a:ext>
             </a:extLst>
           </p:cNvPr>
@@ -2892,7 +2893,7 @@
           <p:cNvPr id="2" name="Title 1">
             <a:extLst>
               <a:ext uri="{FF2B5EF4-FFF2-40B4-BE49-F238E27FC236}">
-                <a16:creationId xmlns:a16="http://schemas.microsoft.com/office/drawing/2014/main" xmlns="" id="{199AD403-A15F-4A2F-B050-AB874136E732}"/>
+                <a16:creationId xmlns="" xmlns:a16="http://schemas.microsoft.com/office/drawing/2014/main" id="{199AD403-A15F-4A2F-B050-AB874136E732}"/>
               </a:ext>
             </a:extLst>
           </p:cNvPr>
@@ -2939,7 +2940,7 @@
           <p:cNvPr id="28" name="Freeform: Shape 27">
             <a:extLst>
               <a:ext uri="{FF2B5EF4-FFF2-40B4-BE49-F238E27FC236}">
-                <a16:creationId xmlns:a16="http://schemas.microsoft.com/office/drawing/2014/main" xmlns="" id="{87A7AFAC-3F6D-48D1-A100-148792529BC6}"/>
+                <a16:creationId xmlns="" xmlns:a16="http://schemas.microsoft.com/office/drawing/2014/main" id="{87A7AFAC-3F6D-48D1-A100-148792529BC6}"/>
               </a:ext>
             </a:extLst>
           </p:cNvPr>
@@ -3034,7 +3035,7 @@
           <p:cNvPr id="29" name="Freeform: Shape 28">
             <a:extLst>
               <a:ext uri="{FF2B5EF4-FFF2-40B4-BE49-F238E27FC236}">
-                <a16:creationId xmlns:a16="http://schemas.microsoft.com/office/drawing/2014/main" xmlns="" id="{81A4F88F-4E35-4BB3-AD24-CAC580C12F96}"/>
+                <a16:creationId xmlns="" xmlns:a16="http://schemas.microsoft.com/office/drawing/2014/main" id="{81A4F88F-4E35-4BB3-AD24-CAC580C12F96}"/>
               </a:ext>
             </a:extLst>
           </p:cNvPr>
@@ -3142,7 +3143,7 @@
           <p:cNvPr id="30" name="Freeform: Shape 29">
             <a:extLst>
               <a:ext uri="{FF2B5EF4-FFF2-40B4-BE49-F238E27FC236}">
-                <a16:creationId xmlns:a16="http://schemas.microsoft.com/office/drawing/2014/main" xmlns="" id="{592CE00E-F2AB-4099-8BB8-F109C4F2EFDB}"/>
+                <a16:creationId xmlns="" xmlns:a16="http://schemas.microsoft.com/office/drawing/2014/main" id="{592CE00E-F2AB-4099-8BB8-F109C4F2EFDB}"/>
               </a:ext>
             </a:extLst>
           </p:cNvPr>
@@ -3250,7 +3251,7 @@
           <p:cNvPr id="32" name="Freeform: Shape 31">
             <a:extLst>
               <a:ext uri="{FF2B5EF4-FFF2-40B4-BE49-F238E27FC236}">
-                <a16:creationId xmlns:a16="http://schemas.microsoft.com/office/drawing/2014/main" xmlns="" id="{B0920EEC-7CE3-4708-93D2-53699D17E5E3}"/>
+                <a16:creationId xmlns="" xmlns:a16="http://schemas.microsoft.com/office/drawing/2014/main" id="{B0920EEC-7CE3-4708-93D2-53699D17E5E3}"/>
               </a:ext>
             </a:extLst>
           </p:cNvPr>
@@ -3358,7 +3359,7 @@
           <p:cNvPr id="33" name="Freeform: Shape 32">
             <a:extLst>
               <a:ext uri="{FF2B5EF4-FFF2-40B4-BE49-F238E27FC236}">
-                <a16:creationId xmlns:a16="http://schemas.microsoft.com/office/drawing/2014/main" xmlns="" id="{2DF8B751-9294-46D5-B390-5D322195540F}"/>
+                <a16:creationId xmlns="" xmlns:a16="http://schemas.microsoft.com/office/drawing/2014/main" id="{2DF8B751-9294-46D5-B390-5D322195540F}"/>
               </a:ext>
             </a:extLst>
           </p:cNvPr>
@@ -3466,7 +3467,7 @@
           <p:cNvPr id="34" name="Freeform: Shape 33">
             <a:extLst>
               <a:ext uri="{FF2B5EF4-FFF2-40B4-BE49-F238E27FC236}">
-                <a16:creationId xmlns:a16="http://schemas.microsoft.com/office/drawing/2014/main" xmlns="" id="{E0F651C6-BE74-4133-ABA8-316072D4F5B5}"/>
+                <a16:creationId xmlns="" xmlns:a16="http://schemas.microsoft.com/office/drawing/2014/main" id="{E0F651C6-BE74-4133-ABA8-316072D4F5B5}"/>
               </a:ext>
             </a:extLst>
           </p:cNvPr>
@@ -3676,7 +3677,7 @@
           <p:cNvPr id="40" name="Graphic 37">
             <a:extLst>
               <a:ext uri="{FF2B5EF4-FFF2-40B4-BE49-F238E27FC236}">
-                <a16:creationId xmlns:a16="http://schemas.microsoft.com/office/drawing/2014/main" xmlns="" id="{9F75ED2D-7077-4753-B623-4B9A718EB224}"/>
+                <a16:creationId xmlns="" xmlns:a16="http://schemas.microsoft.com/office/drawing/2014/main" id="{9F75ED2D-7077-4753-B623-4B9A718EB224}"/>
               </a:ext>
             </a:extLst>
           </p:cNvPr>
@@ -3812,7 +3813,7 @@
           <p:cNvPr id="12" name="Graphic 36">
             <a:extLst>
               <a:ext uri="{FF2B5EF4-FFF2-40B4-BE49-F238E27FC236}">
-                <a16:creationId xmlns:a16="http://schemas.microsoft.com/office/drawing/2014/main" xmlns="" id="{21FF5BCF-BC53-4C3F-8B7F-7077B35ADCA8}"/>
+                <a16:creationId xmlns="" xmlns:a16="http://schemas.microsoft.com/office/drawing/2014/main" id="{21FF5BCF-BC53-4C3F-8B7F-7077B35ADCA8}"/>
               </a:ext>
             </a:extLst>
           </p:cNvPr>
@@ -3920,7 +3921,7 @@
           <p:cNvPr id="15" name="Subtitle 2">
             <a:extLst>
               <a:ext uri="{FF2B5EF4-FFF2-40B4-BE49-F238E27FC236}">
-                <a16:creationId xmlns:a16="http://schemas.microsoft.com/office/drawing/2014/main" xmlns="" id="{4BCD5243-C973-44F2-88E8-A4A6E3387B1F}"/>
+                <a16:creationId xmlns="" xmlns:a16="http://schemas.microsoft.com/office/drawing/2014/main" id="{4BCD5243-C973-44F2-88E8-A4A6E3387B1F}"/>
               </a:ext>
             </a:extLst>
           </p:cNvPr>
@@ -3992,7 +3993,7 @@
           <p:cNvPr id="34" name="Oval 33">
             <a:extLst>
               <a:ext uri="{FF2B5EF4-FFF2-40B4-BE49-F238E27FC236}">
-                <a16:creationId xmlns:a16="http://schemas.microsoft.com/office/drawing/2014/main" xmlns="" id="{13074BE4-153F-46FE-B915-CD1AEF318A25}"/>
+                <a16:creationId xmlns="" xmlns:a16="http://schemas.microsoft.com/office/drawing/2014/main" id="{13074BE4-153F-46FE-B915-CD1AEF318A25}"/>
               </a:ext>
             </a:extLst>
           </p:cNvPr>
@@ -4044,7 +4045,7 @@
           <p:cNvPr id="35" name="Graphic 12">
             <a:extLst>
               <a:ext uri="{FF2B5EF4-FFF2-40B4-BE49-F238E27FC236}">
-                <a16:creationId xmlns:a16="http://schemas.microsoft.com/office/drawing/2014/main" xmlns="" id="{0B7E91C4-F19E-46BE-B05F-139B5418924E}"/>
+                <a16:creationId xmlns="" xmlns:a16="http://schemas.microsoft.com/office/drawing/2014/main" id="{0B7E91C4-F19E-46BE-B05F-139B5418924E}"/>
               </a:ext>
             </a:extLst>
           </p:cNvPr>
@@ -4161,7 +4162,7 @@
           <p:cNvPr id="10" name="Freeform: Shape 9">
             <a:extLst>
               <a:ext uri="{FF2B5EF4-FFF2-40B4-BE49-F238E27FC236}">
-                <a16:creationId xmlns:a16="http://schemas.microsoft.com/office/drawing/2014/main" xmlns="" id="{08A64499-0304-4070-BCB0-67E2BE20A3EA}"/>
+                <a16:creationId xmlns="" xmlns:a16="http://schemas.microsoft.com/office/drawing/2014/main" id="{08A64499-0304-4070-BCB0-67E2BE20A3EA}"/>
               </a:ext>
             </a:extLst>
           </p:cNvPr>
@@ -4269,7 +4270,7 @@
           <p:cNvPr id="25" name="Freeform: Shape 24">
             <a:extLst>
               <a:ext uri="{FF2B5EF4-FFF2-40B4-BE49-F238E27FC236}">
-                <a16:creationId xmlns:a16="http://schemas.microsoft.com/office/drawing/2014/main" xmlns="" id="{ED1736B3-AE79-40C2-80FF-2FB0FEE27195}"/>
+                <a16:creationId xmlns="" xmlns:a16="http://schemas.microsoft.com/office/drawing/2014/main" id="{ED1736B3-AE79-40C2-80FF-2FB0FEE27195}"/>
               </a:ext>
             </a:extLst>
           </p:cNvPr>
@@ -4359,7 +4360,7 @@
           <p:cNvPr id="2" name="Title 1">
             <a:extLst>
               <a:ext uri="{FF2B5EF4-FFF2-40B4-BE49-F238E27FC236}">
-                <a16:creationId xmlns:a16="http://schemas.microsoft.com/office/drawing/2014/main" xmlns="" id="{DC2228EE-3546-4272-9C39-150FF23CE033}"/>
+                <a16:creationId xmlns="" xmlns:a16="http://schemas.microsoft.com/office/drawing/2014/main" id="{DC2228EE-3546-4272-9C39-150FF23CE033}"/>
               </a:ext>
             </a:extLst>
           </p:cNvPr>
@@ -4411,7 +4412,7 @@
           <p:cNvPr id="3" name="Subtitle 2">
             <a:extLst>
               <a:ext uri="{FF2B5EF4-FFF2-40B4-BE49-F238E27FC236}">
-                <a16:creationId xmlns:a16="http://schemas.microsoft.com/office/drawing/2014/main" xmlns="" id="{0F2EFCC6-4D5A-4B43-A534-1A868887BC7F}"/>
+                <a16:creationId xmlns="" xmlns:a16="http://schemas.microsoft.com/office/drawing/2014/main" id="{0F2EFCC6-4D5A-4B43-A534-1A868887BC7F}"/>
               </a:ext>
             </a:extLst>
           </p:cNvPr>
@@ -4488,7 +4489,7 @@
           <p:cNvPr id="24" name="Graphic 22">
             <a:extLst>
               <a:ext uri="{FF2B5EF4-FFF2-40B4-BE49-F238E27FC236}">
-                <a16:creationId xmlns:a16="http://schemas.microsoft.com/office/drawing/2014/main" xmlns="" id="{4EE1436E-33B5-4388-87D8-2D0633CC3CE7}"/>
+                <a16:creationId xmlns="" xmlns:a16="http://schemas.microsoft.com/office/drawing/2014/main" id="{4EE1436E-33B5-4388-87D8-2D0633CC3CE7}"/>
               </a:ext>
             </a:extLst>
           </p:cNvPr>
@@ -4624,7 +4625,7 @@
           <p:cNvPr id="9" name="Freeform: Shape 8">
             <a:extLst>
               <a:ext uri="{FF2B5EF4-FFF2-40B4-BE49-F238E27FC236}">
-                <a16:creationId xmlns:a16="http://schemas.microsoft.com/office/drawing/2014/main" xmlns="" id="{A8FB11AB-3031-47CA-85DD-696856C3C62C}"/>
+                <a16:creationId xmlns="" xmlns:a16="http://schemas.microsoft.com/office/drawing/2014/main" id="{A8FB11AB-3031-47CA-85DD-696856C3C62C}"/>
               </a:ext>
             </a:extLst>
           </p:cNvPr>
@@ -4732,7 +4733,7 @@
           <p:cNvPr id="38" name="Freeform: Shape 37">
             <a:extLst>
               <a:ext uri="{FF2B5EF4-FFF2-40B4-BE49-F238E27FC236}">
-                <a16:creationId xmlns:a16="http://schemas.microsoft.com/office/drawing/2014/main" xmlns="" id="{9CD6F167-FB82-4EFB-BAB9-1D0FEE07B85D}"/>
+                <a16:creationId xmlns="" xmlns:a16="http://schemas.microsoft.com/office/drawing/2014/main" id="{9CD6F167-FB82-4EFB-BAB9-1D0FEE07B85D}"/>
               </a:ext>
             </a:extLst>
           </p:cNvPr>
@@ -4858,7 +4859,7 @@
           <p:cNvPr id="36" name="Freeform: Shape 35">
             <a:extLst>
               <a:ext uri="{FF2B5EF4-FFF2-40B4-BE49-F238E27FC236}">
-                <a16:creationId xmlns:a16="http://schemas.microsoft.com/office/drawing/2014/main" xmlns="" id="{3DD2082D-81A7-4E2D-8136-9D48016E7FE9}"/>
+                <a16:creationId xmlns="" xmlns:a16="http://schemas.microsoft.com/office/drawing/2014/main" id="{3DD2082D-81A7-4E2D-8136-9D48016E7FE9}"/>
               </a:ext>
             </a:extLst>
           </p:cNvPr>
@@ -4948,7 +4949,7 @@
           <p:cNvPr id="30" name="Freeform: Shape 29">
             <a:extLst>
               <a:ext uri="{FF2B5EF4-FFF2-40B4-BE49-F238E27FC236}">
-                <a16:creationId xmlns:a16="http://schemas.microsoft.com/office/drawing/2014/main" xmlns="" id="{ECF16C35-4A81-4062-808C-7697AF0FD6F5}"/>
+                <a16:creationId xmlns="" xmlns:a16="http://schemas.microsoft.com/office/drawing/2014/main" id="{ECF16C35-4A81-4062-808C-7697AF0FD6F5}"/>
               </a:ext>
             </a:extLst>
           </p:cNvPr>
@@ -5100,7 +5101,7 @@
           <p:cNvPr id="7" name="Date Placeholder 6">
             <a:extLst>
               <a:ext uri="{FF2B5EF4-FFF2-40B4-BE49-F238E27FC236}">
-                <a16:creationId xmlns:a16="http://schemas.microsoft.com/office/drawing/2014/main" xmlns="" id="{B7EF9C60-0FED-4965-A9BC-CE69886A38CA}"/>
+                <a16:creationId xmlns="" xmlns:a16="http://schemas.microsoft.com/office/drawing/2014/main" id="{B7EF9C60-0FED-4965-A9BC-CE69886A38CA}"/>
               </a:ext>
             </a:extLst>
           </p:cNvPr>
@@ -5129,7 +5130,7 @@
           <p:cNvPr id="8" name="Footer Placeholder 7">
             <a:extLst>
               <a:ext uri="{FF2B5EF4-FFF2-40B4-BE49-F238E27FC236}">
-                <a16:creationId xmlns:a16="http://schemas.microsoft.com/office/drawing/2014/main" xmlns="" id="{239F2410-4015-48DB-BB4D-B5944D8C16B7}"/>
+                <a16:creationId xmlns="" xmlns:a16="http://schemas.microsoft.com/office/drawing/2014/main" id="{239F2410-4015-48DB-BB4D-B5944D8C16B7}"/>
               </a:ext>
             </a:extLst>
           </p:cNvPr>
@@ -5158,7 +5159,7 @@
           <p:cNvPr id="11" name="Slide Number Placeholder 10">
             <a:extLst>
               <a:ext uri="{FF2B5EF4-FFF2-40B4-BE49-F238E27FC236}">
-                <a16:creationId xmlns:a16="http://schemas.microsoft.com/office/drawing/2014/main" xmlns="" id="{C44F5F26-1B35-405A-AD75-5DFF48CF6BD6}"/>
+                <a16:creationId xmlns="" xmlns:a16="http://schemas.microsoft.com/office/drawing/2014/main" id="{C44F5F26-1B35-405A-AD75-5DFF48CF6BD6}"/>
               </a:ext>
             </a:extLst>
           </p:cNvPr>
@@ -5234,7 +5235,7 @@
           <p:cNvPr id="48" name="Oval 47">
             <a:extLst>
               <a:ext uri="{FF2B5EF4-FFF2-40B4-BE49-F238E27FC236}">
-                <a16:creationId xmlns:a16="http://schemas.microsoft.com/office/drawing/2014/main" xmlns="" id="{2F290D8B-987A-4555-890C-F3CD026BF7BF}"/>
+                <a16:creationId xmlns="" xmlns:a16="http://schemas.microsoft.com/office/drawing/2014/main" id="{2F290D8B-987A-4555-890C-F3CD026BF7BF}"/>
               </a:ext>
             </a:extLst>
           </p:cNvPr>
@@ -5286,7 +5287,7 @@
           <p:cNvPr id="49" name="Graphic 12">
             <a:extLst>
               <a:ext uri="{FF2B5EF4-FFF2-40B4-BE49-F238E27FC236}">
-                <a16:creationId xmlns:a16="http://schemas.microsoft.com/office/drawing/2014/main" xmlns="" id="{6139C5E6-5A04-4458-8EF9-628BFBA73A92}"/>
+                <a16:creationId xmlns="" xmlns:a16="http://schemas.microsoft.com/office/drawing/2014/main" id="{6139C5E6-5A04-4458-8EF9-628BFBA73A92}"/>
               </a:ext>
             </a:extLst>
           </p:cNvPr>
@@ -5403,7 +5404,7 @@
           <p:cNvPr id="4" name="Date Placeholder 3">
             <a:extLst>
               <a:ext uri="{FF2B5EF4-FFF2-40B4-BE49-F238E27FC236}">
-                <a16:creationId xmlns:a16="http://schemas.microsoft.com/office/drawing/2014/main" xmlns="" id="{DC2A0631-3130-4C36-8E5E-80464B1A62A7}"/>
+                <a16:creationId xmlns="" xmlns:a16="http://schemas.microsoft.com/office/drawing/2014/main" id="{DC2A0631-3130-4C36-8E5E-80464B1A62A7}"/>
               </a:ext>
             </a:extLst>
           </p:cNvPr>
@@ -5431,7 +5432,7 @@
           <p:cNvPr id="5" name="Footer Placeholder 4">
             <a:extLst>
               <a:ext uri="{FF2B5EF4-FFF2-40B4-BE49-F238E27FC236}">
-                <a16:creationId xmlns:a16="http://schemas.microsoft.com/office/drawing/2014/main" xmlns="" id="{79230F82-FE68-4450-98DF-5D29369AEE76}"/>
+                <a16:creationId xmlns="" xmlns:a16="http://schemas.microsoft.com/office/drawing/2014/main" id="{79230F82-FE68-4450-98DF-5D29369AEE76}"/>
               </a:ext>
             </a:extLst>
           </p:cNvPr>
@@ -5468,7 +5469,7 @@
           <p:cNvPr id="6" name="Slide Number Placeholder 5">
             <a:extLst>
               <a:ext uri="{FF2B5EF4-FFF2-40B4-BE49-F238E27FC236}">
-                <a16:creationId xmlns:a16="http://schemas.microsoft.com/office/drawing/2014/main" xmlns="" id="{EE6603C1-6E1A-4E4B-9555-31D84B6BDAD9}"/>
+                <a16:creationId xmlns="" xmlns:a16="http://schemas.microsoft.com/office/drawing/2014/main" id="{EE6603C1-6E1A-4E4B-9555-31D84B6BDAD9}"/>
               </a:ext>
             </a:extLst>
           </p:cNvPr>
@@ -5497,7 +5498,7 @@
           <p:cNvPr id="41" name="Graphic 39">
             <a:extLst>
               <a:ext uri="{FF2B5EF4-FFF2-40B4-BE49-F238E27FC236}">
-                <a16:creationId xmlns:a16="http://schemas.microsoft.com/office/drawing/2014/main" xmlns="" id="{1D75FFD8-3F66-48B3-BB01-D4B8A9496851}"/>
+                <a16:creationId xmlns="" xmlns:a16="http://schemas.microsoft.com/office/drawing/2014/main" id="{1D75FFD8-3F66-48B3-BB01-D4B8A9496851}"/>
               </a:ext>
             </a:extLst>
           </p:cNvPr>
@@ -5517,7 +5518,7 @@
             <p:cNvPr id="42" name="Freeform: Shape 41">
               <a:extLst>
                 <a:ext uri="{FF2B5EF4-FFF2-40B4-BE49-F238E27FC236}">
-                  <a16:creationId xmlns:a16="http://schemas.microsoft.com/office/drawing/2014/main" xmlns="" id="{9BA0EC60-510D-41EF-AFE6-E4E6BD83F8C9}"/>
+                  <a16:creationId xmlns="" xmlns:a16="http://schemas.microsoft.com/office/drawing/2014/main" id="{9BA0EC60-510D-41EF-AFE6-E4E6BD83F8C9}"/>
                 </a:ext>
               </a:extLst>
             </p:cNvPr>
@@ -5707,7 +5708,7 @@
             <p:cNvPr id="43" name="Freeform: Shape 42">
               <a:extLst>
                 <a:ext uri="{FF2B5EF4-FFF2-40B4-BE49-F238E27FC236}">
-                  <a16:creationId xmlns:a16="http://schemas.microsoft.com/office/drawing/2014/main" xmlns="" id="{0162C508-E081-418C-A19D-15A59388C43A}"/>
+                  <a16:creationId xmlns="" xmlns:a16="http://schemas.microsoft.com/office/drawing/2014/main" id="{0162C508-E081-418C-A19D-15A59388C43A}"/>
                 </a:ext>
               </a:extLst>
             </p:cNvPr>
@@ -5815,7 +5816,7 @@
             <p:cNvPr id="44" name="Freeform: Shape 43">
               <a:extLst>
                 <a:ext uri="{FF2B5EF4-FFF2-40B4-BE49-F238E27FC236}">
-                  <a16:creationId xmlns:a16="http://schemas.microsoft.com/office/drawing/2014/main" xmlns="" id="{2A710D7D-FC65-4BF6-BDA4-E59B01AD6FBC}"/>
+                  <a16:creationId xmlns="" xmlns:a16="http://schemas.microsoft.com/office/drawing/2014/main" id="{2A710D7D-FC65-4BF6-BDA4-E59B01AD6FBC}"/>
                 </a:ext>
               </a:extLst>
             </p:cNvPr>
@@ -5923,7 +5924,7 @@
             <p:cNvPr id="45" name="Freeform: Shape 44">
               <a:extLst>
                 <a:ext uri="{FF2B5EF4-FFF2-40B4-BE49-F238E27FC236}">
-                  <a16:creationId xmlns:a16="http://schemas.microsoft.com/office/drawing/2014/main" xmlns="" id="{18811B6B-BBB0-4D69-AEF8-AD0A7F9A4B57}"/>
+                  <a16:creationId xmlns="" xmlns:a16="http://schemas.microsoft.com/office/drawing/2014/main" id="{18811B6B-BBB0-4D69-AEF8-AD0A7F9A4B57}"/>
                 </a:ext>
               </a:extLst>
             </p:cNvPr>
@@ -6031,7 +6032,7 @@
             <p:cNvPr id="46" name="Freeform: Shape 45">
               <a:extLst>
                 <a:ext uri="{FF2B5EF4-FFF2-40B4-BE49-F238E27FC236}">
-                  <a16:creationId xmlns:a16="http://schemas.microsoft.com/office/drawing/2014/main" xmlns="" id="{3DB7F04C-0D31-4172-9D02-F8C8B2043EB9}"/>
+                  <a16:creationId xmlns="" xmlns:a16="http://schemas.microsoft.com/office/drawing/2014/main" id="{3DB7F04C-0D31-4172-9D02-F8C8B2043EB9}"/>
                 </a:ext>
               </a:extLst>
             </p:cNvPr>
@@ -6211,7 +6212,7 @@
             <p:cNvPr id="47" name="Freeform: Shape 46">
               <a:extLst>
                 <a:ext uri="{FF2B5EF4-FFF2-40B4-BE49-F238E27FC236}">
-                  <a16:creationId xmlns:a16="http://schemas.microsoft.com/office/drawing/2014/main" xmlns="" id="{1FB04931-77A8-4259-95CA-DA7DEDB2DEFD}"/>
+                  <a16:creationId xmlns="" xmlns:a16="http://schemas.microsoft.com/office/drawing/2014/main" id="{1FB04931-77A8-4259-95CA-DA7DEDB2DEFD}"/>
                 </a:ext>
               </a:extLst>
             </p:cNvPr>
@@ -6402,7 +6403,7 @@
           <p:cNvPr id="18" name="Content Placeholder 2">
             <a:extLst>
               <a:ext uri="{FF2B5EF4-FFF2-40B4-BE49-F238E27FC236}">
-                <a16:creationId xmlns:a16="http://schemas.microsoft.com/office/drawing/2014/main" xmlns="" id="{D7B996D2-06BA-413A-BDEE-428A188D3ADF}"/>
+                <a16:creationId xmlns="" xmlns:a16="http://schemas.microsoft.com/office/drawing/2014/main" id="{D7B996D2-06BA-413A-BDEE-428A188D3ADF}"/>
               </a:ext>
             </a:extLst>
           </p:cNvPr>
@@ -6503,7 +6504,7 @@
           <p:cNvPr id="7" name="Title 6">
             <a:extLst>
               <a:ext uri="{FF2B5EF4-FFF2-40B4-BE49-F238E27FC236}">
-                <a16:creationId xmlns:a16="http://schemas.microsoft.com/office/drawing/2014/main" xmlns="" id="{5E5109FC-8CB6-4120-99CF-163DDAB90612}"/>
+                <a16:creationId xmlns="" xmlns:a16="http://schemas.microsoft.com/office/drawing/2014/main" id="{5E5109FC-8CB6-4120-99CF-163DDAB90612}"/>
               </a:ext>
             </a:extLst>
           </p:cNvPr>
@@ -6536,7 +6537,7 @@
           <p:cNvPr id="20" name="Graphic 19">
             <a:extLst>
               <a:ext uri="{FF2B5EF4-FFF2-40B4-BE49-F238E27FC236}">
-                <a16:creationId xmlns:a16="http://schemas.microsoft.com/office/drawing/2014/main" xmlns="" id="{9462DA56-F882-470A-8F8C-A55B25FD8A7A}"/>
+                <a16:creationId xmlns="" xmlns:a16="http://schemas.microsoft.com/office/drawing/2014/main" id="{9462DA56-F882-470A-8F8C-A55B25FD8A7A}"/>
               </a:ext>
             </a:extLst>
           </p:cNvPr>
@@ -6702,7 +6703,7 @@
           <p:cNvPr id="48" name="Oval 47">
             <a:extLst>
               <a:ext uri="{FF2B5EF4-FFF2-40B4-BE49-F238E27FC236}">
-                <a16:creationId xmlns:a16="http://schemas.microsoft.com/office/drawing/2014/main" xmlns="" id="{2F290D8B-987A-4555-890C-F3CD026BF7BF}"/>
+                <a16:creationId xmlns="" xmlns:a16="http://schemas.microsoft.com/office/drawing/2014/main" id="{2F290D8B-987A-4555-890C-F3CD026BF7BF}"/>
               </a:ext>
             </a:extLst>
           </p:cNvPr>
@@ -6754,7 +6755,7 @@
           <p:cNvPr id="49" name="Graphic 12">
             <a:extLst>
               <a:ext uri="{FF2B5EF4-FFF2-40B4-BE49-F238E27FC236}">
-                <a16:creationId xmlns:a16="http://schemas.microsoft.com/office/drawing/2014/main" xmlns="" id="{6139C5E6-5A04-4458-8EF9-628BFBA73A92}"/>
+                <a16:creationId xmlns="" xmlns:a16="http://schemas.microsoft.com/office/drawing/2014/main" id="{6139C5E6-5A04-4458-8EF9-628BFBA73A92}"/>
               </a:ext>
             </a:extLst>
           </p:cNvPr>
@@ -6871,7 +6872,7 @@
           <p:cNvPr id="4" name="Date Placeholder 3">
             <a:extLst>
               <a:ext uri="{FF2B5EF4-FFF2-40B4-BE49-F238E27FC236}">
-                <a16:creationId xmlns:a16="http://schemas.microsoft.com/office/drawing/2014/main" xmlns="" id="{DC2A0631-3130-4C36-8E5E-80464B1A62A7}"/>
+                <a16:creationId xmlns="" xmlns:a16="http://schemas.microsoft.com/office/drawing/2014/main" id="{DC2A0631-3130-4C36-8E5E-80464B1A62A7}"/>
               </a:ext>
             </a:extLst>
           </p:cNvPr>
@@ -6899,7 +6900,7 @@
           <p:cNvPr id="5" name="Footer Placeholder 4">
             <a:extLst>
               <a:ext uri="{FF2B5EF4-FFF2-40B4-BE49-F238E27FC236}">
-                <a16:creationId xmlns:a16="http://schemas.microsoft.com/office/drawing/2014/main" xmlns="" id="{79230F82-FE68-4450-98DF-5D29369AEE76}"/>
+                <a16:creationId xmlns="" xmlns:a16="http://schemas.microsoft.com/office/drawing/2014/main" id="{79230F82-FE68-4450-98DF-5D29369AEE76}"/>
               </a:ext>
             </a:extLst>
           </p:cNvPr>
@@ -6936,7 +6937,7 @@
           <p:cNvPr id="6" name="Slide Number Placeholder 5">
             <a:extLst>
               <a:ext uri="{FF2B5EF4-FFF2-40B4-BE49-F238E27FC236}">
-                <a16:creationId xmlns:a16="http://schemas.microsoft.com/office/drawing/2014/main" xmlns="" id="{EE6603C1-6E1A-4E4B-9555-31D84B6BDAD9}"/>
+                <a16:creationId xmlns="" xmlns:a16="http://schemas.microsoft.com/office/drawing/2014/main" id="{EE6603C1-6E1A-4E4B-9555-31D84B6BDAD9}"/>
               </a:ext>
             </a:extLst>
           </p:cNvPr>
@@ -6965,7 +6966,7 @@
           <p:cNvPr id="41" name="Graphic 39">
             <a:extLst>
               <a:ext uri="{FF2B5EF4-FFF2-40B4-BE49-F238E27FC236}">
-                <a16:creationId xmlns:a16="http://schemas.microsoft.com/office/drawing/2014/main" xmlns="" id="{1D75FFD8-3F66-48B3-BB01-D4B8A9496851}"/>
+                <a16:creationId xmlns="" xmlns:a16="http://schemas.microsoft.com/office/drawing/2014/main" id="{1D75FFD8-3F66-48B3-BB01-D4B8A9496851}"/>
               </a:ext>
             </a:extLst>
           </p:cNvPr>
@@ -6985,7 +6986,7 @@
             <p:cNvPr id="42" name="Freeform: Shape 41">
               <a:extLst>
                 <a:ext uri="{FF2B5EF4-FFF2-40B4-BE49-F238E27FC236}">
-                  <a16:creationId xmlns:a16="http://schemas.microsoft.com/office/drawing/2014/main" xmlns="" id="{9BA0EC60-510D-41EF-AFE6-E4E6BD83F8C9}"/>
+                  <a16:creationId xmlns="" xmlns:a16="http://schemas.microsoft.com/office/drawing/2014/main" id="{9BA0EC60-510D-41EF-AFE6-E4E6BD83F8C9}"/>
                 </a:ext>
               </a:extLst>
             </p:cNvPr>
@@ -7175,7 +7176,7 @@
             <p:cNvPr id="43" name="Freeform: Shape 42">
               <a:extLst>
                 <a:ext uri="{FF2B5EF4-FFF2-40B4-BE49-F238E27FC236}">
-                  <a16:creationId xmlns:a16="http://schemas.microsoft.com/office/drawing/2014/main" xmlns="" id="{0162C508-E081-418C-A19D-15A59388C43A}"/>
+                  <a16:creationId xmlns="" xmlns:a16="http://schemas.microsoft.com/office/drawing/2014/main" id="{0162C508-E081-418C-A19D-15A59388C43A}"/>
                 </a:ext>
               </a:extLst>
             </p:cNvPr>
@@ -7283,7 +7284,7 @@
             <p:cNvPr id="44" name="Freeform: Shape 43">
               <a:extLst>
                 <a:ext uri="{FF2B5EF4-FFF2-40B4-BE49-F238E27FC236}">
-                  <a16:creationId xmlns:a16="http://schemas.microsoft.com/office/drawing/2014/main" xmlns="" id="{2A710D7D-FC65-4BF6-BDA4-E59B01AD6FBC}"/>
+                  <a16:creationId xmlns="" xmlns:a16="http://schemas.microsoft.com/office/drawing/2014/main" id="{2A710D7D-FC65-4BF6-BDA4-E59B01AD6FBC}"/>
                 </a:ext>
               </a:extLst>
             </p:cNvPr>
@@ -7391,7 +7392,7 @@
             <p:cNvPr id="45" name="Freeform: Shape 44">
               <a:extLst>
                 <a:ext uri="{FF2B5EF4-FFF2-40B4-BE49-F238E27FC236}">
-                  <a16:creationId xmlns:a16="http://schemas.microsoft.com/office/drawing/2014/main" xmlns="" id="{18811B6B-BBB0-4D69-AEF8-AD0A7F9A4B57}"/>
+                  <a16:creationId xmlns="" xmlns:a16="http://schemas.microsoft.com/office/drawing/2014/main" id="{18811B6B-BBB0-4D69-AEF8-AD0A7F9A4B57}"/>
                 </a:ext>
               </a:extLst>
             </p:cNvPr>
@@ -7499,7 +7500,7 @@
             <p:cNvPr id="46" name="Freeform: Shape 45">
               <a:extLst>
                 <a:ext uri="{FF2B5EF4-FFF2-40B4-BE49-F238E27FC236}">
-                  <a16:creationId xmlns:a16="http://schemas.microsoft.com/office/drawing/2014/main" xmlns="" id="{3DB7F04C-0D31-4172-9D02-F8C8B2043EB9}"/>
+                  <a16:creationId xmlns="" xmlns:a16="http://schemas.microsoft.com/office/drawing/2014/main" id="{3DB7F04C-0D31-4172-9D02-F8C8B2043EB9}"/>
                 </a:ext>
               </a:extLst>
             </p:cNvPr>
@@ -7679,7 +7680,7 @@
             <p:cNvPr id="47" name="Freeform: Shape 46">
               <a:extLst>
                 <a:ext uri="{FF2B5EF4-FFF2-40B4-BE49-F238E27FC236}">
-                  <a16:creationId xmlns:a16="http://schemas.microsoft.com/office/drawing/2014/main" xmlns="" id="{1FB04931-77A8-4259-95CA-DA7DEDB2DEFD}"/>
+                  <a16:creationId xmlns="" xmlns:a16="http://schemas.microsoft.com/office/drawing/2014/main" id="{1FB04931-77A8-4259-95CA-DA7DEDB2DEFD}"/>
                 </a:ext>
               </a:extLst>
             </p:cNvPr>
@@ -7870,7 +7871,7 @@
           <p:cNvPr id="7" name="Title 6">
             <a:extLst>
               <a:ext uri="{FF2B5EF4-FFF2-40B4-BE49-F238E27FC236}">
-                <a16:creationId xmlns:a16="http://schemas.microsoft.com/office/drawing/2014/main" xmlns="" id="{5E5109FC-8CB6-4120-99CF-163DDAB90612}"/>
+                <a16:creationId xmlns="" xmlns:a16="http://schemas.microsoft.com/office/drawing/2014/main" id="{5E5109FC-8CB6-4120-99CF-163DDAB90612}"/>
               </a:ext>
             </a:extLst>
           </p:cNvPr>
@@ -7903,7 +7904,7 @@
           <p:cNvPr id="20" name="Graphic 19">
             <a:extLst>
               <a:ext uri="{FF2B5EF4-FFF2-40B4-BE49-F238E27FC236}">
-                <a16:creationId xmlns:a16="http://schemas.microsoft.com/office/drawing/2014/main" xmlns="" id="{9462DA56-F882-470A-8F8C-A55B25FD8A7A}"/>
+                <a16:creationId xmlns="" xmlns:a16="http://schemas.microsoft.com/office/drawing/2014/main" id="{9462DA56-F882-470A-8F8C-A55B25FD8A7A}"/>
               </a:ext>
             </a:extLst>
           </p:cNvPr>
@@ -8039,7 +8040,7 @@
           <p:cNvPr id="17" name="Text Placeholder 2">
             <a:extLst>
               <a:ext uri="{FF2B5EF4-FFF2-40B4-BE49-F238E27FC236}">
-                <a16:creationId xmlns:a16="http://schemas.microsoft.com/office/drawing/2014/main" xmlns="" id="{24B91177-A100-491C-B5EF-BC77E2E33F72}"/>
+                <a16:creationId xmlns="" xmlns:a16="http://schemas.microsoft.com/office/drawing/2014/main" id="{24B91177-A100-491C-B5EF-BC77E2E33F72}"/>
               </a:ext>
             </a:extLst>
           </p:cNvPr>
@@ -8112,7 +8113,7 @@
           <p:cNvPr id="19" name="Content Placeholder 3">
             <a:extLst>
               <a:ext uri="{FF2B5EF4-FFF2-40B4-BE49-F238E27FC236}">
-                <a16:creationId xmlns:a16="http://schemas.microsoft.com/office/drawing/2014/main" xmlns="" id="{B6758D2F-C9AC-4514-B48E-2863E8DDE0CF}"/>
+                <a16:creationId xmlns="" xmlns:a16="http://schemas.microsoft.com/office/drawing/2014/main" id="{B6758D2F-C9AC-4514-B48E-2863E8DDE0CF}"/>
               </a:ext>
             </a:extLst>
           </p:cNvPr>
@@ -8213,7 +8214,7 @@
           <p:cNvPr id="21" name="Text Placeholder 4">
             <a:extLst>
               <a:ext uri="{FF2B5EF4-FFF2-40B4-BE49-F238E27FC236}">
-                <a16:creationId xmlns:a16="http://schemas.microsoft.com/office/drawing/2014/main" xmlns="" id="{633C3A9F-17E4-45DF-8DB7-7A55846AAA8F}"/>
+                <a16:creationId xmlns="" xmlns:a16="http://schemas.microsoft.com/office/drawing/2014/main" id="{633C3A9F-17E4-45DF-8DB7-7A55846AAA8F}"/>
               </a:ext>
             </a:extLst>
           </p:cNvPr>
@@ -8286,7 +8287,7 @@
           <p:cNvPr id="22" name="Content Placeholder 5">
             <a:extLst>
               <a:ext uri="{FF2B5EF4-FFF2-40B4-BE49-F238E27FC236}">
-                <a16:creationId xmlns:a16="http://schemas.microsoft.com/office/drawing/2014/main" xmlns="" id="{C19AB308-7C32-46C9-B8DB-AA96B7ED0D62}"/>
+                <a16:creationId xmlns="" xmlns:a16="http://schemas.microsoft.com/office/drawing/2014/main" id="{C19AB308-7C32-46C9-B8DB-AA96B7ED0D62}"/>
               </a:ext>
             </a:extLst>
           </p:cNvPr>
@@ -8416,7 +8417,7 @@
           <p:cNvPr id="48" name="Oval 47">
             <a:extLst>
               <a:ext uri="{FF2B5EF4-FFF2-40B4-BE49-F238E27FC236}">
-                <a16:creationId xmlns:a16="http://schemas.microsoft.com/office/drawing/2014/main" xmlns="" id="{2F290D8B-987A-4555-890C-F3CD026BF7BF}"/>
+                <a16:creationId xmlns="" xmlns:a16="http://schemas.microsoft.com/office/drawing/2014/main" id="{2F290D8B-987A-4555-890C-F3CD026BF7BF}"/>
               </a:ext>
             </a:extLst>
           </p:cNvPr>
@@ -8468,7 +8469,7 @@
           <p:cNvPr id="49" name="Graphic 12">
             <a:extLst>
               <a:ext uri="{FF2B5EF4-FFF2-40B4-BE49-F238E27FC236}">
-                <a16:creationId xmlns:a16="http://schemas.microsoft.com/office/drawing/2014/main" xmlns="" id="{6139C5E6-5A04-4458-8EF9-628BFBA73A92}"/>
+                <a16:creationId xmlns="" xmlns:a16="http://schemas.microsoft.com/office/drawing/2014/main" id="{6139C5E6-5A04-4458-8EF9-628BFBA73A92}"/>
               </a:ext>
             </a:extLst>
           </p:cNvPr>
@@ -8585,7 +8586,7 @@
           <p:cNvPr id="4" name="Date Placeholder 3">
             <a:extLst>
               <a:ext uri="{FF2B5EF4-FFF2-40B4-BE49-F238E27FC236}">
-                <a16:creationId xmlns:a16="http://schemas.microsoft.com/office/drawing/2014/main" xmlns="" id="{DC2A0631-3130-4C36-8E5E-80464B1A62A7}"/>
+                <a16:creationId xmlns="" xmlns:a16="http://schemas.microsoft.com/office/drawing/2014/main" id="{DC2A0631-3130-4C36-8E5E-80464B1A62A7}"/>
               </a:ext>
             </a:extLst>
           </p:cNvPr>
@@ -8613,7 +8614,7 @@
           <p:cNvPr id="5" name="Footer Placeholder 4">
             <a:extLst>
               <a:ext uri="{FF2B5EF4-FFF2-40B4-BE49-F238E27FC236}">
-                <a16:creationId xmlns:a16="http://schemas.microsoft.com/office/drawing/2014/main" xmlns="" id="{79230F82-FE68-4450-98DF-5D29369AEE76}"/>
+                <a16:creationId xmlns="" xmlns:a16="http://schemas.microsoft.com/office/drawing/2014/main" id="{79230F82-FE68-4450-98DF-5D29369AEE76}"/>
               </a:ext>
             </a:extLst>
           </p:cNvPr>
@@ -8650,7 +8651,7 @@
           <p:cNvPr id="6" name="Slide Number Placeholder 5">
             <a:extLst>
               <a:ext uri="{FF2B5EF4-FFF2-40B4-BE49-F238E27FC236}">
-                <a16:creationId xmlns:a16="http://schemas.microsoft.com/office/drawing/2014/main" xmlns="" id="{EE6603C1-6E1A-4E4B-9555-31D84B6BDAD9}"/>
+                <a16:creationId xmlns="" xmlns:a16="http://schemas.microsoft.com/office/drawing/2014/main" id="{EE6603C1-6E1A-4E4B-9555-31D84B6BDAD9}"/>
               </a:ext>
             </a:extLst>
           </p:cNvPr>
@@ -8679,7 +8680,7 @@
           <p:cNvPr id="41" name="Graphic 39">
             <a:extLst>
               <a:ext uri="{FF2B5EF4-FFF2-40B4-BE49-F238E27FC236}">
-                <a16:creationId xmlns:a16="http://schemas.microsoft.com/office/drawing/2014/main" xmlns="" id="{1D75FFD8-3F66-48B3-BB01-D4B8A9496851}"/>
+                <a16:creationId xmlns="" xmlns:a16="http://schemas.microsoft.com/office/drawing/2014/main" id="{1D75FFD8-3F66-48B3-BB01-D4B8A9496851}"/>
               </a:ext>
             </a:extLst>
           </p:cNvPr>
@@ -8699,7 +8700,7 @@
             <p:cNvPr id="42" name="Freeform: Shape 41">
               <a:extLst>
                 <a:ext uri="{FF2B5EF4-FFF2-40B4-BE49-F238E27FC236}">
-                  <a16:creationId xmlns:a16="http://schemas.microsoft.com/office/drawing/2014/main" xmlns="" id="{9BA0EC60-510D-41EF-AFE6-E4E6BD83F8C9}"/>
+                  <a16:creationId xmlns="" xmlns:a16="http://schemas.microsoft.com/office/drawing/2014/main" id="{9BA0EC60-510D-41EF-AFE6-E4E6BD83F8C9}"/>
                 </a:ext>
               </a:extLst>
             </p:cNvPr>
@@ -8889,7 +8890,7 @@
             <p:cNvPr id="43" name="Freeform: Shape 42">
               <a:extLst>
                 <a:ext uri="{FF2B5EF4-FFF2-40B4-BE49-F238E27FC236}">
-                  <a16:creationId xmlns:a16="http://schemas.microsoft.com/office/drawing/2014/main" xmlns="" id="{0162C508-E081-418C-A19D-15A59388C43A}"/>
+                  <a16:creationId xmlns="" xmlns:a16="http://schemas.microsoft.com/office/drawing/2014/main" id="{0162C508-E081-418C-A19D-15A59388C43A}"/>
                 </a:ext>
               </a:extLst>
             </p:cNvPr>
@@ -8997,7 +8998,7 @@
             <p:cNvPr id="44" name="Freeform: Shape 43">
               <a:extLst>
                 <a:ext uri="{FF2B5EF4-FFF2-40B4-BE49-F238E27FC236}">
-                  <a16:creationId xmlns:a16="http://schemas.microsoft.com/office/drawing/2014/main" xmlns="" id="{2A710D7D-FC65-4BF6-BDA4-E59B01AD6FBC}"/>
+                  <a16:creationId xmlns="" xmlns:a16="http://schemas.microsoft.com/office/drawing/2014/main" id="{2A710D7D-FC65-4BF6-BDA4-E59B01AD6FBC}"/>
                 </a:ext>
               </a:extLst>
             </p:cNvPr>
@@ -9105,7 +9106,7 @@
             <p:cNvPr id="45" name="Freeform: Shape 44">
               <a:extLst>
                 <a:ext uri="{FF2B5EF4-FFF2-40B4-BE49-F238E27FC236}">
-                  <a16:creationId xmlns:a16="http://schemas.microsoft.com/office/drawing/2014/main" xmlns="" id="{18811B6B-BBB0-4D69-AEF8-AD0A7F9A4B57}"/>
+                  <a16:creationId xmlns="" xmlns:a16="http://schemas.microsoft.com/office/drawing/2014/main" id="{18811B6B-BBB0-4D69-AEF8-AD0A7F9A4B57}"/>
                 </a:ext>
               </a:extLst>
             </p:cNvPr>
@@ -9213,7 +9214,7 @@
             <p:cNvPr id="46" name="Freeform: Shape 45">
               <a:extLst>
                 <a:ext uri="{FF2B5EF4-FFF2-40B4-BE49-F238E27FC236}">
-                  <a16:creationId xmlns:a16="http://schemas.microsoft.com/office/drawing/2014/main" xmlns="" id="{3DB7F04C-0D31-4172-9D02-F8C8B2043EB9}"/>
+                  <a16:creationId xmlns="" xmlns:a16="http://schemas.microsoft.com/office/drawing/2014/main" id="{3DB7F04C-0D31-4172-9D02-F8C8B2043EB9}"/>
                 </a:ext>
               </a:extLst>
             </p:cNvPr>
@@ -9393,7 +9394,7 @@
             <p:cNvPr id="47" name="Freeform: Shape 46">
               <a:extLst>
                 <a:ext uri="{FF2B5EF4-FFF2-40B4-BE49-F238E27FC236}">
-                  <a16:creationId xmlns:a16="http://schemas.microsoft.com/office/drawing/2014/main" xmlns="" id="{1FB04931-77A8-4259-95CA-DA7DEDB2DEFD}"/>
+                  <a16:creationId xmlns="" xmlns:a16="http://schemas.microsoft.com/office/drawing/2014/main" id="{1FB04931-77A8-4259-95CA-DA7DEDB2DEFD}"/>
                 </a:ext>
               </a:extLst>
             </p:cNvPr>
@@ -9584,7 +9585,7 @@
           <p:cNvPr id="7" name="Title 6">
             <a:extLst>
               <a:ext uri="{FF2B5EF4-FFF2-40B4-BE49-F238E27FC236}">
-                <a16:creationId xmlns:a16="http://schemas.microsoft.com/office/drawing/2014/main" xmlns="" id="{5E5109FC-8CB6-4120-99CF-163DDAB90612}"/>
+                <a16:creationId xmlns="" xmlns:a16="http://schemas.microsoft.com/office/drawing/2014/main" id="{5E5109FC-8CB6-4120-99CF-163DDAB90612}"/>
               </a:ext>
             </a:extLst>
           </p:cNvPr>
@@ -9617,7 +9618,7 @@
           <p:cNvPr id="20" name="Graphic 19">
             <a:extLst>
               <a:ext uri="{FF2B5EF4-FFF2-40B4-BE49-F238E27FC236}">
-                <a16:creationId xmlns:a16="http://schemas.microsoft.com/office/drawing/2014/main" xmlns="" id="{9462DA56-F882-470A-8F8C-A55B25FD8A7A}"/>
+                <a16:creationId xmlns="" xmlns:a16="http://schemas.microsoft.com/office/drawing/2014/main" id="{9462DA56-F882-470A-8F8C-A55B25FD8A7A}"/>
               </a:ext>
             </a:extLst>
           </p:cNvPr>
@@ -9753,7 +9754,7 @@
           <p:cNvPr id="23" name="Content Placeholder 2">
             <a:extLst>
               <a:ext uri="{FF2B5EF4-FFF2-40B4-BE49-F238E27FC236}">
-                <a16:creationId xmlns:a16="http://schemas.microsoft.com/office/drawing/2014/main" xmlns="" id="{CD5AE8A8-E027-4529-A5B7-4D355C71E647}"/>
+                <a16:creationId xmlns="" xmlns:a16="http://schemas.microsoft.com/office/drawing/2014/main" id="{CD5AE8A8-E027-4529-A5B7-4D355C71E647}"/>
               </a:ext>
             </a:extLst>
           </p:cNvPr>
@@ -9853,7 +9854,7 @@
           <p:cNvPr id="24" name="Content Placeholder 3">
             <a:extLst>
               <a:ext uri="{FF2B5EF4-FFF2-40B4-BE49-F238E27FC236}">
-                <a16:creationId xmlns:a16="http://schemas.microsoft.com/office/drawing/2014/main" xmlns="" id="{FB3E4803-F2CA-4138-9997-6108BFDFE7E2}"/>
+                <a16:creationId xmlns="" xmlns:a16="http://schemas.microsoft.com/office/drawing/2014/main" id="{FB3E4803-F2CA-4138-9997-6108BFDFE7E2}"/>
               </a:ext>
             </a:extLst>
           </p:cNvPr>
@@ -9983,7 +9984,7 @@
           <p:cNvPr id="57" name="Picture Placeholder 56">
             <a:extLst>
               <a:ext uri="{FF2B5EF4-FFF2-40B4-BE49-F238E27FC236}">
-                <a16:creationId xmlns:a16="http://schemas.microsoft.com/office/drawing/2014/main" xmlns="" id="{8E328517-DD21-40E0-B948-B25B366BDEC7}"/>
+                <a16:creationId xmlns="" xmlns:a16="http://schemas.microsoft.com/office/drawing/2014/main" id="{8E328517-DD21-40E0-B948-B25B366BDEC7}"/>
               </a:ext>
             </a:extLst>
           </p:cNvPr>
@@ -10380,7 +10381,7 @@
           <p:cNvPr id="35" name="Oval 34">
             <a:extLst>
               <a:ext uri="{FF2B5EF4-FFF2-40B4-BE49-F238E27FC236}">
-                <a16:creationId xmlns:a16="http://schemas.microsoft.com/office/drawing/2014/main" xmlns="" id="{7BC6DBB9-1B34-4374-A887-DC30F9E2F62F}"/>
+                <a16:creationId xmlns="" xmlns:a16="http://schemas.microsoft.com/office/drawing/2014/main" id="{7BC6DBB9-1B34-4374-A887-DC30F9E2F62F}"/>
               </a:ext>
             </a:extLst>
           </p:cNvPr>
@@ -10432,7 +10433,7 @@
           <p:cNvPr id="36" name="Graphic 12">
             <a:extLst>
               <a:ext uri="{FF2B5EF4-FFF2-40B4-BE49-F238E27FC236}">
-                <a16:creationId xmlns:a16="http://schemas.microsoft.com/office/drawing/2014/main" xmlns="" id="{00DE0AE3-F44D-4F2C-B7A3-C253AA498DEF}"/>
+                <a16:creationId xmlns="" xmlns:a16="http://schemas.microsoft.com/office/drawing/2014/main" id="{00DE0AE3-F44D-4F2C-B7A3-C253AA498DEF}"/>
               </a:ext>
             </a:extLst>
           </p:cNvPr>
@@ -10549,7 +10550,7 @@
           <p:cNvPr id="4" name="Date Placeholder 3">
             <a:extLst>
               <a:ext uri="{FF2B5EF4-FFF2-40B4-BE49-F238E27FC236}">
-                <a16:creationId xmlns:a16="http://schemas.microsoft.com/office/drawing/2014/main" xmlns="" id="{AC6F89F8-3E24-406D-9C49-00E6E47E4AAC}"/>
+                <a16:creationId xmlns="" xmlns:a16="http://schemas.microsoft.com/office/drawing/2014/main" id="{AC6F89F8-3E24-406D-9C49-00E6E47E4AAC}"/>
               </a:ext>
             </a:extLst>
           </p:cNvPr>
@@ -10577,7 +10578,7 @@
           <p:cNvPr id="5" name="Footer Placeholder 4">
             <a:extLst>
               <a:ext uri="{FF2B5EF4-FFF2-40B4-BE49-F238E27FC236}">
-                <a16:creationId xmlns:a16="http://schemas.microsoft.com/office/drawing/2014/main" xmlns="" id="{4392DBDA-ED00-4248-AC6D-0CE0B821B52F}"/>
+                <a16:creationId xmlns="" xmlns:a16="http://schemas.microsoft.com/office/drawing/2014/main" id="{4392DBDA-ED00-4248-AC6D-0CE0B821B52F}"/>
               </a:ext>
             </a:extLst>
           </p:cNvPr>
@@ -10614,7 +10615,7 @@
           <p:cNvPr id="6" name="Slide Number Placeholder 5">
             <a:extLst>
               <a:ext uri="{FF2B5EF4-FFF2-40B4-BE49-F238E27FC236}">
-                <a16:creationId xmlns:a16="http://schemas.microsoft.com/office/drawing/2014/main" xmlns="" id="{EC2B5F97-2F18-4EF2-9CBC-AAAB9FF4CC91}"/>
+                <a16:creationId xmlns="" xmlns:a16="http://schemas.microsoft.com/office/drawing/2014/main" id="{EC2B5F97-2F18-4EF2-9CBC-AAAB9FF4CC91}"/>
               </a:ext>
             </a:extLst>
           </p:cNvPr>
@@ -10643,7 +10644,7 @@
           <p:cNvPr id="38" name="Freeform: Shape 37">
             <a:extLst>
               <a:ext uri="{FF2B5EF4-FFF2-40B4-BE49-F238E27FC236}">
-                <a16:creationId xmlns:a16="http://schemas.microsoft.com/office/drawing/2014/main" xmlns="" id="{C6C05708-08C7-4EF1-B0D8-6A01C1B1AD85}"/>
+                <a16:creationId xmlns="" xmlns:a16="http://schemas.microsoft.com/office/drawing/2014/main" id="{C6C05708-08C7-4EF1-B0D8-6A01C1B1AD85}"/>
               </a:ext>
             </a:extLst>
           </p:cNvPr>
@@ -10751,7 +10752,7 @@
           <p:cNvPr id="3" name="Graphic 33">
             <a:extLst>
               <a:ext uri="{FF2B5EF4-FFF2-40B4-BE49-F238E27FC236}">
-                <a16:creationId xmlns:a16="http://schemas.microsoft.com/office/drawing/2014/main" xmlns="" id="{38956B41-4EE0-4C7C-8436-027F5DE8B1BC}"/>
+                <a16:creationId xmlns="" xmlns:a16="http://schemas.microsoft.com/office/drawing/2014/main" id="{38956B41-4EE0-4C7C-8436-027F5DE8B1BC}"/>
               </a:ext>
             </a:extLst>
           </p:cNvPr>
@@ -10887,7 +10888,7 @@
           <p:cNvPr id="33" name="Freeform: Shape 32">
             <a:extLst>
               <a:ext uri="{FF2B5EF4-FFF2-40B4-BE49-F238E27FC236}">
-                <a16:creationId xmlns:a16="http://schemas.microsoft.com/office/drawing/2014/main" xmlns="" id="{E08687FC-7322-4F20-9769-1ECF4296A96E}"/>
+                <a16:creationId xmlns="" xmlns:a16="http://schemas.microsoft.com/office/drawing/2014/main" id="{E08687FC-7322-4F20-9769-1ECF4296A96E}"/>
               </a:ext>
             </a:extLst>
           </p:cNvPr>
@@ -10995,7 +10996,7 @@
           <p:cNvPr id="41" name="Freeform: Shape 40">
             <a:extLst>
               <a:ext uri="{FF2B5EF4-FFF2-40B4-BE49-F238E27FC236}">
-                <a16:creationId xmlns:a16="http://schemas.microsoft.com/office/drawing/2014/main" xmlns="" id="{0FCCDE26-7222-4C1B-884A-0FAE84FA57DB}"/>
+                <a16:creationId xmlns="" xmlns:a16="http://schemas.microsoft.com/office/drawing/2014/main" id="{0FCCDE26-7222-4C1B-884A-0FAE84FA57DB}"/>
               </a:ext>
             </a:extLst>
           </p:cNvPr>
@@ -11103,7 +11104,7 @@
           <p:cNvPr id="19" name="Title 1">
             <a:extLst>
               <a:ext uri="{FF2B5EF4-FFF2-40B4-BE49-F238E27FC236}">
-                <a16:creationId xmlns:a16="http://schemas.microsoft.com/office/drawing/2014/main" xmlns="" id="{2AC78A4D-01A3-43A6-BE82-E64E2BF16D65}"/>
+                <a16:creationId xmlns="" xmlns:a16="http://schemas.microsoft.com/office/drawing/2014/main" id="{2AC78A4D-01A3-43A6-BE82-E64E2BF16D65}"/>
               </a:ext>
             </a:extLst>
           </p:cNvPr>
@@ -11140,7 +11141,7 @@
           <p:cNvPr id="20" name="Text Placeholder 3">
             <a:extLst>
               <a:ext uri="{FF2B5EF4-FFF2-40B4-BE49-F238E27FC236}">
-                <a16:creationId xmlns:a16="http://schemas.microsoft.com/office/drawing/2014/main" xmlns="" id="{E6544955-4597-4E52-9C7E-8AEB5D2A4983}"/>
+                <a16:creationId xmlns="" xmlns:a16="http://schemas.microsoft.com/office/drawing/2014/main" id="{E6544955-4597-4E52-9C7E-8AEB5D2A4983}"/>
               </a:ext>
             </a:extLst>
           </p:cNvPr>
@@ -11241,7 +11242,7 @@
           <p:cNvPr id="35" name="Oval 34">
             <a:extLst>
               <a:ext uri="{FF2B5EF4-FFF2-40B4-BE49-F238E27FC236}">
-                <a16:creationId xmlns:a16="http://schemas.microsoft.com/office/drawing/2014/main" xmlns="" id="{7BC6DBB9-1B34-4374-A887-DC30F9E2F62F}"/>
+                <a16:creationId xmlns="" xmlns:a16="http://schemas.microsoft.com/office/drawing/2014/main" id="{7BC6DBB9-1B34-4374-A887-DC30F9E2F62F}"/>
               </a:ext>
             </a:extLst>
           </p:cNvPr>
@@ -11293,7 +11294,7 @@
           <p:cNvPr id="36" name="Graphic 12">
             <a:extLst>
               <a:ext uri="{FF2B5EF4-FFF2-40B4-BE49-F238E27FC236}">
-                <a16:creationId xmlns:a16="http://schemas.microsoft.com/office/drawing/2014/main" xmlns="" id="{00DE0AE3-F44D-4F2C-B7A3-C253AA498DEF}"/>
+                <a16:creationId xmlns="" xmlns:a16="http://schemas.microsoft.com/office/drawing/2014/main" id="{00DE0AE3-F44D-4F2C-B7A3-C253AA498DEF}"/>
               </a:ext>
             </a:extLst>
           </p:cNvPr>
@@ -11410,7 +11411,7 @@
           <p:cNvPr id="4" name="Date Placeholder 3">
             <a:extLst>
               <a:ext uri="{FF2B5EF4-FFF2-40B4-BE49-F238E27FC236}">
-                <a16:creationId xmlns:a16="http://schemas.microsoft.com/office/drawing/2014/main" xmlns="" id="{AC6F89F8-3E24-406D-9C49-00E6E47E4AAC}"/>
+                <a16:creationId xmlns="" xmlns:a16="http://schemas.microsoft.com/office/drawing/2014/main" id="{AC6F89F8-3E24-406D-9C49-00E6E47E4AAC}"/>
               </a:ext>
             </a:extLst>
           </p:cNvPr>
@@ -11438,7 +11439,7 @@
           <p:cNvPr id="5" name="Footer Placeholder 4">
             <a:extLst>
               <a:ext uri="{FF2B5EF4-FFF2-40B4-BE49-F238E27FC236}">
-                <a16:creationId xmlns:a16="http://schemas.microsoft.com/office/drawing/2014/main" xmlns="" id="{4392DBDA-ED00-4248-AC6D-0CE0B821B52F}"/>
+                <a16:creationId xmlns="" xmlns:a16="http://schemas.microsoft.com/office/drawing/2014/main" id="{4392DBDA-ED00-4248-AC6D-0CE0B821B52F}"/>
               </a:ext>
             </a:extLst>
           </p:cNvPr>
@@ -11475,7 +11476,7 @@
           <p:cNvPr id="6" name="Slide Number Placeholder 5">
             <a:extLst>
               <a:ext uri="{FF2B5EF4-FFF2-40B4-BE49-F238E27FC236}">
-                <a16:creationId xmlns:a16="http://schemas.microsoft.com/office/drawing/2014/main" xmlns="" id="{EC2B5F97-2F18-4EF2-9CBC-AAAB9FF4CC91}"/>
+                <a16:creationId xmlns="" xmlns:a16="http://schemas.microsoft.com/office/drawing/2014/main" id="{EC2B5F97-2F18-4EF2-9CBC-AAAB9FF4CC91}"/>
               </a:ext>
             </a:extLst>
           </p:cNvPr>
@@ -11504,7 +11505,7 @@
           <p:cNvPr id="38" name="Freeform: Shape 37">
             <a:extLst>
               <a:ext uri="{FF2B5EF4-FFF2-40B4-BE49-F238E27FC236}">
-                <a16:creationId xmlns:a16="http://schemas.microsoft.com/office/drawing/2014/main" xmlns="" id="{C6C05708-08C7-4EF1-B0D8-6A01C1B1AD85}"/>
+                <a16:creationId xmlns="" xmlns:a16="http://schemas.microsoft.com/office/drawing/2014/main" id="{C6C05708-08C7-4EF1-B0D8-6A01C1B1AD85}"/>
               </a:ext>
             </a:extLst>
           </p:cNvPr>
@@ -11612,7 +11613,7 @@
           <p:cNvPr id="3" name="Graphic 33">
             <a:extLst>
               <a:ext uri="{FF2B5EF4-FFF2-40B4-BE49-F238E27FC236}">
-                <a16:creationId xmlns:a16="http://schemas.microsoft.com/office/drawing/2014/main" xmlns="" id="{38956B41-4EE0-4C7C-8436-027F5DE8B1BC}"/>
+                <a16:creationId xmlns="" xmlns:a16="http://schemas.microsoft.com/office/drawing/2014/main" id="{38956B41-4EE0-4C7C-8436-027F5DE8B1BC}"/>
               </a:ext>
             </a:extLst>
           </p:cNvPr>
@@ -11748,7 +11749,7 @@
           <p:cNvPr id="33" name="Freeform: Shape 32">
             <a:extLst>
               <a:ext uri="{FF2B5EF4-FFF2-40B4-BE49-F238E27FC236}">
-                <a16:creationId xmlns:a16="http://schemas.microsoft.com/office/drawing/2014/main" xmlns="" id="{E08687FC-7322-4F20-9769-1ECF4296A96E}"/>
+                <a16:creationId xmlns="" xmlns:a16="http://schemas.microsoft.com/office/drawing/2014/main" id="{E08687FC-7322-4F20-9769-1ECF4296A96E}"/>
               </a:ext>
             </a:extLst>
           </p:cNvPr>
@@ -11856,7 +11857,7 @@
           <p:cNvPr id="41" name="Freeform: Shape 40">
             <a:extLst>
               <a:ext uri="{FF2B5EF4-FFF2-40B4-BE49-F238E27FC236}">
-                <a16:creationId xmlns:a16="http://schemas.microsoft.com/office/drawing/2014/main" xmlns="" id="{0FCCDE26-7222-4C1B-884A-0FAE84FA57DB}"/>
+                <a16:creationId xmlns="" xmlns:a16="http://schemas.microsoft.com/office/drawing/2014/main" id="{0FCCDE26-7222-4C1B-884A-0FAE84FA57DB}"/>
               </a:ext>
             </a:extLst>
           </p:cNvPr>
@@ -11964,7 +11965,7 @@
           <p:cNvPr id="19" name="Title 1">
             <a:extLst>
               <a:ext uri="{FF2B5EF4-FFF2-40B4-BE49-F238E27FC236}">
-                <a16:creationId xmlns:a16="http://schemas.microsoft.com/office/drawing/2014/main" xmlns="" id="{2AC78A4D-01A3-43A6-BE82-E64E2BF16D65}"/>
+                <a16:creationId xmlns="" xmlns:a16="http://schemas.microsoft.com/office/drawing/2014/main" id="{2AC78A4D-01A3-43A6-BE82-E64E2BF16D65}"/>
               </a:ext>
             </a:extLst>
           </p:cNvPr>
@@ -12001,7 +12002,7 @@
           <p:cNvPr id="20" name="Text Placeholder 3">
             <a:extLst>
               <a:ext uri="{FF2B5EF4-FFF2-40B4-BE49-F238E27FC236}">
-                <a16:creationId xmlns:a16="http://schemas.microsoft.com/office/drawing/2014/main" xmlns="" id="{E6544955-4597-4E52-9C7E-8AEB5D2A4983}"/>
+                <a16:creationId xmlns="" xmlns:a16="http://schemas.microsoft.com/office/drawing/2014/main" id="{E6544955-4597-4E52-9C7E-8AEB5D2A4983}"/>
               </a:ext>
             </a:extLst>
           </p:cNvPr>
@@ -12072,7 +12073,7 @@
           <p:cNvPr id="14" name="Content Placeholder 2">
             <a:extLst>
               <a:ext uri="{FF2B5EF4-FFF2-40B4-BE49-F238E27FC236}">
-                <a16:creationId xmlns:a16="http://schemas.microsoft.com/office/drawing/2014/main" xmlns="" id="{A28A6791-A2CB-40CE-AEF5-A729106DA43B}"/>
+                <a16:creationId xmlns="" xmlns:a16="http://schemas.microsoft.com/office/drawing/2014/main" id="{A28A6791-A2CB-40CE-AEF5-A729106DA43B}"/>
               </a:ext>
             </a:extLst>
           </p:cNvPr>
@@ -12194,7 +12195,7 @@
           <p:cNvPr id="48" name="Oval 47">
             <a:extLst>
               <a:ext uri="{FF2B5EF4-FFF2-40B4-BE49-F238E27FC236}">
-                <a16:creationId xmlns:a16="http://schemas.microsoft.com/office/drawing/2014/main" xmlns="" id="{2F290D8B-987A-4555-890C-F3CD026BF7BF}"/>
+                <a16:creationId xmlns="" xmlns:a16="http://schemas.microsoft.com/office/drawing/2014/main" id="{2F290D8B-987A-4555-890C-F3CD026BF7BF}"/>
               </a:ext>
             </a:extLst>
           </p:cNvPr>
@@ -12246,7 +12247,7 @@
           <p:cNvPr id="49" name="Graphic 12">
             <a:extLst>
               <a:ext uri="{FF2B5EF4-FFF2-40B4-BE49-F238E27FC236}">
-                <a16:creationId xmlns:a16="http://schemas.microsoft.com/office/drawing/2014/main" xmlns="" id="{6139C5E6-5A04-4458-8EF9-628BFBA73A92}"/>
+                <a16:creationId xmlns="" xmlns:a16="http://schemas.microsoft.com/office/drawing/2014/main" id="{6139C5E6-5A04-4458-8EF9-628BFBA73A92}"/>
               </a:ext>
             </a:extLst>
           </p:cNvPr>
@@ -12363,7 +12364,7 @@
           <p:cNvPr id="4" name="Date Placeholder 3">
             <a:extLst>
               <a:ext uri="{FF2B5EF4-FFF2-40B4-BE49-F238E27FC236}">
-                <a16:creationId xmlns:a16="http://schemas.microsoft.com/office/drawing/2014/main" xmlns="" id="{DC2A0631-3130-4C36-8E5E-80464B1A62A7}"/>
+                <a16:creationId xmlns="" xmlns:a16="http://schemas.microsoft.com/office/drawing/2014/main" id="{DC2A0631-3130-4C36-8E5E-80464B1A62A7}"/>
               </a:ext>
             </a:extLst>
           </p:cNvPr>
@@ -12391,7 +12392,7 @@
           <p:cNvPr id="5" name="Footer Placeholder 4">
             <a:extLst>
               <a:ext uri="{FF2B5EF4-FFF2-40B4-BE49-F238E27FC236}">
-                <a16:creationId xmlns:a16="http://schemas.microsoft.com/office/drawing/2014/main" xmlns="" id="{79230F82-FE68-4450-98DF-5D29369AEE76}"/>
+                <a16:creationId xmlns="" xmlns:a16="http://schemas.microsoft.com/office/drawing/2014/main" id="{79230F82-FE68-4450-98DF-5D29369AEE76}"/>
               </a:ext>
             </a:extLst>
           </p:cNvPr>
@@ -12428,7 +12429,7 @@
           <p:cNvPr id="6" name="Slide Number Placeholder 5">
             <a:extLst>
               <a:ext uri="{FF2B5EF4-FFF2-40B4-BE49-F238E27FC236}">
-                <a16:creationId xmlns:a16="http://schemas.microsoft.com/office/drawing/2014/main" xmlns="" id="{EE6603C1-6E1A-4E4B-9555-31D84B6BDAD9}"/>
+                <a16:creationId xmlns="" xmlns:a16="http://schemas.microsoft.com/office/drawing/2014/main" id="{EE6603C1-6E1A-4E4B-9555-31D84B6BDAD9}"/>
               </a:ext>
             </a:extLst>
           </p:cNvPr>
@@ -12457,7 +12458,7 @@
           <p:cNvPr id="41" name="Graphic 39">
             <a:extLst>
               <a:ext uri="{FF2B5EF4-FFF2-40B4-BE49-F238E27FC236}">
-                <a16:creationId xmlns:a16="http://schemas.microsoft.com/office/drawing/2014/main" xmlns="" id="{1D75FFD8-3F66-48B3-BB01-D4B8A9496851}"/>
+                <a16:creationId xmlns="" xmlns:a16="http://schemas.microsoft.com/office/drawing/2014/main" id="{1D75FFD8-3F66-48B3-BB01-D4B8A9496851}"/>
               </a:ext>
             </a:extLst>
           </p:cNvPr>
@@ -12477,7 +12478,7 @@
             <p:cNvPr id="42" name="Freeform: Shape 41">
               <a:extLst>
                 <a:ext uri="{FF2B5EF4-FFF2-40B4-BE49-F238E27FC236}">
-                  <a16:creationId xmlns:a16="http://schemas.microsoft.com/office/drawing/2014/main" xmlns="" id="{9BA0EC60-510D-41EF-AFE6-E4E6BD83F8C9}"/>
+                  <a16:creationId xmlns="" xmlns:a16="http://schemas.microsoft.com/office/drawing/2014/main" id="{9BA0EC60-510D-41EF-AFE6-E4E6BD83F8C9}"/>
                 </a:ext>
               </a:extLst>
             </p:cNvPr>
@@ -12667,7 +12668,7 @@
             <p:cNvPr id="43" name="Freeform: Shape 42">
               <a:extLst>
                 <a:ext uri="{FF2B5EF4-FFF2-40B4-BE49-F238E27FC236}">
-                  <a16:creationId xmlns:a16="http://schemas.microsoft.com/office/drawing/2014/main" xmlns="" id="{0162C508-E081-418C-A19D-15A59388C43A}"/>
+                  <a16:creationId xmlns="" xmlns:a16="http://schemas.microsoft.com/office/drawing/2014/main" id="{0162C508-E081-418C-A19D-15A59388C43A}"/>
                 </a:ext>
               </a:extLst>
             </p:cNvPr>
@@ -12775,7 +12776,7 @@
             <p:cNvPr id="44" name="Freeform: Shape 43">
               <a:extLst>
                 <a:ext uri="{FF2B5EF4-FFF2-40B4-BE49-F238E27FC236}">
-                  <a16:creationId xmlns:a16="http://schemas.microsoft.com/office/drawing/2014/main" xmlns="" id="{2A710D7D-FC65-4BF6-BDA4-E59B01AD6FBC}"/>
+                  <a16:creationId xmlns="" xmlns:a16="http://schemas.microsoft.com/office/drawing/2014/main" id="{2A710D7D-FC65-4BF6-BDA4-E59B01AD6FBC}"/>
                 </a:ext>
               </a:extLst>
             </p:cNvPr>
@@ -12883,7 +12884,7 @@
             <p:cNvPr id="45" name="Freeform: Shape 44">
               <a:extLst>
                 <a:ext uri="{FF2B5EF4-FFF2-40B4-BE49-F238E27FC236}">
-                  <a16:creationId xmlns:a16="http://schemas.microsoft.com/office/drawing/2014/main" xmlns="" id="{18811B6B-BBB0-4D69-AEF8-AD0A7F9A4B57}"/>
+                  <a16:creationId xmlns="" xmlns:a16="http://schemas.microsoft.com/office/drawing/2014/main" id="{18811B6B-BBB0-4D69-AEF8-AD0A7F9A4B57}"/>
                 </a:ext>
               </a:extLst>
             </p:cNvPr>
@@ -12991,7 +12992,7 @@
             <p:cNvPr id="46" name="Freeform: Shape 45">
               <a:extLst>
                 <a:ext uri="{FF2B5EF4-FFF2-40B4-BE49-F238E27FC236}">
-                  <a16:creationId xmlns:a16="http://schemas.microsoft.com/office/drawing/2014/main" xmlns="" id="{3DB7F04C-0D31-4172-9D02-F8C8B2043EB9}"/>
+                  <a16:creationId xmlns="" xmlns:a16="http://schemas.microsoft.com/office/drawing/2014/main" id="{3DB7F04C-0D31-4172-9D02-F8C8B2043EB9}"/>
                 </a:ext>
               </a:extLst>
             </p:cNvPr>
@@ -13171,7 +13172,7 @@
             <p:cNvPr id="47" name="Freeform: Shape 46">
               <a:extLst>
                 <a:ext uri="{FF2B5EF4-FFF2-40B4-BE49-F238E27FC236}">
-                  <a16:creationId xmlns:a16="http://schemas.microsoft.com/office/drawing/2014/main" xmlns="" id="{1FB04931-77A8-4259-95CA-DA7DEDB2DEFD}"/>
+                  <a16:creationId xmlns="" xmlns:a16="http://schemas.microsoft.com/office/drawing/2014/main" id="{1FB04931-77A8-4259-95CA-DA7DEDB2DEFD}"/>
                 </a:ext>
               </a:extLst>
             </p:cNvPr>
@@ -13362,7 +13363,7 @@
           <p:cNvPr id="18" name="Graphic 19">
             <a:extLst>
               <a:ext uri="{FF2B5EF4-FFF2-40B4-BE49-F238E27FC236}">
-                <a16:creationId xmlns:a16="http://schemas.microsoft.com/office/drawing/2014/main" xmlns="" id="{436C4D92-1746-4D54-8232-468DFF66CF79}"/>
+                <a16:creationId xmlns="" xmlns:a16="http://schemas.microsoft.com/office/drawing/2014/main" id="{436C4D92-1746-4D54-8232-468DFF66CF79}"/>
               </a:ext>
             </a:extLst>
           </p:cNvPr>
@@ -13498,7 +13499,7 @@
           <p:cNvPr id="19" name="Title 6">
             <a:extLst>
               <a:ext uri="{FF2B5EF4-FFF2-40B4-BE49-F238E27FC236}">
-                <a16:creationId xmlns:a16="http://schemas.microsoft.com/office/drawing/2014/main" xmlns="" id="{E77FD51D-3B1F-4D51-8A61-6CF8222774BD}"/>
+                <a16:creationId xmlns="" xmlns:a16="http://schemas.microsoft.com/office/drawing/2014/main" id="{E77FD51D-3B1F-4D51-8A61-6CF8222774BD}"/>
               </a:ext>
             </a:extLst>
           </p:cNvPr>
@@ -13561,7 +13562,7 @@
           <p:cNvPr id="48" name="Oval 47">
             <a:extLst>
               <a:ext uri="{FF2B5EF4-FFF2-40B4-BE49-F238E27FC236}">
-                <a16:creationId xmlns:a16="http://schemas.microsoft.com/office/drawing/2014/main" xmlns="" id="{2F290D8B-987A-4555-890C-F3CD026BF7BF}"/>
+                <a16:creationId xmlns="" xmlns:a16="http://schemas.microsoft.com/office/drawing/2014/main" id="{2F290D8B-987A-4555-890C-F3CD026BF7BF}"/>
               </a:ext>
             </a:extLst>
           </p:cNvPr>
@@ -13613,7 +13614,7 @@
           <p:cNvPr id="49" name="Graphic 12">
             <a:extLst>
               <a:ext uri="{FF2B5EF4-FFF2-40B4-BE49-F238E27FC236}">
-                <a16:creationId xmlns:a16="http://schemas.microsoft.com/office/drawing/2014/main" xmlns="" id="{6139C5E6-5A04-4458-8EF9-628BFBA73A92}"/>
+                <a16:creationId xmlns="" xmlns:a16="http://schemas.microsoft.com/office/drawing/2014/main" id="{6139C5E6-5A04-4458-8EF9-628BFBA73A92}"/>
               </a:ext>
             </a:extLst>
           </p:cNvPr>
@@ -13730,7 +13731,7 @@
           <p:cNvPr id="4" name="Date Placeholder 3">
             <a:extLst>
               <a:ext uri="{FF2B5EF4-FFF2-40B4-BE49-F238E27FC236}">
-                <a16:creationId xmlns:a16="http://schemas.microsoft.com/office/drawing/2014/main" xmlns="" id="{DC2A0631-3130-4C36-8E5E-80464B1A62A7}"/>
+                <a16:creationId xmlns="" xmlns:a16="http://schemas.microsoft.com/office/drawing/2014/main" id="{DC2A0631-3130-4C36-8E5E-80464B1A62A7}"/>
               </a:ext>
             </a:extLst>
           </p:cNvPr>
@@ -13758,7 +13759,7 @@
           <p:cNvPr id="5" name="Footer Placeholder 4">
             <a:extLst>
               <a:ext uri="{FF2B5EF4-FFF2-40B4-BE49-F238E27FC236}">
-                <a16:creationId xmlns:a16="http://schemas.microsoft.com/office/drawing/2014/main" xmlns="" id="{79230F82-FE68-4450-98DF-5D29369AEE76}"/>
+                <a16:creationId xmlns="" xmlns:a16="http://schemas.microsoft.com/office/drawing/2014/main" id="{79230F82-FE68-4450-98DF-5D29369AEE76}"/>
               </a:ext>
             </a:extLst>
           </p:cNvPr>
@@ -13795,7 +13796,7 @@
           <p:cNvPr id="6" name="Slide Number Placeholder 5">
             <a:extLst>
               <a:ext uri="{FF2B5EF4-FFF2-40B4-BE49-F238E27FC236}">
-                <a16:creationId xmlns:a16="http://schemas.microsoft.com/office/drawing/2014/main" xmlns="" id="{EE6603C1-6E1A-4E4B-9555-31D84B6BDAD9}"/>
+                <a16:creationId xmlns="" xmlns:a16="http://schemas.microsoft.com/office/drawing/2014/main" id="{EE6603C1-6E1A-4E4B-9555-31D84B6BDAD9}"/>
               </a:ext>
             </a:extLst>
           </p:cNvPr>
@@ -13824,7 +13825,7 @@
           <p:cNvPr id="41" name="Graphic 39">
             <a:extLst>
               <a:ext uri="{FF2B5EF4-FFF2-40B4-BE49-F238E27FC236}">
-                <a16:creationId xmlns:a16="http://schemas.microsoft.com/office/drawing/2014/main" xmlns="" id="{1D75FFD8-3F66-48B3-BB01-D4B8A9496851}"/>
+                <a16:creationId xmlns="" xmlns:a16="http://schemas.microsoft.com/office/drawing/2014/main" id="{1D75FFD8-3F66-48B3-BB01-D4B8A9496851}"/>
               </a:ext>
             </a:extLst>
           </p:cNvPr>
@@ -13844,7 +13845,7 @@
             <p:cNvPr id="42" name="Freeform: Shape 41">
               <a:extLst>
                 <a:ext uri="{FF2B5EF4-FFF2-40B4-BE49-F238E27FC236}">
-                  <a16:creationId xmlns:a16="http://schemas.microsoft.com/office/drawing/2014/main" xmlns="" id="{9BA0EC60-510D-41EF-AFE6-E4E6BD83F8C9}"/>
+                  <a16:creationId xmlns="" xmlns:a16="http://schemas.microsoft.com/office/drawing/2014/main" id="{9BA0EC60-510D-41EF-AFE6-E4E6BD83F8C9}"/>
                 </a:ext>
               </a:extLst>
             </p:cNvPr>
@@ -14034,7 +14035,7 @@
             <p:cNvPr id="43" name="Freeform: Shape 42">
               <a:extLst>
                 <a:ext uri="{FF2B5EF4-FFF2-40B4-BE49-F238E27FC236}">
-                  <a16:creationId xmlns:a16="http://schemas.microsoft.com/office/drawing/2014/main" xmlns="" id="{0162C508-E081-418C-A19D-15A59388C43A}"/>
+                  <a16:creationId xmlns="" xmlns:a16="http://schemas.microsoft.com/office/drawing/2014/main" id="{0162C508-E081-418C-A19D-15A59388C43A}"/>
                 </a:ext>
               </a:extLst>
             </p:cNvPr>
@@ -14142,7 +14143,7 @@
             <p:cNvPr id="44" name="Freeform: Shape 43">
               <a:extLst>
                 <a:ext uri="{FF2B5EF4-FFF2-40B4-BE49-F238E27FC236}">
-                  <a16:creationId xmlns:a16="http://schemas.microsoft.com/office/drawing/2014/main" xmlns="" id="{2A710D7D-FC65-4BF6-BDA4-E59B01AD6FBC}"/>
+                  <a16:creationId xmlns="" xmlns:a16="http://schemas.microsoft.com/office/drawing/2014/main" id="{2A710D7D-FC65-4BF6-BDA4-E59B01AD6FBC}"/>
                 </a:ext>
               </a:extLst>
             </p:cNvPr>
@@ -14250,7 +14251,7 @@
             <p:cNvPr id="45" name="Freeform: Shape 44">
               <a:extLst>
                 <a:ext uri="{FF2B5EF4-FFF2-40B4-BE49-F238E27FC236}">
-                  <a16:creationId xmlns:a16="http://schemas.microsoft.com/office/drawing/2014/main" xmlns="" id="{18811B6B-BBB0-4D69-AEF8-AD0A7F9A4B57}"/>
+                  <a16:creationId xmlns="" xmlns:a16="http://schemas.microsoft.com/office/drawing/2014/main" id="{18811B6B-BBB0-4D69-AEF8-AD0A7F9A4B57}"/>
                 </a:ext>
               </a:extLst>
             </p:cNvPr>
@@ -14358,7 +14359,7 @@
             <p:cNvPr id="46" name="Freeform: Shape 45">
               <a:extLst>
                 <a:ext uri="{FF2B5EF4-FFF2-40B4-BE49-F238E27FC236}">
-                  <a16:creationId xmlns:a16="http://schemas.microsoft.com/office/drawing/2014/main" xmlns="" id="{3DB7F04C-0D31-4172-9D02-F8C8B2043EB9}"/>
+                  <a16:creationId xmlns="" xmlns:a16="http://schemas.microsoft.com/office/drawing/2014/main" id="{3DB7F04C-0D31-4172-9D02-F8C8B2043EB9}"/>
                 </a:ext>
               </a:extLst>
             </p:cNvPr>
@@ -14538,7 +14539,7 @@
             <p:cNvPr id="47" name="Freeform: Shape 46">
               <a:extLst>
                 <a:ext uri="{FF2B5EF4-FFF2-40B4-BE49-F238E27FC236}">
-                  <a16:creationId xmlns:a16="http://schemas.microsoft.com/office/drawing/2014/main" xmlns="" id="{1FB04931-77A8-4259-95CA-DA7DEDB2DEFD}"/>
+                  <a16:creationId xmlns="" xmlns:a16="http://schemas.microsoft.com/office/drawing/2014/main" id="{1FB04931-77A8-4259-95CA-DA7DEDB2DEFD}"/>
                 </a:ext>
               </a:extLst>
             </p:cNvPr>
@@ -14759,7 +14760,7 @@
           <p:cNvPr id="39" name="Picture Placeholder 38">
             <a:extLst>
               <a:ext uri="{FF2B5EF4-FFF2-40B4-BE49-F238E27FC236}">
-                <a16:creationId xmlns:a16="http://schemas.microsoft.com/office/drawing/2014/main" xmlns="" id="{12A714F2-A8EC-40F7-ACFF-A00E1DD10C56}"/>
+                <a16:creationId xmlns="" xmlns:a16="http://schemas.microsoft.com/office/drawing/2014/main" id="{12A714F2-A8EC-40F7-ACFF-A00E1DD10C56}"/>
               </a:ext>
             </a:extLst>
           </p:cNvPr>
@@ -14926,7 +14927,7 @@
           <p:cNvPr id="34" name="Oval 33">
             <a:extLst>
               <a:ext uri="{FF2B5EF4-FFF2-40B4-BE49-F238E27FC236}">
-                <a16:creationId xmlns:a16="http://schemas.microsoft.com/office/drawing/2014/main" xmlns="" id="{13074BE4-153F-46FE-B915-CD1AEF318A25}"/>
+                <a16:creationId xmlns="" xmlns:a16="http://schemas.microsoft.com/office/drawing/2014/main" id="{13074BE4-153F-46FE-B915-CD1AEF318A25}"/>
               </a:ext>
             </a:extLst>
           </p:cNvPr>
@@ -14978,7 +14979,7 @@
           <p:cNvPr id="35" name="Graphic 12">
             <a:extLst>
               <a:ext uri="{FF2B5EF4-FFF2-40B4-BE49-F238E27FC236}">
-                <a16:creationId xmlns:a16="http://schemas.microsoft.com/office/drawing/2014/main" xmlns="" id="{0B7E91C4-F19E-46BE-B05F-139B5418924E}"/>
+                <a16:creationId xmlns="" xmlns:a16="http://schemas.microsoft.com/office/drawing/2014/main" id="{0B7E91C4-F19E-46BE-B05F-139B5418924E}"/>
               </a:ext>
             </a:extLst>
           </p:cNvPr>
@@ -15095,7 +15096,7 @@
           <p:cNvPr id="10" name="Freeform: Shape 9">
             <a:extLst>
               <a:ext uri="{FF2B5EF4-FFF2-40B4-BE49-F238E27FC236}">
-                <a16:creationId xmlns:a16="http://schemas.microsoft.com/office/drawing/2014/main" xmlns="" id="{08A64499-0304-4070-BCB0-67E2BE20A3EA}"/>
+                <a16:creationId xmlns="" xmlns:a16="http://schemas.microsoft.com/office/drawing/2014/main" id="{08A64499-0304-4070-BCB0-67E2BE20A3EA}"/>
               </a:ext>
             </a:extLst>
           </p:cNvPr>
@@ -15203,7 +15204,7 @@
           <p:cNvPr id="25" name="Freeform: Shape 24">
             <a:extLst>
               <a:ext uri="{FF2B5EF4-FFF2-40B4-BE49-F238E27FC236}">
-                <a16:creationId xmlns:a16="http://schemas.microsoft.com/office/drawing/2014/main" xmlns="" id="{ED1736B3-AE79-40C2-80FF-2FB0FEE27195}"/>
+                <a16:creationId xmlns="" xmlns:a16="http://schemas.microsoft.com/office/drawing/2014/main" id="{ED1736B3-AE79-40C2-80FF-2FB0FEE27195}"/>
               </a:ext>
             </a:extLst>
           </p:cNvPr>
@@ -15293,7 +15294,7 @@
           <p:cNvPr id="2" name="Title 1">
             <a:extLst>
               <a:ext uri="{FF2B5EF4-FFF2-40B4-BE49-F238E27FC236}">
-                <a16:creationId xmlns:a16="http://schemas.microsoft.com/office/drawing/2014/main" xmlns="" id="{DC2228EE-3546-4272-9C39-150FF23CE033}"/>
+                <a16:creationId xmlns="" xmlns:a16="http://schemas.microsoft.com/office/drawing/2014/main" id="{DC2228EE-3546-4272-9C39-150FF23CE033}"/>
               </a:ext>
             </a:extLst>
           </p:cNvPr>
@@ -15345,7 +15346,7 @@
           <p:cNvPr id="3" name="Subtitle 2">
             <a:extLst>
               <a:ext uri="{FF2B5EF4-FFF2-40B4-BE49-F238E27FC236}">
-                <a16:creationId xmlns:a16="http://schemas.microsoft.com/office/drawing/2014/main" xmlns="" id="{0F2EFCC6-4D5A-4B43-A534-1A868887BC7F}"/>
+                <a16:creationId xmlns="" xmlns:a16="http://schemas.microsoft.com/office/drawing/2014/main" id="{0F2EFCC6-4D5A-4B43-A534-1A868887BC7F}"/>
               </a:ext>
             </a:extLst>
           </p:cNvPr>
@@ -15422,7 +15423,7 @@
           <p:cNvPr id="4" name="Date Placeholder 3">
             <a:extLst>
               <a:ext uri="{FF2B5EF4-FFF2-40B4-BE49-F238E27FC236}">
-                <a16:creationId xmlns:a16="http://schemas.microsoft.com/office/drawing/2014/main" xmlns="" id="{0FD10BB4-D57E-4372-8E10-AC15DC09615A}"/>
+                <a16:creationId xmlns="" xmlns:a16="http://schemas.microsoft.com/office/drawing/2014/main" id="{0FD10BB4-D57E-4372-8E10-AC15DC09615A}"/>
               </a:ext>
             </a:extLst>
           </p:cNvPr>
@@ -15450,7 +15451,7 @@
           <p:cNvPr id="5" name="Footer Placeholder 4">
             <a:extLst>
               <a:ext uri="{FF2B5EF4-FFF2-40B4-BE49-F238E27FC236}">
-                <a16:creationId xmlns:a16="http://schemas.microsoft.com/office/drawing/2014/main" xmlns="" id="{66020939-F172-405E-A418-A87CE5D908B7}"/>
+                <a16:creationId xmlns="" xmlns:a16="http://schemas.microsoft.com/office/drawing/2014/main" id="{66020939-F172-405E-A418-A87CE5D908B7}"/>
               </a:ext>
             </a:extLst>
           </p:cNvPr>
@@ -15487,7 +15488,7 @@
           <p:cNvPr id="24" name="Graphic 22">
             <a:extLst>
               <a:ext uri="{FF2B5EF4-FFF2-40B4-BE49-F238E27FC236}">
-                <a16:creationId xmlns:a16="http://schemas.microsoft.com/office/drawing/2014/main" xmlns="" id="{4EE1436E-33B5-4388-87D8-2D0633CC3CE7}"/>
+                <a16:creationId xmlns="" xmlns:a16="http://schemas.microsoft.com/office/drawing/2014/main" id="{4EE1436E-33B5-4388-87D8-2D0633CC3CE7}"/>
               </a:ext>
             </a:extLst>
           </p:cNvPr>
@@ -15623,7 +15624,7 @@
           <p:cNvPr id="9" name="Freeform: Shape 8">
             <a:extLst>
               <a:ext uri="{FF2B5EF4-FFF2-40B4-BE49-F238E27FC236}">
-                <a16:creationId xmlns:a16="http://schemas.microsoft.com/office/drawing/2014/main" xmlns="" id="{A8FB11AB-3031-47CA-85DD-696856C3C62C}"/>
+                <a16:creationId xmlns="" xmlns:a16="http://schemas.microsoft.com/office/drawing/2014/main" id="{A8FB11AB-3031-47CA-85DD-696856C3C62C}"/>
               </a:ext>
             </a:extLst>
           </p:cNvPr>
@@ -15731,7 +15732,7 @@
           <p:cNvPr id="6" name="Slide Number Placeholder 5">
             <a:extLst>
               <a:ext uri="{FF2B5EF4-FFF2-40B4-BE49-F238E27FC236}">
-                <a16:creationId xmlns:a16="http://schemas.microsoft.com/office/drawing/2014/main" xmlns="" id="{E0210624-61F8-48B2-BD00-D3BC39DEBDCF}"/>
+                <a16:creationId xmlns="" xmlns:a16="http://schemas.microsoft.com/office/drawing/2014/main" id="{E0210624-61F8-48B2-BD00-D3BC39DEBDCF}"/>
               </a:ext>
             </a:extLst>
           </p:cNvPr>
@@ -15760,7 +15761,7 @@
           <p:cNvPr id="38" name="Freeform: Shape 37">
             <a:extLst>
               <a:ext uri="{FF2B5EF4-FFF2-40B4-BE49-F238E27FC236}">
-                <a16:creationId xmlns:a16="http://schemas.microsoft.com/office/drawing/2014/main" xmlns="" id="{9CD6F167-FB82-4EFB-BAB9-1D0FEE07B85D}"/>
+                <a16:creationId xmlns="" xmlns:a16="http://schemas.microsoft.com/office/drawing/2014/main" id="{9CD6F167-FB82-4EFB-BAB9-1D0FEE07B85D}"/>
               </a:ext>
             </a:extLst>
           </p:cNvPr>
@@ -15886,7 +15887,7 @@
           <p:cNvPr id="36" name="Freeform: Shape 35">
             <a:extLst>
               <a:ext uri="{FF2B5EF4-FFF2-40B4-BE49-F238E27FC236}">
-                <a16:creationId xmlns:a16="http://schemas.microsoft.com/office/drawing/2014/main" xmlns="" id="{3DD2082D-81A7-4E2D-8136-9D48016E7FE9}"/>
+                <a16:creationId xmlns="" xmlns:a16="http://schemas.microsoft.com/office/drawing/2014/main" id="{3DD2082D-81A7-4E2D-8136-9D48016E7FE9}"/>
               </a:ext>
             </a:extLst>
           </p:cNvPr>
@@ -15976,7 +15977,7 @@
           <p:cNvPr id="30" name="Freeform: Shape 29">
             <a:extLst>
               <a:ext uri="{FF2B5EF4-FFF2-40B4-BE49-F238E27FC236}">
-                <a16:creationId xmlns:a16="http://schemas.microsoft.com/office/drawing/2014/main" xmlns="" id="{ECF16C35-4A81-4062-808C-7697AF0FD6F5}"/>
+                <a16:creationId xmlns="" xmlns:a16="http://schemas.microsoft.com/office/drawing/2014/main" id="{ECF16C35-4A81-4062-808C-7697AF0FD6F5}"/>
               </a:ext>
             </a:extLst>
           </p:cNvPr>
@@ -16296,7 +16297,7 @@
           <p:cNvPr id="26" name="Picture Placeholder 25">
             <a:extLst>
               <a:ext uri="{FF2B5EF4-FFF2-40B4-BE49-F238E27FC236}">
-                <a16:creationId xmlns:a16="http://schemas.microsoft.com/office/drawing/2014/main" xmlns="" id="{5A97CE06-9ECC-4438-8B22-B58B27F2B5FA}"/>
+                <a16:creationId xmlns="" xmlns:a16="http://schemas.microsoft.com/office/drawing/2014/main" id="{5A97CE06-9ECC-4438-8B22-B58B27F2B5FA}"/>
               </a:ext>
             </a:extLst>
           </p:cNvPr>
@@ -16499,7 +16500,7 @@
           <p:cNvPr id="24" name="Oval 23">
             <a:extLst>
               <a:ext uri="{FF2B5EF4-FFF2-40B4-BE49-F238E27FC236}">
-                <a16:creationId xmlns:a16="http://schemas.microsoft.com/office/drawing/2014/main" xmlns="" id="{CE8B26E3-C9CA-4CFF-8221-19518F497FF4}"/>
+                <a16:creationId xmlns="" xmlns:a16="http://schemas.microsoft.com/office/drawing/2014/main" id="{CE8B26E3-C9CA-4CFF-8221-19518F497FF4}"/>
               </a:ext>
             </a:extLst>
           </p:cNvPr>
@@ -16551,7 +16552,7 @@
           <p:cNvPr id="25" name="Graphic 12">
             <a:extLst>
               <a:ext uri="{FF2B5EF4-FFF2-40B4-BE49-F238E27FC236}">
-                <a16:creationId xmlns:a16="http://schemas.microsoft.com/office/drawing/2014/main" xmlns="" id="{A9957602-C843-44E0-A93F-66AF5A6A0F0A}"/>
+                <a16:creationId xmlns="" xmlns:a16="http://schemas.microsoft.com/office/drawing/2014/main" id="{A9957602-C843-44E0-A93F-66AF5A6A0F0A}"/>
               </a:ext>
             </a:extLst>
           </p:cNvPr>
@@ -16668,7 +16669,7 @@
           <p:cNvPr id="2" name="Title 1">
             <a:extLst>
               <a:ext uri="{FF2B5EF4-FFF2-40B4-BE49-F238E27FC236}">
-                <a16:creationId xmlns:a16="http://schemas.microsoft.com/office/drawing/2014/main" xmlns="" id="{7242568A-7F20-40F2-9490-E3BC7466DA0D}"/>
+                <a16:creationId xmlns="" xmlns:a16="http://schemas.microsoft.com/office/drawing/2014/main" id="{7242568A-7F20-40F2-9490-E3BC7466DA0D}"/>
               </a:ext>
             </a:extLst>
           </p:cNvPr>
@@ -16706,7 +16707,7 @@
           <p:cNvPr id="4" name="Date Placeholder 3">
             <a:extLst>
               <a:ext uri="{FF2B5EF4-FFF2-40B4-BE49-F238E27FC236}">
-                <a16:creationId xmlns:a16="http://schemas.microsoft.com/office/drawing/2014/main" xmlns="" id="{AC6F89F8-3E24-406D-9C49-00E6E47E4AAC}"/>
+                <a16:creationId xmlns="" xmlns:a16="http://schemas.microsoft.com/office/drawing/2014/main" id="{AC6F89F8-3E24-406D-9C49-00E6E47E4AAC}"/>
               </a:ext>
             </a:extLst>
           </p:cNvPr>
@@ -16734,7 +16735,7 @@
           <p:cNvPr id="5" name="Footer Placeholder 4">
             <a:extLst>
               <a:ext uri="{FF2B5EF4-FFF2-40B4-BE49-F238E27FC236}">
-                <a16:creationId xmlns:a16="http://schemas.microsoft.com/office/drawing/2014/main" xmlns="" id="{4392DBDA-ED00-4248-AC6D-0CE0B821B52F}"/>
+                <a16:creationId xmlns="" xmlns:a16="http://schemas.microsoft.com/office/drawing/2014/main" id="{4392DBDA-ED00-4248-AC6D-0CE0B821B52F}"/>
               </a:ext>
             </a:extLst>
           </p:cNvPr>
@@ -16771,7 +16772,7 @@
           <p:cNvPr id="6" name="Slide Number Placeholder 5">
             <a:extLst>
               <a:ext uri="{FF2B5EF4-FFF2-40B4-BE49-F238E27FC236}">
-                <a16:creationId xmlns:a16="http://schemas.microsoft.com/office/drawing/2014/main" xmlns="" id="{EC2B5F97-2F18-4EF2-9CBC-AAAB9FF4CC91}"/>
+                <a16:creationId xmlns="" xmlns:a16="http://schemas.microsoft.com/office/drawing/2014/main" id="{EC2B5F97-2F18-4EF2-9CBC-AAAB9FF4CC91}"/>
               </a:ext>
             </a:extLst>
           </p:cNvPr>
@@ -16800,7 +16801,7 @@
           <p:cNvPr id="10" name="Freeform: Shape 9">
             <a:extLst>
               <a:ext uri="{FF2B5EF4-FFF2-40B4-BE49-F238E27FC236}">
-                <a16:creationId xmlns:a16="http://schemas.microsoft.com/office/drawing/2014/main" xmlns="" id="{7492975F-6F5D-4157-A751-54BACCCF1800}"/>
+                <a16:creationId xmlns="" xmlns:a16="http://schemas.microsoft.com/office/drawing/2014/main" id="{7492975F-6F5D-4157-A751-54BACCCF1800}"/>
               </a:ext>
             </a:extLst>
           </p:cNvPr>
@@ -16908,7 +16909,7 @@
           <p:cNvPr id="13" name="Freeform: Shape 12">
             <a:extLst>
               <a:ext uri="{FF2B5EF4-FFF2-40B4-BE49-F238E27FC236}">
-                <a16:creationId xmlns:a16="http://schemas.microsoft.com/office/drawing/2014/main" xmlns="" id="{6C50EDEB-35C1-4DED-A608-A0EAA8DE5404}"/>
+                <a16:creationId xmlns="" xmlns:a16="http://schemas.microsoft.com/office/drawing/2014/main" id="{6C50EDEB-35C1-4DED-A608-A0EAA8DE5404}"/>
               </a:ext>
             </a:extLst>
           </p:cNvPr>
@@ -17068,7 +17069,7 @@
           <p:cNvPr id="16" name="Text Placeholder 14">
             <a:extLst>
               <a:ext uri="{FF2B5EF4-FFF2-40B4-BE49-F238E27FC236}">
-                <a16:creationId xmlns:a16="http://schemas.microsoft.com/office/drawing/2014/main" xmlns="" id="{F469DEB5-CC79-4D71-8360-0B10B34244B7}"/>
+                <a16:creationId xmlns="" xmlns:a16="http://schemas.microsoft.com/office/drawing/2014/main" id="{F469DEB5-CC79-4D71-8360-0B10B34244B7}"/>
               </a:ext>
             </a:extLst>
           </p:cNvPr>
@@ -17109,7 +17110,7 @@
           <p:cNvPr id="17" name="Text Placeholder 14">
             <a:extLst>
               <a:ext uri="{FF2B5EF4-FFF2-40B4-BE49-F238E27FC236}">
-                <a16:creationId xmlns:a16="http://schemas.microsoft.com/office/drawing/2014/main" xmlns="" id="{9EE0722D-F13C-4FFB-9E31-CC024B92E6CD}"/>
+                <a16:creationId xmlns="" xmlns:a16="http://schemas.microsoft.com/office/drawing/2014/main" id="{9EE0722D-F13C-4FFB-9E31-CC024B92E6CD}"/>
               </a:ext>
             </a:extLst>
           </p:cNvPr>
@@ -17164,7 +17165,7 @@
           <p:cNvPr id="3" name="Graphic 22">
             <a:extLst>
               <a:ext uri="{FF2B5EF4-FFF2-40B4-BE49-F238E27FC236}">
-                <a16:creationId xmlns:a16="http://schemas.microsoft.com/office/drawing/2014/main" xmlns="" id="{827885C7-FA6F-4513-83BC-BEAD42F63D5B}"/>
+                <a16:creationId xmlns="" xmlns:a16="http://schemas.microsoft.com/office/drawing/2014/main" id="{827885C7-FA6F-4513-83BC-BEAD42F63D5B}"/>
               </a:ext>
             </a:extLst>
           </p:cNvPr>
@@ -17300,7 +17301,7 @@
           <p:cNvPr id="22" name="Freeform: Shape 21">
             <a:extLst>
               <a:ext uri="{FF2B5EF4-FFF2-40B4-BE49-F238E27FC236}">
-                <a16:creationId xmlns:a16="http://schemas.microsoft.com/office/drawing/2014/main" xmlns="" id="{30961087-B677-45AC-8D02-FEE615D17609}"/>
+                <a16:creationId xmlns="" xmlns:a16="http://schemas.microsoft.com/office/drawing/2014/main" id="{30961087-B677-45AC-8D02-FEE615D17609}"/>
               </a:ext>
             </a:extLst>
           </p:cNvPr>
@@ -17438,7 +17439,7 @@
           <p:cNvPr id="42" name="Picture Placeholder 41">
             <a:extLst>
               <a:ext uri="{FF2B5EF4-FFF2-40B4-BE49-F238E27FC236}">
-                <a16:creationId xmlns:a16="http://schemas.microsoft.com/office/drawing/2014/main" xmlns="" id="{D6E0F90B-941A-45B6-85DA-E0D4E7977CD8}"/>
+                <a16:creationId xmlns="" xmlns:a16="http://schemas.microsoft.com/office/drawing/2014/main" id="{D6E0F90B-941A-45B6-85DA-E0D4E7977CD8}"/>
               </a:ext>
             </a:extLst>
           </p:cNvPr>
@@ -17675,7 +17676,7 @@
           <p:cNvPr id="35" name="Oval 34">
             <a:extLst>
               <a:ext uri="{FF2B5EF4-FFF2-40B4-BE49-F238E27FC236}">
-                <a16:creationId xmlns:a16="http://schemas.microsoft.com/office/drawing/2014/main" xmlns="" id="{7BC6DBB9-1B34-4374-A887-DC30F9E2F62F}"/>
+                <a16:creationId xmlns="" xmlns:a16="http://schemas.microsoft.com/office/drawing/2014/main" id="{7BC6DBB9-1B34-4374-A887-DC30F9E2F62F}"/>
               </a:ext>
             </a:extLst>
           </p:cNvPr>
@@ -17727,7 +17728,7 @@
           <p:cNvPr id="36" name="Graphic 12">
             <a:extLst>
               <a:ext uri="{FF2B5EF4-FFF2-40B4-BE49-F238E27FC236}">
-                <a16:creationId xmlns:a16="http://schemas.microsoft.com/office/drawing/2014/main" xmlns="" id="{00DE0AE3-F44D-4F2C-B7A3-C253AA498DEF}"/>
+                <a16:creationId xmlns="" xmlns:a16="http://schemas.microsoft.com/office/drawing/2014/main" id="{00DE0AE3-F44D-4F2C-B7A3-C253AA498DEF}"/>
               </a:ext>
             </a:extLst>
           </p:cNvPr>
@@ -17844,7 +17845,7 @@
           <p:cNvPr id="2" name="Title 1">
             <a:extLst>
               <a:ext uri="{FF2B5EF4-FFF2-40B4-BE49-F238E27FC236}">
-                <a16:creationId xmlns:a16="http://schemas.microsoft.com/office/drawing/2014/main" xmlns="" id="{7242568A-7F20-40F2-9490-E3BC7466DA0D}"/>
+                <a16:creationId xmlns="" xmlns:a16="http://schemas.microsoft.com/office/drawing/2014/main" id="{7242568A-7F20-40F2-9490-E3BC7466DA0D}"/>
               </a:ext>
             </a:extLst>
           </p:cNvPr>
@@ -17882,7 +17883,7 @@
           <p:cNvPr id="4" name="Date Placeholder 3">
             <a:extLst>
               <a:ext uri="{FF2B5EF4-FFF2-40B4-BE49-F238E27FC236}">
-                <a16:creationId xmlns:a16="http://schemas.microsoft.com/office/drawing/2014/main" xmlns="" id="{AC6F89F8-3E24-406D-9C49-00E6E47E4AAC}"/>
+                <a16:creationId xmlns="" xmlns:a16="http://schemas.microsoft.com/office/drawing/2014/main" id="{AC6F89F8-3E24-406D-9C49-00E6E47E4AAC}"/>
               </a:ext>
             </a:extLst>
           </p:cNvPr>
@@ -17910,7 +17911,7 @@
           <p:cNvPr id="5" name="Footer Placeholder 4">
             <a:extLst>
               <a:ext uri="{FF2B5EF4-FFF2-40B4-BE49-F238E27FC236}">
-                <a16:creationId xmlns:a16="http://schemas.microsoft.com/office/drawing/2014/main" xmlns="" id="{4392DBDA-ED00-4248-AC6D-0CE0B821B52F}"/>
+                <a16:creationId xmlns="" xmlns:a16="http://schemas.microsoft.com/office/drawing/2014/main" id="{4392DBDA-ED00-4248-AC6D-0CE0B821B52F}"/>
               </a:ext>
             </a:extLst>
           </p:cNvPr>
@@ -17947,7 +17948,7 @@
           <p:cNvPr id="6" name="Slide Number Placeholder 5">
             <a:extLst>
               <a:ext uri="{FF2B5EF4-FFF2-40B4-BE49-F238E27FC236}">
-                <a16:creationId xmlns:a16="http://schemas.microsoft.com/office/drawing/2014/main" xmlns="" id="{EC2B5F97-2F18-4EF2-9CBC-AAAB9FF4CC91}"/>
+                <a16:creationId xmlns="" xmlns:a16="http://schemas.microsoft.com/office/drawing/2014/main" id="{EC2B5F97-2F18-4EF2-9CBC-AAAB9FF4CC91}"/>
               </a:ext>
             </a:extLst>
           </p:cNvPr>
@@ -17976,7 +17977,7 @@
           <p:cNvPr id="18" name="Text Placeholder 14">
             <a:extLst>
               <a:ext uri="{FF2B5EF4-FFF2-40B4-BE49-F238E27FC236}">
-                <a16:creationId xmlns:a16="http://schemas.microsoft.com/office/drawing/2014/main" xmlns="" id="{82903A57-2768-42F8-A5EA-4C19B9049850}"/>
+                <a16:creationId xmlns="" xmlns:a16="http://schemas.microsoft.com/office/drawing/2014/main" id="{82903A57-2768-42F8-A5EA-4C19B9049850}"/>
               </a:ext>
             </a:extLst>
           </p:cNvPr>
@@ -18031,7 +18032,7 @@
           <p:cNvPr id="38" name="Freeform: Shape 37">
             <a:extLst>
               <a:ext uri="{FF2B5EF4-FFF2-40B4-BE49-F238E27FC236}">
-                <a16:creationId xmlns:a16="http://schemas.microsoft.com/office/drawing/2014/main" xmlns="" id="{C6C05708-08C7-4EF1-B0D8-6A01C1B1AD85}"/>
+                <a16:creationId xmlns="" xmlns:a16="http://schemas.microsoft.com/office/drawing/2014/main" id="{C6C05708-08C7-4EF1-B0D8-6A01C1B1AD85}"/>
               </a:ext>
             </a:extLst>
           </p:cNvPr>
@@ -18139,7 +18140,7 @@
           <p:cNvPr id="29" name="Freeform: Shape 28">
             <a:extLst>
               <a:ext uri="{FF2B5EF4-FFF2-40B4-BE49-F238E27FC236}">
-                <a16:creationId xmlns:a16="http://schemas.microsoft.com/office/drawing/2014/main" xmlns="" id="{E46691B2-7AF3-4CAC-A285-36444A9101D9}"/>
+                <a16:creationId xmlns="" xmlns:a16="http://schemas.microsoft.com/office/drawing/2014/main" id="{E46691B2-7AF3-4CAC-A285-36444A9101D9}"/>
               </a:ext>
             </a:extLst>
           </p:cNvPr>
@@ -18229,7 +18230,7 @@
           <p:cNvPr id="26" name="Freeform: Shape 25">
             <a:extLst>
               <a:ext uri="{FF2B5EF4-FFF2-40B4-BE49-F238E27FC236}">
-                <a16:creationId xmlns:a16="http://schemas.microsoft.com/office/drawing/2014/main" xmlns="" id="{FE8ACF66-A148-4D4F-A35C-837CDC6B154D}"/>
+                <a16:creationId xmlns="" xmlns:a16="http://schemas.microsoft.com/office/drawing/2014/main" id="{FE8ACF66-A148-4D4F-A35C-837CDC6B154D}"/>
               </a:ext>
             </a:extLst>
           </p:cNvPr>
@@ -18319,7 +18320,7 @@
           <p:cNvPr id="28" name="Text Placeholder 26">
             <a:extLst>
               <a:ext uri="{FF2B5EF4-FFF2-40B4-BE49-F238E27FC236}">
-                <a16:creationId xmlns:a16="http://schemas.microsoft.com/office/drawing/2014/main" xmlns="" id="{5F10B1F7-5633-4C8B-A868-72D9C782CBA6}"/>
+                <a16:creationId xmlns="" xmlns:a16="http://schemas.microsoft.com/office/drawing/2014/main" id="{5F10B1F7-5633-4C8B-A868-72D9C782CBA6}"/>
               </a:ext>
             </a:extLst>
           </p:cNvPr>
@@ -18376,7 +18377,7 @@
           <p:cNvPr id="31" name="Text Placeholder 29">
             <a:extLst>
               <a:ext uri="{FF2B5EF4-FFF2-40B4-BE49-F238E27FC236}">
-                <a16:creationId xmlns:a16="http://schemas.microsoft.com/office/drawing/2014/main" xmlns="" id="{CBA9BCD0-48BA-4D5B-8871-61204EACE422}"/>
+                <a16:creationId xmlns="" xmlns:a16="http://schemas.microsoft.com/office/drawing/2014/main" id="{CBA9BCD0-48BA-4D5B-8871-61204EACE422}"/>
               </a:ext>
             </a:extLst>
           </p:cNvPr>
@@ -18466,7 +18467,7 @@
           <p:cNvPr id="3" name="Graphic 33">
             <a:extLst>
               <a:ext uri="{FF2B5EF4-FFF2-40B4-BE49-F238E27FC236}">
-                <a16:creationId xmlns:a16="http://schemas.microsoft.com/office/drawing/2014/main" xmlns="" id="{38956B41-4EE0-4C7C-8436-027F5DE8B1BC}"/>
+                <a16:creationId xmlns="" xmlns:a16="http://schemas.microsoft.com/office/drawing/2014/main" id="{38956B41-4EE0-4C7C-8436-027F5DE8B1BC}"/>
               </a:ext>
             </a:extLst>
           </p:cNvPr>
@@ -18602,7 +18603,7 @@
           <p:cNvPr id="33" name="Freeform: Shape 32">
             <a:extLst>
               <a:ext uri="{FF2B5EF4-FFF2-40B4-BE49-F238E27FC236}">
-                <a16:creationId xmlns:a16="http://schemas.microsoft.com/office/drawing/2014/main" xmlns="" id="{E08687FC-7322-4F20-9769-1ECF4296A96E}"/>
+                <a16:creationId xmlns="" xmlns:a16="http://schemas.microsoft.com/office/drawing/2014/main" id="{E08687FC-7322-4F20-9769-1ECF4296A96E}"/>
               </a:ext>
             </a:extLst>
           </p:cNvPr>
@@ -18710,7 +18711,7 @@
           <p:cNvPr id="41" name="Freeform: Shape 40">
             <a:extLst>
               <a:ext uri="{FF2B5EF4-FFF2-40B4-BE49-F238E27FC236}">
-                <a16:creationId xmlns:a16="http://schemas.microsoft.com/office/drawing/2014/main" xmlns="" id="{0FCCDE26-7222-4C1B-884A-0FAE84FA57DB}"/>
+                <a16:creationId xmlns="" xmlns:a16="http://schemas.microsoft.com/office/drawing/2014/main" id="{0FCCDE26-7222-4C1B-884A-0FAE84FA57DB}"/>
               </a:ext>
             </a:extLst>
           </p:cNvPr>
@@ -18848,7 +18849,7 @@
           <p:cNvPr id="48" name="Oval 47">
             <a:extLst>
               <a:ext uri="{FF2B5EF4-FFF2-40B4-BE49-F238E27FC236}">
-                <a16:creationId xmlns:a16="http://schemas.microsoft.com/office/drawing/2014/main" xmlns="" id="{6F44C9A9-0E74-4918-9B66-273196D2956C}"/>
+                <a16:creationId xmlns="" xmlns:a16="http://schemas.microsoft.com/office/drawing/2014/main" id="{6F44C9A9-0E74-4918-9B66-273196D2956C}"/>
               </a:ext>
             </a:extLst>
           </p:cNvPr>
@@ -18902,7 +18903,7 @@
           <p:cNvPr id="49" name="Graphic 12">
             <a:extLst>
               <a:ext uri="{FF2B5EF4-FFF2-40B4-BE49-F238E27FC236}">
-                <a16:creationId xmlns:a16="http://schemas.microsoft.com/office/drawing/2014/main" xmlns="" id="{4FD74D9D-1BEE-4A13-ABAA-5FBA5C4D1BFA}"/>
+                <a16:creationId xmlns="" xmlns:a16="http://schemas.microsoft.com/office/drawing/2014/main" id="{4FD74D9D-1BEE-4A13-ABAA-5FBA5C4D1BFA}"/>
               </a:ext>
             </a:extLst>
           </p:cNvPr>
@@ -19010,7 +19011,7 @@
           <p:cNvPr id="2" name="Title 1">
             <a:extLst>
               <a:ext uri="{FF2B5EF4-FFF2-40B4-BE49-F238E27FC236}">
-                <a16:creationId xmlns:a16="http://schemas.microsoft.com/office/drawing/2014/main" xmlns="" id="{81053F33-9837-4E9F-8D29-24A800D841E9}"/>
+                <a16:creationId xmlns="" xmlns:a16="http://schemas.microsoft.com/office/drawing/2014/main" id="{81053F33-9837-4E9F-8D29-24A800D841E9}"/>
               </a:ext>
             </a:extLst>
           </p:cNvPr>
@@ -19050,7 +19051,7 @@
           <p:cNvPr id="3" name="Text Placeholder 2">
             <a:extLst>
               <a:ext uri="{FF2B5EF4-FFF2-40B4-BE49-F238E27FC236}">
-                <a16:creationId xmlns:a16="http://schemas.microsoft.com/office/drawing/2014/main" xmlns="" id="{40DFDBBD-D278-4F5A-BD28-172F5B157E88}"/>
+                <a16:creationId xmlns="" xmlns:a16="http://schemas.microsoft.com/office/drawing/2014/main" id="{40DFDBBD-D278-4F5A-BD28-172F5B157E88}"/>
               </a:ext>
             </a:extLst>
           </p:cNvPr>
@@ -19176,7 +19177,7 @@
           <p:cNvPr id="4" name="Date Placeholder 3">
             <a:extLst>
               <a:ext uri="{FF2B5EF4-FFF2-40B4-BE49-F238E27FC236}">
-                <a16:creationId xmlns:a16="http://schemas.microsoft.com/office/drawing/2014/main" xmlns="" id="{DC2A0631-3130-4C36-8E5E-80464B1A62A7}"/>
+                <a16:creationId xmlns="" xmlns:a16="http://schemas.microsoft.com/office/drawing/2014/main" id="{DC2A0631-3130-4C36-8E5E-80464B1A62A7}"/>
               </a:ext>
             </a:extLst>
           </p:cNvPr>
@@ -19204,7 +19205,7 @@
           <p:cNvPr id="5" name="Footer Placeholder 4">
             <a:extLst>
               <a:ext uri="{FF2B5EF4-FFF2-40B4-BE49-F238E27FC236}">
-                <a16:creationId xmlns:a16="http://schemas.microsoft.com/office/drawing/2014/main" xmlns="" id="{79230F82-FE68-4450-98DF-5D29369AEE76}"/>
+                <a16:creationId xmlns="" xmlns:a16="http://schemas.microsoft.com/office/drawing/2014/main" id="{79230F82-FE68-4450-98DF-5D29369AEE76}"/>
               </a:ext>
             </a:extLst>
           </p:cNvPr>
@@ -19241,7 +19242,7 @@
           <p:cNvPr id="6" name="Slide Number Placeholder 5">
             <a:extLst>
               <a:ext uri="{FF2B5EF4-FFF2-40B4-BE49-F238E27FC236}">
-                <a16:creationId xmlns:a16="http://schemas.microsoft.com/office/drawing/2014/main" xmlns="" id="{EE6603C1-6E1A-4E4B-9555-31D84B6BDAD9}"/>
+                <a16:creationId xmlns="" xmlns:a16="http://schemas.microsoft.com/office/drawing/2014/main" id="{EE6603C1-6E1A-4E4B-9555-31D84B6BDAD9}"/>
               </a:ext>
             </a:extLst>
           </p:cNvPr>
@@ -19275,7 +19276,7 @@
           <p:cNvPr id="17" name="Text Placeholder 26">
             <a:extLst>
               <a:ext uri="{FF2B5EF4-FFF2-40B4-BE49-F238E27FC236}">
-                <a16:creationId xmlns:a16="http://schemas.microsoft.com/office/drawing/2014/main" xmlns="" id="{C990C5BD-BC2C-4822-AA4E-446B77052F23}"/>
+                <a16:creationId xmlns="" xmlns:a16="http://schemas.microsoft.com/office/drawing/2014/main" id="{C990C5BD-BC2C-4822-AA4E-446B77052F23}"/>
               </a:ext>
             </a:extLst>
           </p:cNvPr>
@@ -19332,7 +19333,7 @@
           <p:cNvPr id="22" name="Graphic 19">
             <a:extLst>
               <a:ext uri="{FF2B5EF4-FFF2-40B4-BE49-F238E27FC236}">
-                <a16:creationId xmlns:a16="http://schemas.microsoft.com/office/drawing/2014/main" xmlns="" id="{258EB2BC-F42B-4177-83EB-F2D2BF76129C}"/>
+                <a16:creationId xmlns="" xmlns:a16="http://schemas.microsoft.com/office/drawing/2014/main" id="{258EB2BC-F42B-4177-83EB-F2D2BF76129C}"/>
               </a:ext>
             </a:extLst>
           </p:cNvPr>
@@ -19462,7 +19463,7 @@
           <p:cNvPr id="24" name="Text Placeholder 2">
             <a:extLst>
               <a:ext uri="{FF2B5EF4-FFF2-40B4-BE49-F238E27FC236}">
-                <a16:creationId xmlns:a16="http://schemas.microsoft.com/office/drawing/2014/main" xmlns="" id="{B971AAD9-2660-4922-9B41-C45976A31C4F}"/>
+                <a16:creationId xmlns="" xmlns:a16="http://schemas.microsoft.com/office/drawing/2014/main" id="{B971AAD9-2660-4922-9B41-C45976A31C4F}"/>
               </a:ext>
             </a:extLst>
           </p:cNvPr>
@@ -19588,7 +19589,7 @@
           <p:cNvPr id="28" name="Text Placeholder 26">
             <a:extLst>
               <a:ext uri="{FF2B5EF4-FFF2-40B4-BE49-F238E27FC236}">
-                <a16:creationId xmlns:a16="http://schemas.microsoft.com/office/drawing/2014/main" xmlns="" id="{D0525F80-1CD7-406E-A2B0-ACB0CD78A32C}"/>
+                <a16:creationId xmlns="" xmlns:a16="http://schemas.microsoft.com/office/drawing/2014/main" id="{D0525F80-1CD7-406E-A2B0-ACB0CD78A32C}"/>
               </a:ext>
             </a:extLst>
           </p:cNvPr>
@@ -19681,7 +19682,7 @@
           <p:cNvPr id="30" name="Text Placeholder 26">
             <a:extLst>
               <a:ext uri="{FF2B5EF4-FFF2-40B4-BE49-F238E27FC236}">
-                <a16:creationId xmlns:a16="http://schemas.microsoft.com/office/drawing/2014/main" xmlns="" id="{527B617A-AB11-44E9-B2E2-53B7F35CD968}"/>
+                <a16:creationId xmlns="" xmlns:a16="http://schemas.microsoft.com/office/drawing/2014/main" id="{527B617A-AB11-44E9-B2E2-53B7F35CD968}"/>
               </a:ext>
             </a:extLst>
           </p:cNvPr>
@@ -19774,7 +19775,7 @@
           <p:cNvPr id="41" name="Graphic 39">
             <a:extLst>
               <a:ext uri="{FF2B5EF4-FFF2-40B4-BE49-F238E27FC236}">
-                <a16:creationId xmlns:a16="http://schemas.microsoft.com/office/drawing/2014/main" xmlns="" id="{F4C9083C-573A-4951-8064-8A2074E45857}"/>
+                <a16:creationId xmlns="" xmlns:a16="http://schemas.microsoft.com/office/drawing/2014/main" id="{F4C9083C-573A-4951-8064-8A2074E45857}"/>
               </a:ext>
             </a:extLst>
           </p:cNvPr>
@@ -19794,7 +19795,7 @@
             <p:cNvPr id="42" name="Freeform: Shape 41">
               <a:extLst>
                 <a:ext uri="{FF2B5EF4-FFF2-40B4-BE49-F238E27FC236}">
-                  <a16:creationId xmlns:a16="http://schemas.microsoft.com/office/drawing/2014/main" xmlns="" id="{E24D028E-B0C2-46BA-B6A7-734B26FEA989}"/>
+                  <a16:creationId xmlns="" xmlns:a16="http://schemas.microsoft.com/office/drawing/2014/main" id="{E24D028E-B0C2-46BA-B6A7-734B26FEA989}"/>
                 </a:ext>
               </a:extLst>
             </p:cNvPr>
@@ -19984,7 +19985,7 @@
             <p:cNvPr id="43" name="Freeform: Shape 42">
               <a:extLst>
                 <a:ext uri="{FF2B5EF4-FFF2-40B4-BE49-F238E27FC236}">
-                  <a16:creationId xmlns:a16="http://schemas.microsoft.com/office/drawing/2014/main" xmlns="" id="{1FD2C3DF-070C-48BB-8EC1-3FE31FCD20DC}"/>
+                  <a16:creationId xmlns="" xmlns:a16="http://schemas.microsoft.com/office/drawing/2014/main" id="{1FD2C3DF-070C-48BB-8EC1-3FE31FCD20DC}"/>
                 </a:ext>
               </a:extLst>
             </p:cNvPr>
@@ -20092,7 +20093,7 @@
             <p:cNvPr id="44" name="Freeform: Shape 43">
               <a:extLst>
                 <a:ext uri="{FF2B5EF4-FFF2-40B4-BE49-F238E27FC236}">
-                  <a16:creationId xmlns:a16="http://schemas.microsoft.com/office/drawing/2014/main" xmlns="" id="{F503CC8C-61AD-4DAB-B26E-509EA44669D4}"/>
+                  <a16:creationId xmlns="" xmlns:a16="http://schemas.microsoft.com/office/drawing/2014/main" id="{F503CC8C-61AD-4DAB-B26E-509EA44669D4}"/>
                 </a:ext>
               </a:extLst>
             </p:cNvPr>
@@ -20202,7 +20203,7 @@
             <p:cNvPr id="45" name="Freeform: Shape 44">
               <a:extLst>
                 <a:ext uri="{FF2B5EF4-FFF2-40B4-BE49-F238E27FC236}">
-                  <a16:creationId xmlns:a16="http://schemas.microsoft.com/office/drawing/2014/main" xmlns="" id="{8BB58BBD-BF4B-44A6-A2C8-AF1BE81D516E}"/>
+                  <a16:creationId xmlns="" xmlns:a16="http://schemas.microsoft.com/office/drawing/2014/main" id="{8BB58BBD-BF4B-44A6-A2C8-AF1BE81D516E}"/>
                 </a:ext>
               </a:extLst>
             </p:cNvPr>
@@ -20312,7 +20313,7 @@
             <p:cNvPr id="46" name="Freeform: Shape 45">
               <a:extLst>
                 <a:ext uri="{FF2B5EF4-FFF2-40B4-BE49-F238E27FC236}">
-                  <a16:creationId xmlns:a16="http://schemas.microsoft.com/office/drawing/2014/main" xmlns="" id="{602EAB3F-89ED-4532-AC15-8D6D0DE40EEB}"/>
+                  <a16:creationId xmlns="" xmlns:a16="http://schemas.microsoft.com/office/drawing/2014/main" id="{602EAB3F-89ED-4532-AC15-8D6D0DE40EEB}"/>
                 </a:ext>
               </a:extLst>
             </p:cNvPr>
@@ -20492,7 +20493,7 @@
             <p:cNvPr id="47" name="Freeform: Shape 46">
               <a:extLst>
                 <a:ext uri="{FF2B5EF4-FFF2-40B4-BE49-F238E27FC236}">
-                  <a16:creationId xmlns:a16="http://schemas.microsoft.com/office/drawing/2014/main" xmlns="" id="{714D3737-C4D1-46DE-A197-29A638CA1F30}"/>
+                  <a16:creationId xmlns="" xmlns:a16="http://schemas.microsoft.com/office/drawing/2014/main" id="{714D3737-C4D1-46DE-A197-29A638CA1F30}"/>
                 </a:ext>
               </a:extLst>
             </p:cNvPr>
@@ -20683,7 +20684,7 @@
           <p:cNvPr id="21" name="Imagen 18">
             <a:extLst>
               <a:ext uri="{FF2B5EF4-FFF2-40B4-BE49-F238E27FC236}">
-                <a16:creationId xmlns:a16="http://schemas.microsoft.com/office/drawing/2014/main" xmlns="" id="{CAA2F7E1-C4D5-49BC-9D8E-F33FED6ACF22}"/>
+                <a16:creationId xmlns="" xmlns:a16="http://schemas.microsoft.com/office/drawing/2014/main" id="{CAA2F7E1-C4D5-49BC-9D8E-F33FED6ACF22}"/>
               </a:ext>
             </a:extLst>
           </p:cNvPr>
@@ -20743,7 +20744,7 @@
           <p:cNvPr id="48" name="Oval 47">
             <a:extLst>
               <a:ext uri="{FF2B5EF4-FFF2-40B4-BE49-F238E27FC236}">
-                <a16:creationId xmlns:a16="http://schemas.microsoft.com/office/drawing/2014/main" xmlns="" id="{6BE8D45D-1E08-4F59-96CC-EA53D7CA6AB0}"/>
+                <a16:creationId xmlns="" xmlns:a16="http://schemas.microsoft.com/office/drawing/2014/main" id="{6BE8D45D-1E08-4F59-96CC-EA53D7CA6AB0}"/>
               </a:ext>
             </a:extLst>
           </p:cNvPr>
@@ -20795,7 +20796,7 @@
           <p:cNvPr id="49" name="Graphic 12">
             <a:extLst>
               <a:ext uri="{FF2B5EF4-FFF2-40B4-BE49-F238E27FC236}">
-                <a16:creationId xmlns:a16="http://schemas.microsoft.com/office/drawing/2014/main" xmlns="" id="{8E968353-82DA-42A2-88B6-AEFCF124AF4E}"/>
+                <a16:creationId xmlns="" xmlns:a16="http://schemas.microsoft.com/office/drawing/2014/main" id="{8E968353-82DA-42A2-88B6-AEFCF124AF4E}"/>
               </a:ext>
             </a:extLst>
           </p:cNvPr>
@@ -20912,7 +20913,7 @@
           <p:cNvPr id="2" name="Title 1">
             <a:extLst>
               <a:ext uri="{FF2B5EF4-FFF2-40B4-BE49-F238E27FC236}">
-                <a16:creationId xmlns:a16="http://schemas.microsoft.com/office/drawing/2014/main" xmlns="" id="{81053F33-9837-4E9F-8D29-24A800D841E9}"/>
+                <a16:creationId xmlns="" xmlns:a16="http://schemas.microsoft.com/office/drawing/2014/main" id="{81053F33-9837-4E9F-8D29-24A800D841E9}"/>
               </a:ext>
             </a:extLst>
           </p:cNvPr>
@@ -20952,7 +20953,7 @@
           <p:cNvPr id="4" name="Date Placeholder 3">
             <a:extLst>
               <a:ext uri="{FF2B5EF4-FFF2-40B4-BE49-F238E27FC236}">
-                <a16:creationId xmlns:a16="http://schemas.microsoft.com/office/drawing/2014/main" xmlns="" id="{DC2A0631-3130-4C36-8E5E-80464B1A62A7}"/>
+                <a16:creationId xmlns="" xmlns:a16="http://schemas.microsoft.com/office/drawing/2014/main" id="{DC2A0631-3130-4C36-8E5E-80464B1A62A7}"/>
               </a:ext>
             </a:extLst>
           </p:cNvPr>
@@ -20980,7 +20981,7 @@
           <p:cNvPr id="5" name="Footer Placeholder 4">
             <a:extLst>
               <a:ext uri="{FF2B5EF4-FFF2-40B4-BE49-F238E27FC236}">
-                <a16:creationId xmlns:a16="http://schemas.microsoft.com/office/drawing/2014/main" xmlns="" id="{79230F82-FE68-4450-98DF-5D29369AEE76}"/>
+                <a16:creationId xmlns="" xmlns:a16="http://schemas.microsoft.com/office/drawing/2014/main" id="{79230F82-FE68-4450-98DF-5D29369AEE76}"/>
               </a:ext>
             </a:extLst>
           </p:cNvPr>
@@ -21017,7 +21018,7 @@
           <p:cNvPr id="6" name="Slide Number Placeholder 5">
             <a:extLst>
               <a:ext uri="{FF2B5EF4-FFF2-40B4-BE49-F238E27FC236}">
-                <a16:creationId xmlns:a16="http://schemas.microsoft.com/office/drawing/2014/main" xmlns="" id="{EE6603C1-6E1A-4E4B-9555-31D84B6BDAD9}"/>
+                <a16:creationId xmlns="" xmlns:a16="http://schemas.microsoft.com/office/drawing/2014/main" id="{EE6603C1-6E1A-4E4B-9555-31D84B6BDAD9}"/>
               </a:ext>
             </a:extLst>
           </p:cNvPr>
@@ -21046,7 +21047,7 @@
           <p:cNvPr id="17" name="Text Placeholder 26">
             <a:extLst>
               <a:ext uri="{FF2B5EF4-FFF2-40B4-BE49-F238E27FC236}">
-                <a16:creationId xmlns:a16="http://schemas.microsoft.com/office/drawing/2014/main" xmlns="" id="{C990C5BD-BC2C-4822-AA4E-446B77052F23}"/>
+                <a16:creationId xmlns="" xmlns:a16="http://schemas.microsoft.com/office/drawing/2014/main" id="{C990C5BD-BC2C-4822-AA4E-446B77052F23}"/>
               </a:ext>
             </a:extLst>
           </p:cNvPr>
@@ -21103,7 +21104,7 @@
           <p:cNvPr id="24" name="Text Placeholder 2">
             <a:extLst>
               <a:ext uri="{FF2B5EF4-FFF2-40B4-BE49-F238E27FC236}">
-                <a16:creationId xmlns:a16="http://schemas.microsoft.com/office/drawing/2014/main" xmlns="" id="{B971AAD9-2660-4922-9B41-C45976A31C4F}"/>
+                <a16:creationId xmlns="" xmlns:a16="http://schemas.microsoft.com/office/drawing/2014/main" id="{B971AAD9-2660-4922-9B41-C45976A31C4F}"/>
               </a:ext>
             </a:extLst>
           </p:cNvPr>
@@ -21229,7 +21230,7 @@
           <p:cNvPr id="30" name="Text Placeholder 26">
             <a:extLst>
               <a:ext uri="{FF2B5EF4-FFF2-40B4-BE49-F238E27FC236}">
-                <a16:creationId xmlns:a16="http://schemas.microsoft.com/office/drawing/2014/main" xmlns="" id="{527B617A-AB11-44E9-B2E2-53B7F35CD968}"/>
+                <a16:creationId xmlns="" xmlns:a16="http://schemas.microsoft.com/office/drawing/2014/main" id="{527B617A-AB11-44E9-B2E2-53B7F35CD968}"/>
               </a:ext>
             </a:extLst>
           </p:cNvPr>
@@ -21323,7 +21324,7 @@
           <p:cNvPr id="23" name="Text Placeholder 2">
             <a:extLst>
               <a:ext uri="{FF2B5EF4-FFF2-40B4-BE49-F238E27FC236}">
-                <a16:creationId xmlns:a16="http://schemas.microsoft.com/office/drawing/2014/main" xmlns="" id="{E9080FED-3BFC-4CCC-8B5A-A2942CA5CF36}"/>
+                <a16:creationId xmlns="" xmlns:a16="http://schemas.microsoft.com/office/drawing/2014/main" id="{E9080FED-3BFC-4CCC-8B5A-A2942CA5CF36}"/>
               </a:ext>
             </a:extLst>
           </p:cNvPr>
@@ -21449,7 +21450,7 @@
           <p:cNvPr id="25" name="Text Placeholder 26">
             <a:extLst>
               <a:ext uri="{FF2B5EF4-FFF2-40B4-BE49-F238E27FC236}">
-                <a16:creationId xmlns:a16="http://schemas.microsoft.com/office/drawing/2014/main" xmlns="" id="{E7EC8229-D712-4FD1-990B-9212FC211A9B}"/>
+                <a16:creationId xmlns="" xmlns:a16="http://schemas.microsoft.com/office/drawing/2014/main" id="{E7EC8229-D712-4FD1-990B-9212FC211A9B}"/>
               </a:ext>
             </a:extLst>
           </p:cNvPr>
@@ -21543,7 +21544,7 @@
           <p:cNvPr id="27" name="Text Placeholder 2">
             <a:extLst>
               <a:ext uri="{FF2B5EF4-FFF2-40B4-BE49-F238E27FC236}">
-                <a16:creationId xmlns:a16="http://schemas.microsoft.com/office/drawing/2014/main" xmlns="" id="{27341020-DCB7-4CC5-BE55-AAAF421822ED}"/>
+                <a16:creationId xmlns="" xmlns:a16="http://schemas.microsoft.com/office/drawing/2014/main" id="{27341020-DCB7-4CC5-BE55-AAAF421822ED}"/>
               </a:ext>
             </a:extLst>
           </p:cNvPr>
@@ -21669,7 +21670,7 @@
           <p:cNvPr id="29" name="Text Placeholder 26">
             <a:extLst>
               <a:ext uri="{FF2B5EF4-FFF2-40B4-BE49-F238E27FC236}">
-                <a16:creationId xmlns:a16="http://schemas.microsoft.com/office/drawing/2014/main" xmlns="" id="{B1896019-AE20-47E2-AA66-ED9D16B2DAF7}"/>
+                <a16:creationId xmlns="" xmlns:a16="http://schemas.microsoft.com/office/drawing/2014/main" id="{B1896019-AE20-47E2-AA66-ED9D16B2DAF7}"/>
               </a:ext>
             </a:extLst>
           </p:cNvPr>
@@ -21763,7 +21764,7 @@
           <p:cNvPr id="32" name="Text Placeholder 2">
             <a:extLst>
               <a:ext uri="{FF2B5EF4-FFF2-40B4-BE49-F238E27FC236}">
-                <a16:creationId xmlns:a16="http://schemas.microsoft.com/office/drawing/2014/main" xmlns="" id="{212C49D2-92E0-4567-8BD4-9B8FC0536701}"/>
+                <a16:creationId xmlns="" xmlns:a16="http://schemas.microsoft.com/office/drawing/2014/main" id="{212C49D2-92E0-4567-8BD4-9B8FC0536701}"/>
               </a:ext>
             </a:extLst>
           </p:cNvPr>
@@ -21889,7 +21890,7 @@
           <p:cNvPr id="33" name="Text Placeholder 26">
             <a:extLst>
               <a:ext uri="{FF2B5EF4-FFF2-40B4-BE49-F238E27FC236}">
-                <a16:creationId xmlns:a16="http://schemas.microsoft.com/office/drawing/2014/main" xmlns="" id="{6B5DA211-72E1-4B00-AA61-980CE5A34565}"/>
+                <a16:creationId xmlns="" xmlns:a16="http://schemas.microsoft.com/office/drawing/2014/main" id="{6B5DA211-72E1-4B00-AA61-980CE5A34565}"/>
               </a:ext>
             </a:extLst>
           </p:cNvPr>
@@ -21983,7 +21984,7 @@
           <p:cNvPr id="35" name="Text Placeholder 2">
             <a:extLst>
               <a:ext uri="{FF2B5EF4-FFF2-40B4-BE49-F238E27FC236}">
-                <a16:creationId xmlns:a16="http://schemas.microsoft.com/office/drawing/2014/main" xmlns="" id="{A7CF7C63-619A-46EE-AF36-FCA26441A064}"/>
+                <a16:creationId xmlns="" xmlns:a16="http://schemas.microsoft.com/office/drawing/2014/main" id="{A7CF7C63-619A-46EE-AF36-FCA26441A064}"/>
               </a:ext>
             </a:extLst>
           </p:cNvPr>
@@ -22109,7 +22110,7 @@
           <p:cNvPr id="36" name="Text Placeholder 26">
             <a:extLst>
               <a:ext uri="{FF2B5EF4-FFF2-40B4-BE49-F238E27FC236}">
-                <a16:creationId xmlns:a16="http://schemas.microsoft.com/office/drawing/2014/main" xmlns="" id="{92E0EA61-C10D-4760-B03F-F27BCF1FC24C}"/>
+                <a16:creationId xmlns="" xmlns:a16="http://schemas.microsoft.com/office/drawing/2014/main" id="{92E0EA61-C10D-4760-B03F-F27BCF1FC24C}"/>
               </a:ext>
             </a:extLst>
           </p:cNvPr>
@@ -22203,7 +22204,7 @@
           <p:cNvPr id="38" name="Text Placeholder 2">
             <a:extLst>
               <a:ext uri="{FF2B5EF4-FFF2-40B4-BE49-F238E27FC236}">
-                <a16:creationId xmlns:a16="http://schemas.microsoft.com/office/drawing/2014/main" xmlns="" id="{1A3A14FA-D9E9-4000-B30C-14CADBFE48F6}"/>
+                <a16:creationId xmlns="" xmlns:a16="http://schemas.microsoft.com/office/drawing/2014/main" id="{1A3A14FA-D9E9-4000-B30C-14CADBFE48F6}"/>
               </a:ext>
             </a:extLst>
           </p:cNvPr>
@@ -22329,7 +22330,7 @@
           <p:cNvPr id="39" name="Text Placeholder 26">
             <a:extLst>
               <a:ext uri="{FF2B5EF4-FFF2-40B4-BE49-F238E27FC236}">
-                <a16:creationId xmlns:a16="http://schemas.microsoft.com/office/drawing/2014/main" xmlns="" id="{0FBCB607-92E0-4206-871B-10CAEB3377B3}"/>
+                <a16:creationId xmlns="" xmlns:a16="http://schemas.microsoft.com/office/drawing/2014/main" id="{0FBCB607-92E0-4206-871B-10CAEB3377B3}"/>
               </a:ext>
             </a:extLst>
           </p:cNvPr>
@@ -22423,7 +22424,7 @@
           <p:cNvPr id="19" name="Chart Placeholder 18">
             <a:extLst>
               <a:ext uri="{FF2B5EF4-FFF2-40B4-BE49-F238E27FC236}">
-                <a16:creationId xmlns:a16="http://schemas.microsoft.com/office/drawing/2014/main" xmlns="" id="{08CD548A-F4DA-41C7-BC55-620C696D5A6A}"/>
+                <a16:creationId xmlns="" xmlns:a16="http://schemas.microsoft.com/office/drawing/2014/main" id="{08CD548A-F4DA-41C7-BC55-620C696D5A6A}"/>
               </a:ext>
             </a:extLst>
           </p:cNvPr>
@@ -22471,7 +22472,7 @@
           <p:cNvPr id="41" name="Graphic 39">
             <a:extLst>
               <a:ext uri="{FF2B5EF4-FFF2-40B4-BE49-F238E27FC236}">
-                <a16:creationId xmlns:a16="http://schemas.microsoft.com/office/drawing/2014/main" xmlns="" id="{D0A213E0-4DC9-4F6A-98B8-21DE9AE2D9B0}"/>
+                <a16:creationId xmlns="" xmlns:a16="http://schemas.microsoft.com/office/drawing/2014/main" id="{D0A213E0-4DC9-4F6A-98B8-21DE9AE2D9B0}"/>
               </a:ext>
             </a:extLst>
           </p:cNvPr>
@@ -22491,7 +22492,7 @@
             <p:cNvPr id="42" name="Freeform: Shape 41">
               <a:extLst>
                 <a:ext uri="{FF2B5EF4-FFF2-40B4-BE49-F238E27FC236}">
-                  <a16:creationId xmlns:a16="http://schemas.microsoft.com/office/drawing/2014/main" xmlns="" id="{24312820-32BB-4DFC-B775-2031DE03F33E}"/>
+                  <a16:creationId xmlns="" xmlns:a16="http://schemas.microsoft.com/office/drawing/2014/main" id="{24312820-32BB-4DFC-B775-2031DE03F33E}"/>
                 </a:ext>
               </a:extLst>
             </p:cNvPr>
@@ -22681,7 +22682,7 @@
             <p:cNvPr id="43" name="Freeform: Shape 42">
               <a:extLst>
                 <a:ext uri="{FF2B5EF4-FFF2-40B4-BE49-F238E27FC236}">
-                  <a16:creationId xmlns:a16="http://schemas.microsoft.com/office/drawing/2014/main" xmlns="" id="{F9B4581F-B122-40B8-BE37-64894A713B38}"/>
+                  <a16:creationId xmlns="" xmlns:a16="http://schemas.microsoft.com/office/drawing/2014/main" id="{F9B4581F-B122-40B8-BE37-64894A713B38}"/>
                 </a:ext>
               </a:extLst>
             </p:cNvPr>
@@ -22789,7 +22790,7 @@
             <p:cNvPr id="44" name="Freeform: Shape 43">
               <a:extLst>
                 <a:ext uri="{FF2B5EF4-FFF2-40B4-BE49-F238E27FC236}">
-                  <a16:creationId xmlns:a16="http://schemas.microsoft.com/office/drawing/2014/main" xmlns="" id="{C7CF8C75-A610-43BA-923F-335A6051357D}"/>
+                  <a16:creationId xmlns="" xmlns:a16="http://schemas.microsoft.com/office/drawing/2014/main" id="{C7CF8C75-A610-43BA-923F-335A6051357D}"/>
                 </a:ext>
               </a:extLst>
             </p:cNvPr>
@@ -22897,7 +22898,7 @@
             <p:cNvPr id="45" name="Freeform: Shape 44">
               <a:extLst>
                 <a:ext uri="{FF2B5EF4-FFF2-40B4-BE49-F238E27FC236}">
-                  <a16:creationId xmlns:a16="http://schemas.microsoft.com/office/drawing/2014/main" xmlns="" id="{56793F9B-5B71-414E-9CB2-2B76F8308871}"/>
+                  <a16:creationId xmlns="" xmlns:a16="http://schemas.microsoft.com/office/drawing/2014/main" id="{56793F9B-5B71-414E-9CB2-2B76F8308871}"/>
                 </a:ext>
               </a:extLst>
             </p:cNvPr>
@@ -23005,7 +23006,7 @@
             <p:cNvPr id="46" name="Freeform: Shape 45">
               <a:extLst>
                 <a:ext uri="{FF2B5EF4-FFF2-40B4-BE49-F238E27FC236}">
-                  <a16:creationId xmlns:a16="http://schemas.microsoft.com/office/drawing/2014/main" xmlns="" id="{9807DE94-0E8D-4E1B-A7D2-E0F91AF2E54C}"/>
+                  <a16:creationId xmlns="" xmlns:a16="http://schemas.microsoft.com/office/drawing/2014/main" id="{9807DE94-0E8D-4E1B-A7D2-E0F91AF2E54C}"/>
                 </a:ext>
               </a:extLst>
             </p:cNvPr>
@@ -23185,7 +23186,7 @@
             <p:cNvPr id="47" name="Freeform: Shape 46">
               <a:extLst>
                 <a:ext uri="{FF2B5EF4-FFF2-40B4-BE49-F238E27FC236}">
-                  <a16:creationId xmlns:a16="http://schemas.microsoft.com/office/drawing/2014/main" xmlns="" id="{7BC592BA-C191-49B5-8F41-8E14CFFDAC40}"/>
+                  <a16:creationId xmlns="" xmlns:a16="http://schemas.microsoft.com/office/drawing/2014/main" id="{7BC592BA-C191-49B5-8F41-8E14CFFDAC40}"/>
                 </a:ext>
               </a:extLst>
             </p:cNvPr>
@@ -23376,7 +23377,7 @@
           <p:cNvPr id="3" name="Graphic 50">
             <a:extLst>
               <a:ext uri="{FF2B5EF4-FFF2-40B4-BE49-F238E27FC236}">
-                <a16:creationId xmlns:a16="http://schemas.microsoft.com/office/drawing/2014/main" xmlns="" id="{33AA43FA-C2DC-406C-BFE6-A2A804112236}"/>
+                <a16:creationId xmlns="" xmlns:a16="http://schemas.microsoft.com/office/drawing/2014/main" id="{33AA43FA-C2DC-406C-BFE6-A2A804112236}"/>
               </a:ext>
             </a:extLst>
           </p:cNvPr>
@@ -23542,7 +23543,7 @@
           <p:cNvPr id="52" name="Oval 51">
             <a:extLst>
               <a:ext uri="{FF2B5EF4-FFF2-40B4-BE49-F238E27FC236}">
-                <a16:creationId xmlns:a16="http://schemas.microsoft.com/office/drawing/2014/main" xmlns="" id="{F21AF1E2-466C-487E-86AF-CA6FFFCA2720}"/>
+                <a16:creationId xmlns="" xmlns:a16="http://schemas.microsoft.com/office/drawing/2014/main" id="{F21AF1E2-466C-487E-86AF-CA6FFFCA2720}"/>
               </a:ext>
             </a:extLst>
           </p:cNvPr>
@@ -23594,7 +23595,7 @@
           <p:cNvPr id="53" name="Graphic 12">
             <a:extLst>
               <a:ext uri="{FF2B5EF4-FFF2-40B4-BE49-F238E27FC236}">
-                <a16:creationId xmlns:a16="http://schemas.microsoft.com/office/drawing/2014/main" xmlns="" id="{531F1BC1-79BD-45BA-B27E-7A2C62A65EC9}"/>
+                <a16:creationId xmlns="" xmlns:a16="http://schemas.microsoft.com/office/drawing/2014/main" id="{531F1BC1-79BD-45BA-B27E-7A2C62A65EC9}"/>
               </a:ext>
             </a:extLst>
           </p:cNvPr>
@@ -23711,7 +23712,7 @@
           <p:cNvPr id="2" name="Title 1">
             <a:extLst>
               <a:ext uri="{FF2B5EF4-FFF2-40B4-BE49-F238E27FC236}">
-                <a16:creationId xmlns:a16="http://schemas.microsoft.com/office/drawing/2014/main" xmlns="" id="{81053F33-9837-4E9F-8D29-24A800D841E9}"/>
+                <a16:creationId xmlns="" xmlns:a16="http://schemas.microsoft.com/office/drawing/2014/main" id="{81053F33-9837-4E9F-8D29-24A800D841E9}"/>
               </a:ext>
             </a:extLst>
           </p:cNvPr>
@@ -23751,7 +23752,7 @@
           <p:cNvPr id="4" name="Date Placeholder 3">
             <a:extLst>
               <a:ext uri="{FF2B5EF4-FFF2-40B4-BE49-F238E27FC236}">
-                <a16:creationId xmlns:a16="http://schemas.microsoft.com/office/drawing/2014/main" xmlns="" id="{DC2A0631-3130-4C36-8E5E-80464B1A62A7}"/>
+                <a16:creationId xmlns="" xmlns:a16="http://schemas.microsoft.com/office/drawing/2014/main" id="{DC2A0631-3130-4C36-8E5E-80464B1A62A7}"/>
               </a:ext>
             </a:extLst>
           </p:cNvPr>
@@ -23779,7 +23780,7 @@
           <p:cNvPr id="5" name="Footer Placeholder 4">
             <a:extLst>
               <a:ext uri="{FF2B5EF4-FFF2-40B4-BE49-F238E27FC236}">
-                <a16:creationId xmlns:a16="http://schemas.microsoft.com/office/drawing/2014/main" xmlns="" id="{79230F82-FE68-4450-98DF-5D29369AEE76}"/>
+                <a16:creationId xmlns="" xmlns:a16="http://schemas.microsoft.com/office/drawing/2014/main" id="{79230F82-FE68-4450-98DF-5D29369AEE76}"/>
               </a:ext>
             </a:extLst>
           </p:cNvPr>
@@ -23816,7 +23817,7 @@
           <p:cNvPr id="6" name="Slide Number Placeholder 5">
             <a:extLst>
               <a:ext uri="{FF2B5EF4-FFF2-40B4-BE49-F238E27FC236}">
-                <a16:creationId xmlns:a16="http://schemas.microsoft.com/office/drawing/2014/main" xmlns="" id="{EE6603C1-6E1A-4E4B-9555-31D84B6BDAD9}"/>
+                <a16:creationId xmlns="" xmlns:a16="http://schemas.microsoft.com/office/drawing/2014/main" id="{EE6603C1-6E1A-4E4B-9555-31D84B6BDAD9}"/>
               </a:ext>
             </a:extLst>
           </p:cNvPr>
@@ -23845,7 +23846,7 @@
           <p:cNvPr id="17" name="Text Placeholder 26">
             <a:extLst>
               <a:ext uri="{FF2B5EF4-FFF2-40B4-BE49-F238E27FC236}">
-                <a16:creationId xmlns:a16="http://schemas.microsoft.com/office/drawing/2014/main" xmlns="" id="{C990C5BD-BC2C-4822-AA4E-446B77052F23}"/>
+                <a16:creationId xmlns="" xmlns:a16="http://schemas.microsoft.com/office/drawing/2014/main" id="{C990C5BD-BC2C-4822-AA4E-446B77052F23}"/>
               </a:ext>
             </a:extLst>
           </p:cNvPr>
@@ -23902,7 +23903,7 @@
           <p:cNvPr id="18" name="Table Placeholder 17">
             <a:extLst>
               <a:ext uri="{FF2B5EF4-FFF2-40B4-BE49-F238E27FC236}">
-                <a16:creationId xmlns:a16="http://schemas.microsoft.com/office/drawing/2014/main" xmlns="" id="{3AF64257-E00C-4FE5-925B-A78911D1D2B9}"/>
+                <a16:creationId xmlns="" xmlns:a16="http://schemas.microsoft.com/office/drawing/2014/main" id="{3AF64257-E00C-4FE5-925B-A78911D1D2B9}"/>
               </a:ext>
             </a:extLst>
           </p:cNvPr>
@@ -23950,7 +23951,7 @@
           <p:cNvPr id="45" name="Graphic 39">
             <a:extLst>
               <a:ext uri="{FF2B5EF4-FFF2-40B4-BE49-F238E27FC236}">
-                <a16:creationId xmlns:a16="http://schemas.microsoft.com/office/drawing/2014/main" xmlns="" id="{2B29CFAD-7DFA-43C8-BC78-F666303C4A65}"/>
+                <a16:creationId xmlns="" xmlns:a16="http://schemas.microsoft.com/office/drawing/2014/main" id="{2B29CFAD-7DFA-43C8-BC78-F666303C4A65}"/>
               </a:ext>
             </a:extLst>
           </p:cNvPr>
@@ -23970,7 +23971,7 @@
             <p:cNvPr id="46" name="Freeform: Shape 45">
               <a:extLst>
                 <a:ext uri="{FF2B5EF4-FFF2-40B4-BE49-F238E27FC236}">
-                  <a16:creationId xmlns:a16="http://schemas.microsoft.com/office/drawing/2014/main" xmlns="" id="{7709766F-07C2-47E0-94AE-482595B63D17}"/>
+                  <a16:creationId xmlns="" xmlns:a16="http://schemas.microsoft.com/office/drawing/2014/main" id="{7709766F-07C2-47E0-94AE-482595B63D17}"/>
                 </a:ext>
               </a:extLst>
             </p:cNvPr>
@@ -24160,7 +24161,7 @@
             <p:cNvPr id="47" name="Freeform: Shape 46">
               <a:extLst>
                 <a:ext uri="{FF2B5EF4-FFF2-40B4-BE49-F238E27FC236}">
-                  <a16:creationId xmlns:a16="http://schemas.microsoft.com/office/drawing/2014/main" xmlns="" id="{29F02ED7-2803-4FC7-8D17-DB9AF81B2257}"/>
+                  <a16:creationId xmlns="" xmlns:a16="http://schemas.microsoft.com/office/drawing/2014/main" id="{29F02ED7-2803-4FC7-8D17-DB9AF81B2257}"/>
                 </a:ext>
               </a:extLst>
             </p:cNvPr>
@@ -24268,7 +24269,7 @@
             <p:cNvPr id="48" name="Freeform: Shape 47">
               <a:extLst>
                 <a:ext uri="{FF2B5EF4-FFF2-40B4-BE49-F238E27FC236}">
-                  <a16:creationId xmlns:a16="http://schemas.microsoft.com/office/drawing/2014/main" xmlns="" id="{6715C276-3245-4E87-976F-10DC35AF0E89}"/>
+                  <a16:creationId xmlns="" xmlns:a16="http://schemas.microsoft.com/office/drawing/2014/main" id="{6715C276-3245-4E87-976F-10DC35AF0E89}"/>
                 </a:ext>
               </a:extLst>
             </p:cNvPr>
@@ -24376,7 +24377,7 @@
             <p:cNvPr id="49" name="Freeform: Shape 48">
               <a:extLst>
                 <a:ext uri="{FF2B5EF4-FFF2-40B4-BE49-F238E27FC236}">
-                  <a16:creationId xmlns:a16="http://schemas.microsoft.com/office/drawing/2014/main" xmlns="" id="{4D4F9402-D548-4465-B31D-5C89E49D8F2D}"/>
+                  <a16:creationId xmlns="" xmlns:a16="http://schemas.microsoft.com/office/drawing/2014/main" id="{4D4F9402-D548-4465-B31D-5C89E49D8F2D}"/>
                 </a:ext>
               </a:extLst>
             </p:cNvPr>
@@ -24484,7 +24485,7 @@
             <p:cNvPr id="50" name="Freeform: Shape 49">
               <a:extLst>
                 <a:ext uri="{FF2B5EF4-FFF2-40B4-BE49-F238E27FC236}">
-                  <a16:creationId xmlns:a16="http://schemas.microsoft.com/office/drawing/2014/main" xmlns="" id="{64C16800-96DF-4B5C-B15B-EB27E1475EB3}"/>
+                  <a16:creationId xmlns="" xmlns:a16="http://schemas.microsoft.com/office/drawing/2014/main" id="{64C16800-96DF-4B5C-B15B-EB27E1475EB3}"/>
                 </a:ext>
               </a:extLst>
             </p:cNvPr>
@@ -24664,7 +24665,7 @@
             <p:cNvPr id="51" name="Freeform: Shape 50">
               <a:extLst>
                 <a:ext uri="{FF2B5EF4-FFF2-40B4-BE49-F238E27FC236}">
-                  <a16:creationId xmlns:a16="http://schemas.microsoft.com/office/drawing/2014/main" xmlns="" id="{AE9DBF7F-0A02-4C85-A28D-3C88C66B3486}"/>
+                  <a16:creationId xmlns="" xmlns:a16="http://schemas.microsoft.com/office/drawing/2014/main" id="{AE9DBF7F-0A02-4C85-A28D-3C88C66B3486}"/>
                 </a:ext>
               </a:extLst>
             </p:cNvPr>
@@ -24855,7 +24856,7 @@
           <p:cNvPr id="3" name="Graphic 54">
             <a:extLst>
               <a:ext uri="{FF2B5EF4-FFF2-40B4-BE49-F238E27FC236}">
-                <a16:creationId xmlns:a16="http://schemas.microsoft.com/office/drawing/2014/main" xmlns="" id="{A1820133-6B1B-4297-8A79-2E89B2C7199B}"/>
+                <a16:creationId xmlns="" xmlns:a16="http://schemas.microsoft.com/office/drawing/2014/main" id="{A1820133-6B1B-4297-8A79-2E89B2C7199B}"/>
               </a:ext>
             </a:extLst>
           </p:cNvPr>
@@ -25021,7 +25022,7 @@
           <p:cNvPr id="51" name="Picture Placeholder 50">
             <a:extLst>
               <a:ext uri="{FF2B5EF4-FFF2-40B4-BE49-F238E27FC236}">
-                <a16:creationId xmlns:a16="http://schemas.microsoft.com/office/drawing/2014/main" xmlns="" id="{3767FEE9-DC75-4465-BA6B-06E00CF6A27B}"/>
+                <a16:creationId xmlns="" xmlns:a16="http://schemas.microsoft.com/office/drawing/2014/main" id="{3767FEE9-DC75-4465-BA6B-06E00CF6A27B}"/>
               </a:ext>
             </a:extLst>
           </p:cNvPr>
@@ -25352,7 +25353,7 @@
           <p:cNvPr id="46" name="Freeform: Shape 45">
             <a:extLst>
               <a:ext uri="{FF2B5EF4-FFF2-40B4-BE49-F238E27FC236}">
-                <a16:creationId xmlns:a16="http://schemas.microsoft.com/office/drawing/2014/main" xmlns="" id="{3A0902BC-58E0-4395-9D80-6CF5CA0FAAB0}"/>
+                <a16:creationId xmlns="" xmlns:a16="http://schemas.microsoft.com/office/drawing/2014/main" id="{3A0902BC-58E0-4395-9D80-6CF5CA0FAAB0}"/>
               </a:ext>
             </a:extLst>
           </p:cNvPr>
@@ -25468,7 +25469,7 @@
           <p:cNvPr id="47" name="Freeform: Shape 46">
             <a:extLst>
               <a:ext uri="{FF2B5EF4-FFF2-40B4-BE49-F238E27FC236}">
-                <a16:creationId xmlns:a16="http://schemas.microsoft.com/office/drawing/2014/main" xmlns="" id="{5DCE3DA5-C000-4DAD-8FCD-9A285AB48C83}"/>
+                <a16:creationId xmlns="" xmlns:a16="http://schemas.microsoft.com/office/drawing/2014/main" id="{5DCE3DA5-C000-4DAD-8FCD-9A285AB48C83}"/>
               </a:ext>
             </a:extLst>
           </p:cNvPr>
@@ -25576,7 +25577,7 @@
           <p:cNvPr id="45" name="Freeform: Shape 44">
             <a:extLst>
               <a:ext uri="{FF2B5EF4-FFF2-40B4-BE49-F238E27FC236}">
-                <a16:creationId xmlns:a16="http://schemas.microsoft.com/office/drawing/2014/main" xmlns="" id="{EAE88C29-9AC8-4A6D-9141-98B2210C7466}"/>
+                <a16:creationId xmlns="" xmlns:a16="http://schemas.microsoft.com/office/drawing/2014/main" id="{EAE88C29-9AC8-4A6D-9141-98B2210C7466}"/>
               </a:ext>
             </a:extLst>
           </p:cNvPr>
@@ -25684,7 +25685,7 @@
           <p:cNvPr id="24" name="Oval 23">
             <a:extLst>
               <a:ext uri="{FF2B5EF4-FFF2-40B4-BE49-F238E27FC236}">
-                <a16:creationId xmlns:a16="http://schemas.microsoft.com/office/drawing/2014/main" xmlns="" id="{7F8CA5B8-0BAD-4554-87FE-E0910E6CD5C5}"/>
+                <a16:creationId xmlns="" xmlns:a16="http://schemas.microsoft.com/office/drawing/2014/main" id="{7F8CA5B8-0BAD-4554-87FE-E0910E6CD5C5}"/>
               </a:ext>
             </a:extLst>
           </p:cNvPr>
@@ -25736,7 +25737,7 @@
           <p:cNvPr id="25" name="Graphic 12">
             <a:extLst>
               <a:ext uri="{FF2B5EF4-FFF2-40B4-BE49-F238E27FC236}">
-                <a16:creationId xmlns:a16="http://schemas.microsoft.com/office/drawing/2014/main" xmlns="" id="{12CBB0CF-5FCC-4507-BD7B-C02386D2A23C}"/>
+                <a16:creationId xmlns="" xmlns:a16="http://schemas.microsoft.com/office/drawing/2014/main" id="{12CBB0CF-5FCC-4507-BD7B-C02386D2A23C}"/>
               </a:ext>
             </a:extLst>
           </p:cNvPr>
@@ -25853,7 +25854,7 @@
           <p:cNvPr id="2" name="Title 1">
             <a:extLst>
               <a:ext uri="{FF2B5EF4-FFF2-40B4-BE49-F238E27FC236}">
-                <a16:creationId xmlns:a16="http://schemas.microsoft.com/office/drawing/2014/main" xmlns="" id="{0B9CB2BB-1ED9-489E-8AC7-2A8D8459E388}"/>
+                <a16:creationId xmlns="" xmlns:a16="http://schemas.microsoft.com/office/drawing/2014/main" id="{0B9CB2BB-1ED9-489E-8AC7-2A8D8459E388}"/>
               </a:ext>
             </a:extLst>
           </p:cNvPr>
@@ -25895,7 +25896,7 @@
           <p:cNvPr id="6" name="Footer Placeholder 5">
             <a:extLst>
               <a:ext uri="{FF2B5EF4-FFF2-40B4-BE49-F238E27FC236}">
-                <a16:creationId xmlns:a16="http://schemas.microsoft.com/office/drawing/2014/main" xmlns="" id="{FC208BCD-3B7E-49DF-8BF5-68AE9DD7D786}"/>
+                <a16:creationId xmlns="" xmlns:a16="http://schemas.microsoft.com/office/drawing/2014/main" id="{FC208BCD-3B7E-49DF-8BF5-68AE9DD7D786}"/>
               </a:ext>
             </a:extLst>
           </p:cNvPr>
@@ -25932,7 +25933,7 @@
           <p:cNvPr id="7" name="Slide Number Placeholder 6">
             <a:extLst>
               <a:ext uri="{FF2B5EF4-FFF2-40B4-BE49-F238E27FC236}">
-                <a16:creationId xmlns:a16="http://schemas.microsoft.com/office/drawing/2014/main" xmlns="" id="{B41517C1-CBB7-46B0-99AA-8512104026B7}"/>
+                <a16:creationId xmlns="" xmlns:a16="http://schemas.microsoft.com/office/drawing/2014/main" id="{B41517C1-CBB7-46B0-99AA-8512104026B7}"/>
               </a:ext>
             </a:extLst>
           </p:cNvPr>
@@ -25961,7 +25962,7 @@
           <p:cNvPr id="21" name="Text Placeholder 26">
             <a:extLst>
               <a:ext uri="{FF2B5EF4-FFF2-40B4-BE49-F238E27FC236}">
-                <a16:creationId xmlns:a16="http://schemas.microsoft.com/office/drawing/2014/main" xmlns="" id="{78B29DA7-7E72-4576-8F68-91B70D11C8FD}"/>
+                <a16:creationId xmlns="" xmlns:a16="http://schemas.microsoft.com/office/drawing/2014/main" id="{78B29DA7-7E72-4576-8F68-91B70D11C8FD}"/>
               </a:ext>
             </a:extLst>
           </p:cNvPr>
@@ -26018,7 +26019,7 @@
           <p:cNvPr id="22" name="Graphic 21">
             <a:extLst>
               <a:ext uri="{FF2B5EF4-FFF2-40B4-BE49-F238E27FC236}">
-                <a16:creationId xmlns:a16="http://schemas.microsoft.com/office/drawing/2014/main" xmlns="" id="{B091E01B-B80B-4194-AC2B-41043EC597D2}"/>
+                <a16:creationId xmlns="" xmlns:a16="http://schemas.microsoft.com/office/drawing/2014/main" id="{B091E01B-B80B-4194-AC2B-41043EC597D2}"/>
               </a:ext>
             </a:extLst>
           </p:cNvPr>
@@ -26031,7 +26032,7 @@
           <a:blip r:embed="rId2">
             <a:extLst>
               <a:ext uri="{96DAC541-7B7A-43D3-8B79-37D633B846F1}">
-                <asvg:svgBlip xmlns:asvg="http://schemas.microsoft.com/office/drawing/2016/SVG/main" xmlns="" r:embed="rId3"/>
+                <asvg:svgBlip xmlns="" xmlns:asvg="http://schemas.microsoft.com/office/drawing/2016/SVG/main" r:embed="rId3"/>
               </a:ext>
             </a:extLst>
           </a:blip>
@@ -26054,7 +26055,7 @@
           <p:cNvPr id="40" name="Freeform: Shape 39">
             <a:extLst>
               <a:ext uri="{FF2B5EF4-FFF2-40B4-BE49-F238E27FC236}">
-                <a16:creationId xmlns:a16="http://schemas.microsoft.com/office/drawing/2014/main" xmlns="" id="{FBE26926-54A6-49D3-95EA-F31F133A0E3B}"/>
+                <a16:creationId xmlns="" xmlns:a16="http://schemas.microsoft.com/office/drawing/2014/main" id="{FBE26926-54A6-49D3-95EA-F31F133A0E3B}"/>
               </a:ext>
             </a:extLst>
           </p:cNvPr>
@@ -26149,7 +26150,7 @@
           <p:cNvPr id="41" name="Freeform: Shape 40">
             <a:extLst>
               <a:ext uri="{FF2B5EF4-FFF2-40B4-BE49-F238E27FC236}">
-                <a16:creationId xmlns:a16="http://schemas.microsoft.com/office/drawing/2014/main" xmlns="" id="{C3AFCA09-1411-4603-AEED-DBD79C4BE2CA}"/>
+                <a16:creationId xmlns="" xmlns:a16="http://schemas.microsoft.com/office/drawing/2014/main" id="{C3AFCA09-1411-4603-AEED-DBD79C4BE2CA}"/>
               </a:ext>
             </a:extLst>
           </p:cNvPr>
@@ -26294,7 +26295,7 @@
           <p:cNvPr id="42" name="Freeform: Shape 41">
             <a:extLst>
               <a:ext uri="{FF2B5EF4-FFF2-40B4-BE49-F238E27FC236}">
-                <a16:creationId xmlns:a16="http://schemas.microsoft.com/office/drawing/2014/main" xmlns="" id="{7E4E0103-B430-4F31-B26F-21E197A41135}"/>
+                <a16:creationId xmlns="" xmlns:a16="http://schemas.microsoft.com/office/drawing/2014/main" id="{7E4E0103-B430-4F31-B26F-21E197A41135}"/>
               </a:ext>
             </a:extLst>
           </p:cNvPr>
@@ -26512,7 +26513,7 @@
           <p:cNvPr id="44" name="Freeform: Shape 43">
             <a:extLst>
               <a:ext uri="{FF2B5EF4-FFF2-40B4-BE49-F238E27FC236}">
-                <a16:creationId xmlns:a16="http://schemas.microsoft.com/office/drawing/2014/main" xmlns="" id="{65525C01-736F-4E07-B20A-72ABE0F38C9F}"/>
+                <a16:creationId xmlns="" xmlns:a16="http://schemas.microsoft.com/office/drawing/2014/main" id="{65525C01-736F-4E07-B20A-72ABE0F38C9F}"/>
               </a:ext>
             </a:extLst>
           </p:cNvPr>
@@ -26722,7 +26723,7 @@
           <p:cNvPr id="48" name="Freeform: Shape 47">
             <a:extLst>
               <a:ext uri="{FF2B5EF4-FFF2-40B4-BE49-F238E27FC236}">
-                <a16:creationId xmlns:a16="http://schemas.microsoft.com/office/drawing/2014/main" xmlns="" id="{49472789-B79C-464F-9D88-E51F8B5062D3}"/>
+                <a16:creationId xmlns="" xmlns:a16="http://schemas.microsoft.com/office/drawing/2014/main" id="{49472789-B79C-464F-9D88-E51F8B5062D3}"/>
               </a:ext>
             </a:extLst>
           </p:cNvPr>
@@ -26986,7 +26987,7 @@
           <p:cNvPr id="25" name="Oval 24">
             <a:extLst>
               <a:ext uri="{FF2B5EF4-FFF2-40B4-BE49-F238E27FC236}">
-                <a16:creationId xmlns:a16="http://schemas.microsoft.com/office/drawing/2014/main" xmlns="" id="{DD823940-1850-4484-BDCE-3D9B898D6787}"/>
+                <a16:creationId xmlns="" xmlns:a16="http://schemas.microsoft.com/office/drawing/2014/main" id="{DD823940-1850-4484-BDCE-3D9B898D6787}"/>
               </a:ext>
             </a:extLst>
           </p:cNvPr>
@@ -27038,7 +27039,7 @@
           <p:cNvPr id="26" name="Graphic 12">
             <a:extLst>
               <a:ext uri="{FF2B5EF4-FFF2-40B4-BE49-F238E27FC236}">
-                <a16:creationId xmlns:a16="http://schemas.microsoft.com/office/drawing/2014/main" xmlns="" id="{6FFA8582-48C8-4154-ACF0-5F6412FAAE0C}"/>
+                <a16:creationId xmlns="" xmlns:a16="http://schemas.microsoft.com/office/drawing/2014/main" id="{6FFA8582-48C8-4154-ACF0-5F6412FAAE0C}"/>
               </a:ext>
             </a:extLst>
           </p:cNvPr>
@@ -27155,7 +27156,7 @@
           <p:cNvPr id="8" name="Media Placeholder 7">
             <a:extLst>
               <a:ext uri="{FF2B5EF4-FFF2-40B4-BE49-F238E27FC236}">
-                <a16:creationId xmlns:a16="http://schemas.microsoft.com/office/drawing/2014/main" xmlns="" id="{FBCC61A6-FEB7-4CD2-9686-FB5F1EB66A10}"/>
+                <a16:creationId xmlns="" xmlns:a16="http://schemas.microsoft.com/office/drawing/2014/main" id="{FBCC61A6-FEB7-4CD2-9686-FB5F1EB66A10}"/>
               </a:ext>
             </a:extLst>
           </p:cNvPr>
@@ -27203,7 +27204,7 @@
           <p:cNvPr id="6" name="Footer Placeholder 5">
             <a:extLst>
               <a:ext uri="{FF2B5EF4-FFF2-40B4-BE49-F238E27FC236}">
-                <a16:creationId xmlns:a16="http://schemas.microsoft.com/office/drawing/2014/main" xmlns="" id="{FC208BCD-3B7E-49DF-8BF5-68AE9DD7D786}"/>
+                <a16:creationId xmlns="" xmlns:a16="http://schemas.microsoft.com/office/drawing/2014/main" id="{FC208BCD-3B7E-49DF-8BF5-68AE9DD7D786}"/>
               </a:ext>
             </a:extLst>
           </p:cNvPr>
@@ -27240,7 +27241,7 @@
           <p:cNvPr id="7" name="Slide Number Placeholder 6">
             <a:extLst>
               <a:ext uri="{FF2B5EF4-FFF2-40B4-BE49-F238E27FC236}">
-                <a16:creationId xmlns:a16="http://schemas.microsoft.com/office/drawing/2014/main" xmlns="" id="{B41517C1-CBB7-46B0-99AA-8512104026B7}"/>
+                <a16:creationId xmlns="" xmlns:a16="http://schemas.microsoft.com/office/drawing/2014/main" id="{B41517C1-CBB7-46B0-99AA-8512104026B7}"/>
               </a:ext>
             </a:extLst>
           </p:cNvPr>
@@ -27269,7 +27270,7 @@
           <p:cNvPr id="11" name="Freeform: Shape 10">
             <a:extLst>
               <a:ext uri="{FF2B5EF4-FFF2-40B4-BE49-F238E27FC236}">
-                <a16:creationId xmlns:a16="http://schemas.microsoft.com/office/drawing/2014/main" xmlns="" id="{B8EAB5B0-43C3-4F9F-98FF-253CBE6C9668}"/>
+                <a16:creationId xmlns="" xmlns:a16="http://schemas.microsoft.com/office/drawing/2014/main" id="{B8EAB5B0-43C3-4F9F-98FF-253CBE6C9668}"/>
               </a:ext>
             </a:extLst>
           </p:cNvPr>
@@ -27414,7 +27415,7 @@
           <p:cNvPr id="15" name="Freeform: Shape 14">
             <a:extLst>
               <a:ext uri="{FF2B5EF4-FFF2-40B4-BE49-F238E27FC236}">
-                <a16:creationId xmlns:a16="http://schemas.microsoft.com/office/drawing/2014/main" xmlns="" id="{06A97B71-3A84-4844-BDB5-E3F77302BBC0}"/>
+                <a16:creationId xmlns="" xmlns:a16="http://schemas.microsoft.com/office/drawing/2014/main" id="{06A97B71-3A84-4844-BDB5-E3F77302BBC0}"/>
               </a:ext>
             </a:extLst>
           </p:cNvPr>
@@ -27522,7 +27523,7 @@
           <p:cNvPr id="16" name="Freeform: Shape 15">
             <a:extLst>
               <a:ext uri="{FF2B5EF4-FFF2-40B4-BE49-F238E27FC236}">
-                <a16:creationId xmlns:a16="http://schemas.microsoft.com/office/drawing/2014/main" xmlns="" id="{030939C4-65C9-4508-8EFE-F715B9946844}"/>
+                <a16:creationId xmlns="" xmlns:a16="http://schemas.microsoft.com/office/drawing/2014/main" id="{030939C4-65C9-4508-8EFE-F715B9946844}"/>
               </a:ext>
             </a:extLst>
           </p:cNvPr>
@@ -27732,7 +27733,7 @@
           <p:cNvPr id="17" name="Freeform: Shape 16">
             <a:extLst>
               <a:ext uri="{FF2B5EF4-FFF2-40B4-BE49-F238E27FC236}">
-                <a16:creationId xmlns:a16="http://schemas.microsoft.com/office/drawing/2014/main" xmlns="" id="{759BB951-621D-4456-A832-116187764B2E}"/>
+                <a16:creationId xmlns="" xmlns:a16="http://schemas.microsoft.com/office/drawing/2014/main" id="{759BB951-621D-4456-A832-116187764B2E}"/>
               </a:ext>
             </a:extLst>
           </p:cNvPr>
@@ -27848,7 +27849,7 @@
           <p:cNvPr id="18" name="Freeform: Shape 17">
             <a:extLst>
               <a:ext uri="{FF2B5EF4-FFF2-40B4-BE49-F238E27FC236}">
-                <a16:creationId xmlns:a16="http://schemas.microsoft.com/office/drawing/2014/main" xmlns="" id="{3F8008CE-2F0A-4568-9C4A-C347A4880513}"/>
+                <a16:creationId xmlns="" xmlns:a16="http://schemas.microsoft.com/office/drawing/2014/main" id="{3F8008CE-2F0A-4568-9C4A-C347A4880513}"/>
               </a:ext>
             </a:extLst>
           </p:cNvPr>
@@ -28084,7 +28085,7 @@
           <p:cNvPr id="19" name="Title 2">
             <a:extLst>
               <a:ext uri="{FF2B5EF4-FFF2-40B4-BE49-F238E27FC236}">
-                <a16:creationId xmlns:a16="http://schemas.microsoft.com/office/drawing/2014/main" xmlns="" id="{3A926948-B9C1-4E84-AF0F-40965A132C47}"/>
+                <a16:creationId xmlns="" xmlns:a16="http://schemas.microsoft.com/office/drawing/2014/main" id="{3A926948-B9C1-4E84-AF0F-40965A132C47}"/>
               </a:ext>
             </a:extLst>
           </p:cNvPr>
@@ -28131,7 +28132,7 @@
           <p:cNvPr id="10" name="Group 9">
             <a:extLst>
               <a:ext uri="{FF2B5EF4-FFF2-40B4-BE49-F238E27FC236}">
-                <a16:creationId xmlns:a16="http://schemas.microsoft.com/office/drawing/2014/main" xmlns="" id="{223A17C7-5A8B-4D9D-AC8A-2486018F3FB8}"/>
+                <a16:creationId xmlns="" xmlns:a16="http://schemas.microsoft.com/office/drawing/2014/main" id="{223A17C7-5A8B-4D9D-AC8A-2486018F3FB8}"/>
               </a:ext>
             </a:extLst>
           </p:cNvPr>
@@ -28151,7 +28152,7 @@
             <p:cNvPr id="3" name="Freeform: Shape 2">
               <a:extLst>
                 <a:ext uri="{FF2B5EF4-FFF2-40B4-BE49-F238E27FC236}">
-                  <a16:creationId xmlns:a16="http://schemas.microsoft.com/office/drawing/2014/main" xmlns="" id="{C42001FF-B76E-4445-BDE5-6BFAD41EBBD4}"/>
+                  <a16:creationId xmlns="" xmlns:a16="http://schemas.microsoft.com/office/drawing/2014/main" id="{C42001FF-B76E-4445-BDE5-6BFAD41EBBD4}"/>
                 </a:ext>
               </a:extLst>
             </p:cNvPr>
@@ -28259,7 +28260,7 @@
             <p:cNvPr id="4" name="Freeform: Shape 3">
               <a:extLst>
                 <a:ext uri="{FF2B5EF4-FFF2-40B4-BE49-F238E27FC236}">
-                  <a16:creationId xmlns:a16="http://schemas.microsoft.com/office/drawing/2014/main" xmlns="" id="{55EB89C3-8B52-4763-9DB2-C51CC8AF377C}"/>
+                  <a16:creationId xmlns="" xmlns:a16="http://schemas.microsoft.com/office/drawing/2014/main" id="{55EB89C3-8B52-4763-9DB2-C51CC8AF377C}"/>
                 </a:ext>
               </a:extLst>
             </p:cNvPr>
@@ -28457,7 +28458,7 @@
             <p:cNvPr id="5" name="Freeform: Shape 4">
               <a:extLst>
                 <a:ext uri="{FF2B5EF4-FFF2-40B4-BE49-F238E27FC236}">
-                  <a16:creationId xmlns:a16="http://schemas.microsoft.com/office/drawing/2014/main" xmlns="" id="{8F230BC5-B028-4266-A395-BFB56DFDC484}"/>
+                  <a16:creationId xmlns="" xmlns:a16="http://schemas.microsoft.com/office/drawing/2014/main" id="{8F230BC5-B028-4266-A395-BFB56DFDC484}"/>
                 </a:ext>
               </a:extLst>
             </p:cNvPr>
@@ -28565,7 +28566,7 @@
             <p:cNvPr id="9" name="Freeform: Shape 8">
               <a:extLst>
                 <a:ext uri="{FF2B5EF4-FFF2-40B4-BE49-F238E27FC236}">
-                  <a16:creationId xmlns:a16="http://schemas.microsoft.com/office/drawing/2014/main" xmlns="" id="{5A52C234-DC7D-488B-8975-61485991A4A8}"/>
+                  <a16:creationId xmlns="" xmlns:a16="http://schemas.microsoft.com/office/drawing/2014/main" id="{5A52C234-DC7D-488B-8975-61485991A4A8}"/>
                 </a:ext>
               </a:extLst>
             </p:cNvPr>
@@ -28761,7 +28762,7 @@
           <p:cNvPr id="2" name="Title Placeholder 1">
             <a:extLst>
               <a:ext uri="{FF2B5EF4-FFF2-40B4-BE49-F238E27FC236}">
-                <a16:creationId xmlns:a16="http://schemas.microsoft.com/office/drawing/2014/main" xmlns="" id="{A8DB6A3A-74E6-4FE2-8AD2-CEB070447182}"/>
+                <a16:creationId xmlns="" xmlns:a16="http://schemas.microsoft.com/office/drawing/2014/main" id="{A8DB6A3A-74E6-4FE2-8AD2-CEB070447182}"/>
               </a:ext>
             </a:extLst>
           </p:cNvPr>
@@ -28800,7 +28801,7 @@
           <p:cNvPr id="3" name="Text Placeholder 2">
             <a:extLst>
               <a:ext uri="{FF2B5EF4-FFF2-40B4-BE49-F238E27FC236}">
-                <a16:creationId xmlns:a16="http://schemas.microsoft.com/office/drawing/2014/main" xmlns="" id="{2C0128AA-FDF4-4DD5-A009-3C58D24570F2}"/>
+                <a16:creationId xmlns="" xmlns:a16="http://schemas.microsoft.com/office/drawing/2014/main" id="{2C0128AA-FDF4-4DD5-A009-3C58D24570F2}"/>
               </a:ext>
             </a:extLst>
           </p:cNvPr>
@@ -28868,7 +28869,7 @@
           <p:cNvPr id="4" name="Date Placeholder 3">
             <a:extLst>
               <a:ext uri="{FF2B5EF4-FFF2-40B4-BE49-F238E27FC236}">
-                <a16:creationId xmlns:a16="http://schemas.microsoft.com/office/drawing/2014/main" xmlns="" id="{BB1C2DC0-7E13-4A66-9F9B-371BA9C6E4F1}"/>
+                <a16:creationId xmlns="" xmlns:a16="http://schemas.microsoft.com/office/drawing/2014/main" id="{BB1C2DC0-7E13-4A66-9F9B-371BA9C6E4F1}"/>
               </a:ext>
             </a:extLst>
           </p:cNvPr>
@@ -28914,7 +28915,7 @@
           <p:cNvPr id="6" name="Slide Number Placeholder 5">
             <a:extLst>
               <a:ext uri="{FF2B5EF4-FFF2-40B4-BE49-F238E27FC236}">
-                <a16:creationId xmlns:a16="http://schemas.microsoft.com/office/drawing/2014/main" xmlns="" id="{9475097E-EB08-4475-9112-275B8402794C}"/>
+                <a16:creationId xmlns="" xmlns:a16="http://schemas.microsoft.com/office/drawing/2014/main" id="{9475097E-EB08-4475-9112-275B8402794C}"/>
               </a:ext>
             </a:extLst>
           </p:cNvPr>
@@ -28960,7 +28961,7 @@
           <p:cNvPr id="11" name="Footer Placeholder 4">
             <a:extLst>
               <a:ext uri="{FF2B5EF4-FFF2-40B4-BE49-F238E27FC236}">
-                <a16:creationId xmlns:a16="http://schemas.microsoft.com/office/drawing/2014/main" xmlns="" id="{1F296578-6D40-435B-861E-0904DDC10B7C}"/>
+                <a16:creationId xmlns="" xmlns:a16="http://schemas.microsoft.com/office/drawing/2014/main" id="{1F296578-6D40-435B-861E-0904DDC10B7C}"/>
               </a:ext>
             </a:extLst>
           </p:cNvPr>
@@ -29390,7 +29391,7 @@
           <p:cNvPr id="3" name="Text Placeholder 2">
             <a:extLst>
               <a:ext uri="{FF2B5EF4-FFF2-40B4-BE49-F238E27FC236}">
-                <a16:creationId xmlns:a16="http://schemas.microsoft.com/office/drawing/2014/main" xmlns="" id="{D46DC636-DB75-49A5-B764-91FF21804DA0}"/>
+                <a16:creationId xmlns="" xmlns:a16="http://schemas.microsoft.com/office/drawing/2014/main" id="{D46DC636-DB75-49A5-B764-91FF21804DA0}"/>
               </a:ext>
             </a:extLst>
           </p:cNvPr>
@@ -29555,7 +29556,7 @@
           <p:cNvPr id="4" name="Text Placeholder 3">
             <a:extLst>
               <a:ext uri="{FF2B5EF4-FFF2-40B4-BE49-F238E27FC236}">
-                <a16:creationId xmlns:a16="http://schemas.microsoft.com/office/drawing/2014/main" xmlns="" id="{EE5A967A-4C75-4949-9D48-17FD2D8B8B59}"/>
+                <a16:creationId xmlns="" xmlns:a16="http://schemas.microsoft.com/office/drawing/2014/main" id="{EE5A967A-4C75-4949-9D48-17FD2D8B8B59}"/>
               </a:ext>
             </a:extLst>
           </p:cNvPr>
@@ -29649,7 +29650,7 @@
           <p:cNvPr id="7" name="Text Placeholder 6">
             <a:extLst>
               <a:ext uri="{FF2B5EF4-FFF2-40B4-BE49-F238E27FC236}">
-                <a16:creationId xmlns:a16="http://schemas.microsoft.com/office/drawing/2014/main" xmlns="" id="{D10F5C8F-9E7F-4E64-9AF6-329D1654118B}"/>
+                <a16:creationId xmlns="" xmlns:a16="http://schemas.microsoft.com/office/drawing/2014/main" id="{D10F5C8F-9E7F-4E64-9AF6-329D1654118B}"/>
               </a:ext>
             </a:extLst>
           </p:cNvPr>
@@ -29862,7 +29863,7 @@
           <p:cNvPr id="16" name="Text Placeholder 3">
             <a:extLst>
               <a:ext uri="{FF2B5EF4-FFF2-40B4-BE49-F238E27FC236}">
-                <a16:creationId xmlns:a16="http://schemas.microsoft.com/office/drawing/2014/main" xmlns="" id="{EE5A967A-4C75-4949-9D48-17FD2D8B8B59}"/>
+                <a16:creationId xmlns="" xmlns:a16="http://schemas.microsoft.com/office/drawing/2014/main" id="{EE5A967A-4C75-4949-9D48-17FD2D8B8B59}"/>
               </a:ext>
             </a:extLst>
           </p:cNvPr>
@@ -30097,7 +30098,7 @@
           <p:cNvPr id="5" name="Slide Number Placeholder 4">
             <a:extLst>
               <a:ext uri="{FF2B5EF4-FFF2-40B4-BE49-F238E27FC236}">
-                <a16:creationId xmlns:a16="http://schemas.microsoft.com/office/drawing/2014/main" xmlns="" id="{CFEE48EC-430B-4D42-9565-527E52286C4D}"/>
+                <a16:creationId xmlns="" xmlns:a16="http://schemas.microsoft.com/office/drawing/2014/main" id="{CFEE48EC-430B-4D42-9565-527E52286C4D}"/>
               </a:ext>
             </a:extLst>
           </p:cNvPr>
@@ -30169,7 +30170,7 @@
       </p:sp>
       <p:pic>
         <p:nvPicPr>
-          <p:cNvPr id="4" name="Imagen 3"/>
+          <p:cNvPr id="2" name="Imagen 1"/>
           <p:cNvPicPr>
             <a:picLocks noChangeAspect="1"/>
           </p:cNvPicPr>
@@ -30183,8 +30184,8 @@
         </p:blipFill>
         <p:spPr>
           <a:xfrm>
-            <a:off x="1818409" y="1471709"/>
-            <a:ext cx="8379659" cy="4713558"/>
+            <a:off x="1604952" y="1194955"/>
+            <a:ext cx="8950033" cy="5034394"/>
           </a:xfrm>
           <a:prstGeom prst="rect">
             <a:avLst/>
@@ -30226,7 +30227,7 @@
           <p:cNvPr id="3" name="Text Placeholder 2">
             <a:extLst>
               <a:ext uri="{FF2B5EF4-FFF2-40B4-BE49-F238E27FC236}">
-                <a16:creationId xmlns:a16="http://schemas.microsoft.com/office/drawing/2014/main" xmlns="" id="{C9DF92D8-1371-40FE-AB90-C65DFF928F5D}"/>
+                <a16:creationId xmlns="" xmlns:a16="http://schemas.microsoft.com/office/drawing/2014/main" id="{C9DF92D8-1371-40FE-AB90-C65DFF928F5D}"/>
               </a:ext>
             </a:extLst>
           </p:cNvPr>
@@ -30276,7 +30277,7 @@
           <p:cNvPr id="5" name="Slide Number Placeholder 4">
             <a:extLst>
               <a:ext uri="{FF2B5EF4-FFF2-40B4-BE49-F238E27FC236}">
-                <a16:creationId xmlns:a16="http://schemas.microsoft.com/office/drawing/2014/main" xmlns="" id="{CFEE48EC-430B-4D42-9565-527E52286C4D}"/>
+                <a16:creationId xmlns="" xmlns:a16="http://schemas.microsoft.com/office/drawing/2014/main" id="{CFEE48EC-430B-4D42-9565-527E52286C4D}"/>
               </a:ext>
             </a:extLst>
           </p:cNvPr>
@@ -30329,7 +30330,7 @@
           <p:cNvPr id="8" name="Text Placeholder 2">
             <a:extLst>
               <a:ext uri="{FF2B5EF4-FFF2-40B4-BE49-F238E27FC236}">
-                <a16:creationId xmlns:a16="http://schemas.microsoft.com/office/drawing/2014/main" xmlns="" id="{C9DF92D8-1371-40FE-AB90-C65DFF928F5D}"/>
+                <a16:creationId xmlns="" xmlns:a16="http://schemas.microsoft.com/office/drawing/2014/main" id="{C9DF92D8-1371-40FE-AB90-C65DFF928F5D}"/>
               </a:ext>
             </a:extLst>
           </p:cNvPr>
@@ -30412,7 +30413,7 @@
           <p:cNvPr id="12" name="Text Placeholder 2">
             <a:extLst>
               <a:ext uri="{FF2B5EF4-FFF2-40B4-BE49-F238E27FC236}">
-                <a16:creationId xmlns:a16="http://schemas.microsoft.com/office/drawing/2014/main" xmlns="" id="{C9DF92D8-1371-40FE-AB90-C65DFF928F5D}"/>
+                <a16:creationId xmlns="" xmlns:a16="http://schemas.microsoft.com/office/drawing/2014/main" id="{C9DF92D8-1371-40FE-AB90-C65DFF928F5D}"/>
               </a:ext>
             </a:extLst>
           </p:cNvPr>
@@ -30505,7 +30506,7 @@
           <p:cNvPr id="5" name="Slide Number Placeholder 4">
             <a:extLst>
               <a:ext uri="{FF2B5EF4-FFF2-40B4-BE49-F238E27FC236}">
-                <a16:creationId xmlns:a16="http://schemas.microsoft.com/office/drawing/2014/main" xmlns="" id="{CFEE48EC-430B-4D42-9565-527E52286C4D}"/>
+                <a16:creationId xmlns="" xmlns:a16="http://schemas.microsoft.com/office/drawing/2014/main" id="{CFEE48EC-430B-4D42-9565-527E52286C4D}"/>
               </a:ext>
             </a:extLst>
           </p:cNvPr>
@@ -30561,14 +30562,6 @@
               </a:rPr>
               <a:t>REASON FOR THE SELECTION OF THE SUBJECT</a:t>
             </a:r>
-            <a:endParaRPr lang="en-US" dirty="0">
-              <a:solidFill>
-                <a:schemeClr val="tx1">
-                  <a:lumMod val="65000"/>
-                  <a:lumOff val="35000"/>
-                </a:schemeClr>
-              </a:solidFill>
-            </a:endParaRPr>
           </a:p>
         </p:txBody>
       </p:sp>
@@ -30630,7 +30623,7 @@
           <p:cNvPr id="5" name="Slide Number Placeholder 4">
             <a:extLst>
               <a:ext uri="{FF2B5EF4-FFF2-40B4-BE49-F238E27FC236}">
-                <a16:creationId xmlns:a16="http://schemas.microsoft.com/office/drawing/2014/main" xmlns="" id="{CFEE48EC-430B-4D42-9565-527E52286C4D}"/>
+                <a16:creationId xmlns="" xmlns:a16="http://schemas.microsoft.com/office/drawing/2014/main" id="{CFEE48EC-430B-4D42-9565-527E52286C4D}"/>
               </a:ext>
             </a:extLst>
           </p:cNvPr>
@@ -30688,14 +30681,6 @@
               </a:rPr>
               <a:t>3.-KNOWLEDGE OF THE CURRENT SITUATION</a:t>
             </a:r>
-            <a:endParaRPr lang="en-US" sz="3600" dirty="0">
-              <a:solidFill>
-                <a:schemeClr val="tx1">
-                  <a:lumMod val="65000"/>
-                  <a:lumOff val="35000"/>
-                </a:schemeClr>
-              </a:solidFill>
-            </a:endParaRPr>
           </a:p>
         </p:txBody>
       </p:sp>
@@ -30780,7 +30765,7 @@
           <p:cNvPr id="5" name="Slide Number Placeholder 4">
             <a:extLst>
               <a:ext uri="{FF2B5EF4-FFF2-40B4-BE49-F238E27FC236}">
-                <a16:creationId xmlns:a16="http://schemas.microsoft.com/office/drawing/2014/main" xmlns="" id="{CFEE48EC-430B-4D42-9565-527E52286C4D}"/>
+                <a16:creationId xmlns="" xmlns:a16="http://schemas.microsoft.com/office/drawing/2014/main" id="{CFEE48EC-430B-4D42-9565-527E52286C4D}"/>
               </a:ext>
             </a:extLst>
           </p:cNvPr>
@@ -30838,14 +30823,6 @@
               </a:rPr>
               <a:t>3.-KNOWLEDGE OF THE CURRENT SITUATION</a:t>
             </a:r>
-            <a:endParaRPr lang="en-US" sz="3600" dirty="0">
-              <a:solidFill>
-                <a:schemeClr val="tx1">
-                  <a:lumMod val="65000"/>
-                  <a:lumOff val="35000"/>
-                </a:schemeClr>
-              </a:solidFill>
-            </a:endParaRPr>
           </a:p>
         </p:txBody>
       </p:sp>
@@ -30907,7 +30884,7 @@
           <p:cNvPr id="5" name="Slide Number Placeholder 4">
             <a:extLst>
               <a:ext uri="{FF2B5EF4-FFF2-40B4-BE49-F238E27FC236}">
-                <a16:creationId xmlns:a16="http://schemas.microsoft.com/office/drawing/2014/main" xmlns="" id="{CFEE48EC-430B-4D42-9565-527E52286C4D}"/>
+                <a16:creationId xmlns="" xmlns:a16="http://schemas.microsoft.com/office/drawing/2014/main" id="{CFEE48EC-430B-4D42-9565-527E52286C4D}"/>
               </a:ext>
             </a:extLst>
           </p:cNvPr>
@@ -30963,7 +30940,18 @@
                   </a:schemeClr>
                 </a:solidFill>
               </a:rPr>
-              <a:t>4.-ESTABLISHMENT OF THE OBJECTIVE</a:t>
+              <a:t>4</a:t>
+            </a:r>
+            <a:r>
+              <a:rPr lang="en-US" sz="3600" dirty="0">
+                <a:solidFill>
+                  <a:schemeClr val="tx1">
+                    <a:lumMod val="65000"/>
+                    <a:lumOff val="35000"/>
+                  </a:schemeClr>
+                </a:solidFill>
+              </a:rPr>
+              <a:t>.- Create an Activity Plan</a:t>
             </a:r>
             <a:endParaRPr lang="en-US" sz="3600" dirty="0">
               <a:solidFill>
@@ -30978,7 +30966,7 @@
       </p:sp>
       <p:pic>
         <p:nvPicPr>
-          <p:cNvPr id="9" name="Imagen 8"/>
+          <p:cNvPr id="4" name="Imagen 3"/>
           <p:cNvPicPr>
             <a:picLocks noChangeAspect="1"/>
           </p:cNvPicPr>
@@ -30986,13 +30974,13 @@
         </p:nvPicPr>
         <p:blipFill rotWithShape="1">
           <a:blip r:embed="rId2"/>
-          <a:srcRect l="31896" t="34935" r="18779" b="22537"/>
+          <a:srcRect l="1330" t="26398" r="44997" b="10154"/>
           <a:stretch/>
         </p:blipFill>
         <p:spPr>
           <a:xfrm>
-            <a:off x="1199408" y="1543791"/>
-            <a:ext cx="9010703" cy="4370120"/>
+            <a:off x="1679943" y="981240"/>
+            <a:ext cx="8155173" cy="5422604"/>
           </a:xfrm>
           <a:prstGeom prst="rect">
             <a:avLst/>
@@ -31003,6 +30991,206 @@
     <p:extLst>
       <p:ext uri="{BB962C8B-B14F-4D97-AF65-F5344CB8AC3E}">
         <p14:creationId xmlns:p14="http://schemas.microsoft.com/office/powerpoint/2010/main" val="2185023096"/>
+      </p:ext>
+    </p:extLst>
+  </p:cSld>
+  <p:clrMapOvr>
+    <a:masterClrMapping/>
+  </p:clrMapOvr>
+</p:sld>
+</file>
+
+<file path=ppt/slides/slide8.xml><?xml version="1.0" encoding="utf-8"?>
+<p:sld xmlns:a="http://schemas.openxmlformats.org/drawingml/2006/main" xmlns:r="http://schemas.openxmlformats.org/officeDocument/2006/relationships" xmlns:p="http://schemas.openxmlformats.org/presentationml/2006/main">
+  <p:cSld>
+    <p:spTree>
+      <p:nvGrpSpPr>
+        <p:cNvPr id="1" name=""/>
+        <p:cNvGrpSpPr/>
+        <p:nvPr/>
+      </p:nvGrpSpPr>
+      <p:grpSpPr>
+        <a:xfrm>
+          <a:off x="0" y="0"/>
+          <a:ext cx="0" cy="0"/>
+          <a:chOff x="0" y="0"/>
+          <a:chExt cx="0" cy="0"/>
+        </a:xfrm>
+      </p:grpSpPr>
+      <p:sp>
+        <p:nvSpPr>
+          <p:cNvPr id="5" name="Slide Number Placeholder 4">
+            <a:extLst>
+              <a:ext uri="{FF2B5EF4-FFF2-40B4-BE49-F238E27FC236}">
+                <a16:creationId xmlns="" xmlns:a16="http://schemas.microsoft.com/office/drawing/2014/main" id="{CFEE48EC-430B-4D42-9565-527E52286C4D}"/>
+              </a:ext>
+            </a:extLst>
+          </p:cNvPr>
+          <p:cNvSpPr>
+            <a:spLocks noGrp="1"/>
+          </p:cNvSpPr>
+          <p:nvPr>
+            <p:ph type="sldNum" sz="quarter" idx="12"/>
+          </p:nvPr>
+        </p:nvSpPr>
+        <p:spPr/>
+        <p:txBody>
+          <a:bodyPr/>
+          <a:lstStyle/>
+          <a:p>
+            <a:fld id="{D495E168-DA5E-4888-8D8A-92B118324C14}" type="slidenum">
+              <a:rPr lang="ru-RU" smtClean="0"/>
+              <a:pPr/>
+              <a:t>8</a:t>
+            </a:fld>
+            <a:endParaRPr lang="ru-RU" dirty="0"/>
+          </a:p>
+        </p:txBody>
+      </p:sp>
+      <p:sp>
+        <p:nvSpPr>
+          <p:cNvPr id="10" name="Title 8"/>
+          <p:cNvSpPr>
+            <a:spLocks noGrp="1"/>
+          </p:cNvSpPr>
+          <p:nvPr>
+            <p:ph type="title"/>
+          </p:nvPr>
+        </p:nvSpPr>
+        <p:spPr>
+          <a:xfrm>
+            <a:off x="50290" y="81139"/>
+            <a:ext cx="11047201" cy="676275"/>
+          </a:xfrm>
+        </p:spPr>
+        <p:txBody>
+          <a:bodyPr>
+            <a:normAutofit/>
+          </a:bodyPr>
+          <a:lstStyle/>
+          <a:p>
+            <a:r>
+              <a:rPr lang="en-US" sz="3600" dirty="0">
+                <a:solidFill>
+                  <a:schemeClr val="tx1">
+                    <a:lumMod val="65000"/>
+                    <a:lumOff val="35000"/>
+                  </a:schemeClr>
+                </a:solidFill>
+              </a:rPr>
+              <a:t>5</a:t>
+            </a:r>
+            <a:r>
+              <a:rPr lang="en-US" sz="3600" dirty="0" smtClean="0">
+                <a:solidFill>
+                  <a:schemeClr val="tx1">
+                    <a:lumMod val="65000"/>
+                    <a:lumOff val="35000"/>
+                  </a:schemeClr>
+                </a:solidFill>
+              </a:rPr>
+              <a:t>.-</a:t>
+            </a:r>
+            <a:r>
+              <a:rPr lang="en-US" sz="3600" dirty="0">
+                <a:solidFill>
+                  <a:schemeClr val="tx1">
+                    <a:lumMod val="65000"/>
+                    <a:lumOff val="35000"/>
+                  </a:schemeClr>
+                </a:solidFill>
+              </a:rPr>
+              <a:t>Analysis</a:t>
+            </a:r>
+            <a:endParaRPr lang="en-US" sz="3600" dirty="0">
+              <a:solidFill>
+                <a:schemeClr val="tx1">
+                  <a:lumMod val="65000"/>
+                  <a:lumOff val="35000"/>
+                </a:schemeClr>
+              </a:solidFill>
+            </a:endParaRPr>
+          </a:p>
+        </p:txBody>
+      </p:sp>
+      <p:pic>
+        <p:nvPicPr>
+          <p:cNvPr id="2" name="Imagen 1"/>
+          <p:cNvPicPr>
+            <a:picLocks noChangeAspect="1"/>
+          </p:cNvPicPr>
+          <p:nvPr/>
+        </p:nvPicPr>
+        <p:blipFill rotWithShape="1">
+          <a:blip r:embed="rId2"/>
+          <a:srcRect l="2465" t="27736" r="1953" b="43364"/>
+          <a:stretch/>
+        </p:blipFill>
+        <p:spPr>
+          <a:xfrm>
+            <a:off x="233773" y="2580805"/>
+            <a:ext cx="11757578" cy="1999647"/>
+          </a:xfrm>
+          <a:prstGeom prst="rect">
+            <a:avLst/>
+          </a:prstGeom>
+        </p:spPr>
+      </p:pic>
+      <p:sp>
+        <p:nvSpPr>
+          <p:cNvPr id="6" name="TextBox 28"/>
+          <p:cNvSpPr txBox="1"/>
+          <p:nvPr/>
+        </p:nvSpPr>
+        <p:spPr>
+          <a:xfrm>
+            <a:off x="976180" y="5044674"/>
+            <a:ext cx="9195419" cy="1169551"/>
+          </a:xfrm>
+          <a:prstGeom prst="rect">
+            <a:avLst/>
+          </a:prstGeom>
+          <a:solidFill>
+            <a:srgbClr val="FFB1FE">
+              <a:alpha val="25098"/>
+            </a:srgbClr>
+          </a:solidFill>
+          <a:ln>
+            <a:solidFill>
+              <a:schemeClr val="accent3"/>
+            </a:solidFill>
+          </a:ln>
+        </p:spPr>
+        <p:txBody>
+          <a:bodyPr wrap="square" rtlCol="0">
+            <a:spAutoFit/>
+          </a:bodyPr>
+          <a:lstStyle/>
+          <a:p>
+            <a:r>
+              <a:rPr lang="en-US" b="1" u="sng" dirty="0"/>
+              <a:t>CONCLUTION:</a:t>
+            </a:r>
+          </a:p>
+          <a:p>
+            <a:endParaRPr lang="en-US" b="1" u="sng" dirty="0"/>
+          </a:p>
+          <a:p>
+            <a:r>
+              <a:rPr lang="en-US" dirty="0"/>
+              <a:t>What you want to avoid is the mixing of waste in the container modules, and time is one of the biggest factors in this problem. </a:t>
+            </a:r>
+            <a:endParaRPr lang="en-US" dirty="0"/>
+          </a:p>
+          <a:p>
+            <a:endParaRPr lang="en-US" dirty="0"/>
+          </a:p>
+        </p:txBody>
+      </p:sp>
+    </p:spTree>
+    <p:extLst>
+      <p:ext uri="{BB962C8B-B14F-4D97-AF65-F5344CB8AC3E}">
+        <p14:creationId xmlns:p14="http://schemas.microsoft.com/office/powerpoint/2010/main" val="2132331320"/>
       </p:ext>
     </p:extLst>
   </p:cSld>
@@ -31832,6 +32020,24 @@
 </file>
 
 <file path=customXml/item1.xml><?xml version="1.0" encoding="utf-8"?>
+<?mso-contentType ?>
+<FormTemplates xmlns="http://schemas.microsoft.com/sharepoint/v3/contenttype/forms">
+  <Display>DocumentLibraryForm</Display>
+  <Edit>DocumentLibraryForm</Edit>
+  <New>DocumentLibraryForm</New>
+</FormTemplates>
+</file>
+
+<file path=customXml/item2.xml><?xml version="1.0" encoding="utf-8"?>
+<p:properties xmlns:p="http://schemas.microsoft.com/office/2006/metadata/properties" xmlns:xsi="http://www.w3.org/2001/XMLSchema-instance" xmlns:pc="http://schemas.microsoft.com/office/infopath/2007/PartnerControls">
+  <documentManagement>
+    <_ip_UnifiedCompliancePolicyUIAction xmlns="http://schemas.microsoft.com/sharepoint/v3" xsi:nil="true"/>
+    <_ip_UnifiedCompliancePolicyProperties xmlns="http://schemas.microsoft.com/sharepoint/v3" xsi:nil="true"/>
+  </documentManagement>
+</p:properties>
+</file>
+
+<file path=customXml/item3.xml><?xml version="1.0" encoding="utf-8"?>
 <ct:contentTypeSchema xmlns:ct="http://schemas.microsoft.com/office/2006/metadata/contentType" xmlns:ma="http://schemas.microsoft.com/office/2006/metadata/properties/metaAttributes" ct:_="" ma:_="" ma:contentTypeName="Document" ma:contentTypeID="0x010100DEEA25CC0A0AC24199CDC46C25B8B0BC" ma:contentTypeVersion="10" ma:contentTypeDescription="Create a new document." ma:contentTypeScope="" ma:versionID="e3b47856d4cf355c0dacb39e1084d14f">
   <xsd:schema xmlns:xsd="http://www.w3.org/2001/XMLSchema" xmlns:xs="http://www.w3.org/2001/XMLSchema" xmlns:p="http://schemas.microsoft.com/office/2006/metadata/properties" xmlns:ns1="http://schemas.microsoft.com/sharepoint/v3" xmlns:ns2="6dc4bcd6-49db-4c07-9060-8acfc67cef9f" xmlns:ns3="fb0879af-3eba-417a-a55a-ffe6dcd6ca77" targetNamespace="http://schemas.microsoft.com/office/2006/metadata/properties" ma:root="true" ma:fieldsID="a845a615265fdb1f7b12cc65ac20ecbd" ns1:_="" ns2:_="" ns3:_="">
     <xsd:import namespace="http://schemas.microsoft.com/sharepoint/v3"/>
@@ -32039,25 +32245,27 @@
 </ct:contentTypeSchema>
 </file>
 
-<file path=customXml/item2.xml><?xml version="1.0" encoding="utf-8"?>
-<p:properties xmlns:p="http://schemas.microsoft.com/office/2006/metadata/properties" xmlns:xsi="http://www.w3.org/2001/XMLSchema-instance" xmlns:pc="http://schemas.microsoft.com/office/infopath/2007/PartnerControls">
-  <documentManagement>
-    <_ip_UnifiedCompliancePolicyUIAction xmlns="http://schemas.microsoft.com/sharepoint/v3" xsi:nil="true"/>
-    <_ip_UnifiedCompliancePolicyProperties xmlns="http://schemas.microsoft.com/sharepoint/v3" xsi:nil="true"/>
-  </documentManagement>
-</p:properties>
+<file path=customXml/itemProps1.xml><?xml version="1.0" encoding="utf-8"?>
+<ds:datastoreItem xmlns:ds="http://schemas.openxmlformats.org/officeDocument/2006/customXml" ds:itemID="{750F309C-DE10-4641-9043-BB7E781AC404}">
+  <ds:schemaRefs>
+    <ds:schemaRef ds:uri="http://schemas.microsoft.com/sharepoint/v3/contenttype/forms"/>
+  </ds:schemaRefs>
+</ds:datastoreItem>
 </file>
 
-<file path=customXml/item3.xml><?xml version="1.0" encoding="utf-8"?>
-<?mso-contentType ?>
-<FormTemplates xmlns="http://schemas.microsoft.com/sharepoint/v3/contenttype/forms">
-  <Display>DocumentLibraryForm</Display>
-  <Edit>DocumentLibraryForm</Edit>
-  <New>DocumentLibraryForm</New>
-</FormTemplates>
+<file path=customXml/itemProps2.xml><?xml version="1.0" encoding="utf-8"?>
+<ds:datastoreItem xmlns:ds="http://schemas.openxmlformats.org/officeDocument/2006/customXml" ds:itemID="{12024DF7-0783-4549-86B7-A48B29FBA9C2}">
+  <ds:schemaRefs>
+    <ds:schemaRef ds:uri="http://schemas.microsoft.com/office/2006/metadata/properties"/>
+    <ds:schemaRef ds:uri="http://www.w3.org/2000/xmlns/"/>
+    <ds:schemaRef ds:uri="http://schemas.microsoft.com/sharepoint/v3"/>
+    <ds:schemaRef ds:uri="http://www.w3.org/2001/XMLSchema-instance"/>
+    <ds:schemaRef ds:uri="http://schemas.microsoft.com/office/infopath/2007/PartnerControls"/>
+  </ds:schemaRefs>
+</ds:datastoreItem>
 </file>
 
-<file path=customXml/itemProps1.xml><?xml version="1.0" encoding="utf-8"?>
+<file path=customXml/itemProps3.xml><?xml version="1.0" encoding="utf-8"?>
 <ds:datastoreItem xmlns:ds="http://schemas.openxmlformats.org/officeDocument/2006/customXml" ds:itemID="{A6393BED-762D-4FA3-96CF-866F426A043C}">
   <ds:schemaRefs>
     <ds:schemaRef ds:uri="http://schemas.microsoft.com/office/2006/metadata/contentType"/>
@@ -32076,24 +32284,4 @@
     <ds:schemaRef ds:uri="http://schemas.microsoft.com/internal/obd"/>
   </ds:schemaRefs>
 </ds:datastoreItem>
-</file>
-
-<file path=customXml/itemProps2.xml><?xml version="1.0" encoding="utf-8"?>
-<ds:datastoreItem xmlns:ds="http://schemas.openxmlformats.org/officeDocument/2006/customXml" ds:itemID="{12024DF7-0783-4549-86B7-A48B29FBA9C2}">
-  <ds:schemaRefs>
-    <ds:schemaRef ds:uri="http://schemas.microsoft.com/office/2006/metadata/properties"/>
-    <ds:schemaRef ds:uri="http://www.w3.org/2000/xmlns/"/>
-    <ds:schemaRef ds:uri="http://schemas.microsoft.com/sharepoint/v3"/>
-    <ds:schemaRef ds:uri="http://www.w3.org/2001/XMLSchema-instance"/>
-    <ds:schemaRef ds:uri="http://schemas.microsoft.com/office/infopath/2007/PartnerControls"/>
-  </ds:schemaRefs>
-</ds:datastoreItem>
-</file>
-
-<file path=customXml/itemProps3.xml><?xml version="1.0" encoding="utf-8"?>
-<ds:datastoreItem xmlns:ds="http://schemas.openxmlformats.org/officeDocument/2006/customXml" ds:itemID="{750F309C-DE10-4641-9043-BB7E781AC404}">
-  <ds:schemaRefs>
-    <ds:schemaRef ds:uri="http://schemas.microsoft.com/sharepoint/v3/contenttype/forms"/>
-  </ds:schemaRefs>
-</ds:datastoreItem>
 </file>
</xml_diff>